<commit_message>
add some basic info
</commit_message>
<xml_diff>
--- a/bash/Introduction to Bash.pptx
+++ b/bash/Introduction to Bash.pptx
@@ -5,11 +5,24 @@
     <p:sldMasterId id="2147483707" r:id="rId1"/>
   </p:sldMasterIdLst>
   <p:notesMasterIdLst>
-    <p:notesMasterId r:id="rId4"/>
+    <p:notesMasterId r:id="rId17"/>
   </p:notesMasterIdLst>
   <p:sldIdLst>
     <p:sldId id="266" r:id="rId2"/>
-    <p:sldId id="268" r:id="rId3"/>
+    <p:sldId id="269" r:id="rId3"/>
+    <p:sldId id="270" r:id="rId4"/>
+    <p:sldId id="271" r:id="rId5"/>
+    <p:sldId id="272" r:id="rId6"/>
+    <p:sldId id="273" r:id="rId7"/>
+    <p:sldId id="276" r:id="rId8"/>
+    <p:sldId id="277" r:id="rId9"/>
+    <p:sldId id="278" r:id="rId10"/>
+    <p:sldId id="279" r:id="rId11"/>
+    <p:sldId id="280" r:id="rId12"/>
+    <p:sldId id="274" r:id="rId13"/>
+    <p:sldId id="281" r:id="rId14"/>
+    <p:sldId id="275" r:id="rId15"/>
+    <p:sldId id="268" r:id="rId16"/>
   </p:sldIdLst>
   <p:sldSz cx="12192000" cy="6858000"/>
   <p:notesSz cx="6858000" cy="9144000"/>
@@ -3841,6 +3854,1793 @@
 </p:sld>
 </file>
 
+<file path=ppt/slides/slide10.xml><?xml version="1.0" encoding="utf-8"?>
+<p:sld xmlns:a="http://schemas.openxmlformats.org/drawingml/2006/main" xmlns:r="http://schemas.openxmlformats.org/officeDocument/2006/relationships" xmlns:p="http://schemas.openxmlformats.org/presentationml/2006/main">
+  <p:cSld>
+    <p:spTree>
+      <p:nvGrpSpPr>
+        <p:cNvPr id="1" name=""/>
+        <p:cNvGrpSpPr/>
+        <p:nvPr/>
+      </p:nvGrpSpPr>
+      <p:grpSpPr>
+        <a:xfrm>
+          <a:off x="0" y="0"/>
+          <a:ext cx="0" cy="0"/>
+          <a:chOff x="0" y="0"/>
+          <a:chExt cx="0" cy="0"/>
+        </a:xfrm>
+      </p:grpSpPr>
+      <p:sp>
+        <p:nvSpPr>
+          <p:cNvPr id="7" name="Title 6">
+            <a:extLst>
+              <a:ext uri="{FF2B5EF4-FFF2-40B4-BE49-F238E27FC236}">
+                <a16:creationId xmlns:a16="http://schemas.microsoft.com/office/drawing/2014/main" id="{601B20C1-6D2C-410B-9C7D-B09E2AC0F10C}"/>
+              </a:ext>
+            </a:extLst>
+          </p:cNvPr>
+          <p:cNvSpPr>
+            <a:spLocks noGrp="1"/>
+          </p:cNvSpPr>
+          <p:nvPr>
+            <p:ph type="title"/>
+          </p:nvPr>
+        </p:nvSpPr>
+        <p:spPr/>
+        <p:txBody>
+          <a:bodyPr/>
+          <a:lstStyle/>
+          <a:p>
+            <a:r>
+              <a:rPr lang="en-US" dirty="0"/>
+              <a:t>ENVIRONMENT</a:t>
+            </a:r>
+          </a:p>
+        </p:txBody>
+      </p:sp>
+      <p:sp>
+        <p:nvSpPr>
+          <p:cNvPr id="4" name="Date Placeholder 3">
+            <a:extLst>
+              <a:ext uri="{FF2B5EF4-FFF2-40B4-BE49-F238E27FC236}">
+                <a16:creationId xmlns:a16="http://schemas.microsoft.com/office/drawing/2014/main" id="{FDFCF223-64BA-421E-9ED7-B50193B5C5E1}"/>
+              </a:ext>
+            </a:extLst>
+          </p:cNvPr>
+          <p:cNvSpPr>
+            <a:spLocks noGrp="1"/>
+          </p:cNvSpPr>
+          <p:nvPr>
+            <p:ph type="dt" sz="half" idx="10"/>
+          </p:nvPr>
+        </p:nvSpPr>
+        <p:spPr/>
+        <p:txBody>
+          <a:bodyPr/>
+          <a:lstStyle/>
+          <a:p>
+            <a:fld id="{B08FEED8-D7D4-44E9-BFBC-ED06B5996D94}" type="datetime4">
+              <a:rPr lang="en-US" smtClean="0"/>
+              <a:t>August 12, 2019</a:t>
+            </a:fld>
+            <a:endParaRPr lang="en-US" dirty="0"/>
+          </a:p>
+        </p:txBody>
+      </p:sp>
+      <p:sp>
+        <p:nvSpPr>
+          <p:cNvPr id="5" name="Footer Placeholder 4">
+            <a:extLst>
+              <a:ext uri="{FF2B5EF4-FFF2-40B4-BE49-F238E27FC236}">
+                <a16:creationId xmlns:a16="http://schemas.microsoft.com/office/drawing/2014/main" id="{985A19B1-AD30-4909-B986-F717612E68FA}"/>
+              </a:ext>
+            </a:extLst>
+          </p:cNvPr>
+          <p:cNvSpPr>
+            <a:spLocks noGrp="1"/>
+          </p:cNvSpPr>
+          <p:nvPr>
+            <p:ph type="ftr" sz="quarter" idx="11"/>
+          </p:nvPr>
+        </p:nvSpPr>
+        <p:spPr/>
+        <p:txBody>
+          <a:bodyPr/>
+          <a:lstStyle/>
+          <a:p>
+            <a:r>
+              <a:rPr lang="en-US"/>
+              <a:t>Digital Scholarship Services </a:t>
+            </a:r>
+            <a:r>
+              <a:rPr lang="en-US">
+                <a:solidFill>
+                  <a:schemeClr val="accent1">
+                    <a:lumMod val="50000"/>
+                  </a:schemeClr>
+                </a:solidFill>
+              </a:rPr>
+              <a:t>| Email</a:t>
+            </a:r>
+            <a:r>
+              <a:rPr lang="en-US"/>
+              <a:t> cf24@rice.edu </a:t>
+            </a:r>
+            <a:r>
+              <a:rPr lang="en-US">
+                <a:solidFill>
+                  <a:schemeClr val="accent1">
+                    <a:lumMod val="50000"/>
+                  </a:schemeClr>
+                </a:solidFill>
+              </a:rPr>
+              <a:t>|</a:t>
+            </a:r>
+            <a:r>
+              <a:rPr lang="en-US"/>
+              <a:t> library.rice.edu/dss</a:t>
+            </a:r>
+            <a:endParaRPr lang="en-US" dirty="0"/>
+          </a:p>
+        </p:txBody>
+      </p:sp>
+      <p:sp>
+        <p:nvSpPr>
+          <p:cNvPr id="6" name="Slide Number Placeholder 5">
+            <a:extLst>
+              <a:ext uri="{FF2B5EF4-FFF2-40B4-BE49-F238E27FC236}">
+                <a16:creationId xmlns:a16="http://schemas.microsoft.com/office/drawing/2014/main" id="{75C4D062-ACF2-41DA-A700-03DC514486D1}"/>
+              </a:ext>
+            </a:extLst>
+          </p:cNvPr>
+          <p:cNvSpPr>
+            <a:spLocks noGrp="1"/>
+          </p:cNvSpPr>
+          <p:nvPr>
+            <p:ph type="sldNum" sz="quarter" idx="12"/>
+          </p:nvPr>
+        </p:nvSpPr>
+        <p:spPr/>
+        <p:txBody>
+          <a:bodyPr/>
+          <a:lstStyle/>
+          <a:p>
+            <a:fld id="{D57F1E4F-1CFF-5643-939E-02111984F565}" type="slidenum">
+              <a:rPr lang="en-US" smtClean="0"/>
+              <a:t>10</a:t>
+            </a:fld>
+            <a:endParaRPr lang="en-US" dirty="0"/>
+          </a:p>
+        </p:txBody>
+      </p:sp>
+      <p:sp>
+        <p:nvSpPr>
+          <p:cNvPr id="10" name="Content Placeholder 2">
+            <a:extLst>
+              <a:ext uri="{FF2B5EF4-FFF2-40B4-BE49-F238E27FC236}">
+                <a16:creationId xmlns:a16="http://schemas.microsoft.com/office/drawing/2014/main" id="{507A9182-6C57-44EB-967D-7501C299A75A}"/>
+              </a:ext>
+            </a:extLst>
+          </p:cNvPr>
+          <p:cNvSpPr txBox="1">
+            <a:spLocks/>
+          </p:cNvSpPr>
+          <p:nvPr/>
+        </p:nvSpPr>
+        <p:spPr>
+          <a:xfrm>
+            <a:off x="838199" y="1825625"/>
+            <a:ext cx="10515599" cy="4351338"/>
+          </a:xfrm>
+          <a:prstGeom prst="rect">
+            <a:avLst/>
+          </a:prstGeom>
+        </p:spPr>
+        <p:txBody>
+          <a:bodyPr vert="horz" lIns="91440" tIns="45720" rIns="91440" bIns="45720" rtlCol="0">
+            <a:normAutofit/>
+          </a:bodyPr>
+          <a:lstStyle>
+            <a:lvl1pPr marL="228600" indent="-228600" algn="l" defTabSz="914400" rtl="0" eaLnBrk="1" latinLnBrk="0" hangingPunct="1">
+              <a:lnSpc>
+                <a:spcPct val="90000"/>
+              </a:lnSpc>
+              <a:spcBef>
+                <a:spcPts val="1000"/>
+              </a:spcBef>
+              <a:buFont typeface="Arial" panose="020B0604020202020204" pitchFamily="34" charset="0"/>
+              <a:buChar char="•"/>
+              <a:defRPr sz="2800" kern="1200">
+                <a:solidFill>
+                  <a:schemeClr val="tx1"/>
+                </a:solidFill>
+                <a:latin typeface="+mn-lt"/>
+                <a:ea typeface="+mn-ea"/>
+                <a:cs typeface="+mn-cs"/>
+              </a:defRPr>
+            </a:lvl1pPr>
+            <a:lvl2pPr marL="685800" indent="-228600" algn="l" defTabSz="914400" rtl="0" eaLnBrk="1" latinLnBrk="0" hangingPunct="1">
+              <a:lnSpc>
+                <a:spcPct val="90000"/>
+              </a:lnSpc>
+              <a:spcBef>
+                <a:spcPts val="500"/>
+              </a:spcBef>
+              <a:buFont typeface="Arial" panose="020B0604020202020204" pitchFamily="34" charset="0"/>
+              <a:buChar char="•"/>
+              <a:defRPr sz="2400" kern="1200">
+                <a:solidFill>
+                  <a:schemeClr val="tx1"/>
+                </a:solidFill>
+                <a:latin typeface="+mn-lt"/>
+                <a:ea typeface="+mn-ea"/>
+                <a:cs typeface="+mn-cs"/>
+              </a:defRPr>
+            </a:lvl2pPr>
+            <a:lvl3pPr marL="1143000" indent="-228600" algn="l" defTabSz="914400" rtl="0" eaLnBrk="1" latinLnBrk="0" hangingPunct="1">
+              <a:lnSpc>
+                <a:spcPct val="90000"/>
+              </a:lnSpc>
+              <a:spcBef>
+                <a:spcPts val="500"/>
+              </a:spcBef>
+              <a:buFont typeface="Arial" panose="020B0604020202020204" pitchFamily="34" charset="0"/>
+              <a:buChar char="•"/>
+              <a:defRPr sz="2000" kern="1200">
+                <a:solidFill>
+                  <a:schemeClr val="tx1"/>
+                </a:solidFill>
+                <a:latin typeface="+mn-lt"/>
+                <a:ea typeface="+mn-ea"/>
+                <a:cs typeface="+mn-cs"/>
+              </a:defRPr>
+            </a:lvl3pPr>
+            <a:lvl4pPr marL="1600200" indent="-228600" algn="l" defTabSz="914400" rtl="0" eaLnBrk="1" latinLnBrk="0" hangingPunct="1">
+              <a:lnSpc>
+                <a:spcPct val="90000"/>
+              </a:lnSpc>
+              <a:spcBef>
+                <a:spcPts val="500"/>
+              </a:spcBef>
+              <a:buFont typeface="Arial" panose="020B0604020202020204" pitchFamily="34" charset="0"/>
+              <a:buChar char="•"/>
+              <a:defRPr sz="1800" kern="1200">
+                <a:solidFill>
+                  <a:schemeClr val="tx1"/>
+                </a:solidFill>
+                <a:latin typeface="+mn-lt"/>
+                <a:ea typeface="+mn-ea"/>
+                <a:cs typeface="+mn-cs"/>
+              </a:defRPr>
+            </a:lvl4pPr>
+            <a:lvl5pPr marL="2057400" indent="-228600" algn="l" defTabSz="914400" rtl="0" eaLnBrk="1" latinLnBrk="0" hangingPunct="1">
+              <a:lnSpc>
+                <a:spcPct val="90000"/>
+              </a:lnSpc>
+              <a:spcBef>
+                <a:spcPts val="500"/>
+              </a:spcBef>
+              <a:buFont typeface="Arial" panose="020B0604020202020204" pitchFamily="34" charset="0"/>
+              <a:buChar char="•"/>
+              <a:defRPr sz="1800" kern="1200">
+                <a:solidFill>
+                  <a:schemeClr val="tx1"/>
+                </a:solidFill>
+                <a:latin typeface="+mn-lt"/>
+                <a:ea typeface="+mn-ea"/>
+                <a:cs typeface="+mn-cs"/>
+              </a:defRPr>
+            </a:lvl5pPr>
+            <a:lvl6pPr marL="2514600" indent="-228600" algn="l" defTabSz="914400" rtl="0" eaLnBrk="1" latinLnBrk="0" hangingPunct="1">
+              <a:lnSpc>
+                <a:spcPct val="90000"/>
+              </a:lnSpc>
+              <a:spcBef>
+                <a:spcPts val="500"/>
+              </a:spcBef>
+              <a:buFont typeface="Arial" panose="020B0604020202020204" pitchFamily="34" charset="0"/>
+              <a:buChar char="•"/>
+              <a:defRPr sz="1800" kern="1200">
+                <a:solidFill>
+                  <a:schemeClr val="tx1"/>
+                </a:solidFill>
+                <a:latin typeface="+mn-lt"/>
+                <a:ea typeface="+mn-ea"/>
+                <a:cs typeface="+mn-cs"/>
+              </a:defRPr>
+            </a:lvl6pPr>
+            <a:lvl7pPr marL="2971800" indent="-228600" algn="l" defTabSz="914400" rtl="0" eaLnBrk="1" latinLnBrk="0" hangingPunct="1">
+              <a:lnSpc>
+                <a:spcPct val="90000"/>
+              </a:lnSpc>
+              <a:spcBef>
+                <a:spcPts val="500"/>
+              </a:spcBef>
+              <a:buFont typeface="Arial" panose="020B0604020202020204" pitchFamily="34" charset="0"/>
+              <a:buChar char="•"/>
+              <a:defRPr sz="1800" kern="1200">
+                <a:solidFill>
+                  <a:schemeClr val="tx1"/>
+                </a:solidFill>
+                <a:latin typeface="+mn-lt"/>
+                <a:ea typeface="+mn-ea"/>
+                <a:cs typeface="+mn-cs"/>
+              </a:defRPr>
+            </a:lvl7pPr>
+            <a:lvl8pPr marL="3429000" indent="-228600" algn="l" defTabSz="914400" rtl="0" eaLnBrk="1" latinLnBrk="0" hangingPunct="1">
+              <a:lnSpc>
+                <a:spcPct val="90000"/>
+              </a:lnSpc>
+              <a:spcBef>
+                <a:spcPts val="500"/>
+              </a:spcBef>
+              <a:buFont typeface="Arial" panose="020B0604020202020204" pitchFamily="34" charset="0"/>
+              <a:buChar char="•"/>
+              <a:defRPr sz="1800" kern="1200">
+                <a:solidFill>
+                  <a:schemeClr val="tx1"/>
+                </a:solidFill>
+                <a:latin typeface="+mn-lt"/>
+                <a:ea typeface="+mn-ea"/>
+                <a:cs typeface="+mn-cs"/>
+              </a:defRPr>
+            </a:lvl8pPr>
+            <a:lvl9pPr marL="3886200" indent="-228600" algn="l" defTabSz="914400" rtl="0" eaLnBrk="1" latinLnBrk="0" hangingPunct="1">
+              <a:lnSpc>
+                <a:spcPct val="90000"/>
+              </a:lnSpc>
+              <a:spcBef>
+                <a:spcPts val="500"/>
+              </a:spcBef>
+              <a:buFont typeface="Arial" panose="020B0604020202020204" pitchFamily="34" charset="0"/>
+              <a:buChar char="•"/>
+              <a:defRPr sz="1800" kern="1200">
+                <a:solidFill>
+                  <a:schemeClr val="tx1"/>
+                </a:solidFill>
+                <a:latin typeface="+mn-lt"/>
+                <a:ea typeface="+mn-ea"/>
+                <a:cs typeface="+mn-cs"/>
+              </a:defRPr>
+            </a:lvl9pPr>
+          </a:lstStyle>
+          <a:p>
+            <a:r>
+              <a:rPr lang="en-US" dirty="0"/>
+              <a:t>Several environment variables</a:t>
+            </a:r>
+          </a:p>
+          <a:p>
+            <a:pPr lvl="1"/>
+            <a:r>
+              <a:rPr lang="en-US" dirty="0">
+                <a:latin typeface="Courier New" panose="02070309020205020404" pitchFamily="49" charset="0"/>
+                <a:cs typeface="Courier New" panose="02070309020205020404" pitchFamily="49" charset="0"/>
+              </a:rPr>
+              <a:t>PWD</a:t>
+            </a:r>
+            <a:r>
+              <a:rPr lang="en-US" dirty="0">
+                <a:cs typeface="Courier New" panose="02070309020205020404" pitchFamily="49" charset="0"/>
+              </a:rPr>
+              <a:t> (print working directory)</a:t>
+            </a:r>
+          </a:p>
+          <a:p>
+            <a:pPr lvl="1"/>
+            <a:r>
+              <a:rPr lang="en-US" dirty="0">
+                <a:latin typeface="Courier New" panose="02070309020205020404" pitchFamily="49" charset="0"/>
+                <a:cs typeface="Courier New" panose="02070309020205020404" pitchFamily="49" charset="0"/>
+              </a:rPr>
+              <a:t>PATH</a:t>
+            </a:r>
+            <a:r>
+              <a:rPr lang="en-US" dirty="0">
+                <a:cs typeface="Courier New" panose="02070309020205020404" pitchFamily="49" charset="0"/>
+              </a:rPr>
+              <a:t> (where to look for executable files)</a:t>
+            </a:r>
+          </a:p>
+          <a:p>
+            <a:pPr lvl="1"/>
+            <a:r>
+              <a:rPr lang="en-US" dirty="0">
+                <a:cs typeface="Courier New" panose="02070309020205020404" pitchFamily="49" charset="0"/>
+              </a:rPr>
+              <a:t>Many more (if you’re curious, type in </a:t>
+            </a:r>
+            <a:r>
+              <a:rPr lang="en-US" dirty="0">
+                <a:latin typeface="Courier New" panose="02070309020205020404" pitchFamily="49" charset="0"/>
+                <a:cs typeface="Courier New" panose="02070309020205020404" pitchFamily="49" charset="0"/>
+              </a:rPr>
+              <a:t>env</a:t>
+            </a:r>
+            <a:r>
+              <a:rPr lang="en-US" dirty="0">
+                <a:cs typeface="Courier New" panose="02070309020205020404" pitchFamily="49" charset="0"/>
+              </a:rPr>
+              <a:t>!)</a:t>
+            </a:r>
+          </a:p>
+          <a:p>
+            <a:r>
+              <a:rPr lang="en-US" dirty="0">
+                <a:cs typeface="Courier New" panose="02070309020205020404" pitchFamily="49" charset="0"/>
+              </a:rPr>
+              <a:t>This is how we can keep track of our state</a:t>
+            </a:r>
+          </a:p>
+          <a:p>
+            <a:r>
+              <a:rPr lang="en-US" dirty="0">
+                <a:cs typeface="Courier New" panose="02070309020205020404" pitchFamily="49" charset="0"/>
+              </a:rPr>
+              <a:t>Note that on Windows (more accurately NTFS/FAT file systems) case does not matter (</a:t>
+            </a:r>
+            <a:r>
+              <a:rPr lang="en-US" dirty="0">
+                <a:latin typeface="Courier New" panose="02070309020205020404" pitchFamily="49" charset="0"/>
+                <a:cs typeface="Courier New" panose="02070309020205020404" pitchFamily="49" charset="0"/>
+              </a:rPr>
+              <a:t>File.txt </a:t>
+            </a:r>
+            <a:r>
+              <a:rPr lang="en-US" dirty="0">
+                <a:cs typeface="Courier New" panose="02070309020205020404" pitchFamily="49" charset="0"/>
+              </a:rPr>
+              <a:t>is the same as </a:t>
+            </a:r>
+            <a:r>
+              <a:rPr lang="en-US" dirty="0" err="1">
+                <a:latin typeface="Courier New" panose="02070309020205020404" pitchFamily="49" charset="0"/>
+                <a:cs typeface="Courier New" panose="02070309020205020404" pitchFamily="49" charset="0"/>
+              </a:rPr>
+              <a:t>filE.tXt</a:t>
+            </a:r>
+            <a:r>
+              <a:rPr lang="en-US" dirty="0">
+                <a:cs typeface="Courier New" panose="02070309020205020404" pitchFamily="49" charset="0"/>
+              </a:rPr>
+              <a:t>), but on Linux (ext4) case matters</a:t>
+            </a:r>
+          </a:p>
+        </p:txBody>
+      </p:sp>
+    </p:spTree>
+    <p:extLst>
+      <p:ext uri="{BB962C8B-B14F-4D97-AF65-F5344CB8AC3E}">
+        <p14:creationId xmlns:p14="http://schemas.microsoft.com/office/powerpoint/2010/main" val="2996882368"/>
+      </p:ext>
+    </p:extLst>
+  </p:cSld>
+  <p:clrMapOvr>
+    <a:masterClrMapping/>
+  </p:clrMapOvr>
+</p:sld>
+</file>
+
+<file path=ppt/slides/slide11.xml><?xml version="1.0" encoding="utf-8"?>
+<p:sld xmlns:a="http://schemas.openxmlformats.org/drawingml/2006/main" xmlns:r="http://schemas.openxmlformats.org/officeDocument/2006/relationships" xmlns:p="http://schemas.openxmlformats.org/presentationml/2006/main">
+  <p:cSld>
+    <p:spTree>
+      <p:nvGrpSpPr>
+        <p:cNvPr id="1" name=""/>
+        <p:cNvGrpSpPr/>
+        <p:nvPr/>
+      </p:nvGrpSpPr>
+      <p:grpSpPr>
+        <a:xfrm>
+          <a:off x="0" y="0"/>
+          <a:ext cx="0" cy="0"/>
+          <a:chOff x="0" y="0"/>
+          <a:chExt cx="0" cy="0"/>
+        </a:xfrm>
+      </p:grpSpPr>
+      <p:sp>
+        <p:nvSpPr>
+          <p:cNvPr id="7" name="Title 6">
+            <a:extLst>
+              <a:ext uri="{FF2B5EF4-FFF2-40B4-BE49-F238E27FC236}">
+                <a16:creationId xmlns:a16="http://schemas.microsoft.com/office/drawing/2014/main" id="{601B20C1-6D2C-410B-9C7D-B09E2AC0F10C}"/>
+              </a:ext>
+            </a:extLst>
+          </p:cNvPr>
+          <p:cNvSpPr>
+            <a:spLocks noGrp="1"/>
+          </p:cNvSpPr>
+          <p:nvPr>
+            <p:ph type="title"/>
+          </p:nvPr>
+        </p:nvSpPr>
+        <p:spPr/>
+        <p:txBody>
+          <a:bodyPr/>
+          <a:lstStyle/>
+          <a:p>
+            <a:r>
+              <a:rPr lang="en-US" dirty="0"/>
+              <a:t>FILES</a:t>
+            </a:r>
+          </a:p>
+        </p:txBody>
+      </p:sp>
+      <p:sp>
+        <p:nvSpPr>
+          <p:cNvPr id="4" name="Date Placeholder 3">
+            <a:extLst>
+              <a:ext uri="{FF2B5EF4-FFF2-40B4-BE49-F238E27FC236}">
+                <a16:creationId xmlns:a16="http://schemas.microsoft.com/office/drawing/2014/main" id="{FDFCF223-64BA-421E-9ED7-B50193B5C5E1}"/>
+              </a:ext>
+            </a:extLst>
+          </p:cNvPr>
+          <p:cNvSpPr>
+            <a:spLocks noGrp="1"/>
+          </p:cNvSpPr>
+          <p:nvPr>
+            <p:ph type="dt" sz="half" idx="10"/>
+          </p:nvPr>
+        </p:nvSpPr>
+        <p:spPr/>
+        <p:txBody>
+          <a:bodyPr/>
+          <a:lstStyle/>
+          <a:p>
+            <a:fld id="{B08FEED8-D7D4-44E9-BFBC-ED06B5996D94}" type="datetime4">
+              <a:rPr lang="en-US" smtClean="0"/>
+              <a:t>August 12, 2019</a:t>
+            </a:fld>
+            <a:endParaRPr lang="en-US" dirty="0"/>
+          </a:p>
+        </p:txBody>
+      </p:sp>
+      <p:sp>
+        <p:nvSpPr>
+          <p:cNvPr id="5" name="Footer Placeholder 4">
+            <a:extLst>
+              <a:ext uri="{FF2B5EF4-FFF2-40B4-BE49-F238E27FC236}">
+                <a16:creationId xmlns:a16="http://schemas.microsoft.com/office/drawing/2014/main" id="{985A19B1-AD30-4909-B986-F717612E68FA}"/>
+              </a:ext>
+            </a:extLst>
+          </p:cNvPr>
+          <p:cNvSpPr>
+            <a:spLocks noGrp="1"/>
+          </p:cNvSpPr>
+          <p:nvPr>
+            <p:ph type="ftr" sz="quarter" idx="11"/>
+          </p:nvPr>
+        </p:nvSpPr>
+        <p:spPr/>
+        <p:txBody>
+          <a:bodyPr/>
+          <a:lstStyle/>
+          <a:p>
+            <a:r>
+              <a:rPr lang="en-US"/>
+              <a:t>Digital Scholarship Services </a:t>
+            </a:r>
+            <a:r>
+              <a:rPr lang="en-US">
+                <a:solidFill>
+                  <a:schemeClr val="accent1">
+                    <a:lumMod val="50000"/>
+                  </a:schemeClr>
+                </a:solidFill>
+              </a:rPr>
+              <a:t>| Email</a:t>
+            </a:r>
+            <a:r>
+              <a:rPr lang="en-US"/>
+              <a:t> cf24@rice.edu </a:t>
+            </a:r>
+            <a:r>
+              <a:rPr lang="en-US">
+                <a:solidFill>
+                  <a:schemeClr val="accent1">
+                    <a:lumMod val="50000"/>
+                  </a:schemeClr>
+                </a:solidFill>
+              </a:rPr>
+              <a:t>|</a:t>
+            </a:r>
+            <a:r>
+              <a:rPr lang="en-US"/>
+              <a:t> library.rice.edu/dss</a:t>
+            </a:r>
+            <a:endParaRPr lang="en-US" dirty="0"/>
+          </a:p>
+        </p:txBody>
+      </p:sp>
+      <p:sp>
+        <p:nvSpPr>
+          <p:cNvPr id="6" name="Slide Number Placeholder 5">
+            <a:extLst>
+              <a:ext uri="{FF2B5EF4-FFF2-40B4-BE49-F238E27FC236}">
+                <a16:creationId xmlns:a16="http://schemas.microsoft.com/office/drawing/2014/main" id="{75C4D062-ACF2-41DA-A700-03DC514486D1}"/>
+              </a:ext>
+            </a:extLst>
+          </p:cNvPr>
+          <p:cNvSpPr>
+            <a:spLocks noGrp="1"/>
+          </p:cNvSpPr>
+          <p:nvPr>
+            <p:ph type="sldNum" sz="quarter" idx="12"/>
+          </p:nvPr>
+        </p:nvSpPr>
+        <p:spPr/>
+        <p:txBody>
+          <a:bodyPr/>
+          <a:lstStyle/>
+          <a:p>
+            <a:fld id="{D57F1E4F-1CFF-5643-939E-02111984F565}" type="slidenum">
+              <a:rPr lang="en-US" smtClean="0"/>
+              <a:t>11</a:t>
+            </a:fld>
+            <a:endParaRPr lang="en-US" dirty="0"/>
+          </a:p>
+        </p:txBody>
+      </p:sp>
+      <p:sp>
+        <p:nvSpPr>
+          <p:cNvPr id="10" name="Content Placeholder 2">
+            <a:extLst>
+              <a:ext uri="{FF2B5EF4-FFF2-40B4-BE49-F238E27FC236}">
+                <a16:creationId xmlns:a16="http://schemas.microsoft.com/office/drawing/2014/main" id="{507A9182-6C57-44EB-967D-7501C299A75A}"/>
+              </a:ext>
+            </a:extLst>
+          </p:cNvPr>
+          <p:cNvSpPr txBox="1">
+            <a:spLocks/>
+          </p:cNvSpPr>
+          <p:nvPr/>
+        </p:nvSpPr>
+        <p:spPr>
+          <a:xfrm>
+            <a:off x="838199" y="1825625"/>
+            <a:ext cx="10515599" cy="4351338"/>
+          </a:xfrm>
+          <a:prstGeom prst="rect">
+            <a:avLst/>
+          </a:prstGeom>
+        </p:spPr>
+        <p:txBody>
+          <a:bodyPr vert="horz" lIns="91440" tIns="45720" rIns="91440" bIns="45720" rtlCol="0">
+            <a:normAutofit/>
+          </a:bodyPr>
+          <a:lstStyle>
+            <a:lvl1pPr marL="228600" indent="-228600" algn="l" defTabSz="914400" rtl="0" eaLnBrk="1" latinLnBrk="0" hangingPunct="1">
+              <a:lnSpc>
+                <a:spcPct val="90000"/>
+              </a:lnSpc>
+              <a:spcBef>
+                <a:spcPts val="1000"/>
+              </a:spcBef>
+              <a:buFont typeface="Arial" panose="020B0604020202020204" pitchFamily="34" charset="0"/>
+              <a:buChar char="•"/>
+              <a:defRPr sz="2800" kern="1200">
+                <a:solidFill>
+                  <a:schemeClr val="tx1"/>
+                </a:solidFill>
+                <a:latin typeface="+mn-lt"/>
+                <a:ea typeface="+mn-ea"/>
+                <a:cs typeface="+mn-cs"/>
+              </a:defRPr>
+            </a:lvl1pPr>
+            <a:lvl2pPr marL="685800" indent="-228600" algn="l" defTabSz="914400" rtl="0" eaLnBrk="1" latinLnBrk="0" hangingPunct="1">
+              <a:lnSpc>
+                <a:spcPct val="90000"/>
+              </a:lnSpc>
+              <a:spcBef>
+                <a:spcPts val="500"/>
+              </a:spcBef>
+              <a:buFont typeface="Arial" panose="020B0604020202020204" pitchFamily="34" charset="0"/>
+              <a:buChar char="•"/>
+              <a:defRPr sz="2400" kern="1200">
+                <a:solidFill>
+                  <a:schemeClr val="tx1"/>
+                </a:solidFill>
+                <a:latin typeface="+mn-lt"/>
+                <a:ea typeface="+mn-ea"/>
+                <a:cs typeface="+mn-cs"/>
+              </a:defRPr>
+            </a:lvl2pPr>
+            <a:lvl3pPr marL="1143000" indent="-228600" algn="l" defTabSz="914400" rtl="0" eaLnBrk="1" latinLnBrk="0" hangingPunct="1">
+              <a:lnSpc>
+                <a:spcPct val="90000"/>
+              </a:lnSpc>
+              <a:spcBef>
+                <a:spcPts val="500"/>
+              </a:spcBef>
+              <a:buFont typeface="Arial" panose="020B0604020202020204" pitchFamily="34" charset="0"/>
+              <a:buChar char="•"/>
+              <a:defRPr sz="2000" kern="1200">
+                <a:solidFill>
+                  <a:schemeClr val="tx1"/>
+                </a:solidFill>
+                <a:latin typeface="+mn-lt"/>
+                <a:ea typeface="+mn-ea"/>
+                <a:cs typeface="+mn-cs"/>
+              </a:defRPr>
+            </a:lvl3pPr>
+            <a:lvl4pPr marL="1600200" indent="-228600" algn="l" defTabSz="914400" rtl="0" eaLnBrk="1" latinLnBrk="0" hangingPunct="1">
+              <a:lnSpc>
+                <a:spcPct val="90000"/>
+              </a:lnSpc>
+              <a:spcBef>
+                <a:spcPts val="500"/>
+              </a:spcBef>
+              <a:buFont typeface="Arial" panose="020B0604020202020204" pitchFamily="34" charset="0"/>
+              <a:buChar char="•"/>
+              <a:defRPr sz="1800" kern="1200">
+                <a:solidFill>
+                  <a:schemeClr val="tx1"/>
+                </a:solidFill>
+                <a:latin typeface="+mn-lt"/>
+                <a:ea typeface="+mn-ea"/>
+                <a:cs typeface="+mn-cs"/>
+              </a:defRPr>
+            </a:lvl4pPr>
+            <a:lvl5pPr marL="2057400" indent="-228600" algn="l" defTabSz="914400" rtl="0" eaLnBrk="1" latinLnBrk="0" hangingPunct="1">
+              <a:lnSpc>
+                <a:spcPct val="90000"/>
+              </a:lnSpc>
+              <a:spcBef>
+                <a:spcPts val="500"/>
+              </a:spcBef>
+              <a:buFont typeface="Arial" panose="020B0604020202020204" pitchFamily="34" charset="0"/>
+              <a:buChar char="•"/>
+              <a:defRPr sz="1800" kern="1200">
+                <a:solidFill>
+                  <a:schemeClr val="tx1"/>
+                </a:solidFill>
+                <a:latin typeface="+mn-lt"/>
+                <a:ea typeface="+mn-ea"/>
+                <a:cs typeface="+mn-cs"/>
+              </a:defRPr>
+            </a:lvl5pPr>
+            <a:lvl6pPr marL="2514600" indent="-228600" algn="l" defTabSz="914400" rtl="0" eaLnBrk="1" latinLnBrk="0" hangingPunct="1">
+              <a:lnSpc>
+                <a:spcPct val="90000"/>
+              </a:lnSpc>
+              <a:spcBef>
+                <a:spcPts val="500"/>
+              </a:spcBef>
+              <a:buFont typeface="Arial" panose="020B0604020202020204" pitchFamily="34" charset="0"/>
+              <a:buChar char="•"/>
+              <a:defRPr sz="1800" kern="1200">
+                <a:solidFill>
+                  <a:schemeClr val="tx1"/>
+                </a:solidFill>
+                <a:latin typeface="+mn-lt"/>
+                <a:ea typeface="+mn-ea"/>
+                <a:cs typeface="+mn-cs"/>
+              </a:defRPr>
+            </a:lvl6pPr>
+            <a:lvl7pPr marL="2971800" indent="-228600" algn="l" defTabSz="914400" rtl="0" eaLnBrk="1" latinLnBrk="0" hangingPunct="1">
+              <a:lnSpc>
+                <a:spcPct val="90000"/>
+              </a:lnSpc>
+              <a:spcBef>
+                <a:spcPts val="500"/>
+              </a:spcBef>
+              <a:buFont typeface="Arial" panose="020B0604020202020204" pitchFamily="34" charset="0"/>
+              <a:buChar char="•"/>
+              <a:defRPr sz="1800" kern="1200">
+                <a:solidFill>
+                  <a:schemeClr val="tx1"/>
+                </a:solidFill>
+                <a:latin typeface="+mn-lt"/>
+                <a:ea typeface="+mn-ea"/>
+                <a:cs typeface="+mn-cs"/>
+              </a:defRPr>
+            </a:lvl7pPr>
+            <a:lvl8pPr marL="3429000" indent="-228600" algn="l" defTabSz="914400" rtl="0" eaLnBrk="1" latinLnBrk="0" hangingPunct="1">
+              <a:lnSpc>
+                <a:spcPct val="90000"/>
+              </a:lnSpc>
+              <a:spcBef>
+                <a:spcPts val="500"/>
+              </a:spcBef>
+              <a:buFont typeface="Arial" panose="020B0604020202020204" pitchFamily="34" charset="0"/>
+              <a:buChar char="•"/>
+              <a:defRPr sz="1800" kern="1200">
+                <a:solidFill>
+                  <a:schemeClr val="tx1"/>
+                </a:solidFill>
+                <a:latin typeface="+mn-lt"/>
+                <a:ea typeface="+mn-ea"/>
+                <a:cs typeface="+mn-cs"/>
+              </a:defRPr>
+            </a:lvl8pPr>
+            <a:lvl9pPr marL="3886200" indent="-228600" algn="l" defTabSz="914400" rtl="0" eaLnBrk="1" latinLnBrk="0" hangingPunct="1">
+              <a:lnSpc>
+                <a:spcPct val="90000"/>
+              </a:lnSpc>
+              <a:spcBef>
+                <a:spcPts val="500"/>
+              </a:spcBef>
+              <a:buFont typeface="Arial" panose="020B0604020202020204" pitchFamily="34" charset="0"/>
+              <a:buChar char="•"/>
+              <a:defRPr sz="1800" kern="1200">
+                <a:solidFill>
+                  <a:schemeClr val="tx1"/>
+                </a:solidFill>
+                <a:latin typeface="+mn-lt"/>
+                <a:ea typeface="+mn-ea"/>
+                <a:cs typeface="+mn-cs"/>
+              </a:defRPr>
+            </a:lvl9pPr>
+          </a:lstStyle>
+          <a:p>
+            <a:pPr marL="0" indent="0">
+              <a:buNone/>
+            </a:pPr>
+            <a:r>
+              <a:rPr lang="en-US" dirty="0"/>
+              <a:t>Special file shortcuts in bash</a:t>
+            </a:r>
+          </a:p>
+          <a:p>
+            <a:r>
+              <a:rPr lang="en-US" dirty="0">
+                <a:latin typeface="Courier New" panose="02070309020205020404" pitchFamily="49" charset="0"/>
+                <a:cs typeface="Courier New" panose="02070309020205020404" pitchFamily="49" charset="0"/>
+              </a:rPr>
+              <a:t>.-&gt; </a:t>
+            </a:r>
+            <a:r>
+              <a:rPr lang="en-US" dirty="0">
+                <a:cs typeface="Courier New" panose="02070309020205020404" pitchFamily="49" charset="0"/>
+              </a:rPr>
+              <a:t>This directory</a:t>
+            </a:r>
+            <a:endParaRPr lang="en-US" dirty="0">
+              <a:latin typeface="Courier New" panose="02070309020205020404" pitchFamily="49" charset="0"/>
+              <a:cs typeface="Courier New" panose="02070309020205020404" pitchFamily="49" charset="0"/>
+            </a:endParaRPr>
+          </a:p>
+          <a:p>
+            <a:r>
+              <a:rPr lang="en-US" dirty="0">
+                <a:latin typeface="Courier New" panose="02070309020205020404" pitchFamily="49" charset="0"/>
+                <a:cs typeface="Courier New" panose="02070309020205020404" pitchFamily="49" charset="0"/>
+              </a:rPr>
+              <a:t>.. -&gt; </a:t>
+            </a:r>
+            <a:r>
+              <a:rPr lang="en-US" dirty="0">
+                <a:cs typeface="Courier New" panose="02070309020205020404" pitchFamily="49" charset="0"/>
+              </a:rPr>
+              <a:t>Parent directory</a:t>
+            </a:r>
+            <a:endParaRPr lang="en-US" dirty="0">
+              <a:latin typeface="Courier New" panose="02070309020205020404" pitchFamily="49" charset="0"/>
+              <a:cs typeface="Courier New" panose="02070309020205020404" pitchFamily="49" charset="0"/>
+            </a:endParaRPr>
+          </a:p>
+          <a:p>
+            <a:r>
+              <a:rPr lang="en-US" dirty="0">
+                <a:latin typeface="Courier New" panose="02070309020205020404" pitchFamily="49" charset="0"/>
+                <a:cs typeface="Courier New" panose="02070309020205020404" pitchFamily="49" charset="0"/>
+              </a:rPr>
+              <a:t>~ -&gt; </a:t>
+            </a:r>
+            <a:r>
+              <a:rPr lang="en-US" dirty="0">
+                <a:cs typeface="Courier New" panose="02070309020205020404" pitchFamily="49" charset="0"/>
+              </a:rPr>
+              <a:t>User’s home directory</a:t>
+            </a:r>
+            <a:endParaRPr lang="en-US" dirty="0">
+              <a:latin typeface="Courier New" panose="02070309020205020404" pitchFamily="49" charset="0"/>
+              <a:cs typeface="Courier New" panose="02070309020205020404" pitchFamily="49" charset="0"/>
+            </a:endParaRPr>
+          </a:p>
+          <a:p>
+            <a:r>
+              <a:rPr lang="en-US" dirty="0">
+                <a:latin typeface="Courier New" panose="02070309020205020404" pitchFamily="49" charset="0"/>
+                <a:cs typeface="Courier New" panose="02070309020205020404" pitchFamily="49" charset="0"/>
+              </a:rPr>
+              <a:t>/ -&gt; </a:t>
+            </a:r>
+            <a:r>
+              <a:rPr lang="en-US" dirty="0">
+                <a:cs typeface="Courier New" panose="02070309020205020404" pitchFamily="49" charset="0"/>
+              </a:rPr>
+              <a:t>System root</a:t>
+            </a:r>
+          </a:p>
+          <a:p>
+            <a:r>
+              <a:rPr lang="en-US" dirty="0">
+                <a:cs typeface="Courier New" panose="02070309020205020404" pitchFamily="49" charset="0"/>
+              </a:rPr>
+              <a:t>Just type a few characters of the file then press tab to autocomplete!</a:t>
+            </a:r>
+          </a:p>
+          <a:p>
+            <a:r>
+              <a:rPr lang="en-US" dirty="0">
+                <a:cs typeface="Courier New" panose="02070309020205020404" pitchFamily="49" charset="0"/>
+              </a:rPr>
+              <a:t>Permissions: read, write, and execute</a:t>
+            </a:r>
+          </a:p>
+          <a:p>
+            <a:pPr lvl="1"/>
+            <a:r>
+              <a:rPr lang="en-US" dirty="0">
+                <a:cs typeface="Courier New" panose="02070309020205020404" pitchFamily="49" charset="0"/>
+              </a:rPr>
+              <a:t>Any file can be executed!</a:t>
+            </a:r>
+          </a:p>
+        </p:txBody>
+      </p:sp>
+    </p:spTree>
+    <p:extLst>
+      <p:ext uri="{BB962C8B-B14F-4D97-AF65-F5344CB8AC3E}">
+        <p14:creationId xmlns:p14="http://schemas.microsoft.com/office/powerpoint/2010/main" val="3841091255"/>
+      </p:ext>
+    </p:extLst>
+  </p:cSld>
+  <p:clrMapOvr>
+    <a:masterClrMapping/>
+  </p:clrMapOvr>
+</p:sld>
+</file>
+
+<file path=ppt/slides/slide12.xml><?xml version="1.0" encoding="utf-8"?>
+<p:sld xmlns:a="http://schemas.openxmlformats.org/drawingml/2006/main" xmlns:r="http://schemas.openxmlformats.org/officeDocument/2006/relationships" xmlns:p="http://schemas.openxmlformats.org/presentationml/2006/main">
+  <p:cSld>
+    <p:spTree>
+      <p:nvGrpSpPr>
+        <p:cNvPr id="1" name=""/>
+        <p:cNvGrpSpPr/>
+        <p:nvPr/>
+      </p:nvGrpSpPr>
+      <p:grpSpPr>
+        <a:xfrm>
+          <a:off x="0" y="0"/>
+          <a:ext cx="0" cy="0"/>
+          <a:chOff x="0" y="0"/>
+          <a:chExt cx="0" cy="0"/>
+        </a:xfrm>
+      </p:grpSpPr>
+      <p:sp>
+        <p:nvSpPr>
+          <p:cNvPr id="2" name="Title 1">
+            <a:extLst>
+              <a:ext uri="{FF2B5EF4-FFF2-40B4-BE49-F238E27FC236}">
+                <a16:creationId xmlns:a16="http://schemas.microsoft.com/office/drawing/2014/main" id="{763619FC-2C00-4A86-9CDA-1BF3459DAC50}"/>
+              </a:ext>
+            </a:extLst>
+          </p:cNvPr>
+          <p:cNvSpPr>
+            <a:spLocks noGrp="1"/>
+          </p:cNvSpPr>
+          <p:nvPr>
+            <p:ph type="title"/>
+          </p:nvPr>
+        </p:nvSpPr>
+        <p:spPr/>
+        <p:txBody>
+          <a:bodyPr/>
+          <a:lstStyle/>
+          <a:p>
+            <a:r>
+              <a:rPr lang="en-US" dirty="0"/>
+              <a:t>CONFIGURATION</a:t>
+            </a:r>
+          </a:p>
+        </p:txBody>
+      </p:sp>
+      <p:sp>
+        <p:nvSpPr>
+          <p:cNvPr id="3" name="Text Placeholder 2">
+            <a:extLst>
+              <a:ext uri="{FF2B5EF4-FFF2-40B4-BE49-F238E27FC236}">
+                <a16:creationId xmlns:a16="http://schemas.microsoft.com/office/drawing/2014/main" id="{14188AF0-954F-45E0-97B5-73D18A416CC7}"/>
+              </a:ext>
+            </a:extLst>
+          </p:cNvPr>
+          <p:cNvSpPr>
+            <a:spLocks noGrp="1"/>
+          </p:cNvSpPr>
+          <p:nvPr>
+            <p:ph type="body" idx="1"/>
+          </p:nvPr>
+        </p:nvSpPr>
+        <p:spPr/>
+        <p:txBody>
+          <a:bodyPr/>
+          <a:lstStyle/>
+          <a:p>
+            <a:r>
+              <a:rPr lang="en-US" dirty="0"/>
+              <a:t>Making your shell look and act its best!</a:t>
+            </a:r>
+          </a:p>
+        </p:txBody>
+      </p:sp>
+      <p:sp>
+        <p:nvSpPr>
+          <p:cNvPr id="4" name="Date Placeholder 3">
+            <a:extLst>
+              <a:ext uri="{FF2B5EF4-FFF2-40B4-BE49-F238E27FC236}">
+                <a16:creationId xmlns:a16="http://schemas.microsoft.com/office/drawing/2014/main" id="{6D5133BD-4847-4D49-B5BF-4CC178F8FDB8}"/>
+              </a:ext>
+            </a:extLst>
+          </p:cNvPr>
+          <p:cNvSpPr>
+            <a:spLocks noGrp="1"/>
+          </p:cNvSpPr>
+          <p:nvPr>
+            <p:ph type="dt" sz="half" idx="10"/>
+          </p:nvPr>
+        </p:nvSpPr>
+        <p:spPr/>
+        <p:txBody>
+          <a:bodyPr/>
+          <a:lstStyle/>
+          <a:p>
+            <a:fld id="{8AAE40A0-A7D8-4DC3-BC9E-BADA32DA2004}" type="datetime4">
+              <a:rPr lang="en-US" smtClean="0"/>
+              <a:t>August 12, 2019</a:t>
+            </a:fld>
+            <a:endParaRPr lang="en-US" dirty="0"/>
+          </a:p>
+        </p:txBody>
+      </p:sp>
+      <p:sp>
+        <p:nvSpPr>
+          <p:cNvPr id="5" name="Footer Placeholder 4">
+            <a:extLst>
+              <a:ext uri="{FF2B5EF4-FFF2-40B4-BE49-F238E27FC236}">
+                <a16:creationId xmlns:a16="http://schemas.microsoft.com/office/drawing/2014/main" id="{5963B75A-EC19-4470-9F8C-1E2C1FB85999}"/>
+              </a:ext>
+            </a:extLst>
+          </p:cNvPr>
+          <p:cNvSpPr>
+            <a:spLocks noGrp="1"/>
+          </p:cNvSpPr>
+          <p:nvPr>
+            <p:ph type="ftr" sz="quarter" idx="11"/>
+          </p:nvPr>
+        </p:nvSpPr>
+        <p:spPr/>
+        <p:txBody>
+          <a:bodyPr/>
+          <a:lstStyle/>
+          <a:p>
+            <a:r>
+              <a:rPr lang="en-US"/>
+              <a:t>Digital Scholarship Services </a:t>
+            </a:r>
+            <a:r>
+              <a:rPr lang="en-US">
+                <a:solidFill>
+                  <a:schemeClr val="accent1">
+                    <a:lumMod val="50000"/>
+                  </a:schemeClr>
+                </a:solidFill>
+              </a:rPr>
+              <a:t>| Email</a:t>
+            </a:r>
+            <a:r>
+              <a:rPr lang="en-US"/>
+              <a:t> cf24@rice.edu </a:t>
+            </a:r>
+            <a:r>
+              <a:rPr lang="en-US">
+                <a:solidFill>
+                  <a:schemeClr val="accent1">
+                    <a:lumMod val="50000"/>
+                  </a:schemeClr>
+                </a:solidFill>
+              </a:rPr>
+              <a:t>|</a:t>
+            </a:r>
+            <a:r>
+              <a:rPr lang="en-US"/>
+              <a:t> library.rice.edu/dss</a:t>
+            </a:r>
+            <a:endParaRPr lang="en-US" dirty="0"/>
+          </a:p>
+        </p:txBody>
+      </p:sp>
+      <p:sp>
+        <p:nvSpPr>
+          <p:cNvPr id="6" name="Slide Number Placeholder 5">
+            <a:extLst>
+              <a:ext uri="{FF2B5EF4-FFF2-40B4-BE49-F238E27FC236}">
+                <a16:creationId xmlns:a16="http://schemas.microsoft.com/office/drawing/2014/main" id="{BDAB3897-F226-4B28-B7E1-52A0CDB34A2C}"/>
+              </a:ext>
+            </a:extLst>
+          </p:cNvPr>
+          <p:cNvSpPr>
+            <a:spLocks noGrp="1"/>
+          </p:cNvSpPr>
+          <p:nvPr>
+            <p:ph type="sldNum" sz="quarter" idx="12"/>
+          </p:nvPr>
+        </p:nvSpPr>
+        <p:spPr/>
+        <p:txBody>
+          <a:bodyPr/>
+          <a:lstStyle/>
+          <a:p>
+            <a:fld id="{D57F1E4F-1CFF-5643-939E-02111984F565}" type="slidenum">
+              <a:rPr lang="en-US" smtClean="0"/>
+              <a:t>12</a:t>
+            </a:fld>
+            <a:endParaRPr lang="en-US" dirty="0"/>
+          </a:p>
+        </p:txBody>
+      </p:sp>
+    </p:spTree>
+    <p:extLst>
+      <p:ext uri="{BB962C8B-B14F-4D97-AF65-F5344CB8AC3E}">
+        <p14:creationId xmlns:p14="http://schemas.microsoft.com/office/powerpoint/2010/main" val="2625404447"/>
+      </p:ext>
+    </p:extLst>
+  </p:cSld>
+  <p:clrMapOvr>
+    <a:masterClrMapping/>
+  </p:clrMapOvr>
+</p:sld>
+</file>
+
+<file path=ppt/slides/slide13.xml><?xml version="1.0" encoding="utf-8"?>
+<p:sld xmlns:a="http://schemas.openxmlformats.org/drawingml/2006/main" xmlns:r="http://schemas.openxmlformats.org/officeDocument/2006/relationships" xmlns:p="http://schemas.openxmlformats.org/presentationml/2006/main">
+  <p:cSld>
+    <p:spTree>
+      <p:nvGrpSpPr>
+        <p:cNvPr id="1" name=""/>
+        <p:cNvGrpSpPr/>
+        <p:nvPr/>
+      </p:nvGrpSpPr>
+      <p:grpSpPr>
+        <a:xfrm>
+          <a:off x="0" y="0"/>
+          <a:ext cx="0" cy="0"/>
+          <a:chOff x="0" y="0"/>
+          <a:chExt cx="0" cy="0"/>
+        </a:xfrm>
+      </p:grpSpPr>
+      <p:sp>
+        <p:nvSpPr>
+          <p:cNvPr id="2" name="Title 1">
+            <a:extLst>
+              <a:ext uri="{FF2B5EF4-FFF2-40B4-BE49-F238E27FC236}">
+                <a16:creationId xmlns:a16="http://schemas.microsoft.com/office/drawing/2014/main" id="{763619FC-2C00-4A86-9CDA-1BF3459DAC50}"/>
+              </a:ext>
+            </a:extLst>
+          </p:cNvPr>
+          <p:cNvSpPr>
+            <a:spLocks noGrp="1"/>
+          </p:cNvSpPr>
+          <p:nvPr>
+            <p:ph type="title"/>
+          </p:nvPr>
+        </p:nvSpPr>
+        <p:spPr/>
+        <p:txBody>
+          <a:bodyPr/>
+          <a:lstStyle/>
+          <a:p>
+            <a:r>
+              <a:rPr lang="en-US" dirty="0"/>
+              <a:t>COLORS</a:t>
+            </a:r>
+          </a:p>
+        </p:txBody>
+      </p:sp>
+      <p:sp>
+        <p:nvSpPr>
+          <p:cNvPr id="3" name="Text Placeholder 2">
+            <a:extLst>
+              <a:ext uri="{FF2B5EF4-FFF2-40B4-BE49-F238E27FC236}">
+                <a16:creationId xmlns:a16="http://schemas.microsoft.com/office/drawing/2014/main" id="{14188AF0-954F-45E0-97B5-73D18A416CC7}"/>
+              </a:ext>
+            </a:extLst>
+          </p:cNvPr>
+          <p:cNvSpPr>
+            <a:spLocks noGrp="1"/>
+          </p:cNvSpPr>
+          <p:nvPr>
+            <p:ph idx="1"/>
+          </p:nvPr>
+        </p:nvSpPr>
+        <p:spPr/>
+        <p:txBody>
+          <a:bodyPr/>
+          <a:lstStyle/>
+          <a:p>
+            <a:r>
+              <a:rPr lang="en-US" dirty="0"/>
+              <a:t>Modern shells have support for colors</a:t>
+            </a:r>
+          </a:p>
+          <a:p>
+            <a:pPr lvl="1"/>
+            <a:r>
+              <a:rPr lang="en-US" dirty="0"/>
+              <a:t>Great for distinguishing between file types (directory versus program versus document)</a:t>
+            </a:r>
+          </a:p>
+          <a:p>
+            <a:endParaRPr lang="en-US" dirty="0"/>
+          </a:p>
+        </p:txBody>
+      </p:sp>
+      <p:sp>
+        <p:nvSpPr>
+          <p:cNvPr id="4" name="Date Placeholder 3">
+            <a:extLst>
+              <a:ext uri="{FF2B5EF4-FFF2-40B4-BE49-F238E27FC236}">
+                <a16:creationId xmlns:a16="http://schemas.microsoft.com/office/drawing/2014/main" id="{6D5133BD-4847-4D49-B5BF-4CC178F8FDB8}"/>
+              </a:ext>
+            </a:extLst>
+          </p:cNvPr>
+          <p:cNvSpPr>
+            <a:spLocks noGrp="1"/>
+          </p:cNvSpPr>
+          <p:nvPr>
+            <p:ph type="dt" sz="half" idx="10"/>
+          </p:nvPr>
+        </p:nvSpPr>
+        <p:spPr/>
+        <p:txBody>
+          <a:bodyPr/>
+          <a:lstStyle/>
+          <a:p>
+            <a:fld id="{8AAE40A0-A7D8-4DC3-BC9E-BADA32DA2004}" type="datetime4">
+              <a:rPr lang="en-US" smtClean="0"/>
+              <a:t>August 12, 2019</a:t>
+            </a:fld>
+            <a:endParaRPr lang="en-US" dirty="0"/>
+          </a:p>
+        </p:txBody>
+      </p:sp>
+      <p:sp>
+        <p:nvSpPr>
+          <p:cNvPr id="5" name="Footer Placeholder 4">
+            <a:extLst>
+              <a:ext uri="{FF2B5EF4-FFF2-40B4-BE49-F238E27FC236}">
+                <a16:creationId xmlns:a16="http://schemas.microsoft.com/office/drawing/2014/main" id="{5963B75A-EC19-4470-9F8C-1E2C1FB85999}"/>
+              </a:ext>
+            </a:extLst>
+          </p:cNvPr>
+          <p:cNvSpPr>
+            <a:spLocks noGrp="1"/>
+          </p:cNvSpPr>
+          <p:nvPr>
+            <p:ph type="ftr" sz="quarter" idx="11"/>
+          </p:nvPr>
+        </p:nvSpPr>
+        <p:spPr/>
+        <p:txBody>
+          <a:bodyPr/>
+          <a:lstStyle/>
+          <a:p>
+            <a:r>
+              <a:rPr lang="en-US"/>
+              <a:t>Digital Scholarship Services </a:t>
+            </a:r>
+            <a:r>
+              <a:rPr lang="en-US">
+                <a:solidFill>
+                  <a:schemeClr val="accent1">
+                    <a:lumMod val="50000"/>
+                  </a:schemeClr>
+                </a:solidFill>
+              </a:rPr>
+              <a:t>| Email</a:t>
+            </a:r>
+            <a:r>
+              <a:rPr lang="en-US"/>
+              <a:t> cf24@rice.edu </a:t>
+            </a:r>
+            <a:r>
+              <a:rPr lang="en-US">
+                <a:solidFill>
+                  <a:schemeClr val="accent1">
+                    <a:lumMod val="50000"/>
+                  </a:schemeClr>
+                </a:solidFill>
+              </a:rPr>
+              <a:t>|</a:t>
+            </a:r>
+            <a:r>
+              <a:rPr lang="en-US"/>
+              <a:t> library.rice.edu/dss</a:t>
+            </a:r>
+            <a:endParaRPr lang="en-US" dirty="0"/>
+          </a:p>
+        </p:txBody>
+      </p:sp>
+      <p:sp>
+        <p:nvSpPr>
+          <p:cNvPr id="6" name="Slide Number Placeholder 5">
+            <a:extLst>
+              <a:ext uri="{FF2B5EF4-FFF2-40B4-BE49-F238E27FC236}">
+                <a16:creationId xmlns:a16="http://schemas.microsoft.com/office/drawing/2014/main" id="{BDAB3897-F226-4B28-B7E1-52A0CDB34A2C}"/>
+              </a:ext>
+            </a:extLst>
+          </p:cNvPr>
+          <p:cNvSpPr>
+            <a:spLocks noGrp="1"/>
+          </p:cNvSpPr>
+          <p:nvPr>
+            <p:ph type="sldNum" sz="quarter" idx="12"/>
+          </p:nvPr>
+        </p:nvSpPr>
+        <p:spPr/>
+        <p:txBody>
+          <a:bodyPr/>
+          <a:lstStyle/>
+          <a:p>
+            <a:fld id="{D57F1E4F-1CFF-5643-939E-02111984F565}" type="slidenum">
+              <a:rPr lang="en-US" smtClean="0"/>
+              <a:t>13</a:t>
+            </a:fld>
+            <a:endParaRPr lang="en-US" dirty="0"/>
+          </a:p>
+        </p:txBody>
+      </p:sp>
+    </p:spTree>
+    <p:extLst>
+      <p:ext uri="{BB962C8B-B14F-4D97-AF65-F5344CB8AC3E}">
+        <p14:creationId xmlns:p14="http://schemas.microsoft.com/office/powerpoint/2010/main" val="2818230357"/>
+      </p:ext>
+    </p:extLst>
+  </p:cSld>
+  <p:clrMapOvr>
+    <a:masterClrMapping/>
+  </p:clrMapOvr>
+</p:sld>
+</file>
+
+<file path=ppt/slides/slide14.xml><?xml version="1.0" encoding="utf-8"?>
+<p:sld xmlns:a="http://schemas.openxmlformats.org/drawingml/2006/main" xmlns:r="http://schemas.openxmlformats.org/officeDocument/2006/relationships" xmlns:p="http://schemas.openxmlformats.org/presentationml/2006/main">
+  <p:cSld>
+    <p:spTree>
+      <p:nvGrpSpPr>
+        <p:cNvPr id="1" name=""/>
+        <p:cNvGrpSpPr/>
+        <p:nvPr/>
+      </p:nvGrpSpPr>
+      <p:grpSpPr>
+        <a:xfrm>
+          <a:off x="0" y="0"/>
+          <a:ext cx="0" cy="0"/>
+          <a:chOff x="0" y="0"/>
+          <a:chExt cx="0" cy="0"/>
+        </a:xfrm>
+      </p:grpSpPr>
+      <p:sp>
+        <p:nvSpPr>
+          <p:cNvPr id="2" name="Title 1">
+            <a:extLst>
+              <a:ext uri="{FF2B5EF4-FFF2-40B4-BE49-F238E27FC236}">
+                <a16:creationId xmlns:a16="http://schemas.microsoft.com/office/drawing/2014/main" id="{763619FC-2C00-4A86-9CDA-1BF3459DAC50}"/>
+              </a:ext>
+            </a:extLst>
+          </p:cNvPr>
+          <p:cNvSpPr>
+            <a:spLocks noGrp="1"/>
+          </p:cNvSpPr>
+          <p:nvPr>
+            <p:ph type="title"/>
+          </p:nvPr>
+        </p:nvSpPr>
+        <p:spPr/>
+        <p:txBody>
+          <a:bodyPr/>
+          <a:lstStyle/>
+          <a:p>
+            <a:r>
+              <a:rPr lang="en-US" dirty="0"/>
+              <a:t>PROMPTS</a:t>
+            </a:r>
+          </a:p>
+        </p:txBody>
+      </p:sp>
+      <p:sp>
+        <p:nvSpPr>
+          <p:cNvPr id="3" name="Text Placeholder 2">
+            <a:extLst>
+              <a:ext uri="{FF2B5EF4-FFF2-40B4-BE49-F238E27FC236}">
+                <a16:creationId xmlns:a16="http://schemas.microsoft.com/office/drawing/2014/main" id="{14188AF0-954F-45E0-97B5-73D18A416CC7}"/>
+              </a:ext>
+            </a:extLst>
+          </p:cNvPr>
+          <p:cNvSpPr>
+            <a:spLocks noGrp="1"/>
+          </p:cNvSpPr>
+          <p:nvPr>
+            <p:ph idx="1"/>
+          </p:nvPr>
+        </p:nvSpPr>
+        <p:spPr/>
+        <p:txBody>
+          <a:bodyPr/>
+          <a:lstStyle/>
+          <a:p>
+            <a:r>
+              <a:rPr lang="en-US" dirty="0"/>
+              <a:t>Making your shell look and act its best!</a:t>
+            </a:r>
+          </a:p>
+        </p:txBody>
+      </p:sp>
+      <p:sp>
+        <p:nvSpPr>
+          <p:cNvPr id="4" name="Date Placeholder 3">
+            <a:extLst>
+              <a:ext uri="{FF2B5EF4-FFF2-40B4-BE49-F238E27FC236}">
+                <a16:creationId xmlns:a16="http://schemas.microsoft.com/office/drawing/2014/main" id="{6D5133BD-4847-4D49-B5BF-4CC178F8FDB8}"/>
+              </a:ext>
+            </a:extLst>
+          </p:cNvPr>
+          <p:cNvSpPr>
+            <a:spLocks noGrp="1"/>
+          </p:cNvSpPr>
+          <p:nvPr>
+            <p:ph type="dt" sz="half" idx="10"/>
+          </p:nvPr>
+        </p:nvSpPr>
+        <p:spPr/>
+        <p:txBody>
+          <a:bodyPr/>
+          <a:lstStyle/>
+          <a:p>
+            <a:fld id="{8AAE40A0-A7D8-4DC3-BC9E-BADA32DA2004}" type="datetime4">
+              <a:rPr lang="en-US" smtClean="0"/>
+              <a:t>August 12, 2019</a:t>
+            </a:fld>
+            <a:endParaRPr lang="en-US" dirty="0"/>
+          </a:p>
+        </p:txBody>
+      </p:sp>
+      <p:sp>
+        <p:nvSpPr>
+          <p:cNvPr id="5" name="Footer Placeholder 4">
+            <a:extLst>
+              <a:ext uri="{FF2B5EF4-FFF2-40B4-BE49-F238E27FC236}">
+                <a16:creationId xmlns:a16="http://schemas.microsoft.com/office/drawing/2014/main" id="{5963B75A-EC19-4470-9F8C-1E2C1FB85999}"/>
+              </a:ext>
+            </a:extLst>
+          </p:cNvPr>
+          <p:cNvSpPr>
+            <a:spLocks noGrp="1"/>
+          </p:cNvSpPr>
+          <p:nvPr>
+            <p:ph type="ftr" sz="quarter" idx="11"/>
+          </p:nvPr>
+        </p:nvSpPr>
+        <p:spPr/>
+        <p:txBody>
+          <a:bodyPr/>
+          <a:lstStyle/>
+          <a:p>
+            <a:r>
+              <a:rPr lang="en-US"/>
+              <a:t>Digital Scholarship Services </a:t>
+            </a:r>
+            <a:r>
+              <a:rPr lang="en-US">
+                <a:solidFill>
+                  <a:schemeClr val="accent1">
+                    <a:lumMod val="50000"/>
+                  </a:schemeClr>
+                </a:solidFill>
+              </a:rPr>
+              <a:t>| Email</a:t>
+            </a:r>
+            <a:r>
+              <a:rPr lang="en-US"/>
+              <a:t> cf24@rice.edu </a:t>
+            </a:r>
+            <a:r>
+              <a:rPr lang="en-US">
+                <a:solidFill>
+                  <a:schemeClr val="accent1">
+                    <a:lumMod val="50000"/>
+                  </a:schemeClr>
+                </a:solidFill>
+              </a:rPr>
+              <a:t>|</a:t>
+            </a:r>
+            <a:r>
+              <a:rPr lang="en-US"/>
+              <a:t> library.rice.edu/dss</a:t>
+            </a:r>
+            <a:endParaRPr lang="en-US" dirty="0"/>
+          </a:p>
+        </p:txBody>
+      </p:sp>
+      <p:sp>
+        <p:nvSpPr>
+          <p:cNvPr id="6" name="Slide Number Placeholder 5">
+            <a:extLst>
+              <a:ext uri="{FF2B5EF4-FFF2-40B4-BE49-F238E27FC236}">
+                <a16:creationId xmlns:a16="http://schemas.microsoft.com/office/drawing/2014/main" id="{BDAB3897-F226-4B28-B7E1-52A0CDB34A2C}"/>
+              </a:ext>
+            </a:extLst>
+          </p:cNvPr>
+          <p:cNvSpPr>
+            <a:spLocks noGrp="1"/>
+          </p:cNvSpPr>
+          <p:nvPr>
+            <p:ph type="sldNum" sz="quarter" idx="12"/>
+          </p:nvPr>
+        </p:nvSpPr>
+        <p:spPr/>
+        <p:txBody>
+          <a:bodyPr/>
+          <a:lstStyle/>
+          <a:p>
+            <a:fld id="{D57F1E4F-1CFF-5643-939E-02111984F565}" type="slidenum">
+              <a:rPr lang="en-US" smtClean="0"/>
+              <a:t>14</a:t>
+            </a:fld>
+            <a:endParaRPr lang="en-US" dirty="0"/>
+          </a:p>
+        </p:txBody>
+      </p:sp>
+    </p:spTree>
+    <p:extLst>
+      <p:ext uri="{BB962C8B-B14F-4D97-AF65-F5344CB8AC3E}">
+        <p14:creationId xmlns:p14="http://schemas.microsoft.com/office/powerpoint/2010/main" val="345372323"/>
+      </p:ext>
+    </p:extLst>
+  </p:cSld>
+  <p:clrMapOvr>
+    <a:masterClrMapping/>
+  </p:clrMapOvr>
+</p:sld>
+</file>
+
+<file path=ppt/slides/slide15.xml><?xml version="1.0" encoding="utf-8"?>
+<p:sld xmlns:a="http://schemas.openxmlformats.org/drawingml/2006/main" xmlns:r="http://schemas.openxmlformats.org/officeDocument/2006/relationships" xmlns:p="http://schemas.openxmlformats.org/presentationml/2006/main">
+  <p:cSld>
+    <p:spTree>
+      <p:nvGrpSpPr>
+        <p:cNvPr id="1" name=""/>
+        <p:cNvGrpSpPr/>
+        <p:nvPr/>
+      </p:nvGrpSpPr>
+      <p:grpSpPr>
+        <a:xfrm>
+          <a:off x="0" y="0"/>
+          <a:ext cx="0" cy="0"/>
+          <a:chOff x="0" y="0"/>
+          <a:chExt cx="0" cy="0"/>
+        </a:xfrm>
+      </p:grpSpPr>
+      <p:sp>
+        <p:nvSpPr>
+          <p:cNvPr id="7" name="Title 6">
+            <a:extLst>
+              <a:ext uri="{FF2B5EF4-FFF2-40B4-BE49-F238E27FC236}">
+                <a16:creationId xmlns:a16="http://schemas.microsoft.com/office/drawing/2014/main" id="{495B4BC0-844B-4414-A623-BEF78AAC1BA1}"/>
+              </a:ext>
+            </a:extLst>
+          </p:cNvPr>
+          <p:cNvSpPr>
+            <a:spLocks noGrp="1"/>
+          </p:cNvSpPr>
+          <p:nvPr>
+            <p:ph type="title"/>
+          </p:nvPr>
+        </p:nvSpPr>
+        <p:spPr/>
+        <p:txBody>
+          <a:bodyPr/>
+          <a:lstStyle/>
+          <a:p>
+            <a:r>
+              <a:rPr lang="en-US" dirty="0"/>
+              <a:t>ACKNOWLEDGMENTS</a:t>
+            </a:r>
+          </a:p>
+        </p:txBody>
+      </p:sp>
+      <p:sp>
+        <p:nvSpPr>
+          <p:cNvPr id="8" name="Content Placeholder 7">
+            <a:extLst>
+              <a:ext uri="{FF2B5EF4-FFF2-40B4-BE49-F238E27FC236}">
+                <a16:creationId xmlns:a16="http://schemas.microsoft.com/office/drawing/2014/main" id="{2BED3EB3-7E98-4A82-8335-7321D9E37B16}"/>
+              </a:ext>
+            </a:extLst>
+          </p:cNvPr>
+          <p:cNvSpPr>
+            <a:spLocks noGrp="1"/>
+          </p:cNvSpPr>
+          <p:nvPr>
+            <p:ph idx="1"/>
+          </p:nvPr>
+        </p:nvSpPr>
+        <p:spPr/>
+        <p:txBody>
+          <a:bodyPr/>
+          <a:lstStyle/>
+          <a:p>
+            <a:r>
+              <a:rPr lang="en-US" dirty="0"/>
+              <a:t>The Bash Logo is licensed for free use under the Copyleft license.</a:t>
+            </a:r>
+          </a:p>
+          <a:p>
+            <a:r>
+              <a:rPr lang="en-US" dirty="0"/>
+              <a:t>The bash screenshot on Slide 2 is R and Bash running under a </a:t>
+            </a:r>
+            <a:r>
+              <a:rPr lang="en-US" dirty="0" err="1"/>
+              <a:t>Remmina</a:t>
+            </a:r>
+            <a:r>
+              <a:rPr lang="en-US" dirty="0"/>
+              <a:t> connection.</a:t>
+            </a:r>
+          </a:p>
+          <a:p>
+            <a:r>
+              <a:rPr lang="en-US" dirty="0"/>
+              <a:t>The picture on Slide 6 is licensed under Creative Commons Attribution-</a:t>
+            </a:r>
+            <a:r>
+              <a:rPr lang="en-US" dirty="0" err="1"/>
+              <a:t>ShareAlike</a:t>
+            </a:r>
+            <a:r>
+              <a:rPr lang="en-US" dirty="0"/>
+              <a:t> 4.0 International, created by </a:t>
+            </a:r>
+            <a:r>
+              <a:rPr lang="en-US" dirty="0" err="1"/>
+              <a:t>Gorthmog</a:t>
+            </a:r>
+            <a:endParaRPr lang="en-US" dirty="0"/>
+          </a:p>
+        </p:txBody>
+      </p:sp>
+      <p:sp>
+        <p:nvSpPr>
+          <p:cNvPr id="4" name="Date Placeholder 3">
+            <a:extLst>
+              <a:ext uri="{FF2B5EF4-FFF2-40B4-BE49-F238E27FC236}">
+                <a16:creationId xmlns:a16="http://schemas.microsoft.com/office/drawing/2014/main" id="{540F37F1-4F33-429F-A568-1A3ADC499E54}"/>
+              </a:ext>
+            </a:extLst>
+          </p:cNvPr>
+          <p:cNvSpPr>
+            <a:spLocks noGrp="1"/>
+          </p:cNvSpPr>
+          <p:nvPr>
+            <p:ph type="dt" sz="half" idx="10"/>
+          </p:nvPr>
+        </p:nvSpPr>
+        <p:spPr/>
+        <p:txBody>
+          <a:bodyPr/>
+          <a:lstStyle/>
+          <a:p>
+            <a:fld id="{B08FEED8-D7D4-44E9-BFBC-ED06B5996D94}" type="datetime4">
+              <a:rPr lang="en-US" smtClean="0"/>
+              <a:t>August 12, 2019</a:t>
+            </a:fld>
+            <a:endParaRPr lang="en-US" dirty="0"/>
+          </a:p>
+        </p:txBody>
+      </p:sp>
+      <p:sp>
+        <p:nvSpPr>
+          <p:cNvPr id="5" name="Footer Placeholder 4">
+            <a:extLst>
+              <a:ext uri="{FF2B5EF4-FFF2-40B4-BE49-F238E27FC236}">
+                <a16:creationId xmlns:a16="http://schemas.microsoft.com/office/drawing/2014/main" id="{673FFA57-C126-4795-A5F6-DD33AAC5ACBD}"/>
+              </a:ext>
+            </a:extLst>
+          </p:cNvPr>
+          <p:cNvSpPr>
+            <a:spLocks noGrp="1"/>
+          </p:cNvSpPr>
+          <p:nvPr>
+            <p:ph type="ftr" sz="quarter" idx="11"/>
+          </p:nvPr>
+        </p:nvSpPr>
+        <p:spPr/>
+        <p:txBody>
+          <a:bodyPr/>
+          <a:lstStyle/>
+          <a:p>
+            <a:r>
+              <a:rPr lang="en-US"/>
+              <a:t>Digital Scholarship Services </a:t>
+            </a:r>
+            <a:r>
+              <a:rPr lang="en-US">
+                <a:solidFill>
+                  <a:schemeClr val="accent1">
+                    <a:lumMod val="50000"/>
+                  </a:schemeClr>
+                </a:solidFill>
+              </a:rPr>
+              <a:t>| Email</a:t>
+            </a:r>
+            <a:r>
+              <a:rPr lang="en-US"/>
+              <a:t> cf24@rice.edu </a:t>
+            </a:r>
+            <a:r>
+              <a:rPr lang="en-US">
+                <a:solidFill>
+                  <a:schemeClr val="accent1">
+                    <a:lumMod val="50000"/>
+                  </a:schemeClr>
+                </a:solidFill>
+              </a:rPr>
+              <a:t>|</a:t>
+            </a:r>
+            <a:r>
+              <a:rPr lang="en-US"/>
+              <a:t> library.rice.edu/dss</a:t>
+            </a:r>
+            <a:endParaRPr lang="en-US" dirty="0"/>
+          </a:p>
+        </p:txBody>
+      </p:sp>
+      <p:sp>
+        <p:nvSpPr>
+          <p:cNvPr id="6" name="Slide Number Placeholder 5">
+            <a:extLst>
+              <a:ext uri="{FF2B5EF4-FFF2-40B4-BE49-F238E27FC236}">
+                <a16:creationId xmlns:a16="http://schemas.microsoft.com/office/drawing/2014/main" id="{2FA49567-BB70-4798-8746-D0B522CCEE20}"/>
+              </a:ext>
+            </a:extLst>
+          </p:cNvPr>
+          <p:cNvSpPr>
+            <a:spLocks noGrp="1"/>
+          </p:cNvSpPr>
+          <p:nvPr>
+            <p:ph type="sldNum" sz="quarter" idx="12"/>
+          </p:nvPr>
+        </p:nvSpPr>
+        <p:spPr/>
+        <p:txBody>
+          <a:bodyPr/>
+          <a:lstStyle/>
+          <a:p>
+            <a:fld id="{D57F1E4F-1CFF-5643-939E-02111984F565}" type="slidenum">
+              <a:rPr lang="en-US" smtClean="0"/>
+              <a:t>15</a:t>
+            </a:fld>
+            <a:endParaRPr lang="en-US" dirty="0"/>
+          </a:p>
+        </p:txBody>
+      </p:sp>
+    </p:spTree>
+    <p:extLst>
+      <p:ext uri="{BB962C8B-B14F-4D97-AF65-F5344CB8AC3E}">
+        <p14:creationId xmlns:p14="http://schemas.microsoft.com/office/powerpoint/2010/main" val="1585568494"/>
+      </p:ext>
+    </p:extLst>
+  </p:cSld>
+  <p:clrMapOvr>
+    <a:masterClrMapping/>
+  </p:clrMapOvr>
+</p:sld>
+</file>
+
 <file path=ppt/slides/slide2.xml><?xml version="1.0" encoding="utf-8"?>
 <p:sld xmlns:a="http://schemas.openxmlformats.org/drawingml/2006/main" xmlns:r="http://schemas.openxmlformats.org/officeDocument/2006/relationships" xmlns:p="http://schemas.openxmlformats.org/presentationml/2006/main">
   <p:cSld>
@@ -3860,10 +5660,1755 @@
       </p:grpSpPr>
       <p:sp>
         <p:nvSpPr>
+          <p:cNvPr id="2" name="Title 1">
+            <a:extLst>
+              <a:ext uri="{FF2B5EF4-FFF2-40B4-BE49-F238E27FC236}">
+                <a16:creationId xmlns:a16="http://schemas.microsoft.com/office/drawing/2014/main" id="{641E7742-254F-493E-B06B-9F368BD149D3}"/>
+              </a:ext>
+            </a:extLst>
+          </p:cNvPr>
+          <p:cNvSpPr>
+            <a:spLocks noGrp="1"/>
+          </p:cNvSpPr>
+          <p:nvPr>
+            <p:ph type="title"/>
+          </p:nvPr>
+        </p:nvSpPr>
+        <p:spPr/>
+        <p:txBody>
+          <a:bodyPr/>
+          <a:lstStyle/>
+          <a:p>
+            <a:r>
+              <a:rPr lang="en-US" dirty="0"/>
+              <a:t>WHAT IS A SHELL?</a:t>
+            </a:r>
+          </a:p>
+        </p:txBody>
+      </p:sp>
+      <p:pic>
+        <p:nvPicPr>
+          <p:cNvPr id="11" name="Content Placeholder 10" descr="A close up of text on a black background&#10;&#10;Description automatically generated">
+            <a:extLst>
+              <a:ext uri="{FF2B5EF4-FFF2-40B4-BE49-F238E27FC236}">
+                <a16:creationId xmlns:a16="http://schemas.microsoft.com/office/drawing/2014/main" id="{8A358155-5782-42C3-9D25-574A422AC866}"/>
+              </a:ext>
+            </a:extLst>
+          </p:cNvPr>
+          <p:cNvPicPr>
+            <a:picLocks noGrp="1" noChangeAspect="1"/>
+          </p:cNvPicPr>
+          <p:nvPr>
+            <p:ph idx="1"/>
+          </p:nvPr>
+        </p:nvPicPr>
+        <p:blipFill>
+          <a:blip r:embed="rId2"/>
+          <a:stretch>
+            <a:fillRect/>
+          </a:stretch>
+        </p:blipFill>
+        <p:spPr>
+          <a:xfrm>
+            <a:off x="6481570" y="1574613"/>
+            <a:ext cx="5073848" cy="4351338"/>
+          </a:xfrm>
+        </p:spPr>
+      </p:pic>
+      <p:sp>
+        <p:nvSpPr>
+          <p:cNvPr id="4" name="Date Placeholder 3">
+            <a:extLst>
+              <a:ext uri="{FF2B5EF4-FFF2-40B4-BE49-F238E27FC236}">
+                <a16:creationId xmlns:a16="http://schemas.microsoft.com/office/drawing/2014/main" id="{A9E764D9-D59D-490D-B0E4-5440A699C445}"/>
+              </a:ext>
+            </a:extLst>
+          </p:cNvPr>
+          <p:cNvSpPr>
+            <a:spLocks noGrp="1"/>
+          </p:cNvSpPr>
+          <p:nvPr>
+            <p:ph type="dt" sz="half" idx="10"/>
+          </p:nvPr>
+        </p:nvSpPr>
+        <p:spPr/>
+        <p:txBody>
+          <a:bodyPr/>
+          <a:lstStyle/>
+          <a:p>
+            <a:fld id="{8AAE40A0-A7D8-4DC3-BC9E-BADA32DA2004}" type="datetime4">
+              <a:rPr lang="en-US" smtClean="0"/>
+              <a:pPr/>
+              <a:t>August 12, 2019</a:t>
+            </a:fld>
+            <a:endParaRPr lang="en-US" dirty="0"/>
+          </a:p>
+        </p:txBody>
+      </p:sp>
+      <p:sp>
+        <p:nvSpPr>
+          <p:cNvPr id="5" name="Footer Placeholder 4">
+            <a:extLst>
+              <a:ext uri="{FF2B5EF4-FFF2-40B4-BE49-F238E27FC236}">
+                <a16:creationId xmlns:a16="http://schemas.microsoft.com/office/drawing/2014/main" id="{5B8BB806-C28A-4E70-BB77-9473ECE5C58C}"/>
+              </a:ext>
+            </a:extLst>
+          </p:cNvPr>
+          <p:cNvSpPr>
+            <a:spLocks noGrp="1"/>
+          </p:cNvSpPr>
+          <p:nvPr>
+            <p:ph type="ftr" sz="quarter" idx="11"/>
+          </p:nvPr>
+        </p:nvSpPr>
+        <p:spPr/>
+        <p:txBody>
+          <a:bodyPr/>
+          <a:lstStyle/>
+          <a:p>
+            <a:r>
+              <a:rPr lang="en-US"/>
+              <a:t>Digital Scholarship Services | Email cf24@rice.edu | library.rice.edu/dss</a:t>
+            </a:r>
+            <a:endParaRPr lang="en-US" dirty="0"/>
+          </a:p>
+        </p:txBody>
+      </p:sp>
+      <p:sp>
+        <p:nvSpPr>
+          <p:cNvPr id="6" name="Slide Number Placeholder 5">
+            <a:extLst>
+              <a:ext uri="{FF2B5EF4-FFF2-40B4-BE49-F238E27FC236}">
+                <a16:creationId xmlns:a16="http://schemas.microsoft.com/office/drawing/2014/main" id="{00EEFD0C-22FE-446F-BD85-29793ED44139}"/>
+              </a:ext>
+            </a:extLst>
+          </p:cNvPr>
+          <p:cNvSpPr>
+            <a:spLocks noGrp="1"/>
+          </p:cNvSpPr>
+          <p:nvPr>
+            <p:ph type="sldNum" sz="quarter" idx="12"/>
+          </p:nvPr>
+        </p:nvSpPr>
+        <p:spPr/>
+        <p:txBody>
+          <a:bodyPr/>
+          <a:lstStyle/>
+          <a:p>
+            <a:fld id="{D57F1E4F-1CFF-5643-939E-02111984F565}" type="slidenum">
+              <a:rPr lang="en-US" smtClean="0"/>
+              <a:pPr/>
+              <a:t>2</a:t>
+            </a:fld>
+            <a:endParaRPr lang="en-US" dirty="0"/>
+          </a:p>
+        </p:txBody>
+      </p:sp>
+      <p:sp>
+        <p:nvSpPr>
+          <p:cNvPr id="22" name="Content Placeholder 2">
+            <a:extLst>
+              <a:ext uri="{FF2B5EF4-FFF2-40B4-BE49-F238E27FC236}">
+                <a16:creationId xmlns:a16="http://schemas.microsoft.com/office/drawing/2014/main" id="{E93329CB-B15B-4E3A-8FDB-D82A1DC121F2}"/>
+              </a:ext>
+            </a:extLst>
+          </p:cNvPr>
+          <p:cNvSpPr txBox="1">
+            <a:spLocks/>
+          </p:cNvSpPr>
+          <p:nvPr/>
+        </p:nvSpPr>
+        <p:spPr>
+          <a:xfrm>
+            <a:off x="838200" y="1825625"/>
+            <a:ext cx="5257800" cy="4351338"/>
+          </a:xfrm>
+          <a:prstGeom prst="rect">
+            <a:avLst/>
+          </a:prstGeom>
+        </p:spPr>
+        <p:txBody>
+          <a:bodyPr vert="horz" lIns="91440" tIns="45720" rIns="91440" bIns="45720" rtlCol="0">
+            <a:normAutofit/>
+          </a:bodyPr>
+          <a:lstStyle>
+            <a:lvl1pPr marL="228600" indent="-228600" algn="l" defTabSz="914400" rtl="0" eaLnBrk="1" latinLnBrk="0" hangingPunct="1">
+              <a:lnSpc>
+                <a:spcPct val="90000"/>
+              </a:lnSpc>
+              <a:spcBef>
+                <a:spcPts val="1000"/>
+              </a:spcBef>
+              <a:buFont typeface="Arial" panose="020B0604020202020204" pitchFamily="34" charset="0"/>
+              <a:buChar char="•"/>
+              <a:defRPr sz="2800" kern="1200">
+                <a:solidFill>
+                  <a:schemeClr val="tx1"/>
+                </a:solidFill>
+                <a:latin typeface="+mn-lt"/>
+                <a:ea typeface="+mn-ea"/>
+                <a:cs typeface="+mn-cs"/>
+              </a:defRPr>
+            </a:lvl1pPr>
+            <a:lvl2pPr marL="685800" indent="-228600" algn="l" defTabSz="914400" rtl="0" eaLnBrk="1" latinLnBrk="0" hangingPunct="1">
+              <a:lnSpc>
+                <a:spcPct val="90000"/>
+              </a:lnSpc>
+              <a:spcBef>
+                <a:spcPts val="500"/>
+              </a:spcBef>
+              <a:buFont typeface="Arial" panose="020B0604020202020204" pitchFamily="34" charset="0"/>
+              <a:buChar char="•"/>
+              <a:defRPr sz="2400" kern="1200">
+                <a:solidFill>
+                  <a:schemeClr val="tx1"/>
+                </a:solidFill>
+                <a:latin typeface="+mn-lt"/>
+                <a:ea typeface="+mn-ea"/>
+                <a:cs typeface="+mn-cs"/>
+              </a:defRPr>
+            </a:lvl2pPr>
+            <a:lvl3pPr marL="1143000" indent="-228600" algn="l" defTabSz="914400" rtl="0" eaLnBrk="1" latinLnBrk="0" hangingPunct="1">
+              <a:lnSpc>
+                <a:spcPct val="90000"/>
+              </a:lnSpc>
+              <a:spcBef>
+                <a:spcPts val="500"/>
+              </a:spcBef>
+              <a:buFont typeface="Arial" panose="020B0604020202020204" pitchFamily="34" charset="0"/>
+              <a:buChar char="•"/>
+              <a:defRPr sz="2000" kern="1200">
+                <a:solidFill>
+                  <a:schemeClr val="tx1"/>
+                </a:solidFill>
+                <a:latin typeface="+mn-lt"/>
+                <a:ea typeface="+mn-ea"/>
+                <a:cs typeface="+mn-cs"/>
+              </a:defRPr>
+            </a:lvl3pPr>
+            <a:lvl4pPr marL="1600200" indent="-228600" algn="l" defTabSz="914400" rtl="0" eaLnBrk="1" latinLnBrk="0" hangingPunct="1">
+              <a:lnSpc>
+                <a:spcPct val="90000"/>
+              </a:lnSpc>
+              <a:spcBef>
+                <a:spcPts val="500"/>
+              </a:spcBef>
+              <a:buFont typeface="Arial" panose="020B0604020202020204" pitchFamily="34" charset="0"/>
+              <a:buChar char="•"/>
+              <a:defRPr sz="1800" kern="1200">
+                <a:solidFill>
+                  <a:schemeClr val="tx1"/>
+                </a:solidFill>
+                <a:latin typeface="+mn-lt"/>
+                <a:ea typeface="+mn-ea"/>
+                <a:cs typeface="+mn-cs"/>
+              </a:defRPr>
+            </a:lvl4pPr>
+            <a:lvl5pPr marL="2057400" indent="-228600" algn="l" defTabSz="914400" rtl="0" eaLnBrk="1" latinLnBrk="0" hangingPunct="1">
+              <a:lnSpc>
+                <a:spcPct val="90000"/>
+              </a:lnSpc>
+              <a:spcBef>
+                <a:spcPts val="500"/>
+              </a:spcBef>
+              <a:buFont typeface="Arial" panose="020B0604020202020204" pitchFamily="34" charset="0"/>
+              <a:buChar char="•"/>
+              <a:defRPr sz="1800" kern="1200">
+                <a:solidFill>
+                  <a:schemeClr val="tx1"/>
+                </a:solidFill>
+                <a:latin typeface="+mn-lt"/>
+                <a:ea typeface="+mn-ea"/>
+                <a:cs typeface="+mn-cs"/>
+              </a:defRPr>
+            </a:lvl5pPr>
+            <a:lvl6pPr marL="2514600" indent="-228600" algn="l" defTabSz="914400" rtl="0" eaLnBrk="1" latinLnBrk="0" hangingPunct="1">
+              <a:lnSpc>
+                <a:spcPct val="90000"/>
+              </a:lnSpc>
+              <a:spcBef>
+                <a:spcPts val="500"/>
+              </a:spcBef>
+              <a:buFont typeface="Arial" panose="020B0604020202020204" pitchFamily="34" charset="0"/>
+              <a:buChar char="•"/>
+              <a:defRPr sz="1800" kern="1200">
+                <a:solidFill>
+                  <a:schemeClr val="tx1"/>
+                </a:solidFill>
+                <a:latin typeface="+mn-lt"/>
+                <a:ea typeface="+mn-ea"/>
+                <a:cs typeface="+mn-cs"/>
+              </a:defRPr>
+            </a:lvl6pPr>
+            <a:lvl7pPr marL="2971800" indent="-228600" algn="l" defTabSz="914400" rtl="0" eaLnBrk="1" latinLnBrk="0" hangingPunct="1">
+              <a:lnSpc>
+                <a:spcPct val="90000"/>
+              </a:lnSpc>
+              <a:spcBef>
+                <a:spcPts val="500"/>
+              </a:spcBef>
+              <a:buFont typeface="Arial" panose="020B0604020202020204" pitchFamily="34" charset="0"/>
+              <a:buChar char="•"/>
+              <a:defRPr sz="1800" kern="1200">
+                <a:solidFill>
+                  <a:schemeClr val="tx1"/>
+                </a:solidFill>
+                <a:latin typeface="+mn-lt"/>
+                <a:ea typeface="+mn-ea"/>
+                <a:cs typeface="+mn-cs"/>
+              </a:defRPr>
+            </a:lvl7pPr>
+            <a:lvl8pPr marL="3429000" indent="-228600" algn="l" defTabSz="914400" rtl="0" eaLnBrk="1" latinLnBrk="0" hangingPunct="1">
+              <a:lnSpc>
+                <a:spcPct val="90000"/>
+              </a:lnSpc>
+              <a:spcBef>
+                <a:spcPts val="500"/>
+              </a:spcBef>
+              <a:buFont typeface="Arial" panose="020B0604020202020204" pitchFamily="34" charset="0"/>
+              <a:buChar char="•"/>
+              <a:defRPr sz="1800" kern="1200">
+                <a:solidFill>
+                  <a:schemeClr val="tx1"/>
+                </a:solidFill>
+                <a:latin typeface="+mn-lt"/>
+                <a:ea typeface="+mn-ea"/>
+                <a:cs typeface="+mn-cs"/>
+              </a:defRPr>
+            </a:lvl8pPr>
+            <a:lvl9pPr marL="3886200" indent="-228600" algn="l" defTabSz="914400" rtl="0" eaLnBrk="1" latinLnBrk="0" hangingPunct="1">
+              <a:lnSpc>
+                <a:spcPct val="90000"/>
+              </a:lnSpc>
+              <a:spcBef>
+                <a:spcPts val="500"/>
+              </a:spcBef>
+              <a:buFont typeface="Arial" panose="020B0604020202020204" pitchFamily="34" charset="0"/>
+              <a:buChar char="•"/>
+              <a:defRPr sz="1800" kern="1200">
+                <a:solidFill>
+                  <a:schemeClr val="tx1"/>
+                </a:solidFill>
+                <a:latin typeface="+mn-lt"/>
+                <a:ea typeface="+mn-ea"/>
+                <a:cs typeface="+mn-cs"/>
+              </a:defRPr>
+            </a:lvl9pPr>
+          </a:lstStyle>
+          <a:p>
+            <a:r>
+              <a:rPr lang="en-US" dirty="0"/>
+              <a:t>Most simple interface to an operating system</a:t>
+            </a:r>
+          </a:p>
+          <a:p>
+            <a:r>
+              <a:rPr lang="en-US" dirty="0"/>
+              <a:t>Allows easy execution of programs and file operations</a:t>
+            </a:r>
+          </a:p>
+          <a:p>
+            <a:r>
+              <a:rPr lang="en-US" dirty="0"/>
+              <a:t>Highly configurable without needing to sort through massive menus</a:t>
+            </a:r>
+          </a:p>
+          <a:p>
+            <a:r>
+              <a:rPr lang="en-US" dirty="0"/>
+              <a:t>Fast and lightweight</a:t>
+            </a:r>
+          </a:p>
+        </p:txBody>
+      </p:sp>
+    </p:spTree>
+    <p:extLst>
+      <p:ext uri="{BB962C8B-B14F-4D97-AF65-F5344CB8AC3E}">
+        <p14:creationId xmlns:p14="http://schemas.microsoft.com/office/powerpoint/2010/main" val="2699201933"/>
+      </p:ext>
+    </p:extLst>
+  </p:cSld>
+  <p:clrMapOvr>
+    <a:masterClrMapping/>
+  </p:clrMapOvr>
+</p:sld>
+</file>
+
+<file path=ppt/slides/slide3.xml><?xml version="1.0" encoding="utf-8"?>
+<p:sld xmlns:a="http://schemas.openxmlformats.org/drawingml/2006/main" xmlns:r="http://schemas.openxmlformats.org/officeDocument/2006/relationships" xmlns:p="http://schemas.openxmlformats.org/presentationml/2006/main">
+  <p:cSld>
+    <p:spTree>
+      <p:nvGrpSpPr>
+        <p:cNvPr id="1" name=""/>
+        <p:cNvGrpSpPr/>
+        <p:nvPr/>
+      </p:nvGrpSpPr>
+      <p:grpSpPr>
+        <a:xfrm>
+          <a:off x="0" y="0"/>
+          <a:ext cx="0" cy="0"/>
+          <a:chOff x="0" y="0"/>
+          <a:chExt cx="0" cy="0"/>
+        </a:xfrm>
+      </p:grpSpPr>
+      <p:sp>
+        <p:nvSpPr>
+          <p:cNvPr id="2" name="Title 1">
+            <a:extLst>
+              <a:ext uri="{FF2B5EF4-FFF2-40B4-BE49-F238E27FC236}">
+                <a16:creationId xmlns:a16="http://schemas.microsoft.com/office/drawing/2014/main" id="{641E7742-254F-493E-B06B-9F368BD149D3}"/>
+              </a:ext>
+            </a:extLst>
+          </p:cNvPr>
+          <p:cNvSpPr>
+            <a:spLocks noGrp="1"/>
+          </p:cNvSpPr>
+          <p:nvPr>
+            <p:ph type="title"/>
+          </p:nvPr>
+        </p:nvSpPr>
+        <p:spPr/>
+        <p:txBody>
+          <a:bodyPr/>
+          <a:lstStyle/>
+          <a:p>
+            <a:r>
+              <a:rPr lang="en-US" dirty="0"/>
+              <a:t>WHAT IS BASH?</a:t>
+            </a:r>
+          </a:p>
+        </p:txBody>
+      </p:sp>
+      <p:sp>
+        <p:nvSpPr>
+          <p:cNvPr id="3" name="Content Placeholder 2">
+            <a:extLst>
+              <a:ext uri="{FF2B5EF4-FFF2-40B4-BE49-F238E27FC236}">
+                <a16:creationId xmlns:a16="http://schemas.microsoft.com/office/drawing/2014/main" id="{C8AE54F6-A616-4DFF-AB96-AF1109F77700}"/>
+              </a:ext>
+            </a:extLst>
+          </p:cNvPr>
+          <p:cNvSpPr>
+            <a:spLocks noGrp="1"/>
+          </p:cNvSpPr>
+          <p:nvPr>
+            <p:ph idx="1"/>
+          </p:nvPr>
+        </p:nvSpPr>
+        <p:spPr/>
+        <p:txBody>
+          <a:bodyPr/>
+          <a:lstStyle/>
+          <a:p>
+            <a:r>
+              <a:rPr lang="en-US" dirty="0"/>
+              <a:t>Bourne-Again Shell</a:t>
+            </a:r>
+          </a:p>
+          <a:p>
+            <a:pPr lvl="1"/>
+            <a:r>
+              <a:rPr lang="en-US" dirty="0"/>
+              <a:t>Play on words:  Stephen Bourne wrote the initial Unix shell</a:t>
+            </a:r>
+          </a:p>
+          <a:p>
+            <a:r>
+              <a:rPr lang="en-US" dirty="0"/>
+              <a:t>Improved on Bourne shell (</a:t>
+            </a:r>
+            <a:r>
+              <a:rPr lang="en-US" dirty="0" err="1"/>
+              <a:t>sh</a:t>
+            </a:r>
+            <a:r>
+              <a:rPr lang="en-US" dirty="0"/>
+              <a:t>)</a:t>
+            </a:r>
+          </a:p>
+          <a:p>
+            <a:pPr lvl="1"/>
+            <a:r>
+              <a:rPr lang="en-US" dirty="0"/>
+              <a:t>More features, better </a:t>
+            </a:r>
+            <a:r>
+              <a:rPr lang="en-US" dirty="0" err="1"/>
+              <a:t>builtins</a:t>
+            </a:r>
+            <a:endParaRPr lang="en-US" dirty="0"/>
+          </a:p>
+          <a:p>
+            <a:r>
+              <a:rPr lang="en-US" dirty="0"/>
+              <a:t>Completely free and open-source for all platforms, licensed under the GNU public license</a:t>
+            </a:r>
+          </a:p>
+          <a:p>
+            <a:endParaRPr lang="en-US" dirty="0"/>
+          </a:p>
+        </p:txBody>
+      </p:sp>
+      <p:sp>
+        <p:nvSpPr>
+          <p:cNvPr id="4" name="Date Placeholder 3">
+            <a:extLst>
+              <a:ext uri="{FF2B5EF4-FFF2-40B4-BE49-F238E27FC236}">
+                <a16:creationId xmlns:a16="http://schemas.microsoft.com/office/drawing/2014/main" id="{A9E764D9-D59D-490D-B0E4-5440A699C445}"/>
+              </a:ext>
+            </a:extLst>
+          </p:cNvPr>
+          <p:cNvSpPr>
+            <a:spLocks noGrp="1"/>
+          </p:cNvSpPr>
+          <p:nvPr>
+            <p:ph type="dt" sz="half" idx="10"/>
+          </p:nvPr>
+        </p:nvSpPr>
+        <p:spPr/>
+        <p:txBody>
+          <a:bodyPr/>
+          <a:lstStyle/>
+          <a:p>
+            <a:fld id="{8AAE40A0-A7D8-4DC3-BC9E-BADA32DA2004}" type="datetime4">
+              <a:rPr lang="en-US" smtClean="0"/>
+              <a:t>August 12, 2019</a:t>
+            </a:fld>
+            <a:endParaRPr lang="en-US" dirty="0"/>
+          </a:p>
+        </p:txBody>
+      </p:sp>
+      <p:sp>
+        <p:nvSpPr>
+          <p:cNvPr id="5" name="Footer Placeholder 4">
+            <a:extLst>
+              <a:ext uri="{FF2B5EF4-FFF2-40B4-BE49-F238E27FC236}">
+                <a16:creationId xmlns:a16="http://schemas.microsoft.com/office/drawing/2014/main" id="{5B8BB806-C28A-4E70-BB77-9473ECE5C58C}"/>
+              </a:ext>
+            </a:extLst>
+          </p:cNvPr>
+          <p:cNvSpPr>
+            <a:spLocks noGrp="1"/>
+          </p:cNvSpPr>
+          <p:nvPr>
+            <p:ph type="ftr" sz="quarter" idx="11"/>
+          </p:nvPr>
+        </p:nvSpPr>
+        <p:spPr/>
+        <p:txBody>
+          <a:bodyPr/>
+          <a:lstStyle/>
+          <a:p>
+            <a:r>
+              <a:rPr lang="en-US"/>
+              <a:t>Digital Scholarship Services </a:t>
+            </a:r>
+            <a:r>
+              <a:rPr lang="en-US">
+                <a:solidFill>
+                  <a:schemeClr val="accent1">
+                    <a:lumMod val="50000"/>
+                  </a:schemeClr>
+                </a:solidFill>
+              </a:rPr>
+              <a:t>| Email</a:t>
+            </a:r>
+            <a:r>
+              <a:rPr lang="en-US"/>
+              <a:t> cf24@rice.edu </a:t>
+            </a:r>
+            <a:r>
+              <a:rPr lang="en-US">
+                <a:solidFill>
+                  <a:schemeClr val="accent1">
+                    <a:lumMod val="50000"/>
+                  </a:schemeClr>
+                </a:solidFill>
+              </a:rPr>
+              <a:t>|</a:t>
+            </a:r>
+            <a:r>
+              <a:rPr lang="en-US"/>
+              <a:t> library.rice.edu/dss</a:t>
+            </a:r>
+            <a:endParaRPr lang="en-US" dirty="0"/>
+          </a:p>
+        </p:txBody>
+      </p:sp>
+      <p:sp>
+        <p:nvSpPr>
+          <p:cNvPr id="6" name="Slide Number Placeholder 5">
+            <a:extLst>
+              <a:ext uri="{FF2B5EF4-FFF2-40B4-BE49-F238E27FC236}">
+                <a16:creationId xmlns:a16="http://schemas.microsoft.com/office/drawing/2014/main" id="{00EEFD0C-22FE-446F-BD85-29793ED44139}"/>
+              </a:ext>
+            </a:extLst>
+          </p:cNvPr>
+          <p:cNvSpPr>
+            <a:spLocks noGrp="1"/>
+          </p:cNvSpPr>
+          <p:nvPr>
+            <p:ph type="sldNum" sz="quarter" idx="12"/>
+          </p:nvPr>
+        </p:nvSpPr>
+        <p:spPr/>
+        <p:txBody>
+          <a:bodyPr/>
+          <a:lstStyle/>
+          <a:p>
+            <a:fld id="{D57F1E4F-1CFF-5643-939E-02111984F565}" type="slidenum">
+              <a:rPr lang="en-US" smtClean="0"/>
+              <a:t>3</a:t>
+            </a:fld>
+            <a:endParaRPr lang="en-US" dirty="0"/>
+          </a:p>
+        </p:txBody>
+      </p:sp>
+    </p:spTree>
+    <p:extLst>
+      <p:ext uri="{BB962C8B-B14F-4D97-AF65-F5344CB8AC3E}">
+        <p14:creationId xmlns:p14="http://schemas.microsoft.com/office/powerpoint/2010/main" val="3507869141"/>
+      </p:ext>
+    </p:extLst>
+  </p:cSld>
+  <p:clrMapOvr>
+    <a:masterClrMapping/>
+  </p:clrMapOvr>
+</p:sld>
+</file>
+
+<file path=ppt/slides/slide4.xml><?xml version="1.0" encoding="utf-8"?>
+<p:sld xmlns:a="http://schemas.openxmlformats.org/drawingml/2006/main" xmlns:r="http://schemas.openxmlformats.org/officeDocument/2006/relationships" xmlns:p="http://schemas.openxmlformats.org/presentationml/2006/main">
+  <p:cSld>
+    <p:spTree>
+      <p:nvGrpSpPr>
+        <p:cNvPr id="1" name=""/>
+        <p:cNvGrpSpPr/>
+        <p:nvPr/>
+      </p:nvGrpSpPr>
+      <p:grpSpPr>
+        <a:xfrm>
+          <a:off x="0" y="0"/>
+          <a:ext cx="0" cy="0"/>
+          <a:chOff x="0" y="0"/>
+          <a:chExt cx="0" cy="0"/>
+        </a:xfrm>
+      </p:grpSpPr>
+      <p:sp>
+        <p:nvSpPr>
+          <p:cNvPr id="2" name="Title 1">
+            <a:extLst>
+              <a:ext uri="{FF2B5EF4-FFF2-40B4-BE49-F238E27FC236}">
+                <a16:creationId xmlns:a16="http://schemas.microsoft.com/office/drawing/2014/main" id="{641E7742-254F-493E-B06B-9F368BD149D3}"/>
+              </a:ext>
+            </a:extLst>
+          </p:cNvPr>
+          <p:cNvSpPr>
+            <a:spLocks noGrp="1"/>
+          </p:cNvSpPr>
+          <p:nvPr>
+            <p:ph type="title"/>
+          </p:nvPr>
+        </p:nvSpPr>
+        <p:spPr/>
+        <p:txBody>
+          <a:bodyPr/>
+          <a:lstStyle/>
+          <a:p>
+            <a:r>
+              <a:rPr lang="en-US" dirty="0"/>
+              <a:t>HOW DO I GET BASH?</a:t>
+            </a:r>
+          </a:p>
+        </p:txBody>
+      </p:sp>
+      <p:sp>
+        <p:nvSpPr>
+          <p:cNvPr id="3" name="Content Placeholder 2">
+            <a:extLst>
+              <a:ext uri="{FF2B5EF4-FFF2-40B4-BE49-F238E27FC236}">
+                <a16:creationId xmlns:a16="http://schemas.microsoft.com/office/drawing/2014/main" id="{C8AE54F6-A616-4DFF-AB96-AF1109F77700}"/>
+              </a:ext>
+            </a:extLst>
+          </p:cNvPr>
+          <p:cNvSpPr>
+            <a:spLocks noGrp="1"/>
+          </p:cNvSpPr>
+          <p:nvPr>
+            <p:ph idx="1"/>
+          </p:nvPr>
+        </p:nvSpPr>
+        <p:spPr/>
+        <p:txBody>
+          <a:bodyPr/>
+          <a:lstStyle/>
+          <a:p>
+            <a:r>
+              <a:rPr lang="en-US" dirty="0"/>
+              <a:t>On Unix-based platforms (Mac OS, Linux, </a:t>
+            </a:r>
+            <a:r>
+              <a:rPr lang="en-US" dirty="0" err="1"/>
+              <a:t>etc</a:t>
+            </a:r>
+            <a:r>
+              <a:rPr lang="en-US" dirty="0"/>
+              <a:t>) it will almost always be installed by default</a:t>
+            </a:r>
+          </a:p>
+          <a:p>
+            <a:r>
+              <a:rPr lang="en-US" dirty="0"/>
+              <a:t>Windows (the only major non-Unix-based OS):</a:t>
+            </a:r>
+          </a:p>
+          <a:p>
+            <a:pPr lvl="1"/>
+            <a:r>
+              <a:rPr lang="en-US" dirty="0"/>
+              <a:t>Install </a:t>
+            </a:r>
+            <a:r>
+              <a:rPr lang="en-US" dirty="0" err="1"/>
+              <a:t>minGW</a:t>
+            </a:r>
+            <a:r>
+              <a:rPr lang="en-US" dirty="0"/>
+              <a:t> (minimalist GNU for Windows)</a:t>
+            </a:r>
+          </a:p>
+          <a:p>
+            <a:pPr lvl="1"/>
+            <a:r>
+              <a:rPr lang="en-US" dirty="0"/>
+              <a:t>Make sure to select the </a:t>
+            </a:r>
+            <a:r>
+              <a:rPr lang="en-US" dirty="0" err="1"/>
+              <a:t>msys</a:t>
+            </a:r>
+            <a:r>
+              <a:rPr lang="en-US" dirty="0"/>
+              <a:t> developer kit!</a:t>
+            </a:r>
+          </a:p>
+        </p:txBody>
+      </p:sp>
+      <p:sp>
+        <p:nvSpPr>
+          <p:cNvPr id="4" name="Date Placeholder 3">
+            <a:extLst>
+              <a:ext uri="{FF2B5EF4-FFF2-40B4-BE49-F238E27FC236}">
+                <a16:creationId xmlns:a16="http://schemas.microsoft.com/office/drawing/2014/main" id="{A9E764D9-D59D-490D-B0E4-5440A699C445}"/>
+              </a:ext>
+            </a:extLst>
+          </p:cNvPr>
+          <p:cNvSpPr>
+            <a:spLocks noGrp="1"/>
+          </p:cNvSpPr>
+          <p:nvPr>
+            <p:ph type="dt" sz="half" idx="10"/>
+          </p:nvPr>
+        </p:nvSpPr>
+        <p:spPr/>
+        <p:txBody>
+          <a:bodyPr/>
+          <a:lstStyle/>
+          <a:p>
+            <a:fld id="{8AAE40A0-A7D8-4DC3-BC9E-BADA32DA2004}" type="datetime4">
+              <a:rPr lang="en-US" smtClean="0"/>
+              <a:t>August 12, 2019</a:t>
+            </a:fld>
+            <a:endParaRPr lang="en-US" dirty="0"/>
+          </a:p>
+        </p:txBody>
+      </p:sp>
+      <p:sp>
+        <p:nvSpPr>
+          <p:cNvPr id="5" name="Footer Placeholder 4">
+            <a:extLst>
+              <a:ext uri="{FF2B5EF4-FFF2-40B4-BE49-F238E27FC236}">
+                <a16:creationId xmlns:a16="http://schemas.microsoft.com/office/drawing/2014/main" id="{5B8BB806-C28A-4E70-BB77-9473ECE5C58C}"/>
+              </a:ext>
+            </a:extLst>
+          </p:cNvPr>
+          <p:cNvSpPr>
+            <a:spLocks noGrp="1"/>
+          </p:cNvSpPr>
+          <p:nvPr>
+            <p:ph type="ftr" sz="quarter" idx="11"/>
+          </p:nvPr>
+        </p:nvSpPr>
+        <p:spPr/>
+        <p:txBody>
+          <a:bodyPr/>
+          <a:lstStyle/>
+          <a:p>
+            <a:r>
+              <a:rPr lang="en-US"/>
+              <a:t>Digital Scholarship Services </a:t>
+            </a:r>
+            <a:r>
+              <a:rPr lang="en-US">
+                <a:solidFill>
+                  <a:schemeClr val="accent1">
+                    <a:lumMod val="50000"/>
+                  </a:schemeClr>
+                </a:solidFill>
+              </a:rPr>
+              <a:t>| Email</a:t>
+            </a:r>
+            <a:r>
+              <a:rPr lang="en-US"/>
+              <a:t> cf24@rice.edu </a:t>
+            </a:r>
+            <a:r>
+              <a:rPr lang="en-US">
+                <a:solidFill>
+                  <a:schemeClr val="accent1">
+                    <a:lumMod val="50000"/>
+                  </a:schemeClr>
+                </a:solidFill>
+              </a:rPr>
+              <a:t>|</a:t>
+            </a:r>
+            <a:r>
+              <a:rPr lang="en-US"/>
+              <a:t> library.rice.edu/dss</a:t>
+            </a:r>
+            <a:endParaRPr lang="en-US" dirty="0"/>
+          </a:p>
+        </p:txBody>
+      </p:sp>
+      <p:sp>
+        <p:nvSpPr>
+          <p:cNvPr id="6" name="Slide Number Placeholder 5">
+            <a:extLst>
+              <a:ext uri="{FF2B5EF4-FFF2-40B4-BE49-F238E27FC236}">
+                <a16:creationId xmlns:a16="http://schemas.microsoft.com/office/drawing/2014/main" id="{00EEFD0C-22FE-446F-BD85-29793ED44139}"/>
+              </a:ext>
+            </a:extLst>
+          </p:cNvPr>
+          <p:cNvSpPr>
+            <a:spLocks noGrp="1"/>
+          </p:cNvSpPr>
+          <p:nvPr>
+            <p:ph type="sldNum" sz="quarter" idx="12"/>
+          </p:nvPr>
+        </p:nvSpPr>
+        <p:spPr/>
+        <p:txBody>
+          <a:bodyPr/>
+          <a:lstStyle/>
+          <a:p>
+            <a:fld id="{D57F1E4F-1CFF-5643-939E-02111984F565}" type="slidenum">
+              <a:rPr lang="en-US" smtClean="0"/>
+              <a:t>4</a:t>
+            </a:fld>
+            <a:endParaRPr lang="en-US" dirty="0"/>
+          </a:p>
+        </p:txBody>
+      </p:sp>
+    </p:spTree>
+    <p:extLst>
+      <p:ext uri="{BB962C8B-B14F-4D97-AF65-F5344CB8AC3E}">
+        <p14:creationId xmlns:p14="http://schemas.microsoft.com/office/powerpoint/2010/main" val="834182939"/>
+      </p:ext>
+    </p:extLst>
+  </p:cSld>
+  <p:clrMapOvr>
+    <a:masterClrMapping/>
+  </p:clrMapOvr>
+</p:sld>
+</file>
+
+<file path=ppt/slides/slide5.xml><?xml version="1.0" encoding="utf-8"?>
+<p:sld xmlns:a="http://schemas.openxmlformats.org/drawingml/2006/main" xmlns:r="http://schemas.openxmlformats.org/officeDocument/2006/relationships" xmlns:p="http://schemas.openxmlformats.org/presentationml/2006/main">
+  <p:cSld>
+    <p:spTree>
+      <p:nvGrpSpPr>
+        <p:cNvPr id="1" name=""/>
+        <p:cNvGrpSpPr/>
+        <p:nvPr/>
+      </p:nvGrpSpPr>
+      <p:grpSpPr>
+        <a:xfrm>
+          <a:off x="0" y="0"/>
+          <a:ext cx="0" cy="0"/>
+          <a:chOff x="0" y="0"/>
+          <a:chExt cx="0" cy="0"/>
+        </a:xfrm>
+      </p:grpSpPr>
+      <p:sp>
+        <p:nvSpPr>
+          <p:cNvPr id="2" name="Title 1">
+            <a:extLst>
+              <a:ext uri="{FF2B5EF4-FFF2-40B4-BE49-F238E27FC236}">
+                <a16:creationId xmlns:a16="http://schemas.microsoft.com/office/drawing/2014/main" id="{641E7742-254F-493E-B06B-9F368BD149D3}"/>
+              </a:ext>
+            </a:extLst>
+          </p:cNvPr>
+          <p:cNvSpPr>
+            <a:spLocks noGrp="1"/>
+          </p:cNvSpPr>
+          <p:nvPr>
+            <p:ph type="title"/>
+          </p:nvPr>
+        </p:nvSpPr>
+        <p:spPr/>
+        <p:txBody>
+          <a:bodyPr/>
+          <a:lstStyle/>
+          <a:p>
+            <a:r>
+              <a:rPr lang="en-US" dirty="0"/>
+              <a:t>WHEN DO I USE BASH?</a:t>
+            </a:r>
+          </a:p>
+        </p:txBody>
+      </p:sp>
+      <p:sp>
+        <p:nvSpPr>
+          <p:cNvPr id="3" name="Content Placeholder 2">
+            <a:extLst>
+              <a:ext uri="{FF2B5EF4-FFF2-40B4-BE49-F238E27FC236}">
+                <a16:creationId xmlns:a16="http://schemas.microsoft.com/office/drawing/2014/main" id="{C8AE54F6-A616-4DFF-AB96-AF1109F77700}"/>
+              </a:ext>
+            </a:extLst>
+          </p:cNvPr>
+          <p:cNvSpPr>
+            <a:spLocks noGrp="1"/>
+          </p:cNvSpPr>
+          <p:nvPr>
+            <p:ph idx="1"/>
+          </p:nvPr>
+        </p:nvSpPr>
+        <p:spPr/>
+        <p:txBody>
+          <a:bodyPr/>
+          <a:lstStyle/>
+          <a:p>
+            <a:r>
+              <a:rPr lang="en-US" dirty="0"/>
+              <a:t>Versus Scripting Languages (e.g. Perl, Python, Ruby, Lua)</a:t>
+            </a:r>
+          </a:p>
+          <a:p>
+            <a:pPr lvl="1"/>
+            <a:r>
+              <a:rPr lang="en-US" dirty="0"/>
+              <a:t>Bash allows simpler access to commands with extensive shell-specific features, often unsupported by scripting languages</a:t>
+            </a:r>
+          </a:p>
+          <a:p>
+            <a:pPr lvl="1"/>
+            <a:r>
+              <a:rPr lang="en-US" dirty="0"/>
+              <a:t>Scripting languages are usually easier to program in but don’t interface seamlessly with the OS</a:t>
+            </a:r>
+          </a:p>
+          <a:p>
+            <a:r>
+              <a:rPr lang="en-US" dirty="0"/>
+              <a:t>Versus a Visual Environment</a:t>
+            </a:r>
+          </a:p>
+          <a:p>
+            <a:pPr lvl="1"/>
+            <a:r>
+              <a:rPr lang="en-US" dirty="0"/>
+              <a:t>Often with remote servers, you have to use a terminal</a:t>
+            </a:r>
+          </a:p>
+          <a:p>
+            <a:pPr lvl="1"/>
+            <a:r>
+              <a:rPr lang="en-US" dirty="0"/>
+              <a:t>Visual environments are great for quickly looking through file structures</a:t>
+            </a:r>
+          </a:p>
+          <a:p>
+            <a:pPr lvl="1"/>
+            <a:r>
+              <a:rPr lang="en-US" dirty="0"/>
+              <a:t>Shell environments are great if you want to run any slightly advanced query (find operations, </a:t>
+            </a:r>
+            <a:r>
+              <a:rPr lang="en-US" dirty="0" err="1"/>
+              <a:t>etc</a:t>
+            </a:r>
+            <a:r>
+              <a:rPr lang="en-US" dirty="0"/>
+              <a:t>) and for programming</a:t>
+            </a:r>
+          </a:p>
+        </p:txBody>
+      </p:sp>
+      <p:sp>
+        <p:nvSpPr>
+          <p:cNvPr id="4" name="Date Placeholder 3">
+            <a:extLst>
+              <a:ext uri="{FF2B5EF4-FFF2-40B4-BE49-F238E27FC236}">
+                <a16:creationId xmlns:a16="http://schemas.microsoft.com/office/drawing/2014/main" id="{A9E764D9-D59D-490D-B0E4-5440A699C445}"/>
+              </a:ext>
+            </a:extLst>
+          </p:cNvPr>
+          <p:cNvSpPr>
+            <a:spLocks noGrp="1"/>
+          </p:cNvSpPr>
+          <p:nvPr>
+            <p:ph type="dt" sz="half" idx="10"/>
+          </p:nvPr>
+        </p:nvSpPr>
+        <p:spPr/>
+        <p:txBody>
+          <a:bodyPr/>
+          <a:lstStyle/>
+          <a:p>
+            <a:fld id="{8AAE40A0-A7D8-4DC3-BC9E-BADA32DA2004}" type="datetime4">
+              <a:rPr lang="en-US" smtClean="0"/>
+              <a:t>August 12, 2019</a:t>
+            </a:fld>
+            <a:endParaRPr lang="en-US" dirty="0"/>
+          </a:p>
+        </p:txBody>
+      </p:sp>
+      <p:sp>
+        <p:nvSpPr>
+          <p:cNvPr id="5" name="Footer Placeholder 4">
+            <a:extLst>
+              <a:ext uri="{FF2B5EF4-FFF2-40B4-BE49-F238E27FC236}">
+                <a16:creationId xmlns:a16="http://schemas.microsoft.com/office/drawing/2014/main" id="{5B8BB806-C28A-4E70-BB77-9473ECE5C58C}"/>
+              </a:ext>
+            </a:extLst>
+          </p:cNvPr>
+          <p:cNvSpPr>
+            <a:spLocks noGrp="1"/>
+          </p:cNvSpPr>
+          <p:nvPr>
+            <p:ph type="ftr" sz="quarter" idx="11"/>
+          </p:nvPr>
+        </p:nvSpPr>
+        <p:spPr/>
+        <p:txBody>
+          <a:bodyPr/>
+          <a:lstStyle/>
+          <a:p>
+            <a:r>
+              <a:rPr lang="en-US"/>
+              <a:t>Digital Scholarship Services </a:t>
+            </a:r>
+            <a:r>
+              <a:rPr lang="en-US">
+                <a:solidFill>
+                  <a:schemeClr val="accent1">
+                    <a:lumMod val="50000"/>
+                  </a:schemeClr>
+                </a:solidFill>
+              </a:rPr>
+              <a:t>| Email</a:t>
+            </a:r>
+            <a:r>
+              <a:rPr lang="en-US"/>
+              <a:t> cf24@rice.edu </a:t>
+            </a:r>
+            <a:r>
+              <a:rPr lang="en-US">
+                <a:solidFill>
+                  <a:schemeClr val="accent1">
+                    <a:lumMod val="50000"/>
+                  </a:schemeClr>
+                </a:solidFill>
+              </a:rPr>
+              <a:t>|</a:t>
+            </a:r>
+            <a:r>
+              <a:rPr lang="en-US"/>
+              <a:t> library.rice.edu/dss</a:t>
+            </a:r>
+            <a:endParaRPr lang="en-US" dirty="0"/>
+          </a:p>
+        </p:txBody>
+      </p:sp>
+      <p:sp>
+        <p:nvSpPr>
+          <p:cNvPr id="6" name="Slide Number Placeholder 5">
+            <a:extLst>
+              <a:ext uri="{FF2B5EF4-FFF2-40B4-BE49-F238E27FC236}">
+                <a16:creationId xmlns:a16="http://schemas.microsoft.com/office/drawing/2014/main" id="{00EEFD0C-22FE-446F-BD85-29793ED44139}"/>
+              </a:ext>
+            </a:extLst>
+          </p:cNvPr>
+          <p:cNvSpPr>
+            <a:spLocks noGrp="1"/>
+          </p:cNvSpPr>
+          <p:nvPr>
+            <p:ph type="sldNum" sz="quarter" idx="12"/>
+          </p:nvPr>
+        </p:nvSpPr>
+        <p:spPr/>
+        <p:txBody>
+          <a:bodyPr/>
+          <a:lstStyle/>
+          <a:p>
+            <a:fld id="{D57F1E4F-1CFF-5643-939E-02111984F565}" type="slidenum">
+              <a:rPr lang="en-US" smtClean="0"/>
+              <a:t>5</a:t>
+            </a:fld>
+            <a:endParaRPr lang="en-US" dirty="0"/>
+          </a:p>
+        </p:txBody>
+      </p:sp>
+    </p:spTree>
+    <p:extLst>
+      <p:ext uri="{BB962C8B-B14F-4D97-AF65-F5344CB8AC3E}">
+        <p14:creationId xmlns:p14="http://schemas.microsoft.com/office/powerpoint/2010/main" val="3569770012"/>
+      </p:ext>
+    </p:extLst>
+  </p:cSld>
+  <p:clrMapOvr>
+    <a:masterClrMapping/>
+  </p:clrMapOvr>
+</p:sld>
+</file>
+
+<file path=ppt/slides/slide6.xml><?xml version="1.0" encoding="utf-8"?>
+<p:sld xmlns:a="http://schemas.openxmlformats.org/drawingml/2006/main" xmlns:r="http://schemas.openxmlformats.org/officeDocument/2006/relationships" xmlns:p="http://schemas.openxmlformats.org/presentationml/2006/main">
+  <p:cSld>
+    <p:spTree>
+      <p:nvGrpSpPr>
+        <p:cNvPr id="1" name=""/>
+        <p:cNvGrpSpPr/>
+        <p:nvPr/>
+      </p:nvGrpSpPr>
+      <p:grpSpPr>
+        <a:xfrm>
+          <a:off x="0" y="0"/>
+          <a:ext cx="0" cy="0"/>
+          <a:chOff x="0" y="0"/>
+          <a:chExt cx="0" cy="0"/>
+        </a:xfrm>
+      </p:grpSpPr>
+      <p:sp>
+        <p:nvSpPr>
+          <p:cNvPr id="2" name="Title 1">
+            <a:extLst>
+              <a:ext uri="{FF2B5EF4-FFF2-40B4-BE49-F238E27FC236}">
+                <a16:creationId xmlns:a16="http://schemas.microsoft.com/office/drawing/2014/main" id="{763619FC-2C00-4A86-9CDA-1BF3459DAC50}"/>
+              </a:ext>
+            </a:extLst>
+          </p:cNvPr>
+          <p:cNvSpPr>
+            <a:spLocks noGrp="1"/>
+          </p:cNvSpPr>
+          <p:nvPr>
+            <p:ph type="title"/>
+          </p:nvPr>
+        </p:nvSpPr>
+        <p:spPr/>
+        <p:txBody>
+          <a:bodyPr/>
+          <a:lstStyle/>
+          <a:p>
+            <a:r>
+              <a:rPr lang="en-US" dirty="0"/>
+              <a:t>A LITTLE HISTORY</a:t>
+            </a:r>
+          </a:p>
+        </p:txBody>
+      </p:sp>
+      <p:pic>
+        <p:nvPicPr>
+          <p:cNvPr id="8" name="Content Placeholder 7" descr="A picture containing sitting, indoor, top, electronics&#10;&#10;Description automatically generated">
+            <a:extLst>
+              <a:ext uri="{FF2B5EF4-FFF2-40B4-BE49-F238E27FC236}">
+                <a16:creationId xmlns:a16="http://schemas.microsoft.com/office/drawing/2014/main" id="{51988245-6C16-47D8-A486-2BF49EC235DC}"/>
+              </a:ext>
+            </a:extLst>
+          </p:cNvPr>
+          <p:cNvPicPr>
+            <a:picLocks noGrp="1" noChangeAspect="1"/>
+          </p:cNvPicPr>
+          <p:nvPr>
+            <p:ph idx="1"/>
+          </p:nvPr>
+        </p:nvPicPr>
+        <p:blipFill>
+          <a:blip r:embed="rId2"/>
+          <a:stretch>
+            <a:fillRect/>
+          </a:stretch>
+        </p:blipFill>
+        <p:spPr>
+          <a:xfrm>
+            <a:off x="6450883" y="1753907"/>
+            <a:ext cx="4902916" cy="4351338"/>
+          </a:xfrm>
+        </p:spPr>
+      </p:pic>
+      <p:sp>
+        <p:nvSpPr>
+          <p:cNvPr id="4" name="Date Placeholder 3">
+            <a:extLst>
+              <a:ext uri="{FF2B5EF4-FFF2-40B4-BE49-F238E27FC236}">
+                <a16:creationId xmlns:a16="http://schemas.microsoft.com/office/drawing/2014/main" id="{6D5133BD-4847-4D49-B5BF-4CC178F8FDB8}"/>
+              </a:ext>
+            </a:extLst>
+          </p:cNvPr>
+          <p:cNvSpPr>
+            <a:spLocks noGrp="1"/>
+          </p:cNvSpPr>
+          <p:nvPr>
+            <p:ph type="dt" sz="half" idx="10"/>
+          </p:nvPr>
+        </p:nvSpPr>
+        <p:spPr/>
+        <p:txBody>
+          <a:bodyPr/>
+          <a:lstStyle/>
+          <a:p>
+            <a:fld id="{8AAE40A0-A7D8-4DC3-BC9E-BADA32DA2004}" type="datetime4">
+              <a:rPr lang="en-US" smtClean="0"/>
+              <a:t>August 12, 2019</a:t>
+            </a:fld>
+            <a:endParaRPr lang="en-US" dirty="0"/>
+          </a:p>
+        </p:txBody>
+      </p:sp>
+      <p:sp>
+        <p:nvSpPr>
+          <p:cNvPr id="5" name="Footer Placeholder 4">
+            <a:extLst>
+              <a:ext uri="{FF2B5EF4-FFF2-40B4-BE49-F238E27FC236}">
+                <a16:creationId xmlns:a16="http://schemas.microsoft.com/office/drawing/2014/main" id="{5963B75A-EC19-4470-9F8C-1E2C1FB85999}"/>
+              </a:ext>
+            </a:extLst>
+          </p:cNvPr>
+          <p:cNvSpPr>
+            <a:spLocks noGrp="1"/>
+          </p:cNvSpPr>
+          <p:nvPr>
+            <p:ph type="ftr" sz="quarter" idx="11"/>
+          </p:nvPr>
+        </p:nvSpPr>
+        <p:spPr/>
+        <p:txBody>
+          <a:bodyPr/>
+          <a:lstStyle/>
+          <a:p>
+            <a:r>
+              <a:rPr lang="en-US"/>
+              <a:t>Digital Scholarship Services </a:t>
+            </a:r>
+            <a:r>
+              <a:rPr lang="en-US">
+                <a:solidFill>
+                  <a:schemeClr val="accent1">
+                    <a:lumMod val="50000"/>
+                  </a:schemeClr>
+                </a:solidFill>
+              </a:rPr>
+              <a:t>| Email</a:t>
+            </a:r>
+            <a:r>
+              <a:rPr lang="en-US"/>
+              <a:t> cf24@rice.edu </a:t>
+            </a:r>
+            <a:r>
+              <a:rPr lang="en-US">
+                <a:solidFill>
+                  <a:schemeClr val="accent1">
+                    <a:lumMod val="50000"/>
+                  </a:schemeClr>
+                </a:solidFill>
+              </a:rPr>
+              <a:t>|</a:t>
+            </a:r>
+            <a:r>
+              <a:rPr lang="en-US"/>
+              <a:t> library.rice.edu/dss</a:t>
+            </a:r>
+            <a:endParaRPr lang="en-US" dirty="0"/>
+          </a:p>
+        </p:txBody>
+      </p:sp>
+      <p:sp>
+        <p:nvSpPr>
+          <p:cNvPr id="6" name="Slide Number Placeholder 5">
+            <a:extLst>
+              <a:ext uri="{FF2B5EF4-FFF2-40B4-BE49-F238E27FC236}">
+                <a16:creationId xmlns:a16="http://schemas.microsoft.com/office/drawing/2014/main" id="{BDAB3897-F226-4B28-B7E1-52A0CDB34A2C}"/>
+              </a:ext>
+            </a:extLst>
+          </p:cNvPr>
+          <p:cNvSpPr>
+            <a:spLocks noGrp="1"/>
+          </p:cNvSpPr>
+          <p:nvPr>
+            <p:ph type="sldNum" sz="quarter" idx="12"/>
+          </p:nvPr>
+        </p:nvSpPr>
+        <p:spPr/>
+        <p:txBody>
+          <a:bodyPr/>
+          <a:lstStyle/>
+          <a:p>
+            <a:fld id="{D57F1E4F-1CFF-5643-939E-02111984F565}" type="slidenum">
+              <a:rPr lang="en-US" smtClean="0"/>
+              <a:t>6</a:t>
+            </a:fld>
+            <a:endParaRPr lang="en-US" dirty="0"/>
+          </a:p>
+        </p:txBody>
+      </p:sp>
+      <p:sp>
+        <p:nvSpPr>
+          <p:cNvPr id="9" name="Content Placeholder 2">
+            <a:extLst>
+              <a:ext uri="{FF2B5EF4-FFF2-40B4-BE49-F238E27FC236}">
+                <a16:creationId xmlns:a16="http://schemas.microsoft.com/office/drawing/2014/main" id="{94B7C8F0-E828-46B4-BABE-0CB59A6D2C2D}"/>
+              </a:ext>
+            </a:extLst>
+          </p:cNvPr>
+          <p:cNvSpPr txBox="1">
+            <a:spLocks/>
+          </p:cNvSpPr>
+          <p:nvPr/>
+        </p:nvSpPr>
+        <p:spPr>
+          <a:xfrm>
+            <a:off x="838200" y="1825625"/>
+            <a:ext cx="5612683" cy="4351338"/>
+          </a:xfrm>
+          <a:prstGeom prst="rect">
+            <a:avLst/>
+          </a:prstGeom>
+        </p:spPr>
+        <p:txBody>
+          <a:bodyPr vert="horz" lIns="91440" tIns="45720" rIns="91440" bIns="45720" rtlCol="0">
+            <a:normAutofit/>
+          </a:bodyPr>
+          <a:lstStyle>
+            <a:lvl1pPr marL="228600" indent="-228600" algn="l" defTabSz="914400" rtl="0" eaLnBrk="1" latinLnBrk="0" hangingPunct="1">
+              <a:lnSpc>
+                <a:spcPct val="90000"/>
+              </a:lnSpc>
+              <a:spcBef>
+                <a:spcPts val="1000"/>
+              </a:spcBef>
+              <a:buFont typeface="Arial" panose="020B0604020202020204" pitchFamily="34" charset="0"/>
+              <a:buChar char="•"/>
+              <a:defRPr sz="2800" kern="1200">
+                <a:solidFill>
+                  <a:schemeClr val="tx1"/>
+                </a:solidFill>
+                <a:latin typeface="+mn-lt"/>
+                <a:ea typeface="+mn-ea"/>
+                <a:cs typeface="+mn-cs"/>
+              </a:defRPr>
+            </a:lvl1pPr>
+            <a:lvl2pPr marL="685800" indent="-228600" algn="l" defTabSz="914400" rtl="0" eaLnBrk="1" latinLnBrk="0" hangingPunct="1">
+              <a:lnSpc>
+                <a:spcPct val="90000"/>
+              </a:lnSpc>
+              <a:spcBef>
+                <a:spcPts val="500"/>
+              </a:spcBef>
+              <a:buFont typeface="Arial" panose="020B0604020202020204" pitchFamily="34" charset="0"/>
+              <a:buChar char="•"/>
+              <a:defRPr sz="2400" kern="1200">
+                <a:solidFill>
+                  <a:schemeClr val="tx1"/>
+                </a:solidFill>
+                <a:latin typeface="+mn-lt"/>
+                <a:ea typeface="+mn-ea"/>
+                <a:cs typeface="+mn-cs"/>
+              </a:defRPr>
+            </a:lvl2pPr>
+            <a:lvl3pPr marL="1143000" indent="-228600" algn="l" defTabSz="914400" rtl="0" eaLnBrk="1" latinLnBrk="0" hangingPunct="1">
+              <a:lnSpc>
+                <a:spcPct val="90000"/>
+              </a:lnSpc>
+              <a:spcBef>
+                <a:spcPts val="500"/>
+              </a:spcBef>
+              <a:buFont typeface="Arial" panose="020B0604020202020204" pitchFamily="34" charset="0"/>
+              <a:buChar char="•"/>
+              <a:defRPr sz="2000" kern="1200">
+                <a:solidFill>
+                  <a:schemeClr val="tx1"/>
+                </a:solidFill>
+                <a:latin typeface="+mn-lt"/>
+                <a:ea typeface="+mn-ea"/>
+                <a:cs typeface="+mn-cs"/>
+              </a:defRPr>
+            </a:lvl3pPr>
+            <a:lvl4pPr marL="1600200" indent="-228600" algn="l" defTabSz="914400" rtl="0" eaLnBrk="1" latinLnBrk="0" hangingPunct="1">
+              <a:lnSpc>
+                <a:spcPct val="90000"/>
+              </a:lnSpc>
+              <a:spcBef>
+                <a:spcPts val="500"/>
+              </a:spcBef>
+              <a:buFont typeface="Arial" panose="020B0604020202020204" pitchFamily="34" charset="0"/>
+              <a:buChar char="•"/>
+              <a:defRPr sz="1800" kern="1200">
+                <a:solidFill>
+                  <a:schemeClr val="tx1"/>
+                </a:solidFill>
+                <a:latin typeface="+mn-lt"/>
+                <a:ea typeface="+mn-ea"/>
+                <a:cs typeface="+mn-cs"/>
+              </a:defRPr>
+            </a:lvl4pPr>
+            <a:lvl5pPr marL="2057400" indent="-228600" algn="l" defTabSz="914400" rtl="0" eaLnBrk="1" latinLnBrk="0" hangingPunct="1">
+              <a:lnSpc>
+                <a:spcPct val="90000"/>
+              </a:lnSpc>
+              <a:spcBef>
+                <a:spcPts val="500"/>
+              </a:spcBef>
+              <a:buFont typeface="Arial" panose="020B0604020202020204" pitchFamily="34" charset="0"/>
+              <a:buChar char="•"/>
+              <a:defRPr sz="1800" kern="1200">
+                <a:solidFill>
+                  <a:schemeClr val="tx1"/>
+                </a:solidFill>
+                <a:latin typeface="+mn-lt"/>
+                <a:ea typeface="+mn-ea"/>
+                <a:cs typeface="+mn-cs"/>
+              </a:defRPr>
+            </a:lvl5pPr>
+            <a:lvl6pPr marL="2514600" indent="-228600" algn="l" defTabSz="914400" rtl="0" eaLnBrk="1" latinLnBrk="0" hangingPunct="1">
+              <a:lnSpc>
+                <a:spcPct val="90000"/>
+              </a:lnSpc>
+              <a:spcBef>
+                <a:spcPts val="500"/>
+              </a:spcBef>
+              <a:buFont typeface="Arial" panose="020B0604020202020204" pitchFamily="34" charset="0"/>
+              <a:buChar char="•"/>
+              <a:defRPr sz="1800" kern="1200">
+                <a:solidFill>
+                  <a:schemeClr val="tx1"/>
+                </a:solidFill>
+                <a:latin typeface="+mn-lt"/>
+                <a:ea typeface="+mn-ea"/>
+                <a:cs typeface="+mn-cs"/>
+              </a:defRPr>
+            </a:lvl6pPr>
+            <a:lvl7pPr marL="2971800" indent="-228600" algn="l" defTabSz="914400" rtl="0" eaLnBrk="1" latinLnBrk="0" hangingPunct="1">
+              <a:lnSpc>
+                <a:spcPct val="90000"/>
+              </a:lnSpc>
+              <a:spcBef>
+                <a:spcPts val="500"/>
+              </a:spcBef>
+              <a:buFont typeface="Arial" panose="020B0604020202020204" pitchFamily="34" charset="0"/>
+              <a:buChar char="•"/>
+              <a:defRPr sz="1800" kern="1200">
+                <a:solidFill>
+                  <a:schemeClr val="tx1"/>
+                </a:solidFill>
+                <a:latin typeface="+mn-lt"/>
+                <a:ea typeface="+mn-ea"/>
+                <a:cs typeface="+mn-cs"/>
+              </a:defRPr>
+            </a:lvl7pPr>
+            <a:lvl8pPr marL="3429000" indent="-228600" algn="l" defTabSz="914400" rtl="0" eaLnBrk="1" latinLnBrk="0" hangingPunct="1">
+              <a:lnSpc>
+                <a:spcPct val="90000"/>
+              </a:lnSpc>
+              <a:spcBef>
+                <a:spcPts val="500"/>
+              </a:spcBef>
+              <a:buFont typeface="Arial" panose="020B0604020202020204" pitchFamily="34" charset="0"/>
+              <a:buChar char="•"/>
+              <a:defRPr sz="1800" kern="1200">
+                <a:solidFill>
+                  <a:schemeClr val="tx1"/>
+                </a:solidFill>
+                <a:latin typeface="+mn-lt"/>
+                <a:ea typeface="+mn-ea"/>
+                <a:cs typeface="+mn-cs"/>
+              </a:defRPr>
+            </a:lvl8pPr>
+            <a:lvl9pPr marL="3886200" indent="-228600" algn="l" defTabSz="914400" rtl="0" eaLnBrk="1" latinLnBrk="0" hangingPunct="1">
+              <a:lnSpc>
+                <a:spcPct val="90000"/>
+              </a:lnSpc>
+              <a:spcBef>
+                <a:spcPts val="500"/>
+              </a:spcBef>
+              <a:buFont typeface="Arial" panose="020B0604020202020204" pitchFamily="34" charset="0"/>
+              <a:buChar char="•"/>
+              <a:defRPr sz="1800" kern="1200">
+                <a:solidFill>
+                  <a:schemeClr val="tx1"/>
+                </a:solidFill>
+                <a:latin typeface="+mn-lt"/>
+                <a:ea typeface="+mn-ea"/>
+                <a:cs typeface="+mn-cs"/>
+              </a:defRPr>
+            </a:lvl9pPr>
+          </a:lstStyle>
+          <a:p>
+            <a:r>
+              <a:rPr lang="en-US" dirty="0"/>
+              <a:t>Before the advent of Microsoft Windows (1981) and Mac OS (1984) and their desktop environments, terminals were the only option!</a:t>
+            </a:r>
+          </a:p>
+          <a:p>
+            <a:r>
+              <a:rPr lang="en-US" dirty="0"/>
+              <a:t>Unix was the most used, developed by Bell Labs at AT&amp;T</a:t>
+            </a:r>
+          </a:p>
+          <a:p>
+            <a:r>
+              <a:rPr lang="en-US" dirty="0"/>
+              <a:t>Unix adapted by Linus Torvalds into Linux, and enjoyed Free Software Movement support</a:t>
+            </a:r>
+          </a:p>
+        </p:txBody>
+      </p:sp>
+    </p:spTree>
+    <p:extLst>
+      <p:ext uri="{BB962C8B-B14F-4D97-AF65-F5344CB8AC3E}">
+        <p14:creationId xmlns:p14="http://schemas.microsoft.com/office/powerpoint/2010/main" val="1181412086"/>
+      </p:ext>
+    </p:extLst>
+  </p:cSld>
+  <p:clrMapOvr>
+    <a:masterClrMapping/>
+  </p:clrMapOvr>
+</p:sld>
+</file>
+
+<file path=ppt/slides/slide7.xml><?xml version="1.0" encoding="utf-8"?>
+<p:sld xmlns:a="http://schemas.openxmlformats.org/drawingml/2006/main" xmlns:r="http://schemas.openxmlformats.org/officeDocument/2006/relationships" xmlns:p="http://schemas.openxmlformats.org/presentationml/2006/main">
+  <p:cSld>
+    <p:spTree>
+      <p:nvGrpSpPr>
+        <p:cNvPr id="1" name=""/>
+        <p:cNvGrpSpPr/>
+        <p:nvPr/>
+      </p:nvGrpSpPr>
+      <p:grpSpPr>
+        <a:xfrm>
+          <a:off x="0" y="0"/>
+          <a:ext cx="0" cy="0"/>
+          <a:chOff x="0" y="0"/>
+          <a:chExt cx="0" cy="0"/>
+        </a:xfrm>
+      </p:grpSpPr>
+      <p:sp>
+        <p:nvSpPr>
+          <p:cNvPr id="2" name="Title 1">
+            <a:extLst>
+              <a:ext uri="{FF2B5EF4-FFF2-40B4-BE49-F238E27FC236}">
+                <a16:creationId xmlns:a16="http://schemas.microsoft.com/office/drawing/2014/main" id="{763619FC-2C00-4A86-9CDA-1BF3459DAC50}"/>
+              </a:ext>
+            </a:extLst>
+          </p:cNvPr>
+          <p:cNvSpPr>
+            <a:spLocks noGrp="1"/>
+          </p:cNvSpPr>
+          <p:nvPr>
+            <p:ph type="title"/>
+          </p:nvPr>
+        </p:nvSpPr>
+        <p:spPr/>
+        <p:txBody>
+          <a:bodyPr/>
+          <a:lstStyle/>
+          <a:p>
+            <a:r>
+              <a:rPr lang="en-US" dirty="0"/>
+              <a:t>SHELL BASICS</a:t>
+            </a:r>
+          </a:p>
+        </p:txBody>
+      </p:sp>
+      <p:sp>
+        <p:nvSpPr>
+          <p:cNvPr id="3" name="Text Placeholder 2">
+            <a:extLst>
+              <a:ext uri="{FF2B5EF4-FFF2-40B4-BE49-F238E27FC236}">
+                <a16:creationId xmlns:a16="http://schemas.microsoft.com/office/drawing/2014/main" id="{14188AF0-954F-45E0-97B5-73D18A416CC7}"/>
+              </a:ext>
+            </a:extLst>
+          </p:cNvPr>
+          <p:cNvSpPr>
+            <a:spLocks noGrp="1"/>
+          </p:cNvSpPr>
+          <p:nvPr>
+            <p:ph type="body" idx="1"/>
+          </p:nvPr>
+        </p:nvSpPr>
+        <p:spPr/>
+        <p:txBody>
+          <a:bodyPr/>
+          <a:lstStyle/>
+          <a:p>
+            <a:r>
+              <a:rPr lang="en-US" dirty="0"/>
+              <a:t>A quick walkthrough of the environment</a:t>
+            </a:r>
+          </a:p>
+        </p:txBody>
+      </p:sp>
+      <p:sp>
+        <p:nvSpPr>
+          <p:cNvPr id="4" name="Date Placeholder 3">
+            <a:extLst>
+              <a:ext uri="{FF2B5EF4-FFF2-40B4-BE49-F238E27FC236}">
+                <a16:creationId xmlns:a16="http://schemas.microsoft.com/office/drawing/2014/main" id="{6D5133BD-4847-4D49-B5BF-4CC178F8FDB8}"/>
+              </a:ext>
+            </a:extLst>
+          </p:cNvPr>
+          <p:cNvSpPr>
+            <a:spLocks noGrp="1"/>
+          </p:cNvSpPr>
+          <p:nvPr>
+            <p:ph type="dt" sz="half" idx="10"/>
+          </p:nvPr>
+        </p:nvSpPr>
+        <p:spPr/>
+        <p:txBody>
+          <a:bodyPr/>
+          <a:lstStyle/>
+          <a:p>
+            <a:fld id="{8AAE40A0-A7D8-4DC3-BC9E-BADA32DA2004}" type="datetime4">
+              <a:rPr lang="en-US" smtClean="0"/>
+              <a:t>August 12, 2019</a:t>
+            </a:fld>
+            <a:endParaRPr lang="en-US" dirty="0"/>
+          </a:p>
+        </p:txBody>
+      </p:sp>
+      <p:sp>
+        <p:nvSpPr>
+          <p:cNvPr id="5" name="Footer Placeholder 4">
+            <a:extLst>
+              <a:ext uri="{FF2B5EF4-FFF2-40B4-BE49-F238E27FC236}">
+                <a16:creationId xmlns:a16="http://schemas.microsoft.com/office/drawing/2014/main" id="{5963B75A-EC19-4470-9F8C-1E2C1FB85999}"/>
+              </a:ext>
+            </a:extLst>
+          </p:cNvPr>
+          <p:cNvSpPr>
+            <a:spLocks noGrp="1"/>
+          </p:cNvSpPr>
+          <p:nvPr>
+            <p:ph type="ftr" sz="quarter" idx="11"/>
+          </p:nvPr>
+        </p:nvSpPr>
+        <p:spPr/>
+        <p:txBody>
+          <a:bodyPr/>
+          <a:lstStyle/>
+          <a:p>
+            <a:r>
+              <a:rPr lang="en-US"/>
+              <a:t>Digital Scholarship Services </a:t>
+            </a:r>
+            <a:r>
+              <a:rPr lang="en-US">
+                <a:solidFill>
+                  <a:schemeClr val="accent1">
+                    <a:lumMod val="50000"/>
+                  </a:schemeClr>
+                </a:solidFill>
+              </a:rPr>
+              <a:t>| Email</a:t>
+            </a:r>
+            <a:r>
+              <a:rPr lang="en-US"/>
+              <a:t> cf24@rice.edu </a:t>
+            </a:r>
+            <a:r>
+              <a:rPr lang="en-US">
+                <a:solidFill>
+                  <a:schemeClr val="accent1">
+                    <a:lumMod val="50000"/>
+                  </a:schemeClr>
+                </a:solidFill>
+              </a:rPr>
+              <a:t>|</a:t>
+            </a:r>
+            <a:r>
+              <a:rPr lang="en-US"/>
+              <a:t> library.rice.edu/dss</a:t>
+            </a:r>
+            <a:endParaRPr lang="en-US" dirty="0"/>
+          </a:p>
+        </p:txBody>
+      </p:sp>
+      <p:sp>
+        <p:nvSpPr>
+          <p:cNvPr id="6" name="Slide Number Placeholder 5">
+            <a:extLst>
+              <a:ext uri="{FF2B5EF4-FFF2-40B4-BE49-F238E27FC236}">
+                <a16:creationId xmlns:a16="http://schemas.microsoft.com/office/drawing/2014/main" id="{BDAB3897-F226-4B28-B7E1-52A0CDB34A2C}"/>
+              </a:ext>
+            </a:extLst>
+          </p:cNvPr>
+          <p:cNvSpPr>
+            <a:spLocks noGrp="1"/>
+          </p:cNvSpPr>
+          <p:nvPr>
+            <p:ph type="sldNum" sz="quarter" idx="12"/>
+          </p:nvPr>
+        </p:nvSpPr>
+        <p:spPr/>
+        <p:txBody>
+          <a:bodyPr/>
+          <a:lstStyle/>
+          <a:p>
+            <a:fld id="{D57F1E4F-1CFF-5643-939E-02111984F565}" type="slidenum">
+              <a:rPr lang="en-US" smtClean="0"/>
+              <a:t>7</a:t>
+            </a:fld>
+            <a:endParaRPr lang="en-US" dirty="0"/>
+          </a:p>
+        </p:txBody>
+      </p:sp>
+    </p:spTree>
+    <p:extLst>
+      <p:ext uri="{BB962C8B-B14F-4D97-AF65-F5344CB8AC3E}">
+        <p14:creationId xmlns:p14="http://schemas.microsoft.com/office/powerpoint/2010/main" val="1800513880"/>
+      </p:ext>
+    </p:extLst>
+  </p:cSld>
+  <p:clrMapOvr>
+    <a:masterClrMapping/>
+  </p:clrMapOvr>
+</p:sld>
+</file>
+
+<file path=ppt/slides/slide8.xml><?xml version="1.0" encoding="utf-8"?>
+<p:sld xmlns:a="http://schemas.openxmlformats.org/drawingml/2006/main" xmlns:r="http://schemas.openxmlformats.org/officeDocument/2006/relationships" xmlns:p="http://schemas.openxmlformats.org/presentationml/2006/main">
+  <p:cSld>
+    <p:spTree>
+      <p:nvGrpSpPr>
+        <p:cNvPr id="1" name=""/>
+        <p:cNvGrpSpPr/>
+        <p:nvPr/>
+      </p:nvGrpSpPr>
+      <p:grpSpPr>
+        <a:xfrm>
+          <a:off x="0" y="0"/>
+          <a:ext cx="0" cy="0"/>
+          <a:chOff x="0" y="0"/>
+          <a:chExt cx="0" cy="0"/>
+        </a:xfrm>
+      </p:grpSpPr>
+      <p:sp>
+        <p:nvSpPr>
           <p:cNvPr id="7" name="Title 6">
             <a:extLst>
               <a:ext uri="{FF2B5EF4-FFF2-40B4-BE49-F238E27FC236}">
-                <a16:creationId xmlns:a16="http://schemas.microsoft.com/office/drawing/2014/main" id="{495B4BC0-844B-4414-A623-BEF78AAC1BA1}"/>
+                <a16:creationId xmlns:a16="http://schemas.microsoft.com/office/drawing/2014/main" id="{601B20C1-6D2C-410B-9C7D-B09E2AC0F10C}"/>
               </a:ext>
             </a:extLst>
           </p:cNvPr>
@@ -3881,17 +7426,17 @@
           <a:p>
             <a:r>
               <a:rPr lang="en-US" dirty="0"/>
-              <a:t>ACKNOWLEDGMENTS</a:t>
-            </a:r>
-          </a:p>
-        </p:txBody>
-      </p:sp>
-      <p:sp>
-        <p:nvSpPr>
-          <p:cNvPr id="8" name="Content Placeholder 7">
+              <a:t>ANATOMY OF A SHELL</a:t>
+            </a:r>
+          </a:p>
+        </p:txBody>
+      </p:sp>
+      <p:sp>
+        <p:nvSpPr>
+          <p:cNvPr id="4" name="Date Placeholder 3">
             <a:extLst>
               <a:ext uri="{FF2B5EF4-FFF2-40B4-BE49-F238E27FC236}">
-                <a16:creationId xmlns:a16="http://schemas.microsoft.com/office/drawing/2014/main" id="{2BED3EB3-7E98-4A82-8335-7321D9E37B16}"/>
+                <a16:creationId xmlns:a16="http://schemas.microsoft.com/office/drawing/2014/main" id="{FDFCF223-64BA-421E-9ED7-B50193B5C5E1}"/>
               </a:ext>
             </a:extLst>
           </p:cNvPr>
@@ -3899,17 +7444,432 @@
             <a:spLocks noGrp="1"/>
           </p:cNvSpPr>
           <p:nvPr>
-            <p:ph idx="1"/>
-          </p:nvPr>
-        </p:nvSpPr>
-        <p:spPr/>
-        <p:txBody>
-          <a:bodyPr/>
-          <a:lstStyle/>
+            <p:ph type="dt" sz="half" idx="10"/>
+          </p:nvPr>
+        </p:nvSpPr>
+        <p:spPr/>
+        <p:txBody>
+          <a:bodyPr/>
+          <a:lstStyle/>
+          <a:p>
+            <a:fld id="{B08FEED8-D7D4-44E9-BFBC-ED06B5996D94}" type="datetime4">
+              <a:rPr lang="en-US" smtClean="0"/>
+              <a:t>August 12, 2019</a:t>
+            </a:fld>
+            <a:endParaRPr lang="en-US" dirty="0"/>
+          </a:p>
+        </p:txBody>
+      </p:sp>
+      <p:sp>
+        <p:nvSpPr>
+          <p:cNvPr id="5" name="Footer Placeholder 4">
+            <a:extLst>
+              <a:ext uri="{FF2B5EF4-FFF2-40B4-BE49-F238E27FC236}">
+                <a16:creationId xmlns:a16="http://schemas.microsoft.com/office/drawing/2014/main" id="{985A19B1-AD30-4909-B986-F717612E68FA}"/>
+              </a:ext>
+            </a:extLst>
+          </p:cNvPr>
+          <p:cNvSpPr>
+            <a:spLocks noGrp="1"/>
+          </p:cNvSpPr>
+          <p:nvPr>
+            <p:ph type="ftr" sz="quarter" idx="11"/>
+          </p:nvPr>
+        </p:nvSpPr>
+        <p:spPr/>
+        <p:txBody>
+          <a:bodyPr/>
+          <a:lstStyle/>
+          <a:p>
+            <a:r>
+              <a:rPr lang="en-US"/>
+              <a:t>Digital Scholarship Services </a:t>
+            </a:r>
+            <a:r>
+              <a:rPr lang="en-US">
+                <a:solidFill>
+                  <a:schemeClr val="accent1">
+                    <a:lumMod val="50000"/>
+                  </a:schemeClr>
+                </a:solidFill>
+              </a:rPr>
+              <a:t>| Email</a:t>
+            </a:r>
+            <a:r>
+              <a:rPr lang="en-US"/>
+              <a:t> cf24@rice.edu </a:t>
+            </a:r>
+            <a:r>
+              <a:rPr lang="en-US">
+                <a:solidFill>
+                  <a:schemeClr val="accent1">
+                    <a:lumMod val="50000"/>
+                  </a:schemeClr>
+                </a:solidFill>
+              </a:rPr>
+              <a:t>|</a:t>
+            </a:r>
+            <a:r>
+              <a:rPr lang="en-US"/>
+              <a:t> library.rice.edu/dss</a:t>
+            </a:r>
+            <a:endParaRPr lang="en-US" dirty="0"/>
+          </a:p>
+        </p:txBody>
+      </p:sp>
+      <p:sp>
+        <p:nvSpPr>
+          <p:cNvPr id="6" name="Slide Number Placeholder 5">
+            <a:extLst>
+              <a:ext uri="{FF2B5EF4-FFF2-40B4-BE49-F238E27FC236}">
+                <a16:creationId xmlns:a16="http://schemas.microsoft.com/office/drawing/2014/main" id="{75C4D062-ACF2-41DA-A700-03DC514486D1}"/>
+              </a:ext>
+            </a:extLst>
+          </p:cNvPr>
+          <p:cNvSpPr>
+            <a:spLocks noGrp="1"/>
+          </p:cNvSpPr>
+          <p:nvPr>
+            <p:ph type="sldNum" sz="quarter" idx="12"/>
+          </p:nvPr>
+        </p:nvSpPr>
+        <p:spPr/>
+        <p:txBody>
+          <a:bodyPr/>
+          <a:lstStyle/>
+          <a:p>
+            <a:fld id="{D57F1E4F-1CFF-5643-939E-02111984F565}" type="slidenum">
+              <a:rPr lang="en-US" smtClean="0"/>
+              <a:t>8</a:t>
+            </a:fld>
+            <a:endParaRPr lang="en-US" dirty="0"/>
+          </a:p>
+        </p:txBody>
+      </p:sp>
+      <p:sp>
+        <p:nvSpPr>
+          <p:cNvPr id="10" name="Content Placeholder 2">
+            <a:extLst>
+              <a:ext uri="{FF2B5EF4-FFF2-40B4-BE49-F238E27FC236}">
+                <a16:creationId xmlns:a16="http://schemas.microsoft.com/office/drawing/2014/main" id="{507A9182-6C57-44EB-967D-7501C299A75A}"/>
+              </a:ext>
+            </a:extLst>
+          </p:cNvPr>
+          <p:cNvSpPr txBox="1">
+            <a:spLocks/>
+          </p:cNvSpPr>
+          <p:nvPr/>
+        </p:nvSpPr>
+        <p:spPr>
+          <a:xfrm>
+            <a:off x="838200" y="1825625"/>
+            <a:ext cx="5589494" cy="4351338"/>
+          </a:xfrm>
+          <a:prstGeom prst="rect">
+            <a:avLst/>
+          </a:prstGeom>
+        </p:spPr>
+        <p:txBody>
+          <a:bodyPr vert="horz" lIns="91440" tIns="45720" rIns="91440" bIns="45720" rtlCol="0">
+            <a:normAutofit/>
+          </a:bodyPr>
+          <a:lstStyle>
+            <a:lvl1pPr marL="228600" indent="-228600" algn="l" defTabSz="914400" rtl="0" eaLnBrk="1" latinLnBrk="0" hangingPunct="1">
+              <a:lnSpc>
+                <a:spcPct val="90000"/>
+              </a:lnSpc>
+              <a:spcBef>
+                <a:spcPts val="1000"/>
+              </a:spcBef>
+              <a:buFont typeface="Arial" panose="020B0604020202020204" pitchFamily="34" charset="0"/>
+              <a:buChar char="•"/>
+              <a:defRPr sz="2800" kern="1200">
+                <a:solidFill>
+                  <a:schemeClr val="tx1"/>
+                </a:solidFill>
+                <a:latin typeface="+mn-lt"/>
+                <a:ea typeface="+mn-ea"/>
+                <a:cs typeface="+mn-cs"/>
+              </a:defRPr>
+            </a:lvl1pPr>
+            <a:lvl2pPr marL="685800" indent="-228600" algn="l" defTabSz="914400" rtl="0" eaLnBrk="1" latinLnBrk="0" hangingPunct="1">
+              <a:lnSpc>
+                <a:spcPct val="90000"/>
+              </a:lnSpc>
+              <a:spcBef>
+                <a:spcPts val="500"/>
+              </a:spcBef>
+              <a:buFont typeface="Arial" panose="020B0604020202020204" pitchFamily="34" charset="0"/>
+              <a:buChar char="•"/>
+              <a:defRPr sz="2400" kern="1200">
+                <a:solidFill>
+                  <a:schemeClr val="tx1"/>
+                </a:solidFill>
+                <a:latin typeface="+mn-lt"/>
+                <a:ea typeface="+mn-ea"/>
+                <a:cs typeface="+mn-cs"/>
+              </a:defRPr>
+            </a:lvl2pPr>
+            <a:lvl3pPr marL="1143000" indent="-228600" algn="l" defTabSz="914400" rtl="0" eaLnBrk="1" latinLnBrk="0" hangingPunct="1">
+              <a:lnSpc>
+                <a:spcPct val="90000"/>
+              </a:lnSpc>
+              <a:spcBef>
+                <a:spcPts val="500"/>
+              </a:spcBef>
+              <a:buFont typeface="Arial" panose="020B0604020202020204" pitchFamily="34" charset="0"/>
+              <a:buChar char="•"/>
+              <a:defRPr sz="2000" kern="1200">
+                <a:solidFill>
+                  <a:schemeClr val="tx1"/>
+                </a:solidFill>
+                <a:latin typeface="+mn-lt"/>
+                <a:ea typeface="+mn-ea"/>
+                <a:cs typeface="+mn-cs"/>
+              </a:defRPr>
+            </a:lvl3pPr>
+            <a:lvl4pPr marL="1600200" indent="-228600" algn="l" defTabSz="914400" rtl="0" eaLnBrk="1" latinLnBrk="0" hangingPunct="1">
+              <a:lnSpc>
+                <a:spcPct val="90000"/>
+              </a:lnSpc>
+              <a:spcBef>
+                <a:spcPts val="500"/>
+              </a:spcBef>
+              <a:buFont typeface="Arial" panose="020B0604020202020204" pitchFamily="34" charset="0"/>
+              <a:buChar char="•"/>
+              <a:defRPr sz="1800" kern="1200">
+                <a:solidFill>
+                  <a:schemeClr val="tx1"/>
+                </a:solidFill>
+                <a:latin typeface="+mn-lt"/>
+                <a:ea typeface="+mn-ea"/>
+                <a:cs typeface="+mn-cs"/>
+              </a:defRPr>
+            </a:lvl4pPr>
+            <a:lvl5pPr marL="2057400" indent="-228600" algn="l" defTabSz="914400" rtl="0" eaLnBrk="1" latinLnBrk="0" hangingPunct="1">
+              <a:lnSpc>
+                <a:spcPct val="90000"/>
+              </a:lnSpc>
+              <a:spcBef>
+                <a:spcPts val="500"/>
+              </a:spcBef>
+              <a:buFont typeface="Arial" panose="020B0604020202020204" pitchFamily="34" charset="0"/>
+              <a:buChar char="•"/>
+              <a:defRPr sz="1800" kern="1200">
+                <a:solidFill>
+                  <a:schemeClr val="tx1"/>
+                </a:solidFill>
+                <a:latin typeface="+mn-lt"/>
+                <a:ea typeface="+mn-ea"/>
+                <a:cs typeface="+mn-cs"/>
+              </a:defRPr>
+            </a:lvl5pPr>
+            <a:lvl6pPr marL="2514600" indent="-228600" algn="l" defTabSz="914400" rtl="0" eaLnBrk="1" latinLnBrk="0" hangingPunct="1">
+              <a:lnSpc>
+                <a:spcPct val="90000"/>
+              </a:lnSpc>
+              <a:spcBef>
+                <a:spcPts val="500"/>
+              </a:spcBef>
+              <a:buFont typeface="Arial" panose="020B0604020202020204" pitchFamily="34" charset="0"/>
+              <a:buChar char="•"/>
+              <a:defRPr sz="1800" kern="1200">
+                <a:solidFill>
+                  <a:schemeClr val="tx1"/>
+                </a:solidFill>
+                <a:latin typeface="+mn-lt"/>
+                <a:ea typeface="+mn-ea"/>
+                <a:cs typeface="+mn-cs"/>
+              </a:defRPr>
+            </a:lvl6pPr>
+            <a:lvl7pPr marL="2971800" indent="-228600" algn="l" defTabSz="914400" rtl="0" eaLnBrk="1" latinLnBrk="0" hangingPunct="1">
+              <a:lnSpc>
+                <a:spcPct val="90000"/>
+              </a:lnSpc>
+              <a:spcBef>
+                <a:spcPts val="500"/>
+              </a:spcBef>
+              <a:buFont typeface="Arial" panose="020B0604020202020204" pitchFamily="34" charset="0"/>
+              <a:buChar char="•"/>
+              <a:defRPr sz="1800" kern="1200">
+                <a:solidFill>
+                  <a:schemeClr val="tx1"/>
+                </a:solidFill>
+                <a:latin typeface="+mn-lt"/>
+                <a:ea typeface="+mn-ea"/>
+                <a:cs typeface="+mn-cs"/>
+              </a:defRPr>
+            </a:lvl7pPr>
+            <a:lvl8pPr marL="3429000" indent="-228600" algn="l" defTabSz="914400" rtl="0" eaLnBrk="1" latinLnBrk="0" hangingPunct="1">
+              <a:lnSpc>
+                <a:spcPct val="90000"/>
+              </a:lnSpc>
+              <a:spcBef>
+                <a:spcPts val="500"/>
+              </a:spcBef>
+              <a:buFont typeface="Arial" panose="020B0604020202020204" pitchFamily="34" charset="0"/>
+              <a:buChar char="•"/>
+              <a:defRPr sz="1800" kern="1200">
+                <a:solidFill>
+                  <a:schemeClr val="tx1"/>
+                </a:solidFill>
+                <a:latin typeface="+mn-lt"/>
+                <a:ea typeface="+mn-ea"/>
+                <a:cs typeface="+mn-cs"/>
+              </a:defRPr>
+            </a:lvl8pPr>
+            <a:lvl9pPr marL="3886200" indent="-228600" algn="l" defTabSz="914400" rtl="0" eaLnBrk="1" latinLnBrk="0" hangingPunct="1">
+              <a:lnSpc>
+                <a:spcPct val="90000"/>
+              </a:lnSpc>
+              <a:spcBef>
+                <a:spcPts val="500"/>
+              </a:spcBef>
+              <a:buFont typeface="Arial" panose="020B0604020202020204" pitchFamily="34" charset="0"/>
+              <a:buChar char="•"/>
+              <a:defRPr sz="1800" kern="1200">
+                <a:solidFill>
+                  <a:schemeClr val="tx1"/>
+                </a:solidFill>
+                <a:latin typeface="+mn-lt"/>
+                <a:ea typeface="+mn-ea"/>
+                <a:cs typeface="+mn-cs"/>
+              </a:defRPr>
+            </a:lvl9pPr>
+          </a:lstStyle>
           <a:p>
             <a:r>
               <a:rPr lang="en-US" dirty="0"/>
-              <a:t>The Bash Logo is licensed for free use under the Copyleft license.</a:t>
+              <a:t>Prompt: what you see when you open the shell or finish a command</a:t>
+            </a:r>
+          </a:p>
+          <a:p>
+            <a:pPr lvl="1"/>
+            <a:r>
+              <a:rPr lang="en-US" dirty="0"/>
+              <a:t>Waits for you to enter something</a:t>
+            </a:r>
+          </a:p>
+          <a:p>
+            <a:r>
+              <a:rPr lang="en-US" dirty="0"/>
+              <a:t>USER@COMPUTER (Directory)</a:t>
+            </a:r>
+          </a:p>
+          <a:p>
+            <a:pPr marL="0" indent="0">
+              <a:buNone/>
+            </a:pPr>
+            <a:r>
+              <a:rPr lang="en-US" dirty="0"/>
+              <a:t>$ (type commands here)</a:t>
+            </a:r>
+          </a:p>
+          <a:p>
+            <a:pPr lvl="1"/>
+            <a:r>
+              <a:rPr lang="en-US" dirty="0"/>
+              <a:t>completely configurable, though</a:t>
+            </a:r>
+          </a:p>
+          <a:p>
+            <a:r>
+              <a:rPr lang="en-US" dirty="0"/>
+              <a:t>Command</a:t>
+            </a:r>
+          </a:p>
+          <a:p>
+            <a:r>
+              <a:rPr lang="en-US" dirty="0"/>
+              <a:t>Output</a:t>
+            </a:r>
+          </a:p>
+        </p:txBody>
+      </p:sp>
+      <p:pic>
+        <p:nvPicPr>
+          <p:cNvPr id="11" name="Picture 10">
+            <a:extLst>
+              <a:ext uri="{FF2B5EF4-FFF2-40B4-BE49-F238E27FC236}">
+                <a16:creationId xmlns:a16="http://schemas.microsoft.com/office/drawing/2014/main" id="{8FC677BF-DB57-4322-B9BB-644B65135573}"/>
+              </a:ext>
+            </a:extLst>
+          </p:cNvPr>
+          <p:cNvPicPr>
+            <a:picLocks noChangeAspect="1"/>
+          </p:cNvPicPr>
+          <p:nvPr/>
+        </p:nvPicPr>
+        <p:blipFill>
+          <a:blip r:embed="rId2"/>
+          <a:stretch>
+            <a:fillRect/>
+          </a:stretch>
+        </p:blipFill>
+        <p:spPr>
+          <a:xfrm>
+            <a:off x="6508376" y="2131067"/>
+            <a:ext cx="5194768" cy="3489756"/>
+          </a:xfrm>
+          <a:prstGeom prst="rect">
+            <a:avLst/>
+          </a:prstGeom>
+        </p:spPr>
+      </p:pic>
+    </p:spTree>
+    <p:extLst>
+      <p:ext uri="{BB962C8B-B14F-4D97-AF65-F5344CB8AC3E}">
+        <p14:creationId xmlns:p14="http://schemas.microsoft.com/office/powerpoint/2010/main" val="2214526515"/>
+      </p:ext>
+    </p:extLst>
+  </p:cSld>
+  <p:clrMapOvr>
+    <a:masterClrMapping/>
+  </p:clrMapOvr>
+</p:sld>
+</file>
+
+<file path=ppt/slides/slide9.xml><?xml version="1.0" encoding="utf-8"?>
+<p:sld xmlns:a="http://schemas.openxmlformats.org/drawingml/2006/main" xmlns:r="http://schemas.openxmlformats.org/officeDocument/2006/relationships" xmlns:p="http://schemas.openxmlformats.org/presentationml/2006/main">
+  <p:cSld>
+    <p:spTree>
+      <p:nvGrpSpPr>
+        <p:cNvPr id="1" name=""/>
+        <p:cNvGrpSpPr/>
+        <p:nvPr/>
+      </p:nvGrpSpPr>
+      <p:grpSpPr>
+        <a:xfrm>
+          <a:off x="0" y="0"/>
+          <a:ext cx="0" cy="0"/>
+          <a:chOff x="0" y="0"/>
+          <a:chExt cx="0" cy="0"/>
+        </a:xfrm>
+      </p:grpSpPr>
+      <p:sp>
+        <p:nvSpPr>
+          <p:cNvPr id="7" name="Title 6">
+            <a:extLst>
+              <a:ext uri="{FF2B5EF4-FFF2-40B4-BE49-F238E27FC236}">
+                <a16:creationId xmlns:a16="http://schemas.microsoft.com/office/drawing/2014/main" id="{601B20C1-6D2C-410B-9C7D-B09E2AC0F10C}"/>
+              </a:ext>
+            </a:extLst>
+          </p:cNvPr>
+          <p:cNvSpPr>
+            <a:spLocks noGrp="1"/>
+          </p:cNvSpPr>
+          <p:nvPr>
+            <p:ph type="title"/>
+          </p:nvPr>
+        </p:nvSpPr>
+        <p:spPr/>
+        <p:txBody>
+          <a:bodyPr/>
+          <a:lstStyle/>
+          <a:p>
+            <a:r>
+              <a:rPr lang="en-US" dirty="0"/>
+              <a:t>COMMANDS</a:t>
             </a:r>
           </a:p>
         </p:txBody>
@@ -3919,7 +7879,7 @@
           <p:cNvPr id="4" name="Date Placeholder 3">
             <a:extLst>
               <a:ext uri="{FF2B5EF4-FFF2-40B4-BE49-F238E27FC236}">
-                <a16:creationId xmlns:a16="http://schemas.microsoft.com/office/drawing/2014/main" id="{540F37F1-4F33-429F-A568-1A3ADC499E54}"/>
+                <a16:creationId xmlns:a16="http://schemas.microsoft.com/office/drawing/2014/main" id="{FDFCF223-64BA-421E-9ED7-B50193B5C5E1}"/>
               </a:ext>
             </a:extLst>
           </p:cNvPr>
@@ -3937,7 +7897,7 @@
           <a:p>
             <a:fld id="{B08FEED8-D7D4-44E9-BFBC-ED06B5996D94}" type="datetime4">
               <a:rPr lang="en-US" smtClean="0"/>
-              <a:t>August 7, 2019</a:t>
+              <a:t>August 12, 2019</a:t>
             </a:fld>
             <a:endParaRPr lang="en-US" dirty="0"/>
           </a:p>
@@ -3948,7 +7908,7 @@
           <p:cNvPr id="5" name="Footer Placeholder 4">
             <a:extLst>
               <a:ext uri="{FF2B5EF4-FFF2-40B4-BE49-F238E27FC236}">
-                <a16:creationId xmlns:a16="http://schemas.microsoft.com/office/drawing/2014/main" id="{673FFA57-C126-4795-A5F6-DD33AAC5ACBD}"/>
+                <a16:creationId xmlns:a16="http://schemas.microsoft.com/office/drawing/2014/main" id="{985A19B1-AD30-4909-B986-F717612E68FA}"/>
               </a:ext>
             </a:extLst>
           </p:cNvPr>
@@ -4005,7 +7965,7 @@
           <p:cNvPr id="6" name="Slide Number Placeholder 5">
             <a:extLst>
               <a:ext uri="{FF2B5EF4-FFF2-40B4-BE49-F238E27FC236}">
-                <a16:creationId xmlns:a16="http://schemas.microsoft.com/office/drawing/2014/main" id="{2FA49567-BB70-4798-8746-D0B522CCEE20}"/>
+                <a16:creationId xmlns:a16="http://schemas.microsoft.com/office/drawing/2014/main" id="{75C4D062-ACF2-41DA-A700-03DC514486D1}"/>
               </a:ext>
             </a:extLst>
           </p:cNvPr>
@@ -4023,16 +7983,296 @@
           <a:p>
             <a:fld id="{D57F1E4F-1CFF-5643-939E-02111984F565}" type="slidenum">
               <a:rPr lang="en-US" smtClean="0"/>
-              <a:t>2</a:t>
+              <a:t>9</a:t>
             </a:fld>
             <a:endParaRPr lang="en-US" dirty="0"/>
+          </a:p>
+        </p:txBody>
+      </p:sp>
+      <p:sp>
+        <p:nvSpPr>
+          <p:cNvPr id="10" name="Content Placeholder 2">
+            <a:extLst>
+              <a:ext uri="{FF2B5EF4-FFF2-40B4-BE49-F238E27FC236}">
+                <a16:creationId xmlns:a16="http://schemas.microsoft.com/office/drawing/2014/main" id="{507A9182-6C57-44EB-967D-7501C299A75A}"/>
+              </a:ext>
+            </a:extLst>
+          </p:cNvPr>
+          <p:cNvSpPr txBox="1">
+            <a:spLocks/>
+          </p:cNvSpPr>
+          <p:nvPr/>
+        </p:nvSpPr>
+        <p:spPr>
+          <a:xfrm>
+            <a:off x="838199" y="1825625"/>
+            <a:ext cx="10515599" cy="4351338"/>
+          </a:xfrm>
+          <a:prstGeom prst="rect">
+            <a:avLst/>
+          </a:prstGeom>
+        </p:spPr>
+        <p:txBody>
+          <a:bodyPr vert="horz" lIns="91440" tIns="45720" rIns="91440" bIns="45720" rtlCol="0">
+            <a:normAutofit/>
+          </a:bodyPr>
+          <a:lstStyle>
+            <a:lvl1pPr marL="228600" indent="-228600" algn="l" defTabSz="914400" rtl="0" eaLnBrk="1" latinLnBrk="0" hangingPunct="1">
+              <a:lnSpc>
+                <a:spcPct val="90000"/>
+              </a:lnSpc>
+              <a:spcBef>
+                <a:spcPts val="1000"/>
+              </a:spcBef>
+              <a:buFont typeface="Arial" panose="020B0604020202020204" pitchFamily="34" charset="0"/>
+              <a:buChar char="•"/>
+              <a:defRPr sz="2800" kern="1200">
+                <a:solidFill>
+                  <a:schemeClr val="tx1"/>
+                </a:solidFill>
+                <a:latin typeface="+mn-lt"/>
+                <a:ea typeface="+mn-ea"/>
+                <a:cs typeface="+mn-cs"/>
+              </a:defRPr>
+            </a:lvl1pPr>
+            <a:lvl2pPr marL="685800" indent="-228600" algn="l" defTabSz="914400" rtl="0" eaLnBrk="1" latinLnBrk="0" hangingPunct="1">
+              <a:lnSpc>
+                <a:spcPct val="90000"/>
+              </a:lnSpc>
+              <a:spcBef>
+                <a:spcPts val="500"/>
+              </a:spcBef>
+              <a:buFont typeface="Arial" panose="020B0604020202020204" pitchFamily="34" charset="0"/>
+              <a:buChar char="•"/>
+              <a:defRPr sz="2400" kern="1200">
+                <a:solidFill>
+                  <a:schemeClr val="tx1"/>
+                </a:solidFill>
+                <a:latin typeface="+mn-lt"/>
+                <a:ea typeface="+mn-ea"/>
+                <a:cs typeface="+mn-cs"/>
+              </a:defRPr>
+            </a:lvl2pPr>
+            <a:lvl3pPr marL="1143000" indent="-228600" algn="l" defTabSz="914400" rtl="0" eaLnBrk="1" latinLnBrk="0" hangingPunct="1">
+              <a:lnSpc>
+                <a:spcPct val="90000"/>
+              </a:lnSpc>
+              <a:spcBef>
+                <a:spcPts val="500"/>
+              </a:spcBef>
+              <a:buFont typeface="Arial" panose="020B0604020202020204" pitchFamily="34" charset="0"/>
+              <a:buChar char="•"/>
+              <a:defRPr sz="2000" kern="1200">
+                <a:solidFill>
+                  <a:schemeClr val="tx1"/>
+                </a:solidFill>
+                <a:latin typeface="+mn-lt"/>
+                <a:ea typeface="+mn-ea"/>
+                <a:cs typeface="+mn-cs"/>
+              </a:defRPr>
+            </a:lvl3pPr>
+            <a:lvl4pPr marL="1600200" indent="-228600" algn="l" defTabSz="914400" rtl="0" eaLnBrk="1" latinLnBrk="0" hangingPunct="1">
+              <a:lnSpc>
+                <a:spcPct val="90000"/>
+              </a:lnSpc>
+              <a:spcBef>
+                <a:spcPts val="500"/>
+              </a:spcBef>
+              <a:buFont typeface="Arial" panose="020B0604020202020204" pitchFamily="34" charset="0"/>
+              <a:buChar char="•"/>
+              <a:defRPr sz="1800" kern="1200">
+                <a:solidFill>
+                  <a:schemeClr val="tx1"/>
+                </a:solidFill>
+                <a:latin typeface="+mn-lt"/>
+                <a:ea typeface="+mn-ea"/>
+                <a:cs typeface="+mn-cs"/>
+              </a:defRPr>
+            </a:lvl4pPr>
+            <a:lvl5pPr marL="2057400" indent="-228600" algn="l" defTabSz="914400" rtl="0" eaLnBrk="1" latinLnBrk="0" hangingPunct="1">
+              <a:lnSpc>
+                <a:spcPct val="90000"/>
+              </a:lnSpc>
+              <a:spcBef>
+                <a:spcPts val="500"/>
+              </a:spcBef>
+              <a:buFont typeface="Arial" panose="020B0604020202020204" pitchFamily="34" charset="0"/>
+              <a:buChar char="•"/>
+              <a:defRPr sz="1800" kern="1200">
+                <a:solidFill>
+                  <a:schemeClr val="tx1"/>
+                </a:solidFill>
+                <a:latin typeface="+mn-lt"/>
+                <a:ea typeface="+mn-ea"/>
+                <a:cs typeface="+mn-cs"/>
+              </a:defRPr>
+            </a:lvl5pPr>
+            <a:lvl6pPr marL="2514600" indent="-228600" algn="l" defTabSz="914400" rtl="0" eaLnBrk="1" latinLnBrk="0" hangingPunct="1">
+              <a:lnSpc>
+                <a:spcPct val="90000"/>
+              </a:lnSpc>
+              <a:spcBef>
+                <a:spcPts val="500"/>
+              </a:spcBef>
+              <a:buFont typeface="Arial" panose="020B0604020202020204" pitchFamily="34" charset="0"/>
+              <a:buChar char="•"/>
+              <a:defRPr sz="1800" kern="1200">
+                <a:solidFill>
+                  <a:schemeClr val="tx1"/>
+                </a:solidFill>
+                <a:latin typeface="+mn-lt"/>
+                <a:ea typeface="+mn-ea"/>
+                <a:cs typeface="+mn-cs"/>
+              </a:defRPr>
+            </a:lvl6pPr>
+            <a:lvl7pPr marL="2971800" indent="-228600" algn="l" defTabSz="914400" rtl="0" eaLnBrk="1" latinLnBrk="0" hangingPunct="1">
+              <a:lnSpc>
+                <a:spcPct val="90000"/>
+              </a:lnSpc>
+              <a:spcBef>
+                <a:spcPts val="500"/>
+              </a:spcBef>
+              <a:buFont typeface="Arial" panose="020B0604020202020204" pitchFamily="34" charset="0"/>
+              <a:buChar char="•"/>
+              <a:defRPr sz="1800" kern="1200">
+                <a:solidFill>
+                  <a:schemeClr val="tx1"/>
+                </a:solidFill>
+                <a:latin typeface="+mn-lt"/>
+                <a:ea typeface="+mn-ea"/>
+                <a:cs typeface="+mn-cs"/>
+              </a:defRPr>
+            </a:lvl7pPr>
+            <a:lvl8pPr marL="3429000" indent="-228600" algn="l" defTabSz="914400" rtl="0" eaLnBrk="1" latinLnBrk="0" hangingPunct="1">
+              <a:lnSpc>
+                <a:spcPct val="90000"/>
+              </a:lnSpc>
+              <a:spcBef>
+                <a:spcPts val="500"/>
+              </a:spcBef>
+              <a:buFont typeface="Arial" panose="020B0604020202020204" pitchFamily="34" charset="0"/>
+              <a:buChar char="•"/>
+              <a:defRPr sz="1800" kern="1200">
+                <a:solidFill>
+                  <a:schemeClr val="tx1"/>
+                </a:solidFill>
+                <a:latin typeface="+mn-lt"/>
+                <a:ea typeface="+mn-ea"/>
+                <a:cs typeface="+mn-cs"/>
+              </a:defRPr>
+            </a:lvl8pPr>
+            <a:lvl9pPr marL="3886200" indent="-228600" algn="l" defTabSz="914400" rtl="0" eaLnBrk="1" latinLnBrk="0" hangingPunct="1">
+              <a:lnSpc>
+                <a:spcPct val="90000"/>
+              </a:lnSpc>
+              <a:spcBef>
+                <a:spcPts val="500"/>
+              </a:spcBef>
+              <a:buFont typeface="Arial" panose="020B0604020202020204" pitchFamily="34" charset="0"/>
+              <a:buChar char="•"/>
+              <a:defRPr sz="1800" kern="1200">
+                <a:solidFill>
+                  <a:schemeClr val="tx1"/>
+                </a:solidFill>
+                <a:latin typeface="+mn-lt"/>
+                <a:ea typeface="+mn-ea"/>
+                <a:cs typeface="+mn-cs"/>
+              </a:defRPr>
+            </a:lvl9pPr>
+          </a:lstStyle>
+          <a:p>
+            <a:r>
+              <a:rPr lang="en-US" dirty="0"/>
+              <a:t>First: an executable program</a:t>
+            </a:r>
+          </a:p>
+          <a:p>
+            <a:pPr lvl="1"/>
+            <a:r>
+              <a:rPr lang="en-US" dirty="0"/>
+              <a:t>Anything from word.exe to simply listing the directory</a:t>
+            </a:r>
+          </a:p>
+          <a:p>
+            <a:r>
+              <a:rPr lang="en-US" dirty="0"/>
+              <a:t>Any number of arguments</a:t>
+            </a:r>
+          </a:p>
+          <a:p>
+            <a:pPr lvl="1"/>
+            <a:r>
+              <a:rPr lang="en-US" dirty="0"/>
+              <a:t>Filenames, command line switches</a:t>
+            </a:r>
+          </a:p>
+          <a:p>
+            <a:r>
+              <a:rPr lang="en-US" dirty="0"/>
+              <a:t>example: </a:t>
+            </a:r>
+            <a:r>
+              <a:rPr lang="en-US" dirty="0">
+                <a:latin typeface="Courier New" panose="02070309020205020404" pitchFamily="49" charset="0"/>
+                <a:cs typeface="Courier New" panose="02070309020205020404" pitchFamily="49" charset="0"/>
+              </a:rPr>
+              <a:t>ls –al Documents/</a:t>
+            </a:r>
+          </a:p>
+          <a:p>
+            <a:pPr lvl="1"/>
+            <a:r>
+              <a:rPr lang="en-US" dirty="0">
+                <a:latin typeface="Courier New" panose="02070309020205020404" pitchFamily="49" charset="0"/>
+                <a:cs typeface="Courier New" panose="02070309020205020404" pitchFamily="49" charset="0"/>
+              </a:rPr>
+              <a:t>ls </a:t>
+            </a:r>
+            <a:r>
+              <a:rPr lang="en-US" dirty="0">
+                <a:cs typeface="Courier New" panose="02070309020205020404" pitchFamily="49" charset="0"/>
+              </a:rPr>
+              <a:t>is a program that lists the current directory</a:t>
+            </a:r>
+          </a:p>
+          <a:p>
+            <a:pPr lvl="1"/>
+            <a:r>
+              <a:rPr lang="en-US" dirty="0">
+                <a:latin typeface="Courier New" panose="02070309020205020404" pitchFamily="49" charset="0"/>
+                <a:cs typeface="Courier New" panose="02070309020205020404" pitchFamily="49" charset="0"/>
+              </a:rPr>
+              <a:t>-al </a:t>
+            </a:r>
+            <a:r>
+              <a:rPr lang="en-US" dirty="0">
+                <a:cs typeface="Courier New" panose="02070309020205020404" pitchFamily="49" charset="0"/>
+              </a:rPr>
+              <a:t>are two separate arguments that show hidden files and permissions</a:t>
+            </a:r>
+          </a:p>
+          <a:p>
+            <a:pPr lvl="1"/>
+            <a:r>
+              <a:rPr lang="en-US" dirty="0">
+                <a:latin typeface="Courier New" panose="02070309020205020404" pitchFamily="49" charset="0"/>
+                <a:cs typeface="Courier New" panose="02070309020205020404" pitchFamily="49" charset="0"/>
+              </a:rPr>
+              <a:t>Documents/</a:t>
+            </a:r>
+            <a:r>
+              <a:rPr lang="en-US" dirty="0">
+                <a:cs typeface="Courier New" panose="02070309020205020404" pitchFamily="49" charset="0"/>
+              </a:rPr>
+              <a:t> is a folder in the current directory we want the get the contents of</a:t>
+            </a:r>
           </a:p>
         </p:txBody>
       </p:sp>
     </p:spTree>
     <p:extLst>
       <p:ext uri="{BB962C8B-B14F-4D97-AF65-F5344CB8AC3E}">
-        <p14:creationId xmlns:p14="http://schemas.microsoft.com/office/powerpoint/2010/main" val="1585568494"/>
+        <p14:creationId xmlns:p14="http://schemas.microsoft.com/office/powerpoint/2010/main" val="3123716771"/>
       </p:ext>
     </p:extLst>
   </p:cSld>

</xml_diff>

<commit_message>
mingw not wavy, add advanced features
</commit_message>
<xml_diff>
--- a/bash/Introduction to Bash.pptx
+++ b/bash/Introduction to Bash.pptx
@@ -5,7 +5,7 @@
     <p:sldMasterId id="2147483707" r:id="rId1"/>
   </p:sldMasterIdLst>
   <p:notesMasterIdLst>
-    <p:notesMasterId r:id="rId17"/>
+    <p:notesMasterId r:id="rId32"/>
   </p:notesMasterIdLst>
   <p:sldIdLst>
     <p:sldId id="266" r:id="rId2"/>
@@ -21,8 +21,23 @@
     <p:sldId id="280" r:id="rId12"/>
     <p:sldId id="274" r:id="rId13"/>
     <p:sldId id="281" r:id="rId14"/>
-    <p:sldId id="275" r:id="rId15"/>
-    <p:sldId id="268" r:id="rId16"/>
+    <p:sldId id="282" r:id="rId15"/>
+    <p:sldId id="275" r:id="rId16"/>
+    <p:sldId id="283" r:id="rId17"/>
+    <p:sldId id="285" r:id="rId18"/>
+    <p:sldId id="284" r:id="rId19"/>
+    <p:sldId id="286" r:id="rId20"/>
+    <p:sldId id="287" r:id="rId21"/>
+    <p:sldId id="288" r:id="rId22"/>
+    <p:sldId id="289" r:id="rId23"/>
+    <p:sldId id="291" r:id="rId24"/>
+    <p:sldId id="290" r:id="rId25"/>
+    <p:sldId id="293" r:id="rId26"/>
+    <p:sldId id="292" r:id="rId27"/>
+    <p:sldId id="294" r:id="rId28"/>
+    <p:sldId id="295" r:id="rId29"/>
+    <p:sldId id="296" r:id="rId30"/>
+    <p:sldId id="268" r:id="rId31"/>
   </p:sldIdLst>
   <p:sldSz cx="12192000" cy="6858000"/>
   <p:notesSz cx="6858000" cy="9144000"/>
@@ -211,7 +226,7 @@
           <a:p>
             <a:fld id="{D46E3B93-8523-4DBC-8FC5-65A9B9CDE5EE}" type="datetimeFigureOut">
               <a:rPr lang="en-US" smtClean="0"/>
-              <a:t>8/7/2019</a:t>
+              <a:t>8/13/2019</a:t>
             </a:fld>
             <a:endParaRPr lang="en-US"/>
           </a:p>
@@ -607,7 +622,7 @@
           <a:p>
             <a:fld id="{CE8F6EB4-B6EF-44F6-BBD1-CD5E279CFAE2}" type="datetime4">
               <a:rPr lang="en-US" smtClean="0"/>
-              <a:t>August 7, 2019</a:t>
+              <a:t>August 13, 2019</a:t>
             </a:fld>
             <a:endParaRPr lang="en-US" dirty="0"/>
           </a:p>
@@ -779,7 +794,7 @@
           <a:p>
             <a:fld id="{8A405AA7-4C18-4A99-8AAA-8677C1976FC9}" type="datetime4">
               <a:rPr lang="en-US" smtClean="0"/>
-              <a:t>August 7, 2019</a:t>
+              <a:t>August 13, 2019</a:t>
             </a:fld>
             <a:endParaRPr lang="en-US" dirty="0"/>
           </a:p>
@@ -961,7 +976,7 @@
           <a:p>
             <a:fld id="{4EA0D668-33DD-41B9-B668-7E7FF430C345}" type="datetime4">
               <a:rPr lang="en-US" smtClean="0"/>
-              <a:t>August 7, 2019</a:t>
+              <a:t>August 13, 2019</a:t>
             </a:fld>
             <a:endParaRPr lang="en-US" dirty="0"/>
           </a:p>
@@ -1144,7 +1159,7 @@
           <a:p>
             <a:fld id="{8AAE40A0-A7D8-4DC3-BC9E-BADA32DA2004}" type="datetime4">
               <a:rPr lang="en-US" smtClean="0"/>
-              <a:t>August 7, 2019</a:t>
+              <a:t>August 13, 2019</a:t>
             </a:fld>
             <a:endParaRPr lang="en-US" dirty="0"/>
           </a:p>
@@ -1471,7 +1486,7 @@
           <a:p>
             <a:fld id="{B08FEED8-D7D4-44E9-BFBC-ED06B5996D94}" type="datetime4">
               <a:rPr lang="en-US" smtClean="0"/>
-              <a:t>August 7, 2019</a:t>
+              <a:t>August 13, 2019</a:t>
             </a:fld>
             <a:endParaRPr lang="en-US" dirty="0"/>
           </a:p>
@@ -1781,7 +1796,7 @@
           <a:p>
             <a:fld id="{A143C325-9442-4629-8CC6-5CAC69736C93}" type="datetime4">
               <a:rPr lang="en-US" smtClean="0"/>
-              <a:t>August 7, 2019</a:t>
+              <a:t>August 13, 2019</a:t>
             </a:fld>
             <a:endParaRPr lang="en-US" dirty="0"/>
           </a:p>
@@ -2149,7 +2164,7 @@
           <a:p>
             <a:fld id="{EEDAFACB-3FED-4607-9FDD-34A82581A119}" type="datetime4">
               <a:rPr lang="en-US" smtClean="0"/>
-              <a:t>August 7, 2019</a:t>
+              <a:t>August 13, 2019</a:t>
             </a:fld>
             <a:endParaRPr lang="en-US" dirty="0"/>
           </a:p>
@@ -2270,7 +2285,7 @@
           <a:p>
             <a:fld id="{EC2805D6-2E3E-42F7-ABBA-DCD51C704328}" type="datetime4">
               <a:rPr lang="en-US" smtClean="0"/>
-              <a:t>August 7, 2019</a:t>
+              <a:t>August 13, 2019</a:t>
             </a:fld>
             <a:endParaRPr lang="en-US" dirty="0"/>
           </a:p>
@@ -2369,7 +2384,7 @@
           <a:p>
             <a:fld id="{7A745AAB-8888-45FB-8C4E-B86AF9A05200}" type="datetime4">
               <a:rPr lang="en-US" smtClean="0"/>
-              <a:t>August 7, 2019</a:t>
+              <a:t>August 13, 2019</a:t>
             </a:fld>
             <a:endParaRPr lang="en-US" dirty="0"/>
           </a:p>
@@ -2648,7 +2663,7 @@
           <a:p>
             <a:fld id="{9F896CED-8AFA-412F-B61A-472E6093CDBA}" type="datetime4">
               <a:rPr lang="en-US" smtClean="0"/>
-              <a:t>August 7, 2019</a:t>
+              <a:t>August 13, 2019</a:t>
             </a:fld>
             <a:endParaRPr lang="en-US" dirty="0"/>
           </a:p>
@@ -2907,7 +2922,7 @@
           <a:p>
             <a:fld id="{61078AB2-2970-444D-B1FF-A9F37FC020F5}" type="datetime4">
               <a:rPr lang="en-US" smtClean="0"/>
-              <a:t>August 7, 2019</a:t>
+              <a:t>August 13, 2019</a:t>
             </a:fld>
             <a:endParaRPr lang="en-US" dirty="0"/>
           </a:p>
@@ -3125,7 +3140,7 @@
           <a:p>
             <a:fld id="{1148AE1E-D441-45CD-8192-49B13802301D}" type="datetime4">
               <a:rPr lang="en-US" smtClean="0"/>
-              <a:t>August 7, 2019</a:t>
+              <a:t>August 13, 2019</a:t>
             </a:fld>
             <a:endParaRPr lang="en-US" dirty="0"/>
           </a:p>
@@ -3922,7 +3937,7 @@
           <a:p>
             <a:fld id="{B08FEED8-D7D4-44E9-BFBC-ED06B5996D94}" type="datetime4">
               <a:rPr lang="en-US" smtClean="0"/>
-              <a:t>August 12, 2019</a:t>
+              <a:t>August 13, 2019</a:t>
             </a:fld>
             <a:endParaRPr lang="en-US" dirty="0"/>
           </a:p>
@@ -4240,7 +4255,7 @@
               <a:rPr lang="en-US" dirty="0">
                 <a:cs typeface="Courier New" panose="02070309020205020404" pitchFamily="49" charset="0"/>
               </a:rPr>
-              <a:t> (where to look for executable files)</a:t>
+              <a:t> (where to look for executable files – usually not your current directory!)</a:t>
             </a:r>
           </a:p>
           <a:p>
@@ -4390,7 +4405,7 @@
           <a:p>
             <a:fld id="{B08FEED8-D7D4-44E9-BFBC-ED06B5996D94}" type="datetime4">
               <a:rPr lang="en-US" smtClean="0"/>
-              <a:t>August 12, 2019</a:t>
+              <a:t>August 13, 2019</a:t>
             </a:fld>
             <a:endParaRPr lang="en-US" dirty="0"/>
           </a:p>
@@ -4688,7 +4703,7 @@
                 <a:latin typeface="Courier New" panose="02070309020205020404" pitchFamily="49" charset="0"/>
                 <a:cs typeface="Courier New" panose="02070309020205020404" pitchFamily="49" charset="0"/>
               </a:rPr>
-              <a:t>.-&gt; </a:t>
+              <a:t>. -&gt; </a:t>
             </a:r>
             <a:r>
               <a:rPr lang="en-US" dirty="0">
@@ -4890,7 +4905,7 @@
           <a:p>
             <a:fld id="{8AAE40A0-A7D8-4DC3-BC9E-BADA32DA2004}" type="datetime4">
               <a:rPr lang="en-US" smtClean="0"/>
-              <a:t>August 12, 2019</a:t>
+              <a:t>August 13, 2019</a:t>
             </a:fld>
             <a:endParaRPr lang="en-US" dirty="0"/>
           </a:p>
@@ -5101,7 +5116,7 @@
           <a:p>
             <a:fld id="{8AAE40A0-A7D8-4DC3-BC9E-BADA32DA2004}" type="datetime4">
               <a:rPr lang="en-US" smtClean="0"/>
-              <a:t>August 12, 2019</a:t>
+              <a:t>August 13, 2019</a:t>
             </a:fld>
             <a:endParaRPr lang="en-US" dirty="0"/>
           </a:p>
@@ -5246,7 +5261,7 @@
           <a:p>
             <a:r>
               <a:rPr lang="en-US" dirty="0"/>
-              <a:t>PROMPTS</a:t>
+              <a:t>FONTS</a:t>
             </a:r>
           </a:p>
         </p:txBody>
@@ -5274,8 +5289,11 @@
           <a:p>
             <a:r>
               <a:rPr lang="en-US" dirty="0"/>
-              <a:t>Making your shell look and act its best!</a:t>
-            </a:r>
+              <a:t>Technically, a feature of your terminal emulator, not the terminal itself</a:t>
+            </a:r>
+          </a:p>
+          <a:p>
+            <a:endParaRPr lang="en-US" dirty="0"/>
           </a:p>
         </p:txBody>
       </p:sp>
@@ -5302,7 +5320,7 @@
           <a:p>
             <a:fld id="{8AAE40A0-A7D8-4DC3-BC9E-BADA32DA2004}" type="datetime4">
               <a:rPr lang="en-US" smtClean="0"/>
-              <a:t>August 12, 2019</a:t>
+              <a:t>August 13, 2019</a:t>
             </a:fld>
             <a:endParaRPr lang="en-US" dirty="0"/>
           </a:p>
@@ -5397,7 +5415,7 @@
     </p:spTree>
     <p:extLst>
       <p:ext uri="{BB962C8B-B14F-4D97-AF65-F5344CB8AC3E}">
-        <p14:creationId xmlns:p14="http://schemas.microsoft.com/office/powerpoint/2010/main" val="345372323"/>
+        <p14:creationId xmlns:p14="http://schemas.microsoft.com/office/powerpoint/2010/main" val="2923682881"/>
       </p:ext>
     </p:extLst>
   </p:cSld>
@@ -5426,10 +5444,10 @@
       </p:grpSpPr>
       <p:sp>
         <p:nvSpPr>
-          <p:cNvPr id="7" name="Title 6">
-            <a:extLst>
-              <a:ext uri="{FF2B5EF4-FFF2-40B4-BE49-F238E27FC236}">
-                <a16:creationId xmlns:a16="http://schemas.microsoft.com/office/drawing/2014/main" id="{495B4BC0-844B-4414-A623-BEF78AAC1BA1}"/>
+          <p:cNvPr id="2" name="Title 1">
+            <a:extLst>
+              <a:ext uri="{FF2B5EF4-FFF2-40B4-BE49-F238E27FC236}">
+                <a16:creationId xmlns:a16="http://schemas.microsoft.com/office/drawing/2014/main" id="{763619FC-2C00-4A86-9CDA-1BF3459DAC50}"/>
               </a:ext>
             </a:extLst>
           </p:cNvPr>
@@ -5447,17 +5465,17 @@
           <a:p>
             <a:r>
               <a:rPr lang="en-US" dirty="0"/>
-              <a:t>ACKNOWLEDGMENTS</a:t>
-            </a:r>
-          </a:p>
-        </p:txBody>
-      </p:sp>
-      <p:sp>
-        <p:nvSpPr>
-          <p:cNvPr id="8" name="Content Placeholder 7">
-            <a:extLst>
-              <a:ext uri="{FF2B5EF4-FFF2-40B4-BE49-F238E27FC236}">
-                <a16:creationId xmlns:a16="http://schemas.microsoft.com/office/drawing/2014/main" id="{2BED3EB3-7E98-4A82-8335-7321D9E37B16}"/>
+              <a:t>PROMPTS</a:t>
+            </a:r>
+          </a:p>
+        </p:txBody>
+      </p:sp>
+      <p:sp>
+        <p:nvSpPr>
+          <p:cNvPr id="3" name="Text Placeholder 2">
+            <a:extLst>
+              <a:ext uri="{FF2B5EF4-FFF2-40B4-BE49-F238E27FC236}">
+                <a16:creationId xmlns:a16="http://schemas.microsoft.com/office/drawing/2014/main" id="{14188AF0-954F-45E0-97B5-73D18A416CC7}"/>
               </a:ext>
             </a:extLst>
           </p:cNvPr>
@@ -5475,40 +5493,10 @@
           <a:p>
             <a:r>
               <a:rPr lang="en-US" dirty="0"/>
-              <a:t>The Bash Logo is licensed for free use under the Copyleft license.</a:t>
-            </a:r>
-          </a:p>
-          <a:p>
-            <a:r>
-              <a:rPr lang="en-US" dirty="0"/>
-              <a:t>The bash screenshot on Slide 2 is R and Bash running under a </a:t>
-            </a:r>
-            <a:r>
-              <a:rPr lang="en-US" dirty="0" err="1"/>
-              <a:t>Remmina</a:t>
-            </a:r>
-            <a:r>
-              <a:rPr lang="en-US" dirty="0"/>
-              <a:t> connection.</a:t>
-            </a:r>
-          </a:p>
-          <a:p>
-            <a:r>
-              <a:rPr lang="en-US" dirty="0"/>
-              <a:t>The picture on Slide 6 is licensed under Creative Commons Attribution-</a:t>
-            </a:r>
-            <a:r>
-              <a:rPr lang="en-US" dirty="0" err="1"/>
-              <a:t>ShareAlike</a:t>
-            </a:r>
-            <a:r>
-              <a:rPr lang="en-US" dirty="0"/>
-              <a:t> 4.0 International, created by </a:t>
-            </a:r>
-            <a:r>
-              <a:rPr lang="en-US" dirty="0" err="1"/>
-              <a:t>Gorthmog</a:t>
-            </a:r>
+              <a:t>Configure the colors and information displayed on your prompt</a:t>
+            </a:r>
+          </a:p>
+          <a:p>
             <a:endParaRPr lang="en-US" dirty="0"/>
           </a:p>
         </p:txBody>
@@ -5518,7 +5506,7 @@
           <p:cNvPr id="4" name="Date Placeholder 3">
             <a:extLst>
               <a:ext uri="{FF2B5EF4-FFF2-40B4-BE49-F238E27FC236}">
-                <a16:creationId xmlns:a16="http://schemas.microsoft.com/office/drawing/2014/main" id="{540F37F1-4F33-429F-A568-1A3ADC499E54}"/>
+                <a16:creationId xmlns:a16="http://schemas.microsoft.com/office/drawing/2014/main" id="{6D5133BD-4847-4D49-B5BF-4CC178F8FDB8}"/>
               </a:ext>
             </a:extLst>
           </p:cNvPr>
@@ -5534,9 +5522,9 @@
           <a:bodyPr/>
           <a:lstStyle/>
           <a:p>
-            <a:fld id="{B08FEED8-D7D4-44E9-BFBC-ED06B5996D94}" type="datetime4">
+            <a:fld id="{8AAE40A0-A7D8-4DC3-BC9E-BADA32DA2004}" type="datetime4">
               <a:rPr lang="en-US" smtClean="0"/>
-              <a:t>August 12, 2019</a:t>
+              <a:t>August 13, 2019</a:t>
             </a:fld>
             <a:endParaRPr lang="en-US" dirty="0"/>
           </a:p>
@@ -5547,7 +5535,7 @@
           <p:cNvPr id="5" name="Footer Placeholder 4">
             <a:extLst>
               <a:ext uri="{FF2B5EF4-FFF2-40B4-BE49-F238E27FC236}">
-                <a16:creationId xmlns:a16="http://schemas.microsoft.com/office/drawing/2014/main" id="{673FFA57-C126-4795-A5F6-DD33AAC5ACBD}"/>
+                <a16:creationId xmlns:a16="http://schemas.microsoft.com/office/drawing/2014/main" id="{5963B75A-EC19-4470-9F8C-1E2C1FB85999}"/>
               </a:ext>
             </a:extLst>
           </p:cNvPr>
@@ -5604,7 +5592,7 @@
           <p:cNvPr id="6" name="Slide Number Placeholder 5">
             <a:extLst>
               <a:ext uri="{FF2B5EF4-FFF2-40B4-BE49-F238E27FC236}">
-                <a16:creationId xmlns:a16="http://schemas.microsoft.com/office/drawing/2014/main" id="{2FA49567-BB70-4798-8746-D0B522CCEE20}"/>
+                <a16:creationId xmlns:a16="http://schemas.microsoft.com/office/drawing/2014/main" id="{BDAB3897-F226-4B28-B7E1-52A0CDB34A2C}"/>
               </a:ext>
             </a:extLst>
           </p:cNvPr>
@@ -5631,7 +5619,856 @@
     </p:spTree>
     <p:extLst>
       <p:ext uri="{BB962C8B-B14F-4D97-AF65-F5344CB8AC3E}">
-        <p14:creationId xmlns:p14="http://schemas.microsoft.com/office/powerpoint/2010/main" val="1585568494"/>
+        <p14:creationId xmlns:p14="http://schemas.microsoft.com/office/powerpoint/2010/main" val="345372323"/>
+      </p:ext>
+    </p:extLst>
+  </p:cSld>
+  <p:clrMapOvr>
+    <a:masterClrMapping/>
+  </p:clrMapOvr>
+</p:sld>
+</file>
+
+<file path=ppt/slides/slide16.xml><?xml version="1.0" encoding="utf-8"?>
+<p:sld xmlns:a="http://schemas.openxmlformats.org/drawingml/2006/main" xmlns:r="http://schemas.openxmlformats.org/officeDocument/2006/relationships" xmlns:p="http://schemas.openxmlformats.org/presentationml/2006/main">
+  <p:cSld>
+    <p:spTree>
+      <p:nvGrpSpPr>
+        <p:cNvPr id="1" name=""/>
+        <p:cNvGrpSpPr/>
+        <p:nvPr/>
+      </p:nvGrpSpPr>
+      <p:grpSpPr>
+        <a:xfrm>
+          <a:off x="0" y="0"/>
+          <a:ext cx="0" cy="0"/>
+          <a:chOff x="0" y="0"/>
+          <a:chExt cx="0" cy="0"/>
+        </a:xfrm>
+      </p:grpSpPr>
+      <p:sp>
+        <p:nvSpPr>
+          <p:cNvPr id="2" name="Title 1">
+            <a:extLst>
+              <a:ext uri="{FF2B5EF4-FFF2-40B4-BE49-F238E27FC236}">
+                <a16:creationId xmlns:a16="http://schemas.microsoft.com/office/drawing/2014/main" id="{763619FC-2C00-4A86-9CDA-1BF3459DAC50}"/>
+              </a:ext>
+            </a:extLst>
+          </p:cNvPr>
+          <p:cNvSpPr>
+            <a:spLocks noGrp="1"/>
+          </p:cNvSpPr>
+          <p:nvPr>
+            <p:ph type="title"/>
+          </p:nvPr>
+        </p:nvSpPr>
+        <p:spPr/>
+        <p:txBody>
+          <a:bodyPr/>
+          <a:lstStyle/>
+          <a:p>
+            <a:r>
+              <a:rPr lang="en-US" dirty="0"/>
+              <a:t>ADVANCED FEATURES</a:t>
+            </a:r>
+          </a:p>
+        </p:txBody>
+      </p:sp>
+      <p:sp>
+        <p:nvSpPr>
+          <p:cNvPr id="3" name="Text Placeholder 2">
+            <a:extLst>
+              <a:ext uri="{FF2B5EF4-FFF2-40B4-BE49-F238E27FC236}">
+                <a16:creationId xmlns:a16="http://schemas.microsoft.com/office/drawing/2014/main" id="{14188AF0-954F-45E0-97B5-73D18A416CC7}"/>
+              </a:ext>
+            </a:extLst>
+          </p:cNvPr>
+          <p:cNvSpPr>
+            <a:spLocks noGrp="1"/>
+          </p:cNvSpPr>
+          <p:nvPr>
+            <p:ph type="body" idx="1"/>
+          </p:nvPr>
+        </p:nvSpPr>
+        <p:spPr/>
+        <p:txBody>
+          <a:bodyPr/>
+          <a:lstStyle/>
+          <a:p>
+            <a:r>
+              <a:rPr lang="en-US" dirty="0" err="1"/>
+              <a:t>Interprocess</a:t>
+            </a:r>
+            <a:r>
+              <a:rPr lang="en-US" dirty="0"/>
+              <a:t> communication, signals, jobs, and more</a:t>
+            </a:r>
+          </a:p>
+        </p:txBody>
+      </p:sp>
+      <p:sp>
+        <p:nvSpPr>
+          <p:cNvPr id="4" name="Date Placeholder 3">
+            <a:extLst>
+              <a:ext uri="{FF2B5EF4-FFF2-40B4-BE49-F238E27FC236}">
+                <a16:creationId xmlns:a16="http://schemas.microsoft.com/office/drawing/2014/main" id="{6D5133BD-4847-4D49-B5BF-4CC178F8FDB8}"/>
+              </a:ext>
+            </a:extLst>
+          </p:cNvPr>
+          <p:cNvSpPr>
+            <a:spLocks noGrp="1"/>
+          </p:cNvSpPr>
+          <p:nvPr>
+            <p:ph type="dt" sz="half" idx="10"/>
+          </p:nvPr>
+        </p:nvSpPr>
+        <p:spPr/>
+        <p:txBody>
+          <a:bodyPr/>
+          <a:lstStyle/>
+          <a:p>
+            <a:fld id="{8AAE40A0-A7D8-4DC3-BC9E-BADA32DA2004}" type="datetime4">
+              <a:rPr lang="en-US" smtClean="0"/>
+              <a:t>August 13, 2019</a:t>
+            </a:fld>
+            <a:endParaRPr lang="en-US" dirty="0"/>
+          </a:p>
+        </p:txBody>
+      </p:sp>
+      <p:sp>
+        <p:nvSpPr>
+          <p:cNvPr id="5" name="Footer Placeholder 4">
+            <a:extLst>
+              <a:ext uri="{FF2B5EF4-FFF2-40B4-BE49-F238E27FC236}">
+                <a16:creationId xmlns:a16="http://schemas.microsoft.com/office/drawing/2014/main" id="{5963B75A-EC19-4470-9F8C-1E2C1FB85999}"/>
+              </a:ext>
+            </a:extLst>
+          </p:cNvPr>
+          <p:cNvSpPr>
+            <a:spLocks noGrp="1"/>
+          </p:cNvSpPr>
+          <p:nvPr>
+            <p:ph type="ftr" sz="quarter" idx="11"/>
+          </p:nvPr>
+        </p:nvSpPr>
+        <p:spPr/>
+        <p:txBody>
+          <a:bodyPr/>
+          <a:lstStyle/>
+          <a:p>
+            <a:r>
+              <a:rPr lang="en-US"/>
+              <a:t>Digital Scholarship Services </a:t>
+            </a:r>
+            <a:r>
+              <a:rPr lang="en-US">
+                <a:solidFill>
+                  <a:schemeClr val="accent1">
+                    <a:lumMod val="50000"/>
+                  </a:schemeClr>
+                </a:solidFill>
+              </a:rPr>
+              <a:t>| Email</a:t>
+            </a:r>
+            <a:r>
+              <a:rPr lang="en-US"/>
+              <a:t> cf24@rice.edu </a:t>
+            </a:r>
+            <a:r>
+              <a:rPr lang="en-US">
+                <a:solidFill>
+                  <a:schemeClr val="accent1">
+                    <a:lumMod val="50000"/>
+                  </a:schemeClr>
+                </a:solidFill>
+              </a:rPr>
+              <a:t>|</a:t>
+            </a:r>
+            <a:r>
+              <a:rPr lang="en-US"/>
+              <a:t> library.rice.edu/dss</a:t>
+            </a:r>
+            <a:endParaRPr lang="en-US" dirty="0"/>
+          </a:p>
+        </p:txBody>
+      </p:sp>
+      <p:sp>
+        <p:nvSpPr>
+          <p:cNvPr id="6" name="Slide Number Placeholder 5">
+            <a:extLst>
+              <a:ext uri="{FF2B5EF4-FFF2-40B4-BE49-F238E27FC236}">
+                <a16:creationId xmlns:a16="http://schemas.microsoft.com/office/drawing/2014/main" id="{BDAB3897-F226-4B28-B7E1-52A0CDB34A2C}"/>
+              </a:ext>
+            </a:extLst>
+          </p:cNvPr>
+          <p:cNvSpPr>
+            <a:spLocks noGrp="1"/>
+          </p:cNvSpPr>
+          <p:nvPr>
+            <p:ph type="sldNum" sz="quarter" idx="12"/>
+          </p:nvPr>
+        </p:nvSpPr>
+        <p:spPr/>
+        <p:txBody>
+          <a:bodyPr/>
+          <a:lstStyle/>
+          <a:p>
+            <a:fld id="{D57F1E4F-1CFF-5643-939E-02111984F565}" type="slidenum">
+              <a:rPr lang="en-US" smtClean="0"/>
+              <a:t>16</a:t>
+            </a:fld>
+            <a:endParaRPr lang="en-US" dirty="0"/>
+          </a:p>
+        </p:txBody>
+      </p:sp>
+    </p:spTree>
+    <p:extLst>
+      <p:ext uri="{BB962C8B-B14F-4D97-AF65-F5344CB8AC3E}">
+        <p14:creationId xmlns:p14="http://schemas.microsoft.com/office/powerpoint/2010/main" val="1005120841"/>
+      </p:ext>
+    </p:extLst>
+  </p:cSld>
+  <p:clrMapOvr>
+    <a:masterClrMapping/>
+  </p:clrMapOvr>
+</p:sld>
+</file>
+
+<file path=ppt/slides/slide17.xml><?xml version="1.0" encoding="utf-8"?>
+<p:sld xmlns:a="http://schemas.openxmlformats.org/drawingml/2006/main" xmlns:r="http://schemas.openxmlformats.org/officeDocument/2006/relationships" xmlns:p="http://schemas.openxmlformats.org/presentationml/2006/main">
+  <p:cSld>
+    <p:spTree>
+      <p:nvGrpSpPr>
+        <p:cNvPr id="1" name=""/>
+        <p:cNvGrpSpPr/>
+        <p:nvPr/>
+      </p:nvGrpSpPr>
+      <p:grpSpPr>
+        <a:xfrm>
+          <a:off x="0" y="0"/>
+          <a:ext cx="0" cy="0"/>
+          <a:chOff x="0" y="0"/>
+          <a:chExt cx="0" cy="0"/>
+        </a:xfrm>
+      </p:grpSpPr>
+      <p:sp>
+        <p:nvSpPr>
+          <p:cNvPr id="2" name="Title 1">
+            <a:extLst>
+              <a:ext uri="{FF2B5EF4-FFF2-40B4-BE49-F238E27FC236}">
+                <a16:creationId xmlns:a16="http://schemas.microsoft.com/office/drawing/2014/main" id="{763619FC-2C00-4A86-9CDA-1BF3459DAC50}"/>
+              </a:ext>
+            </a:extLst>
+          </p:cNvPr>
+          <p:cNvSpPr>
+            <a:spLocks noGrp="1"/>
+          </p:cNvSpPr>
+          <p:nvPr>
+            <p:ph type="title"/>
+          </p:nvPr>
+        </p:nvSpPr>
+        <p:spPr/>
+        <p:txBody>
+          <a:bodyPr/>
+          <a:lstStyle/>
+          <a:p>
+            <a:r>
+              <a:rPr lang="en-US" dirty="0"/>
+              <a:t>INPUT AND OUTPUT</a:t>
+            </a:r>
+          </a:p>
+        </p:txBody>
+      </p:sp>
+      <p:sp>
+        <p:nvSpPr>
+          <p:cNvPr id="3" name="Text Placeholder 2">
+            <a:extLst>
+              <a:ext uri="{FF2B5EF4-FFF2-40B4-BE49-F238E27FC236}">
+                <a16:creationId xmlns:a16="http://schemas.microsoft.com/office/drawing/2014/main" id="{14188AF0-954F-45E0-97B5-73D18A416CC7}"/>
+              </a:ext>
+            </a:extLst>
+          </p:cNvPr>
+          <p:cNvSpPr>
+            <a:spLocks noGrp="1"/>
+          </p:cNvSpPr>
+          <p:nvPr>
+            <p:ph idx="1"/>
+          </p:nvPr>
+        </p:nvSpPr>
+        <p:spPr/>
+        <p:txBody>
+          <a:bodyPr/>
+          <a:lstStyle/>
+          <a:p>
+            <a:r>
+              <a:rPr lang="en-US" dirty="0"/>
+              <a:t>3 separate input/output streams</a:t>
+            </a:r>
+          </a:p>
+          <a:p>
+            <a:pPr lvl="1"/>
+            <a:r>
+              <a:rPr lang="en-US" dirty="0"/>
+              <a:t>Standard Output</a:t>
+            </a:r>
+          </a:p>
+          <a:p>
+            <a:pPr lvl="1"/>
+            <a:r>
+              <a:rPr lang="en-US" dirty="0"/>
+              <a:t>Standard Input</a:t>
+            </a:r>
+          </a:p>
+          <a:p>
+            <a:pPr lvl="1"/>
+            <a:r>
+              <a:rPr lang="en-US" dirty="0"/>
+              <a:t>Standard Error</a:t>
+            </a:r>
+          </a:p>
+          <a:p>
+            <a:r>
+              <a:rPr lang="en-US" dirty="0"/>
+              <a:t>Redirection</a:t>
+            </a:r>
+          </a:p>
+          <a:p>
+            <a:endParaRPr lang="en-US" dirty="0"/>
+          </a:p>
+        </p:txBody>
+      </p:sp>
+      <p:sp>
+        <p:nvSpPr>
+          <p:cNvPr id="4" name="Date Placeholder 3">
+            <a:extLst>
+              <a:ext uri="{FF2B5EF4-FFF2-40B4-BE49-F238E27FC236}">
+                <a16:creationId xmlns:a16="http://schemas.microsoft.com/office/drawing/2014/main" id="{6D5133BD-4847-4D49-B5BF-4CC178F8FDB8}"/>
+              </a:ext>
+            </a:extLst>
+          </p:cNvPr>
+          <p:cNvSpPr>
+            <a:spLocks noGrp="1"/>
+          </p:cNvSpPr>
+          <p:nvPr>
+            <p:ph type="dt" sz="half" idx="10"/>
+          </p:nvPr>
+        </p:nvSpPr>
+        <p:spPr/>
+        <p:txBody>
+          <a:bodyPr/>
+          <a:lstStyle/>
+          <a:p>
+            <a:fld id="{8AAE40A0-A7D8-4DC3-BC9E-BADA32DA2004}" type="datetime4">
+              <a:rPr lang="en-US" smtClean="0"/>
+              <a:t>August 13, 2019</a:t>
+            </a:fld>
+            <a:endParaRPr lang="en-US" dirty="0"/>
+          </a:p>
+        </p:txBody>
+      </p:sp>
+      <p:sp>
+        <p:nvSpPr>
+          <p:cNvPr id="5" name="Footer Placeholder 4">
+            <a:extLst>
+              <a:ext uri="{FF2B5EF4-FFF2-40B4-BE49-F238E27FC236}">
+                <a16:creationId xmlns:a16="http://schemas.microsoft.com/office/drawing/2014/main" id="{5963B75A-EC19-4470-9F8C-1E2C1FB85999}"/>
+              </a:ext>
+            </a:extLst>
+          </p:cNvPr>
+          <p:cNvSpPr>
+            <a:spLocks noGrp="1"/>
+          </p:cNvSpPr>
+          <p:nvPr>
+            <p:ph type="ftr" sz="quarter" idx="11"/>
+          </p:nvPr>
+        </p:nvSpPr>
+        <p:spPr/>
+        <p:txBody>
+          <a:bodyPr/>
+          <a:lstStyle/>
+          <a:p>
+            <a:r>
+              <a:rPr lang="en-US"/>
+              <a:t>Digital Scholarship Services </a:t>
+            </a:r>
+            <a:r>
+              <a:rPr lang="en-US">
+                <a:solidFill>
+                  <a:schemeClr val="accent1">
+                    <a:lumMod val="50000"/>
+                  </a:schemeClr>
+                </a:solidFill>
+              </a:rPr>
+              <a:t>| Email</a:t>
+            </a:r>
+            <a:r>
+              <a:rPr lang="en-US"/>
+              <a:t> cf24@rice.edu </a:t>
+            </a:r>
+            <a:r>
+              <a:rPr lang="en-US">
+                <a:solidFill>
+                  <a:schemeClr val="accent1">
+                    <a:lumMod val="50000"/>
+                  </a:schemeClr>
+                </a:solidFill>
+              </a:rPr>
+              <a:t>|</a:t>
+            </a:r>
+            <a:r>
+              <a:rPr lang="en-US"/>
+              <a:t> library.rice.edu/dss</a:t>
+            </a:r>
+            <a:endParaRPr lang="en-US" dirty="0"/>
+          </a:p>
+        </p:txBody>
+      </p:sp>
+      <p:sp>
+        <p:nvSpPr>
+          <p:cNvPr id="6" name="Slide Number Placeholder 5">
+            <a:extLst>
+              <a:ext uri="{FF2B5EF4-FFF2-40B4-BE49-F238E27FC236}">
+                <a16:creationId xmlns:a16="http://schemas.microsoft.com/office/drawing/2014/main" id="{BDAB3897-F226-4B28-B7E1-52A0CDB34A2C}"/>
+              </a:ext>
+            </a:extLst>
+          </p:cNvPr>
+          <p:cNvSpPr>
+            <a:spLocks noGrp="1"/>
+          </p:cNvSpPr>
+          <p:nvPr>
+            <p:ph type="sldNum" sz="quarter" idx="12"/>
+          </p:nvPr>
+        </p:nvSpPr>
+        <p:spPr/>
+        <p:txBody>
+          <a:bodyPr/>
+          <a:lstStyle/>
+          <a:p>
+            <a:fld id="{D57F1E4F-1CFF-5643-939E-02111984F565}" type="slidenum">
+              <a:rPr lang="en-US" smtClean="0"/>
+              <a:t>17</a:t>
+            </a:fld>
+            <a:endParaRPr lang="en-US" dirty="0"/>
+          </a:p>
+        </p:txBody>
+      </p:sp>
+    </p:spTree>
+    <p:extLst>
+      <p:ext uri="{BB962C8B-B14F-4D97-AF65-F5344CB8AC3E}">
+        <p14:creationId xmlns:p14="http://schemas.microsoft.com/office/powerpoint/2010/main" val="98178358"/>
+      </p:ext>
+    </p:extLst>
+  </p:cSld>
+  <p:clrMapOvr>
+    <a:masterClrMapping/>
+  </p:clrMapOvr>
+</p:sld>
+</file>
+
+<file path=ppt/slides/slide18.xml><?xml version="1.0" encoding="utf-8"?>
+<p:sld xmlns:a="http://schemas.openxmlformats.org/drawingml/2006/main" xmlns:r="http://schemas.openxmlformats.org/officeDocument/2006/relationships" xmlns:p="http://schemas.openxmlformats.org/presentationml/2006/main">
+  <p:cSld>
+    <p:spTree>
+      <p:nvGrpSpPr>
+        <p:cNvPr id="1" name=""/>
+        <p:cNvGrpSpPr/>
+        <p:nvPr/>
+      </p:nvGrpSpPr>
+      <p:grpSpPr>
+        <a:xfrm>
+          <a:off x="0" y="0"/>
+          <a:ext cx="0" cy="0"/>
+          <a:chOff x="0" y="0"/>
+          <a:chExt cx="0" cy="0"/>
+        </a:xfrm>
+      </p:grpSpPr>
+      <p:sp>
+        <p:nvSpPr>
+          <p:cNvPr id="2" name="Title 1">
+            <a:extLst>
+              <a:ext uri="{FF2B5EF4-FFF2-40B4-BE49-F238E27FC236}">
+                <a16:creationId xmlns:a16="http://schemas.microsoft.com/office/drawing/2014/main" id="{763619FC-2C00-4A86-9CDA-1BF3459DAC50}"/>
+              </a:ext>
+            </a:extLst>
+          </p:cNvPr>
+          <p:cNvSpPr>
+            <a:spLocks noGrp="1"/>
+          </p:cNvSpPr>
+          <p:nvPr>
+            <p:ph type="title"/>
+          </p:nvPr>
+        </p:nvSpPr>
+        <p:spPr/>
+        <p:txBody>
+          <a:bodyPr/>
+          <a:lstStyle/>
+          <a:p>
+            <a:r>
+              <a:rPr lang="en-US" dirty="0"/>
+              <a:t>PIPES</a:t>
+            </a:r>
+          </a:p>
+        </p:txBody>
+      </p:sp>
+      <p:sp>
+        <p:nvSpPr>
+          <p:cNvPr id="3" name="Text Placeholder 2">
+            <a:extLst>
+              <a:ext uri="{FF2B5EF4-FFF2-40B4-BE49-F238E27FC236}">
+                <a16:creationId xmlns:a16="http://schemas.microsoft.com/office/drawing/2014/main" id="{14188AF0-954F-45E0-97B5-73D18A416CC7}"/>
+              </a:ext>
+            </a:extLst>
+          </p:cNvPr>
+          <p:cNvSpPr>
+            <a:spLocks noGrp="1"/>
+          </p:cNvSpPr>
+          <p:nvPr>
+            <p:ph idx="1"/>
+          </p:nvPr>
+        </p:nvSpPr>
+        <p:spPr/>
+        <p:txBody>
+          <a:bodyPr/>
+          <a:lstStyle/>
+          <a:p>
+            <a:r>
+              <a:rPr lang="en-US" dirty="0"/>
+              <a:t>Sending output to a different program</a:t>
+            </a:r>
+          </a:p>
+          <a:p>
+            <a:endParaRPr lang="en-US" dirty="0"/>
+          </a:p>
+        </p:txBody>
+      </p:sp>
+      <p:sp>
+        <p:nvSpPr>
+          <p:cNvPr id="4" name="Date Placeholder 3">
+            <a:extLst>
+              <a:ext uri="{FF2B5EF4-FFF2-40B4-BE49-F238E27FC236}">
+                <a16:creationId xmlns:a16="http://schemas.microsoft.com/office/drawing/2014/main" id="{6D5133BD-4847-4D49-B5BF-4CC178F8FDB8}"/>
+              </a:ext>
+            </a:extLst>
+          </p:cNvPr>
+          <p:cNvSpPr>
+            <a:spLocks noGrp="1"/>
+          </p:cNvSpPr>
+          <p:nvPr>
+            <p:ph type="dt" sz="half" idx="10"/>
+          </p:nvPr>
+        </p:nvSpPr>
+        <p:spPr/>
+        <p:txBody>
+          <a:bodyPr/>
+          <a:lstStyle/>
+          <a:p>
+            <a:fld id="{8AAE40A0-A7D8-4DC3-BC9E-BADA32DA2004}" type="datetime4">
+              <a:rPr lang="en-US" smtClean="0"/>
+              <a:t>August 13, 2019</a:t>
+            </a:fld>
+            <a:endParaRPr lang="en-US" dirty="0"/>
+          </a:p>
+        </p:txBody>
+      </p:sp>
+      <p:sp>
+        <p:nvSpPr>
+          <p:cNvPr id="5" name="Footer Placeholder 4">
+            <a:extLst>
+              <a:ext uri="{FF2B5EF4-FFF2-40B4-BE49-F238E27FC236}">
+                <a16:creationId xmlns:a16="http://schemas.microsoft.com/office/drawing/2014/main" id="{5963B75A-EC19-4470-9F8C-1E2C1FB85999}"/>
+              </a:ext>
+            </a:extLst>
+          </p:cNvPr>
+          <p:cNvSpPr>
+            <a:spLocks noGrp="1"/>
+          </p:cNvSpPr>
+          <p:nvPr>
+            <p:ph type="ftr" sz="quarter" idx="11"/>
+          </p:nvPr>
+        </p:nvSpPr>
+        <p:spPr/>
+        <p:txBody>
+          <a:bodyPr/>
+          <a:lstStyle/>
+          <a:p>
+            <a:r>
+              <a:rPr lang="en-US"/>
+              <a:t>Digital Scholarship Services </a:t>
+            </a:r>
+            <a:r>
+              <a:rPr lang="en-US">
+                <a:solidFill>
+                  <a:schemeClr val="accent1">
+                    <a:lumMod val="50000"/>
+                  </a:schemeClr>
+                </a:solidFill>
+              </a:rPr>
+              <a:t>| Email</a:t>
+            </a:r>
+            <a:r>
+              <a:rPr lang="en-US"/>
+              <a:t> cf24@rice.edu </a:t>
+            </a:r>
+            <a:r>
+              <a:rPr lang="en-US">
+                <a:solidFill>
+                  <a:schemeClr val="accent1">
+                    <a:lumMod val="50000"/>
+                  </a:schemeClr>
+                </a:solidFill>
+              </a:rPr>
+              <a:t>|</a:t>
+            </a:r>
+            <a:r>
+              <a:rPr lang="en-US"/>
+              <a:t> library.rice.edu/dss</a:t>
+            </a:r>
+            <a:endParaRPr lang="en-US" dirty="0"/>
+          </a:p>
+        </p:txBody>
+      </p:sp>
+      <p:sp>
+        <p:nvSpPr>
+          <p:cNvPr id="6" name="Slide Number Placeholder 5">
+            <a:extLst>
+              <a:ext uri="{FF2B5EF4-FFF2-40B4-BE49-F238E27FC236}">
+                <a16:creationId xmlns:a16="http://schemas.microsoft.com/office/drawing/2014/main" id="{BDAB3897-F226-4B28-B7E1-52A0CDB34A2C}"/>
+              </a:ext>
+            </a:extLst>
+          </p:cNvPr>
+          <p:cNvSpPr>
+            <a:spLocks noGrp="1"/>
+          </p:cNvSpPr>
+          <p:nvPr>
+            <p:ph type="sldNum" sz="quarter" idx="12"/>
+          </p:nvPr>
+        </p:nvSpPr>
+        <p:spPr/>
+        <p:txBody>
+          <a:bodyPr/>
+          <a:lstStyle/>
+          <a:p>
+            <a:fld id="{D57F1E4F-1CFF-5643-939E-02111984F565}" type="slidenum">
+              <a:rPr lang="en-US" smtClean="0"/>
+              <a:t>18</a:t>
+            </a:fld>
+            <a:endParaRPr lang="en-US" dirty="0"/>
+          </a:p>
+        </p:txBody>
+      </p:sp>
+    </p:spTree>
+    <p:extLst>
+      <p:ext uri="{BB962C8B-B14F-4D97-AF65-F5344CB8AC3E}">
+        <p14:creationId xmlns:p14="http://schemas.microsoft.com/office/powerpoint/2010/main" val="4096482738"/>
+      </p:ext>
+    </p:extLst>
+  </p:cSld>
+  <p:clrMapOvr>
+    <a:masterClrMapping/>
+  </p:clrMapOvr>
+</p:sld>
+</file>
+
+<file path=ppt/slides/slide19.xml><?xml version="1.0" encoding="utf-8"?>
+<p:sld xmlns:a="http://schemas.openxmlformats.org/drawingml/2006/main" xmlns:r="http://schemas.openxmlformats.org/officeDocument/2006/relationships" xmlns:p="http://schemas.openxmlformats.org/presentationml/2006/main">
+  <p:cSld>
+    <p:spTree>
+      <p:nvGrpSpPr>
+        <p:cNvPr id="1" name=""/>
+        <p:cNvGrpSpPr/>
+        <p:nvPr/>
+      </p:nvGrpSpPr>
+      <p:grpSpPr>
+        <a:xfrm>
+          <a:off x="0" y="0"/>
+          <a:ext cx="0" cy="0"/>
+          <a:chOff x="0" y="0"/>
+          <a:chExt cx="0" cy="0"/>
+        </a:xfrm>
+      </p:grpSpPr>
+      <p:sp>
+        <p:nvSpPr>
+          <p:cNvPr id="2" name="Title 1">
+            <a:extLst>
+              <a:ext uri="{FF2B5EF4-FFF2-40B4-BE49-F238E27FC236}">
+                <a16:creationId xmlns:a16="http://schemas.microsoft.com/office/drawing/2014/main" id="{763619FC-2C00-4A86-9CDA-1BF3459DAC50}"/>
+              </a:ext>
+            </a:extLst>
+          </p:cNvPr>
+          <p:cNvSpPr>
+            <a:spLocks noGrp="1"/>
+          </p:cNvSpPr>
+          <p:nvPr>
+            <p:ph type="title"/>
+          </p:nvPr>
+        </p:nvSpPr>
+        <p:spPr/>
+        <p:txBody>
+          <a:bodyPr/>
+          <a:lstStyle/>
+          <a:p>
+            <a:r>
+              <a:rPr lang="en-US" dirty="0"/>
+              <a:t>VARIABLES</a:t>
+            </a:r>
+          </a:p>
+        </p:txBody>
+      </p:sp>
+      <p:sp>
+        <p:nvSpPr>
+          <p:cNvPr id="3" name="Text Placeholder 2">
+            <a:extLst>
+              <a:ext uri="{FF2B5EF4-FFF2-40B4-BE49-F238E27FC236}">
+                <a16:creationId xmlns:a16="http://schemas.microsoft.com/office/drawing/2014/main" id="{14188AF0-954F-45E0-97B5-73D18A416CC7}"/>
+              </a:ext>
+            </a:extLst>
+          </p:cNvPr>
+          <p:cNvSpPr>
+            <a:spLocks noGrp="1"/>
+          </p:cNvSpPr>
+          <p:nvPr>
+            <p:ph idx="1"/>
+          </p:nvPr>
+        </p:nvSpPr>
+        <p:spPr/>
+        <p:txBody>
+          <a:bodyPr/>
+          <a:lstStyle/>
+          <a:p>
+            <a:r>
+              <a:rPr lang="en-US" dirty="0"/>
+              <a:t>Can name pieces of information and refer to them </a:t>
+            </a:r>
+            <a:r>
+              <a:rPr lang="en-US" dirty="0" err="1"/>
+              <a:t>laters</a:t>
+            </a:r>
+            <a:endParaRPr lang="en-US" dirty="0"/>
+          </a:p>
+          <a:p>
+            <a:endParaRPr lang="en-US" dirty="0"/>
+          </a:p>
+        </p:txBody>
+      </p:sp>
+      <p:sp>
+        <p:nvSpPr>
+          <p:cNvPr id="4" name="Date Placeholder 3">
+            <a:extLst>
+              <a:ext uri="{FF2B5EF4-FFF2-40B4-BE49-F238E27FC236}">
+                <a16:creationId xmlns:a16="http://schemas.microsoft.com/office/drawing/2014/main" id="{6D5133BD-4847-4D49-B5BF-4CC178F8FDB8}"/>
+              </a:ext>
+            </a:extLst>
+          </p:cNvPr>
+          <p:cNvSpPr>
+            <a:spLocks noGrp="1"/>
+          </p:cNvSpPr>
+          <p:nvPr>
+            <p:ph type="dt" sz="half" idx="10"/>
+          </p:nvPr>
+        </p:nvSpPr>
+        <p:spPr/>
+        <p:txBody>
+          <a:bodyPr/>
+          <a:lstStyle/>
+          <a:p>
+            <a:fld id="{8AAE40A0-A7D8-4DC3-BC9E-BADA32DA2004}" type="datetime4">
+              <a:rPr lang="en-US" smtClean="0"/>
+              <a:t>August 13, 2019</a:t>
+            </a:fld>
+            <a:endParaRPr lang="en-US" dirty="0"/>
+          </a:p>
+        </p:txBody>
+      </p:sp>
+      <p:sp>
+        <p:nvSpPr>
+          <p:cNvPr id="5" name="Footer Placeholder 4">
+            <a:extLst>
+              <a:ext uri="{FF2B5EF4-FFF2-40B4-BE49-F238E27FC236}">
+                <a16:creationId xmlns:a16="http://schemas.microsoft.com/office/drawing/2014/main" id="{5963B75A-EC19-4470-9F8C-1E2C1FB85999}"/>
+              </a:ext>
+            </a:extLst>
+          </p:cNvPr>
+          <p:cNvSpPr>
+            <a:spLocks noGrp="1"/>
+          </p:cNvSpPr>
+          <p:nvPr>
+            <p:ph type="ftr" sz="quarter" idx="11"/>
+          </p:nvPr>
+        </p:nvSpPr>
+        <p:spPr/>
+        <p:txBody>
+          <a:bodyPr/>
+          <a:lstStyle/>
+          <a:p>
+            <a:r>
+              <a:rPr lang="en-US"/>
+              <a:t>Digital Scholarship Services </a:t>
+            </a:r>
+            <a:r>
+              <a:rPr lang="en-US">
+                <a:solidFill>
+                  <a:schemeClr val="accent1">
+                    <a:lumMod val="50000"/>
+                  </a:schemeClr>
+                </a:solidFill>
+              </a:rPr>
+              <a:t>| Email</a:t>
+            </a:r>
+            <a:r>
+              <a:rPr lang="en-US"/>
+              <a:t> cf24@rice.edu </a:t>
+            </a:r>
+            <a:r>
+              <a:rPr lang="en-US">
+                <a:solidFill>
+                  <a:schemeClr val="accent1">
+                    <a:lumMod val="50000"/>
+                  </a:schemeClr>
+                </a:solidFill>
+              </a:rPr>
+              <a:t>|</a:t>
+            </a:r>
+            <a:r>
+              <a:rPr lang="en-US"/>
+              <a:t> library.rice.edu/dss</a:t>
+            </a:r>
+            <a:endParaRPr lang="en-US" dirty="0"/>
+          </a:p>
+        </p:txBody>
+      </p:sp>
+      <p:sp>
+        <p:nvSpPr>
+          <p:cNvPr id="6" name="Slide Number Placeholder 5">
+            <a:extLst>
+              <a:ext uri="{FF2B5EF4-FFF2-40B4-BE49-F238E27FC236}">
+                <a16:creationId xmlns:a16="http://schemas.microsoft.com/office/drawing/2014/main" id="{BDAB3897-F226-4B28-B7E1-52A0CDB34A2C}"/>
+              </a:ext>
+            </a:extLst>
+          </p:cNvPr>
+          <p:cNvSpPr>
+            <a:spLocks noGrp="1"/>
+          </p:cNvSpPr>
+          <p:nvPr>
+            <p:ph type="sldNum" sz="quarter" idx="12"/>
+          </p:nvPr>
+        </p:nvSpPr>
+        <p:spPr/>
+        <p:txBody>
+          <a:bodyPr/>
+          <a:lstStyle/>
+          <a:p>
+            <a:fld id="{D57F1E4F-1CFF-5643-939E-02111984F565}" type="slidenum">
+              <a:rPr lang="en-US" smtClean="0"/>
+              <a:t>19</a:t>
+            </a:fld>
+            <a:endParaRPr lang="en-US" dirty="0"/>
+          </a:p>
+        </p:txBody>
+      </p:sp>
+    </p:spTree>
+    <p:extLst>
+      <p:ext uri="{BB962C8B-B14F-4D97-AF65-F5344CB8AC3E}">
+        <p14:creationId xmlns:p14="http://schemas.microsoft.com/office/powerpoint/2010/main" val="3531683742"/>
       </p:ext>
     </p:extLst>
   </p:cSld>
@@ -5739,7 +6576,7 @@
             <a:fld id="{8AAE40A0-A7D8-4DC3-BC9E-BADA32DA2004}" type="datetime4">
               <a:rPr lang="en-US" smtClean="0"/>
               <a:pPr/>
-              <a:t>August 12, 2019</a:t>
+              <a:t>August 13, 2019</a:t>
             </a:fld>
             <a:endParaRPr lang="en-US" dirty="0"/>
           </a:p>
@@ -5998,7 +6835,7 @@
           <a:p>
             <a:r>
               <a:rPr lang="en-US" dirty="0"/>
-              <a:t>Most simple interface to an operating system</a:t>
+              <a:t>Very simple and direct interface to an operating system</a:t>
             </a:r>
           </a:p>
           <a:p>
@@ -6025,6 +6862,2183 @@
     <p:extLst>
       <p:ext uri="{BB962C8B-B14F-4D97-AF65-F5344CB8AC3E}">
         <p14:creationId xmlns:p14="http://schemas.microsoft.com/office/powerpoint/2010/main" val="2699201933"/>
+      </p:ext>
+    </p:extLst>
+  </p:cSld>
+  <p:clrMapOvr>
+    <a:masterClrMapping/>
+  </p:clrMapOvr>
+</p:sld>
+</file>
+
+<file path=ppt/slides/slide20.xml><?xml version="1.0" encoding="utf-8"?>
+<p:sld xmlns:a="http://schemas.openxmlformats.org/drawingml/2006/main" xmlns:r="http://schemas.openxmlformats.org/officeDocument/2006/relationships" xmlns:p="http://schemas.openxmlformats.org/presentationml/2006/main">
+  <p:cSld>
+    <p:spTree>
+      <p:nvGrpSpPr>
+        <p:cNvPr id="1" name=""/>
+        <p:cNvGrpSpPr/>
+        <p:nvPr/>
+      </p:nvGrpSpPr>
+      <p:grpSpPr>
+        <a:xfrm>
+          <a:off x="0" y="0"/>
+          <a:ext cx="0" cy="0"/>
+          <a:chOff x="0" y="0"/>
+          <a:chExt cx="0" cy="0"/>
+        </a:xfrm>
+      </p:grpSpPr>
+      <p:sp>
+        <p:nvSpPr>
+          <p:cNvPr id="2" name="Title 1">
+            <a:extLst>
+              <a:ext uri="{FF2B5EF4-FFF2-40B4-BE49-F238E27FC236}">
+                <a16:creationId xmlns:a16="http://schemas.microsoft.com/office/drawing/2014/main" id="{763619FC-2C00-4A86-9CDA-1BF3459DAC50}"/>
+              </a:ext>
+            </a:extLst>
+          </p:cNvPr>
+          <p:cNvSpPr>
+            <a:spLocks noGrp="1"/>
+          </p:cNvSpPr>
+          <p:nvPr>
+            <p:ph type="title"/>
+          </p:nvPr>
+        </p:nvSpPr>
+        <p:spPr/>
+        <p:txBody>
+          <a:bodyPr/>
+          <a:lstStyle/>
+          <a:p>
+            <a:r>
+              <a:rPr lang="en-US" dirty="0"/>
+              <a:t>IF STATEMENTS</a:t>
+            </a:r>
+          </a:p>
+        </p:txBody>
+      </p:sp>
+      <p:sp>
+        <p:nvSpPr>
+          <p:cNvPr id="3" name="Text Placeholder 2">
+            <a:extLst>
+              <a:ext uri="{FF2B5EF4-FFF2-40B4-BE49-F238E27FC236}">
+                <a16:creationId xmlns:a16="http://schemas.microsoft.com/office/drawing/2014/main" id="{14188AF0-954F-45E0-97B5-73D18A416CC7}"/>
+              </a:ext>
+            </a:extLst>
+          </p:cNvPr>
+          <p:cNvSpPr>
+            <a:spLocks noGrp="1"/>
+          </p:cNvSpPr>
+          <p:nvPr>
+            <p:ph idx="1"/>
+          </p:nvPr>
+        </p:nvSpPr>
+        <p:spPr/>
+        <p:txBody>
+          <a:bodyPr/>
+          <a:lstStyle/>
+          <a:p>
+            <a:r>
+              <a:rPr lang="en-US" dirty="0"/>
+              <a:t>Conditionals:</a:t>
+            </a:r>
+          </a:p>
+          <a:p>
+            <a:endParaRPr lang="en-US" dirty="0"/>
+          </a:p>
+        </p:txBody>
+      </p:sp>
+      <p:sp>
+        <p:nvSpPr>
+          <p:cNvPr id="4" name="Date Placeholder 3">
+            <a:extLst>
+              <a:ext uri="{FF2B5EF4-FFF2-40B4-BE49-F238E27FC236}">
+                <a16:creationId xmlns:a16="http://schemas.microsoft.com/office/drawing/2014/main" id="{6D5133BD-4847-4D49-B5BF-4CC178F8FDB8}"/>
+              </a:ext>
+            </a:extLst>
+          </p:cNvPr>
+          <p:cNvSpPr>
+            <a:spLocks noGrp="1"/>
+          </p:cNvSpPr>
+          <p:nvPr>
+            <p:ph type="dt" sz="half" idx="10"/>
+          </p:nvPr>
+        </p:nvSpPr>
+        <p:spPr/>
+        <p:txBody>
+          <a:bodyPr/>
+          <a:lstStyle/>
+          <a:p>
+            <a:fld id="{8AAE40A0-A7D8-4DC3-BC9E-BADA32DA2004}" type="datetime4">
+              <a:rPr lang="en-US" smtClean="0"/>
+              <a:t>August 13, 2019</a:t>
+            </a:fld>
+            <a:endParaRPr lang="en-US" dirty="0"/>
+          </a:p>
+        </p:txBody>
+      </p:sp>
+      <p:sp>
+        <p:nvSpPr>
+          <p:cNvPr id="5" name="Footer Placeholder 4">
+            <a:extLst>
+              <a:ext uri="{FF2B5EF4-FFF2-40B4-BE49-F238E27FC236}">
+                <a16:creationId xmlns:a16="http://schemas.microsoft.com/office/drawing/2014/main" id="{5963B75A-EC19-4470-9F8C-1E2C1FB85999}"/>
+              </a:ext>
+            </a:extLst>
+          </p:cNvPr>
+          <p:cNvSpPr>
+            <a:spLocks noGrp="1"/>
+          </p:cNvSpPr>
+          <p:nvPr>
+            <p:ph type="ftr" sz="quarter" idx="11"/>
+          </p:nvPr>
+        </p:nvSpPr>
+        <p:spPr/>
+        <p:txBody>
+          <a:bodyPr/>
+          <a:lstStyle/>
+          <a:p>
+            <a:r>
+              <a:rPr lang="en-US"/>
+              <a:t>Digital Scholarship Services </a:t>
+            </a:r>
+            <a:r>
+              <a:rPr lang="en-US">
+                <a:solidFill>
+                  <a:schemeClr val="accent1">
+                    <a:lumMod val="50000"/>
+                  </a:schemeClr>
+                </a:solidFill>
+              </a:rPr>
+              <a:t>| Email</a:t>
+            </a:r>
+            <a:r>
+              <a:rPr lang="en-US"/>
+              <a:t> cf24@rice.edu </a:t>
+            </a:r>
+            <a:r>
+              <a:rPr lang="en-US">
+                <a:solidFill>
+                  <a:schemeClr val="accent1">
+                    <a:lumMod val="50000"/>
+                  </a:schemeClr>
+                </a:solidFill>
+              </a:rPr>
+              <a:t>|</a:t>
+            </a:r>
+            <a:r>
+              <a:rPr lang="en-US"/>
+              <a:t> library.rice.edu/dss</a:t>
+            </a:r>
+            <a:endParaRPr lang="en-US" dirty="0"/>
+          </a:p>
+        </p:txBody>
+      </p:sp>
+      <p:sp>
+        <p:nvSpPr>
+          <p:cNvPr id="6" name="Slide Number Placeholder 5">
+            <a:extLst>
+              <a:ext uri="{FF2B5EF4-FFF2-40B4-BE49-F238E27FC236}">
+                <a16:creationId xmlns:a16="http://schemas.microsoft.com/office/drawing/2014/main" id="{BDAB3897-F226-4B28-B7E1-52A0CDB34A2C}"/>
+              </a:ext>
+            </a:extLst>
+          </p:cNvPr>
+          <p:cNvSpPr>
+            <a:spLocks noGrp="1"/>
+          </p:cNvSpPr>
+          <p:nvPr>
+            <p:ph type="sldNum" sz="quarter" idx="12"/>
+          </p:nvPr>
+        </p:nvSpPr>
+        <p:spPr/>
+        <p:txBody>
+          <a:bodyPr/>
+          <a:lstStyle/>
+          <a:p>
+            <a:fld id="{D57F1E4F-1CFF-5643-939E-02111984F565}" type="slidenum">
+              <a:rPr lang="en-US" smtClean="0"/>
+              <a:t>20</a:t>
+            </a:fld>
+            <a:endParaRPr lang="en-US" dirty="0"/>
+          </a:p>
+        </p:txBody>
+      </p:sp>
+    </p:spTree>
+    <p:extLst>
+      <p:ext uri="{BB962C8B-B14F-4D97-AF65-F5344CB8AC3E}">
+        <p14:creationId xmlns:p14="http://schemas.microsoft.com/office/powerpoint/2010/main" val="3349014258"/>
+      </p:ext>
+    </p:extLst>
+  </p:cSld>
+  <p:clrMapOvr>
+    <a:masterClrMapping/>
+  </p:clrMapOvr>
+</p:sld>
+</file>
+
+<file path=ppt/slides/slide21.xml><?xml version="1.0" encoding="utf-8"?>
+<p:sld xmlns:a="http://schemas.openxmlformats.org/drawingml/2006/main" xmlns:r="http://schemas.openxmlformats.org/officeDocument/2006/relationships" xmlns:p="http://schemas.openxmlformats.org/presentationml/2006/main">
+  <p:cSld>
+    <p:spTree>
+      <p:nvGrpSpPr>
+        <p:cNvPr id="1" name=""/>
+        <p:cNvGrpSpPr/>
+        <p:nvPr/>
+      </p:nvGrpSpPr>
+      <p:grpSpPr>
+        <a:xfrm>
+          <a:off x="0" y="0"/>
+          <a:ext cx="0" cy="0"/>
+          <a:chOff x="0" y="0"/>
+          <a:chExt cx="0" cy="0"/>
+        </a:xfrm>
+      </p:grpSpPr>
+      <p:sp>
+        <p:nvSpPr>
+          <p:cNvPr id="2" name="Title 1">
+            <a:extLst>
+              <a:ext uri="{FF2B5EF4-FFF2-40B4-BE49-F238E27FC236}">
+                <a16:creationId xmlns:a16="http://schemas.microsoft.com/office/drawing/2014/main" id="{763619FC-2C00-4A86-9CDA-1BF3459DAC50}"/>
+              </a:ext>
+            </a:extLst>
+          </p:cNvPr>
+          <p:cNvSpPr>
+            <a:spLocks noGrp="1"/>
+          </p:cNvSpPr>
+          <p:nvPr>
+            <p:ph type="title"/>
+          </p:nvPr>
+        </p:nvSpPr>
+        <p:spPr/>
+        <p:txBody>
+          <a:bodyPr/>
+          <a:lstStyle/>
+          <a:p>
+            <a:r>
+              <a:rPr lang="en-US" dirty="0"/>
+              <a:t>FOR LOOPS</a:t>
+            </a:r>
+          </a:p>
+        </p:txBody>
+      </p:sp>
+      <p:sp>
+        <p:nvSpPr>
+          <p:cNvPr id="3" name="Text Placeholder 2">
+            <a:extLst>
+              <a:ext uri="{FF2B5EF4-FFF2-40B4-BE49-F238E27FC236}">
+                <a16:creationId xmlns:a16="http://schemas.microsoft.com/office/drawing/2014/main" id="{14188AF0-954F-45E0-97B5-73D18A416CC7}"/>
+              </a:ext>
+            </a:extLst>
+          </p:cNvPr>
+          <p:cNvSpPr>
+            <a:spLocks noGrp="1"/>
+          </p:cNvSpPr>
+          <p:nvPr>
+            <p:ph idx="1"/>
+          </p:nvPr>
+        </p:nvSpPr>
+        <p:spPr/>
+        <p:txBody>
+          <a:bodyPr/>
+          <a:lstStyle/>
+          <a:p>
+            <a:r>
+              <a:rPr lang="en-US" dirty="0"/>
+              <a:t>Good for ranges of values (i.e. a-z, 0-9)</a:t>
+            </a:r>
+          </a:p>
+          <a:p>
+            <a:r>
+              <a:rPr lang="en-US" dirty="0"/>
+              <a:t>Or, for lists of values (“cat”, “dog”, “frog”)</a:t>
+            </a:r>
+          </a:p>
+          <a:p>
+            <a:endParaRPr lang="en-US" dirty="0"/>
+          </a:p>
+        </p:txBody>
+      </p:sp>
+      <p:sp>
+        <p:nvSpPr>
+          <p:cNvPr id="4" name="Date Placeholder 3">
+            <a:extLst>
+              <a:ext uri="{FF2B5EF4-FFF2-40B4-BE49-F238E27FC236}">
+                <a16:creationId xmlns:a16="http://schemas.microsoft.com/office/drawing/2014/main" id="{6D5133BD-4847-4D49-B5BF-4CC178F8FDB8}"/>
+              </a:ext>
+            </a:extLst>
+          </p:cNvPr>
+          <p:cNvSpPr>
+            <a:spLocks noGrp="1"/>
+          </p:cNvSpPr>
+          <p:nvPr>
+            <p:ph type="dt" sz="half" idx="10"/>
+          </p:nvPr>
+        </p:nvSpPr>
+        <p:spPr/>
+        <p:txBody>
+          <a:bodyPr/>
+          <a:lstStyle/>
+          <a:p>
+            <a:fld id="{8AAE40A0-A7D8-4DC3-BC9E-BADA32DA2004}" type="datetime4">
+              <a:rPr lang="en-US" smtClean="0"/>
+              <a:t>August 13, 2019</a:t>
+            </a:fld>
+            <a:endParaRPr lang="en-US" dirty="0"/>
+          </a:p>
+        </p:txBody>
+      </p:sp>
+      <p:sp>
+        <p:nvSpPr>
+          <p:cNvPr id="5" name="Footer Placeholder 4">
+            <a:extLst>
+              <a:ext uri="{FF2B5EF4-FFF2-40B4-BE49-F238E27FC236}">
+                <a16:creationId xmlns:a16="http://schemas.microsoft.com/office/drawing/2014/main" id="{5963B75A-EC19-4470-9F8C-1E2C1FB85999}"/>
+              </a:ext>
+            </a:extLst>
+          </p:cNvPr>
+          <p:cNvSpPr>
+            <a:spLocks noGrp="1"/>
+          </p:cNvSpPr>
+          <p:nvPr>
+            <p:ph type="ftr" sz="quarter" idx="11"/>
+          </p:nvPr>
+        </p:nvSpPr>
+        <p:spPr/>
+        <p:txBody>
+          <a:bodyPr/>
+          <a:lstStyle/>
+          <a:p>
+            <a:r>
+              <a:rPr lang="en-US"/>
+              <a:t>Digital Scholarship Services </a:t>
+            </a:r>
+            <a:r>
+              <a:rPr lang="en-US">
+                <a:solidFill>
+                  <a:schemeClr val="accent1">
+                    <a:lumMod val="50000"/>
+                  </a:schemeClr>
+                </a:solidFill>
+              </a:rPr>
+              <a:t>| Email</a:t>
+            </a:r>
+            <a:r>
+              <a:rPr lang="en-US"/>
+              <a:t> cf24@rice.edu </a:t>
+            </a:r>
+            <a:r>
+              <a:rPr lang="en-US">
+                <a:solidFill>
+                  <a:schemeClr val="accent1">
+                    <a:lumMod val="50000"/>
+                  </a:schemeClr>
+                </a:solidFill>
+              </a:rPr>
+              <a:t>|</a:t>
+            </a:r>
+            <a:r>
+              <a:rPr lang="en-US"/>
+              <a:t> library.rice.edu/dss</a:t>
+            </a:r>
+            <a:endParaRPr lang="en-US" dirty="0"/>
+          </a:p>
+        </p:txBody>
+      </p:sp>
+      <p:sp>
+        <p:nvSpPr>
+          <p:cNvPr id="6" name="Slide Number Placeholder 5">
+            <a:extLst>
+              <a:ext uri="{FF2B5EF4-FFF2-40B4-BE49-F238E27FC236}">
+                <a16:creationId xmlns:a16="http://schemas.microsoft.com/office/drawing/2014/main" id="{BDAB3897-F226-4B28-B7E1-52A0CDB34A2C}"/>
+              </a:ext>
+            </a:extLst>
+          </p:cNvPr>
+          <p:cNvSpPr>
+            <a:spLocks noGrp="1"/>
+          </p:cNvSpPr>
+          <p:nvPr>
+            <p:ph type="sldNum" sz="quarter" idx="12"/>
+          </p:nvPr>
+        </p:nvSpPr>
+        <p:spPr/>
+        <p:txBody>
+          <a:bodyPr/>
+          <a:lstStyle/>
+          <a:p>
+            <a:fld id="{D57F1E4F-1CFF-5643-939E-02111984F565}" type="slidenum">
+              <a:rPr lang="en-US" smtClean="0"/>
+              <a:t>21</a:t>
+            </a:fld>
+            <a:endParaRPr lang="en-US" dirty="0"/>
+          </a:p>
+        </p:txBody>
+      </p:sp>
+    </p:spTree>
+    <p:extLst>
+      <p:ext uri="{BB962C8B-B14F-4D97-AF65-F5344CB8AC3E}">
+        <p14:creationId xmlns:p14="http://schemas.microsoft.com/office/powerpoint/2010/main" val="3700336351"/>
+      </p:ext>
+    </p:extLst>
+  </p:cSld>
+  <p:clrMapOvr>
+    <a:masterClrMapping/>
+  </p:clrMapOvr>
+</p:sld>
+</file>
+
+<file path=ppt/slides/slide22.xml><?xml version="1.0" encoding="utf-8"?>
+<p:sld xmlns:a="http://schemas.openxmlformats.org/drawingml/2006/main" xmlns:r="http://schemas.openxmlformats.org/officeDocument/2006/relationships" xmlns:p="http://schemas.openxmlformats.org/presentationml/2006/main">
+  <p:cSld>
+    <p:spTree>
+      <p:nvGrpSpPr>
+        <p:cNvPr id="1" name=""/>
+        <p:cNvGrpSpPr/>
+        <p:nvPr/>
+      </p:nvGrpSpPr>
+      <p:grpSpPr>
+        <a:xfrm>
+          <a:off x="0" y="0"/>
+          <a:ext cx="0" cy="0"/>
+          <a:chOff x="0" y="0"/>
+          <a:chExt cx="0" cy="0"/>
+        </a:xfrm>
+      </p:grpSpPr>
+      <p:sp>
+        <p:nvSpPr>
+          <p:cNvPr id="2" name="Title 1">
+            <a:extLst>
+              <a:ext uri="{FF2B5EF4-FFF2-40B4-BE49-F238E27FC236}">
+                <a16:creationId xmlns:a16="http://schemas.microsoft.com/office/drawing/2014/main" id="{763619FC-2C00-4A86-9CDA-1BF3459DAC50}"/>
+              </a:ext>
+            </a:extLst>
+          </p:cNvPr>
+          <p:cNvSpPr>
+            <a:spLocks noGrp="1"/>
+          </p:cNvSpPr>
+          <p:nvPr>
+            <p:ph type="title"/>
+          </p:nvPr>
+        </p:nvSpPr>
+        <p:spPr/>
+        <p:txBody>
+          <a:bodyPr/>
+          <a:lstStyle/>
+          <a:p>
+            <a:r>
+              <a:rPr lang="en-US" dirty="0"/>
+              <a:t>WHILE LOOPS</a:t>
+            </a:r>
+          </a:p>
+        </p:txBody>
+      </p:sp>
+      <p:sp>
+        <p:nvSpPr>
+          <p:cNvPr id="3" name="Text Placeholder 2">
+            <a:extLst>
+              <a:ext uri="{FF2B5EF4-FFF2-40B4-BE49-F238E27FC236}">
+                <a16:creationId xmlns:a16="http://schemas.microsoft.com/office/drawing/2014/main" id="{14188AF0-954F-45E0-97B5-73D18A416CC7}"/>
+              </a:ext>
+            </a:extLst>
+          </p:cNvPr>
+          <p:cNvSpPr>
+            <a:spLocks noGrp="1"/>
+          </p:cNvSpPr>
+          <p:nvPr>
+            <p:ph idx="1"/>
+          </p:nvPr>
+        </p:nvSpPr>
+        <p:spPr/>
+        <p:txBody>
+          <a:bodyPr/>
+          <a:lstStyle/>
+          <a:p>
+            <a:r>
+              <a:rPr lang="en-US" dirty="0"/>
+              <a:t>Do something over and over, until the condition is false</a:t>
+            </a:r>
+          </a:p>
+          <a:p>
+            <a:endParaRPr lang="en-US" dirty="0"/>
+          </a:p>
+        </p:txBody>
+      </p:sp>
+      <p:sp>
+        <p:nvSpPr>
+          <p:cNvPr id="4" name="Date Placeholder 3">
+            <a:extLst>
+              <a:ext uri="{FF2B5EF4-FFF2-40B4-BE49-F238E27FC236}">
+                <a16:creationId xmlns:a16="http://schemas.microsoft.com/office/drawing/2014/main" id="{6D5133BD-4847-4D49-B5BF-4CC178F8FDB8}"/>
+              </a:ext>
+            </a:extLst>
+          </p:cNvPr>
+          <p:cNvSpPr>
+            <a:spLocks noGrp="1"/>
+          </p:cNvSpPr>
+          <p:nvPr>
+            <p:ph type="dt" sz="half" idx="10"/>
+          </p:nvPr>
+        </p:nvSpPr>
+        <p:spPr/>
+        <p:txBody>
+          <a:bodyPr/>
+          <a:lstStyle/>
+          <a:p>
+            <a:fld id="{8AAE40A0-A7D8-4DC3-BC9E-BADA32DA2004}" type="datetime4">
+              <a:rPr lang="en-US" smtClean="0"/>
+              <a:t>August 13, 2019</a:t>
+            </a:fld>
+            <a:endParaRPr lang="en-US" dirty="0"/>
+          </a:p>
+        </p:txBody>
+      </p:sp>
+      <p:sp>
+        <p:nvSpPr>
+          <p:cNvPr id="5" name="Footer Placeholder 4">
+            <a:extLst>
+              <a:ext uri="{FF2B5EF4-FFF2-40B4-BE49-F238E27FC236}">
+                <a16:creationId xmlns:a16="http://schemas.microsoft.com/office/drawing/2014/main" id="{5963B75A-EC19-4470-9F8C-1E2C1FB85999}"/>
+              </a:ext>
+            </a:extLst>
+          </p:cNvPr>
+          <p:cNvSpPr>
+            <a:spLocks noGrp="1"/>
+          </p:cNvSpPr>
+          <p:nvPr>
+            <p:ph type="ftr" sz="quarter" idx="11"/>
+          </p:nvPr>
+        </p:nvSpPr>
+        <p:spPr/>
+        <p:txBody>
+          <a:bodyPr/>
+          <a:lstStyle/>
+          <a:p>
+            <a:r>
+              <a:rPr lang="en-US"/>
+              <a:t>Digital Scholarship Services </a:t>
+            </a:r>
+            <a:r>
+              <a:rPr lang="en-US">
+                <a:solidFill>
+                  <a:schemeClr val="accent1">
+                    <a:lumMod val="50000"/>
+                  </a:schemeClr>
+                </a:solidFill>
+              </a:rPr>
+              <a:t>| Email</a:t>
+            </a:r>
+            <a:r>
+              <a:rPr lang="en-US"/>
+              <a:t> cf24@rice.edu </a:t>
+            </a:r>
+            <a:r>
+              <a:rPr lang="en-US">
+                <a:solidFill>
+                  <a:schemeClr val="accent1">
+                    <a:lumMod val="50000"/>
+                  </a:schemeClr>
+                </a:solidFill>
+              </a:rPr>
+              <a:t>|</a:t>
+            </a:r>
+            <a:r>
+              <a:rPr lang="en-US"/>
+              <a:t> library.rice.edu/dss</a:t>
+            </a:r>
+            <a:endParaRPr lang="en-US" dirty="0"/>
+          </a:p>
+        </p:txBody>
+      </p:sp>
+      <p:sp>
+        <p:nvSpPr>
+          <p:cNvPr id="6" name="Slide Number Placeholder 5">
+            <a:extLst>
+              <a:ext uri="{FF2B5EF4-FFF2-40B4-BE49-F238E27FC236}">
+                <a16:creationId xmlns:a16="http://schemas.microsoft.com/office/drawing/2014/main" id="{BDAB3897-F226-4B28-B7E1-52A0CDB34A2C}"/>
+              </a:ext>
+            </a:extLst>
+          </p:cNvPr>
+          <p:cNvSpPr>
+            <a:spLocks noGrp="1"/>
+          </p:cNvSpPr>
+          <p:nvPr>
+            <p:ph type="sldNum" sz="quarter" idx="12"/>
+          </p:nvPr>
+        </p:nvSpPr>
+        <p:spPr/>
+        <p:txBody>
+          <a:bodyPr/>
+          <a:lstStyle/>
+          <a:p>
+            <a:fld id="{D57F1E4F-1CFF-5643-939E-02111984F565}" type="slidenum">
+              <a:rPr lang="en-US" smtClean="0"/>
+              <a:t>22</a:t>
+            </a:fld>
+            <a:endParaRPr lang="en-US" dirty="0"/>
+          </a:p>
+        </p:txBody>
+      </p:sp>
+    </p:spTree>
+    <p:extLst>
+      <p:ext uri="{BB962C8B-B14F-4D97-AF65-F5344CB8AC3E}">
+        <p14:creationId xmlns:p14="http://schemas.microsoft.com/office/powerpoint/2010/main" val="1249293789"/>
+      </p:ext>
+    </p:extLst>
+  </p:cSld>
+  <p:clrMapOvr>
+    <a:masterClrMapping/>
+  </p:clrMapOvr>
+</p:sld>
+</file>
+
+<file path=ppt/slides/slide23.xml><?xml version="1.0" encoding="utf-8"?>
+<p:sld xmlns:a="http://schemas.openxmlformats.org/drawingml/2006/main" xmlns:r="http://schemas.openxmlformats.org/officeDocument/2006/relationships" xmlns:p="http://schemas.openxmlformats.org/presentationml/2006/main">
+  <p:cSld>
+    <p:spTree>
+      <p:nvGrpSpPr>
+        <p:cNvPr id="1" name=""/>
+        <p:cNvGrpSpPr/>
+        <p:nvPr/>
+      </p:nvGrpSpPr>
+      <p:grpSpPr>
+        <a:xfrm>
+          <a:off x="0" y="0"/>
+          <a:ext cx="0" cy="0"/>
+          <a:chOff x="0" y="0"/>
+          <a:chExt cx="0" cy="0"/>
+        </a:xfrm>
+      </p:grpSpPr>
+      <p:sp>
+        <p:nvSpPr>
+          <p:cNvPr id="2" name="Title 1">
+            <a:extLst>
+              <a:ext uri="{FF2B5EF4-FFF2-40B4-BE49-F238E27FC236}">
+                <a16:creationId xmlns:a16="http://schemas.microsoft.com/office/drawing/2014/main" id="{763619FC-2C00-4A86-9CDA-1BF3459DAC50}"/>
+              </a:ext>
+            </a:extLst>
+          </p:cNvPr>
+          <p:cNvSpPr>
+            <a:spLocks noGrp="1"/>
+          </p:cNvSpPr>
+          <p:nvPr>
+            <p:ph type="title"/>
+          </p:nvPr>
+        </p:nvSpPr>
+        <p:spPr/>
+        <p:txBody>
+          <a:bodyPr/>
+          <a:lstStyle/>
+          <a:p>
+            <a:r>
+              <a:rPr lang="en-US" dirty="0"/>
+              <a:t>JOBS</a:t>
+            </a:r>
+          </a:p>
+        </p:txBody>
+      </p:sp>
+      <p:sp>
+        <p:nvSpPr>
+          <p:cNvPr id="3" name="Text Placeholder 2">
+            <a:extLst>
+              <a:ext uri="{FF2B5EF4-FFF2-40B4-BE49-F238E27FC236}">
+                <a16:creationId xmlns:a16="http://schemas.microsoft.com/office/drawing/2014/main" id="{14188AF0-954F-45E0-97B5-73D18A416CC7}"/>
+              </a:ext>
+            </a:extLst>
+          </p:cNvPr>
+          <p:cNvSpPr>
+            <a:spLocks noGrp="1"/>
+          </p:cNvSpPr>
+          <p:nvPr>
+            <p:ph idx="1"/>
+          </p:nvPr>
+        </p:nvSpPr>
+        <p:spPr/>
+        <p:txBody>
+          <a:bodyPr/>
+          <a:lstStyle/>
+          <a:p>
+            <a:r>
+              <a:rPr lang="en-US" dirty="0"/>
+              <a:t>Multiple processes can be running in the shell at the same time</a:t>
+            </a:r>
+          </a:p>
+          <a:p>
+            <a:r>
+              <a:rPr lang="en-US" dirty="0"/>
+              <a:t>Start a job in the background by ending the line with &amp;</a:t>
+            </a:r>
+          </a:p>
+          <a:p>
+            <a:r>
+              <a:rPr lang="en-US" dirty="0"/>
+              <a:t>Switch it back to foreground with </a:t>
+            </a:r>
+            <a:r>
+              <a:rPr lang="en-US" dirty="0" err="1"/>
+              <a:t>fg</a:t>
+            </a:r>
+            <a:endParaRPr lang="en-US" dirty="0"/>
+          </a:p>
+          <a:p>
+            <a:r>
+              <a:rPr lang="en-US" dirty="0"/>
+              <a:t>Great for long running processes</a:t>
+            </a:r>
+          </a:p>
+        </p:txBody>
+      </p:sp>
+      <p:sp>
+        <p:nvSpPr>
+          <p:cNvPr id="4" name="Date Placeholder 3">
+            <a:extLst>
+              <a:ext uri="{FF2B5EF4-FFF2-40B4-BE49-F238E27FC236}">
+                <a16:creationId xmlns:a16="http://schemas.microsoft.com/office/drawing/2014/main" id="{6D5133BD-4847-4D49-B5BF-4CC178F8FDB8}"/>
+              </a:ext>
+            </a:extLst>
+          </p:cNvPr>
+          <p:cNvSpPr>
+            <a:spLocks noGrp="1"/>
+          </p:cNvSpPr>
+          <p:nvPr>
+            <p:ph type="dt" sz="half" idx="10"/>
+          </p:nvPr>
+        </p:nvSpPr>
+        <p:spPr/>
+        <p:txBody>
+          <a:bodyPr/>
+          <a:lstStyle/>
+          <a:p>
+            <a:fld id="{8AAE40A0-A7D8-4DC3-BC9E-BADA32DA2004}" type="datetime4">
+              <a:rPr lang="en-US" smtClean="0"/>
+              <a:t>August 13, 2019</a:t>
+            </a:fld>
+            <a:endParaRPr lang="en-US" dirty="0"/>
+          </a:p>
+        </p:txBody>
+      </p:sp>
+      <p:sp>
+        <p:nvSpPr>
+          <p:cNvPr id="5" name="Footer Placeholder 4">
+            <a:extLst>
+              <a:ext uri="{FF2B5EF4-FFF2-40B4-BE49-F238E27FC236}">
+                <a16:creationId xmlns:a16="http://schemas.microsoft.com/office/drawing/2014/main" id="{5963B75A-EC19-4470-9F8C-1E2C1FB85999}"/>
+              </a:ext>
+            </a:extLst>
+          </p:cNvPr>
+          <p:cNvSpPr>
+            <a:spLocks noGrp="1"/>
+          </p:cNvSpPr>
+          <p:nvPr>
+            <p:ph type="ftr" sz="quarter" idx="11"/>
+          </p:nvPr>
+        </p:nvSpPr>
+        <p:spPr/>
+        <p:txBody>
+          <a:bodyPr/>
+          <a:lstStyle/>
+          <a:p>
+            <a:r>
+              <a:rPr lang="en-US"/>
+              <a:t>Digital Scholarship Services </a:t>
+            </a:r>
+            <a:r>
+              <a:rPr lang="en-US">
+                <a:solidFill>
+                  <a:schemeClr val="accent1">
+                    <a:lumMod val="50000"/>
+                  </a:schemeClr>
+                </a:solidFill>
+              </a:rPr>
+              <a:t>| Email</a:t>
+            </a:r>
+            <a:r>
+              <a:rPr lang="en-US"/>
+              <a:t> cf24@rice.edu </a:t>
+            </a:r>
+            <a:r>
+              <a:rPr lang="en-US">
+                <a:solidFill>
+                  <a:schemeClr val="accent1">
+                    <a:lumMod val="50000"/>
+                  </a:schemeClr>
+                </a:solidFill>
+              </a:rPr>
+              <a:t>|</a:t>
+            </a:r>
+            <a:r>
+              <a:rPr lang="en-US"/>
+              <a:t> library.rice.edu/dss</a:t>
+            </a:r>
+            <a:endParaRPr lang="en-US" dirty="0"/>
+          </a:p>
+        </p:txBody>
+      </p:sp>
+      <p:sp>
+        <p:nvSpPr>
+          <p:cNvPr id="6" name="Slide Number Placeholder 5">
+            <a:extLst>
+              <a:ext uri="{FF2B5EF4-FFF2-40B4-BE49-F238E27FC236}">
+                <a16:creationId xmlns:a16="http://schemas.microsoft.com/office/drawing/2014/main" id="{BDAB3897-F226-4B28-B7E1-52A0CDB34A2C}"/>
+              </a:ext>
+            </a:extLst>
+          </p:cNvPr>
+          <p:cNvSpPr>
+            <a:spLocks noGrp="1"/>
+          </p:cNvSpPr>
+          <p:nvPr>
+            <p:ph type="sldNum" sz="quarter" idx="12"/>
+          </p:nvPr>
+        </p:nvSpPr>
+        <p:spPr/>
+        <p:txBody>
+          <a:bodyPr/>
+          <a:lstStyle/>
+          <a:p>
+            <a:fld id="{D57F1E4F-1CFF-5643-939E-02111984F565}" type="slidenum">
+              <a:rPr lang="en-US" smtClean="0"/>
+              <a:t>23</a:t>
+            </a:fld>
+            <a:endParaRPr lang="en-US" dirty="0"/>
+          </a:p>
+        </p:txBody>
+      </p:sp>
+    </p:spTree>
+    <p:extLst>
+      <p:ext uri="{BB962C8B-B14F-4D97-AF65-F5344CB8AC3E}">
+        <p14:creationId xmlns:p14="http://schemas.microsoft.com/office/powerpoint/2010/main" val="4077320852"/>
+      </p:ext>
+    </p:extLst>
+  </p:cSld>
+  <p:clrMapOvr>
+    <a:masterClrMapping/>
+  </p:clrMapOvr>
+</p:sld>
+</file>
+
+<file path=ppt/slides/slide24.xml><?xml version="1.0" encoding="utf-8"?>
+<p:sld xmlns:a="http://schemas.openxmlformats.org/drawingml/2006/main" xmlns:r="http://schemas.openxmlformats.org/officeDocument/2006/relationships" xmlns:p="http://schemas.openxmlformats.org/presentationml/2006/main">
+  <p:cSld>
+    <p:spTree>
+      <p:nvGrpSpPr>
+        <p:cNvPr id="1" name=""/>
+        <p:cNvGrpSpPr/>
+        <p:nvPr/>
+      </p:nvGrpSpPr>
+      <p:grpSpPr>
+        <a:xfrm>
+          <a:off x="0" y="0"/>
+          <a:ext cx="0" cy="0"/>
+          <a:chOff x="0" y="0"/>
+          <a:chExt cx="0" cy="0"/>
+        </a:xfrm>
+      </p:grpSpPr>
+      <p:sp>
+        <p:nvSpPr>
+          <p:cNvPr id="2" name="Title 1">
+            <a:extLst>
+              <a:ext uri="{FF2B5EF4-FFF2-40B4-BE49-F238E27FC236}">
+                <a16:creationId xmlns:a16="http://schemas.microsoft.com/office/drawing/2014/main" id="{763619FC-2C00-4A86-9CDA-1BF3459DAC50}"/>
+              </a:ext>
+            </a:extLst>
+          </p:cNvPr>
+          <p:cNvSpPr>
+            <a:spLocks noGrp="1"/>
+          </p:cNvSpPr>
+          <p:nvPr>
+            <p:ph type="title"/>
+          </p:nvPr>
+        </p:nvSpPr>
+        <p:spPr/>
+        <p:txBody>
+          <a:bodyPr/>
+          <a:lstStyle/>
+          <a:p>
+            <a:r>
+              <a:rPr lang="en-US" dirty="0"/>
+              <a:t>SIGNALS</a:t>
+            </a:r>
+          </a:p>
+        </p:txBody>
+      </p:sp>
+      <p:sp>
+        <p:nvSpPr>
+          <p:cNvPr id="3" name="Text Placeholder 2">
+            <a:extLst>
+              <a:ext uri="{FF2B5EF4-FFF2-40B4-BE49-F238E27FC236}">
+                <a16:creationId xmlns:a16="http://schemas.microsoft.com/office/drawing/2014/main" id="{14188AF0-954F-45E0-97B5-73D18A416CC7}"/>
+              </a:ext>
+            </a:extLst>
+          </p:cNvPr>
+          <p:cNvSpPr>
+            <a:spLocks noGrp="1"/>
+          </p:cNvSpPr>
+          <p:nvPr>
+            <p:ph idx="1"/>
+          </p:nvPr>
+        </p:nvSpPr>
+        <p:spPr/>
+        <p:txBody>
+          <a:bodyPr/>
+          <a:lstStyle/>
+          <a:p>
+            <a:r>
+              <a:rPr lang="en-US" dirty="0" err="1"/>
+              <a:t>Ctrl+D</a:t>
+            </a:r>
+            <a:endParaRPr lang="en-US" dirty="0"/>
+          </a:p>
+          <a:p>
+            <a:r>
+              <a:rPr lang="en-US" dirty="0" err="1"/>
+              <a:t>Ctrl+C</a:t>
+            </a:r>
+            <a:endParaRPr lang="en-US" dirty="0"/>
+          </a:p>
+          <a:p>
+            <a:r>
+              <a:rPr lang="en-US" dirty="0" err="1"/>
+              <a:t>Ctrl+Z</a:t>
+            </a:r>
+            <a:endParaRPr lang="en-US" dirty="0"/>
+          </a:p>
+          <a:p>
+            <a:endParaRPr lang="en-US" dirty="0"/>
+          </a:p>
+          <a:p>
+            <a:endParaRPr lang="en-US" dirty="0"/>
+          </a:p>
+        </p:txBody>
+      </p:sp>
+      <p:sp>
+        <p:nvSpPr>
+          <p:cNvPr id="4" name="Date Placeholder 3">
+            <a:extLst>
+              <a:ext uri="{FF2B5EF4-FFF2-40B4-BE49-F238E27FC236}">
+                <a16:creationId xmlns:a16="http://schemas.microsoft.com/office/drawing/2014/main" id="{6D5133BD-4847-4D49-B5BF-4CC178F8FDB8}"/>
+              </a:ext>
+            </a:extLst>
+          </p:cNvPr>
+          <p:cNvSpPr>
+            <a:spLocks noGrp="1"/>
+          </p:cNvSpPr>
+          <p:nvPr>
+            <p:ph type="dt" sz="half" idx="10"/>
+          </p:nvPr>
+        </p:nvSpPr>
+        <p:spPr/>
+        <p:txBody>
+          <a:bodyPr/>
+          <a:lstStyle/>
+          <a:p>
+            <a:fld id="{8AAE40A0-A7D8-4DC3-BC9E-BADA32DA2004}" type="datetime4">
+              <a:rPr lang="en-US" smtClean="0"/>
+              <a:t>August 13, 2019</a:t>
+            </a:fld>
+            <a:endParaRPr lang="en-US" dirty="0"/>
+          </a:p>
+        </p:txBody>
+      </p:sp>
+      <p:sp>
+        <p:nvSpPr>
+          <p:cNvPr id="5" name="Footer Placeholder 4">
+            <a:extLst>
+              <a:ext uri="{FF2B5EF4-FFF2-40B4-BE49-F238E27FC236}">
+                <a16:creationId xmlns:a16="http://schemas.microsoft.com/office/drawing/2014/main" id="{5963B75A-EC19-4470-9F8C-1E2C1FB85999}"/>
+              </a:ext>
+            </a:extLst>
+          </p:cNvPr>
+          <p:cNvSpPr>
+            <a:spLocks noGrp="1"/>
+          </p:cNvSpPr>
+          <p:nvPr>
+            <p:ph type="ftr" sz="quarter" idx="11"/>
+          </p:nvPr>
+        </p:nvSpPr>
+        <p:spPr/>
+        <p:txBody>
+          <a:bodyPr/>
+          <a:lstStyle/>
+          <a:p>
+            <a:r>
+              <a:rPr lang="en-US"/>
+              <a:t>Digital Scholarship Services </a:t>
+            </a:r>
+            <a:r>
+              <a:rPr lang="en-US">
+                <a:solidFill>
+                  <a:schemeClr val="accent1">
+                    <a:lumMod val="50000"/>
+                  </a:schemeClr>
+                </a:solidFill>
+              </a:rPr>
+              <a:t>| Email</a:t>
+            </a:r>
+            <a:r>
+              <a:rPr lang="en-US"/>
+              <a:t> cf24@rice.edu </a:t>
+            </a:r>
+            <a:r>
+              <a:rPr lang="en-US">
+                <a:solidFill>
+                  <a:schemeClr val="accent1">
+                    <a:lumMod val="50000"/>
+                  </a:schemeClr>
+                </a:solidFill>
+              </a:rPr>
+              <a:t>|</a:t>
+            </a:r>
+            <a:r>
+              <a:rPr lang="en-US"/>
+              <a:t> library.rice.edu/dss</a:t>
+            </a:r>
+            <a:endParaRPr lang="en-US" dirty="0"/>
+          </a:p>
+        </p:txBody>
+      </p:sp>
+      <p:sp>
+        <p:nvSpPr>
+          <p:cNvPr id="6" name="Slide Number Placeholder 5">
+            <a:extLst>
+              <a:ext uri="{FF2B5EF4-FFF2-40B4-BE49-F238E27FC236}">
+                <a16:creationId xmlns:a16="http://schemas.microsoft.com/office/drawing/2014/main" id="{BDAB3897-F226-4B28-B7E1-52A0CDB34A2C}"/>
+              </a:ext>
+            </a:extLst>
+          </p:cNvPr>
+          <p:cNvSpPr>
+            <a:spLocks noGrp="1"/>
+          </p:cNvSpPr>
+          <p:nvPr>
+            <p:ph type="sldNum" sz="quarter" idx="12"/>
+          </p:nvPr>
+        </p:nvSpPr>
+        <p:spPr/>
+        <p:txBody>
+          <a:bodyPr/>
+          <a:lstStyle/>
+          <a:p>
+            <a:fld id="{D57F1E4F-1CFF-5643-939E-02111984F565}" type="slidenum">
+              <a:rPr lang="en-US" smtClean="0"/>
+              <a:t>24</a:t>
+            </a:fld>
+            <a:endParaRPr lang="en-US" dirty="0"/>
+          </a:p>
+        </p:txBody>
+      </p:sp>
+    </p:spTree>
+    <p:extLst>
+      <p:ext uri="{BB962C8B-B14F-4D97-AF65-F5344CB8AC3E}">
+        <p14:creationId xmlns:p14="http://schemas.microsoft.com/office/powerpoint/2010/main" val="1683568060"/>
+      </p:ext>
+    </p:extLst>
+  </p:cSld>
+  <p:clrMapOvr>
+    <a:masterClrMapping/>
+  </p:clrMapOvr>
+</p:sld>
+</file>
+
+<file path=ppt/slides/slide25.xml><?xml version="1.0" encoding="utf-8"?>
+<p:sld xmlns:a="http://schemas.openxmlformats.org/drawingml/2006/main" xmlns:r="http://schemas.openxmlformats.org/officeDocument/2006/relationships" xmlns:p="http://schemas.openxmlformats.org/presentationml/2006/main">
+  <p:cSld>
+    <p:spTree>
+      <p:nvGrpSpPr>
+        <p:cNvPr id="1" name=""/>
+        <p:cNvGrpSpPr/>
+        <p:nvPr/>
+      </p:nvGrpSpPr>
+      <p:grpSpPr>
+        <a:xfrm>
+          <a:off x="0" y="0"/>
+          <a:ext cx="0" cy="0"/>
+          <a:chOff x="0" y="0"/>
+          <a:chExt cx="0" cy="0"/>
+        </a:xfrm>
+      </p:grpSpPr>
+      <p:sp>
+        <p:nvSpPr>
+          <p:cNvPr id="2" name="Title 1">
+            <a:extLst>
+              <a:ext uri="{FF2B5EF4-FFF2-40B4-BE49-F238E27FC236}">
+                <a16:creationId xmlns:a16="http://schemas.microsoft.com/office/drawing/2014/main" id="{763619FC-2C00-4A86-9CDA-1BF3459DAC50}"/>
+              </a:ext>
+            </a:extLst>
+          </p:cNvPr>
+          <p:cNvSpPr>
+            <a:spLocks noGrp="1"/>
+          </p:cNvSpPr>
+          <p:nvPr>
+            <p:ph type="title"/>
+          </p:nvPr>
+        </p:nvSpPr>
+        <p:spPr/>
+        <p:txBody>
+          <a:bodyPr/>
+          <a:lstStyle/>
+          <a:p>
+            <a:r>
+              <a:rPr lang="en-US" dirty="0"/>
+              <a:t>ALIASES</a:t>
+            </a:r>
+          </a:p>
+        </p:txBody>
+      </p:sp>
+      <p:sp>
+        <p:nvSpPr>
+          <p:cNvPr id="3" name="Text Placeholder 2">
+            <a:extLst>
+              <a:ext uri="{FF2B5EF4-FFF2-40B4-BE49-F238E27FC236}">
+                <a16:creationId xmlns:a16="http://schemas.microsoft.com/office/drawing/2014/main" id="{14188AF0-954F-45E0-97B5-73D18A416CC7}"/>
+              </a:ext>
+            </a:extLst>
+          </p:cNvPr>
+          <p:cNvSpPr>
+            <a:spLocks noGrp="1"/>
+          </p:cNvSpPr>
+          <p:nvPr>
+            <p:ph idx="1"/>
+          </p:nvPr>
+        </p:nvSpPr>
+        <p:spPr/>
+        <p:txBody>
+          <a:bodyPr/>
+          <a:lstStyle/>
+          <a:p>
+            <a:r>
+              <a:rPr lang="en-US" dirty="0"/>
+              <a:t>Handy shortcuts for long commands with lots of arguments</a:t>
+            </a:r>
+          </a:p>
+          <a:p>
+            <a:endParaRPr lang="en-US" dirty="0"/>
+          </a:p>
+          <a:p>
+            <a:endParaRPr lang="en-US" dirty="0"/>
+          </a:p>
+        </p:txBody>
+      </p:sp>
+      <p:sp>
+        <p:nvSpPr>
+          <p:cNvPr id="4" name="Date Placeholder 3">
+            <a:extLst>
+              <a:ext uri="{FF2B5EF4-FFF2-40B4-BE49-F238E27FC236}">
+                <a16:creationId xmlns:a16="http://schemas.microsoft.com/office/drawing/2014/main" id="{6D5133BD-4847-4D49-B5BF-4CC178F8FDB8}"/>
+              </a:ext>
+            </a:extLst>
+          </p:cNvPr>
+          <p:cNvSpPr>
+            <a:spLocks noGrp="1"/>
+          </p:cNvSpPr>
+          <p:nvPr>
+            <p:ph type="dt" sz="half" idx="10"/>
+          </p:nvPr>
+        </p:nvSpPr>
+        <p:spPr/>
+        <p:txBody>
+          <a:bodyPr/>
+          <a:lstStyle/>
+          <a:p>
+            <a:fld id="{8AAE40A0-A7D8-4DC3-BC9E-BADA32DA2004}" type="datetime4">
+              <a:rPr lang="en-US" smtClean="0"/>
+              <a:t>August 13, 2019</a:t>
+            </a:fld>
+            <a:endParaRPr lang="en-US" dirty="0"/>
+          </a:p>
+        </p:txBody>
+      </p:sp>
+      <p:sp>
+        <p:nvSpPr>
+          <p:cNvPr id="5" name="Footer Placeholder 4">
+            <a:extLst>
+              <a:ext uri="{FF2B5EF4-FFF2-40B4-BE49-F238E27FC236}">
+                <a16:creationId xmlns:a16="http://schemas.microsoft.com/office/drawing/2014/main" id="{5963B75A-EC19-4470-9F8C-1E2C1FB85999}"/>
+              </a:ext>
+            </a:extLst>
+          </p:cNvPr>
+          <p:cNvSpPr>
+            <a:spLocks noGrp="1"/>
+          </p:cNvSpPr>
+          <p:nvPr>
+            <p:ph type="ftr" sz="quarter" idx="11"/>
+          </p:nvPr>
+        </p:nvSpPr>
+        <p:spPr/>
+        <p:txBody>
+          <a:bodyPr/>
+          <a:lstStyle/>
+          <a:p>
+            <a:r>
+              <a:rPr lang="en-US"/>
+              <a:t>Digital Scholarship Services </a:t>
+            </a:r>
+            <a:r>
+              <a:rPr lang="en-US">
+                <a:solidFill>
+                  <a:schemeClr val="accent1">
+                    <a:lumMod val="50000"/>
+                  </a:schemeClr>
+                </a:solidFill>
+              </a:rPr>
+              <a:t>| Email</a:t>
+            </a:r>
+            <a:r>
+              <a:rPr lang="en-US"/>
+              <a:t> cf24@rice.edu </a:t>
+            </a:r>
+            <a:r>
+              <a:rPr lang="en-US">
+                <a:solidFill>
+                  <a:schemeClr val="accent1">
+                    <a:lumMod val="50000"/>
+                  </a:schemeClr>
+                </a:solidFill>
+              </a:rPr>
+              <a:t>|</a:t>
+            </a:r>
+            <a:r>
+              <a:rPr lang="en-US"/>
+              <a:t> library.rice.edu/dss</a:t>
+            </a:r>
+            <a:endParaRPr lang="en-US" dirty="0"/>
+          </a:p>
+        </p:txBody>
+      </p:sp>
+      <p:sp>
+        <p:nvSpPr>
+          <p:cNvPr id="6" name="Slide Number Placeholder 5">
+            <a:extLst>
+              <a:ext uri="{FF2B5EF4-FFF2-40B4-BE49-F238E27FC236}">
+                <a16:creationId xmlns:a16="http://schemas.microsoft.com/office/drawing/2014/main" id="{BDAB3897-F226-4B28-B7E1-52A0CDB34A2C}"/>
+              </a:ext>
+            </a:extLst>
+          </p:cNvPr>
+          <p:cNvSpPr>
+            <a:spLocks noGrp="1"/>
+          </p:cNvSpPr>
+          <p:nvPr>
+            <p:ph type="sldNum" sz="quarter" idx="12"/>
+          </p:nvPr>
+        </p:nvSpPr>
+        <p:spPr/>
+        <p:txBody>
+          <a:bodyPr/>
+          <a:lstStyle/>
+          <a:p>
+            <a:fld id="{D57F1E4F-1CFF-5643-939E-02111984F565}" type="slidenum">
+              <a:rPr lang="en-US" smtClean="0"/>
+              <a:t>25</a:t>
+            </a:fld>
+            <a:endParaRPr lang="en-US" dirty="0"/>
+          </a:p>
+        </p:txBody>
+      </p:sp>
+    </p:spTree>
+    <p:extLst>
+      <p:ext uri="{BB962C8B-B14F-4D97-AF65-F5344CB8AC3E}">
+        <p14:creationId xmlns:p14="http://schemas.microsoft.com/office/powerpoint/2010/main" val="3102884327"/>
+      </p:ext>
+    </p:extLst>
+  </p:cSld>
+  <p:clrMapOvr>
+    <a:masterClrMapping/>
+  </p:clrMapOvr>
+</p:sld>
+</file>
+
+<file path=ppt/slides/slide26.xml><?xml version="1.0" encoding="utf-8"?>
+<p:sld xmlns:a="http://schemas.openxmlformats.org/drawingml/2006/main" xmlns:r="http://schemas.openxmlformats.org/officeDocument/2006/relationships" xmlns:p="http://schemas.openxmlformats.org/presentationml/2006/main">
+  <p:cSld>
+    <p:spTree>
+      <p:nvGrpSpPr>
+        <p:cNvPr id="1" name=""/>
+        <p:cNvGrpSpPr/>
+        <p:nvPr/>
+      </p:nvGrpSpPr>
+      <p:grpSpPr>
+        <a:xfrm>
+          <a:off x="0" y="0"/>
+          <a:ext cx="0" cy="0"/>
+          <a:chOff x="0" y="0"/>
+          <a:chExt cx="0" cy="0"/>
+        </a:xfrm>
+      </p:grpSpPr>
+      <p:sp>
+        <p:nvSpPr>
+          <p:cNvPr id="2" name="Title 1">
+            <a:extLst>
+              <a:ext uri="{FF2B5EF4-FFF2-40B4-BE49-F238E27FC236}">
+                <a16:creationId xmlns:a16="http://schemas.microsoft.com/office/drawing/2014/main" id="{98EB4F1B-51B3-4B64-8210-21AE8BE64582}"/>
+              </a:ext>
+            </a:extLst>
+          </p:cNvPr>
+          <p:cNvSpPr>
+            <a:spLocks noGrp="1"/>
+          </p:cNvSpPr>
+          <p:nvPr>
+            <p:ph type="title"/>
+          </p:nvPr>
+        </p:nvSpPr>
+        <p:spPr/>
+        <p:txBody>
+          <a:bodyPr/>
+          <a:lstStyle/>
+          <a:p>
+            <a:r>
+              <a:rPr lang="en-US" dirty="0"/>
+              <a:t>SPECIAL FILES</a:t>
+            </a:r>
+          </a:p>
+        </p:txBody>
+      </p:sp>
+      <p:sp>
+        <p:nvSpPr>
+          <p:cNvPr id="3" name="Content Placeholder 2">
+            <a:extLst>
+              <a:ext uri="{FF2B5EF4-FFF2-40B4-BE49-F238E27FC236}">
+                <a16:creationId xmlns:a16="http://schemas.microsoft.com/office/drawing/2014/main" id="{593AD591-5DD9-410C-B27F-EACDDF765FF4}"/>
+              </a:ext>
+            </a:extLst>
+          </p:cNvPr>
+          <p:cNvSpPr>
+            <a:spLocks noGrp="1"/>
+          </p:cNvSpPr>
+          <p:nvPr>
+            <p:ph idx="1"/>
+          </p:nvPr>
+        </p:nvSpPr>
+        <p:spPr/>
+        <p:txBody>
+          <a:bodyPr/>
+          <a:lstStyle/>
+          <a:p>
+            <a:r>
+              <a:rPr lang="en-US" dirty="0"/>
+              <a:t>.</a:t>
+            </a:r>
+            <a:r>
+              <a:rPr lang="en-US" dirty="0" err="1"/>
+              <a:t>bashrc</a:t>
+            </a:r>
+            <a:endParaRPr lang="en-US" dirty="0"/>
+          </a:p>
+          <a:p>
+            <a:pPr lvl="1"/>
+            <a:r>
+              <a:rPr lang="en-US" dirty="0"/>
+              <a:t>Run every time you start bash</a:t>
+            </a:r>
+          </a:p>
+          <a:p>
+            <a:pPr lvl="1"/>
+            <a:r>
+              <a:rPr lang="en-US" dirty="0"/>
+              <a:t>Great for configuring global settings</a:t>
+            </a:r>
+          </a:p>
+          <a:p>
+            <a:r>
+              <a:rPr lang="en-US" dirty="0"/>
+              <a:t>.</a:t>
+            </a:r>
+            <a:r>
+              <a:rPr lang="en-US" dirty="0" err="1"/>
+              <a:t>bash_profile</a:t>
+            </a:r>
+            <a:endParaRPr lang="en-US" dirty="0"/>
+          </a:p>
+          <a:p>
+            <a:r>
+              <a:rPr lang="en-US" dirty="0"/>
+              <a:t>.</a:t>
+            </a:r>
+            <a:r>
+              <a:rPr lang="en-US" dirty="0" err="1"/>
+              <a:t>bash_history</a:t>
+            </a:r>
+            <a:endParaRPr lang="en-US" dirty="0"/>
+          </a:p>
+          <a:p>
+            <a:pPr lvl="1"/>
+            <a:r>
+              <a:rPr lang="en-US" dirty="0"/>
+              <a:t>Re-run previous commands with arrow keys up/down</a:t>
+            </a:r>
+          </a:p>
+        </p:txBody>
+      </p:sp>
+      <p:sp>
+        <p:nvSpPr>
+          <p:cNvPr id="4" name="Date Placeholder 3">
+            <a:extLst>
+              <a:ext uri="{FF2B5EF4-FFF2-40B4-BE49-F238E27FC236}">
+                <a16:creationId xmlns:a16="http://schemas.microsoft.com/office/drawing/2014/main" id="{17E05AC0-8A63-4FDD-A727-54A8C6040A83}"/>
+              </a:ext>
+            </a:extLst>
+          </p:cNvPr>
+          <p:cNvSpPr>
+            <a:spLocks noGrp="1"/>
+          </p:cNvSpPr>
+          <p:nvPr>
+            <p:ph type="dt" sz="half" idx="10"/>
+          </p:nvPr>
+        </p:nvSpPr>
+        <p:spPr/>
+        <p:txBody>
+          <a:bodyPr/>
+          <a:lstStyle/>
+          <a:p>
+            <a:fld id="{8AAE40A0-A7D8-4DC3-BC9E-BADA32DA2004}" type="datetime4">
+              <a:rPr lang="en-US" smtClean="0"/>
+              <a:t>August 13, 2019</a:t>
+            </a:fld>
+            <a:endParaRPr lang="en-US" dirty="0"/>
+          </a:p>
+        </p:txBody>
+      </p:sp>
+      <p:sp>
+        <p:nvSpPr>
+          <p:cNvPr id="5" name="Footer Placeholder 4">
+            <a:extLst>
+              <a:ext uri="{FF2B5EF4-FFF2-40B4-BE49-F238E27FC236}">
+                <a16:creationId xmlns:a16="http://schemas.microsoft.com/office/drawing/2014/main" id="{9C0CA735-E60F-4094-86F7-D33BB272FA25}"/>
+              </a:ext>
+            </a:extLst>
+          </p:cNvPr>
+          <p:cNvSpPr>
+            <a:spLocks noGrp="1"/>
+          </p:cNvSpPr>
+          <p:nvPr>
+            <p:ph type="ftr" sz="quarter" idx="11"/>
+          </p:nvPr>
+        </p:nvSpPr>
+        <p:spPr/>
+        <p:txBody>
+          <a:bodyPr/>
+          <a:lstStyle/>
+          <a:p>
+            <a:r>
+              <a:rPr lang="en-US"/>
+              <a:t>Digital Scholarship Services </a:t>
+            </a:r>
+            <a:r>
+              <a:rPr lang="en-US">
+                <a:solidFill>
+                  <a:schemeClr val="accent1">
+                    <a:lumMod val="50000"/>
+                  </a:schemeClr>
+                </a:solidFill>
+              </a:rPr>
+              <a:t>| Email</a:t>
+            </a:r>
+            <a:r>
+              <a:rPr lang="en-US"/>
+              <a:t> cf24@rice.edu </a:t>
+            </a:r>
+            <a:r>
+              <a:rPr lang="en-US">
+                <a:solidFill>
+                  <a:schemeClr val="accent1">
+                    <a:lumMod val="50000"/>
+                  </a:schemeClr>
+                </a:solidFill>
+              </a:rPr>
+              <a:t>|</a:t>
+            </a:r>
+            <a:r>
+              <a:rPr lang="en-US"/>
+              <a:t> library.rice.edu/dss</a:t>
+            </a:r>
+            <a:endParaRPr lang="en-US" dirty="0"/>
+          </a:p>
+        </p:txBody>
+      </p:sp>
+      <p:sp>
+        <p:nvSpPr>
+          <p:cNvPr id="6" name="Slide Number Placeholder 5">
+            <a:extLst>
+              <a:ext uri="{FF2B5EF4-FFF2-40B4-BE49-F238E27FC236}">
+                <a16:creationId xmlns:a16="http://schemas.microsoft.com/office/drawing/2014/main" id="{33AAFB92-45C0-421A-AC0A-7A439518D3F4}"/>
+              </a:ext>
+            </a:extLst>
+          </p:cNvPr>
+          <p:cNvSpPr>
+            <a:spLocks noGrp="1"/>
+          </p:cNvSpPr>
+          <p:nvPr>
+            <p:ph type="sldNum" sz="quarter" idx="12"/>
+          </p:nvPr>
+        </p:nvSpPr>
+        <p:spPr/>
+        <p:txBody>
+          <a:bodyPr/>
+          <a:lstStyle/>
+          <a:p>
+            <a:fld id="{D57F1E4F-1CFF-5643-939E-02111984F565}" type="slidenum">
+              <a:rPr lang="en-US" smtClean="0"/>
+              <a:t>26</a:t>
+            </a:fld>
+            <a:endParaRPr lang="en-US" dirty="0"/>
+          </a:p>
+        </p:txBody>
+      </p:sp>
+    </p:spTree>
+    <p:extLst>
+      <p:ext uri="{BB962C8B-B14F-4D97-AF65-F5344CB8AC3E}">
+        <p14:creationId xmlns:p14="http://schemas.microsoft.com/office/powerpoint/2010/main" val="1466830417"/>
+      </p:ext>
+    </p:extLst>
+  </p:cSld>
+  <p:clrMapOvr>
+    <a:masterClrMapping/>
+  </p:clrMapOvr>
+</p:sld>
+</file>
+
+<file path=ppt/slides/slide27.xml><?xml version="1.0" encoding="utf-8"?>
+<p:sld xmlns:a="http://schemas.openxmlformats.org/drawingml/2006/main" xmlns:r="http://schemas.openxmlformats.org/officeDocument/2006/relationships" xmlns:p="http://schemas.openxmlformats.org/presentationml/2006/main">
+  <p:cSld>
+    <p:spTree>
+      <p:nvGrpSpPr>
+        <p:cNvPr id="1" name=""/>
+        <p:cNvGrpSpPr/>
+        <p:nvPr/>
+      </p:nvGrpSpPr>
+      <p:grpSpPr>
+        <a:xfrm>
+          <a:off x="0" y="0"/>
+          <a:ext cx="0" cy="0"/>
+          <a:chOff x="0" y="0"/>
+          <a:chExt cx="0" cy="0"/>
+        </a:xfrm>
+      </p:grpSpPr>
+      <p:sp>
+        <p:nvSpPr>
+          <p:cNvPr id="2" name="Title 1">
+            <a:extLst>
+              <a:ext uri="{FF2B5EF4-FFF2-40B4-BE49-F238E27FC236}">
+                <a16:creationId xmlns:a16="http://schemas.microsoft.com/office/drawing/2014/main" id="{98EB4F1B-51B3-4B64-8210-21AE8BE64582}"/>
+              </a:ext>
+            </a:extLst>
+          </p:cNvPr>
+          <p:cNvSpPr>
+            <a:spLocks noGrp="1"/>
+          </p:cNvSpPr>
+          <p:nvPr>
+            <p:ph type="title"/>
+          </p:nvPr>
+        </p:nvSpPr>
+        <p:spPr/>
+        <p:txBody>
+          <a:bodyPr/>
+          <a:lstStyle/>
+          <a:p>
+            <a:r>
+              <a:rPr lang="en-US" dirty="0"/>
+              <a:t>AUTOMATING TASKS</a:t>
+            </a:r>
+          </a:p>
+        </p:txBody>
+      </p:sp>
+      <p:sp>
+        <p:nvSpPr>
+          <p:cNvPr id="3" name="Content Placeholder 2">
+            <a:extLst>
+              <a:ext uri="{FF2B5EF4-FFF2-40B4-BE49-F238E27FC236}">
+                <a16:creationId xmlns:a16="http://schemas.microsoft.com/office/drawing/2014/main" id="{593AD591-5DD9-410C-B27F-EACDDF765FF4}"/>
+              </a:ext>
+            </a:extLst>
+          </p:cNvPr>
+          <p:cNvSpPr>
+            <a:spLocks noGrp="1"/>
+          </p:cNvSpPr>
+          <p:nvPr>
+            <p:ph type="body" idx="1"/>
+          </p:nvPr>
+        </p:nvSpPr>
+        <p:spPr/>
+        <p:txBody>
+          <a:bodyPr>
+            <a:normAutofit/>
+          </a:bodyPr>
+          <a:lstStyle/>
+          <a:p>
+            <a:r>
+              <a:rPr lang="en-US" dirty="0"/>
+              <a:t>A sampling of common use cases</a:t>
+            </a:r>
+          </a:p>
+        </p:txBody>
+      </p:sp>
+      <p:sp>
+        <p:nvSpPr>
+          <p:cNvPr id="4" name="Date Placeholder 3">
+            <a:extLst>
+              <a:ext uri="{FF2B5EF4-FFF2-40B4-BE49-F238E27FC236}">
+                <a16:creationId xmlns:a16="http://schemas.microsoft.com/office/drawing/2014/main" id="{17E05AC0-8A63-4FDD-A727-54A8C6040A83}"/>
+              </a:ext>
+            </a:extLst>
+          </p:cNvPr>
+          <p:cNvSpPr>
+            <a:spLocks noGrp="1"/>
+          </p:cNvSpPr>
+          <p:nvPr>
+            <p:ph type="dt" sz="half" idx="10"/>
+          </p:nvPr>
+        </p:nvSpPr>
+        <p:spPr/>
+        <p:txBody>
+          <a:bodyPr/>
+          <a:lstStyle/>
+          <a:p>
+            <a:fld id="{8AAE40A0-A7D8-4DC3-BC9E-BADA32DA2004}" type="datetime4">
+              <a:rPr lang="en-US" smtClean="0"/>
+              <a:t>August 13, 2019</a:t>
+            </a:fld>
+            <a:endParaRPr lang="en-US" dirty="0"/>
+          </a:p>
+        </p:txBody>
+      </p:sp>
+      <p:sp>
+        <p:nvSpPr>
+          <p:cNvPr id="5" name="Footer Placeholder 4">
+            <a:extLst>
+              <a:ext uri="{FF2B5EF4-FFF2-40B4-BE49-F238E27FC236}">
+                <a16:creationId xmlns:a16="http://schemas.microsoft.com/office/drawing/2014/main" id="{9C0CA735-E60F-4094-86F7-D33BB272FA25}"/>
+              </a:ext>
+            </a:extLst>
+          </p:cNvPr>
+          <p:cNvSpPr>
+            <a:spLocks noGrp="1"/>
+          </p:cNvSpPr>
+          <p:nvPr>
+            <p:ph type="ftr" sz="quarter" idx="11"/>
+          </p:nvPr>
+        </p:nvSpPr>
+        <p:spPr/>
+        <p:txBody>
+          <a:bodyPr/>
+          <a:lstStyle/>
+          <a:p>
+            <a:r>
+              <a:rPr lang="en-US"/>
+              <a:t>Digital Scholarship Services </a:t>
+            </a:r>
+            <a:r>
+              <a:rPr lang="en-US">
+                <a:solidFill>
+                  <a:schemeClr val="accent1">
+                    <a:lumMod val="50000"/>
+                  </a:schemeClr>
+                </a:solidFill>
+              </a:rPr>
+              <a:t>| Email</a:t>
+            </a:r>
+            <a:r>
+              <a:rPr lang="en-US"/>
+              <a:t> cf24@rice.edu </a:t>
+            </a:r>
+            <a:r>
+              <a:rPr lang="en-US">
+                <a:solidFill>
+                  <a:schemeClr val="accent1">
+                    <a:lumMod val="50000"/>
+                  </a:schemeClr>
+                </a:solidFill>
+              </a:rPr>
+              <a:t>|</a:t>
+            </a:r>
+            <a:r>
+              <a:rPr lang="en-US"/>
+              <a:t> library.rice.edu/dss</a:t>
+            </a:r>
+            <a:endParaRPr lang="en-US" dirty="0"/>
+          </a:p>
+        </p:txBody>
+      </p:sp>
+      <p:sp>
+        <p:nvSpPr>
+          <p:cNvPr id="6" name="Slide Number Placeholder 5">
+            <a:extLst>
+              <a:ext uri="{FF2B5EF4-FFF2-40B4-BE49-F238E27FC236}">
+                <a16:creationId xmlns:a16="http://schemas.microsoft.com/office/drawing/2014/main" id="{33AAFB92-45C0-421A-AC0A-7A439518D3F4}"/>
+              </a:ext>
+            </a:extLst>
+          </p:cNvPr>
+          <p:cNvSpPr>
+            <a:spLocks noGrp="1"/>
+          </p:cNvSpPr>
+          <p:nvPr>
+            <p:ph type="sldNum" sz="quarter" idx="12"/>
+          </p:nvPr>
+        </p:nvSpPr>
+        <p:spPr/>
+        <p:txBody>
+          <a:bodyPr/>
+          <a:lstStyle/>
+          <a:p>
+            <a:fld id="{D57F1E4F-1CFF-5643-939E-02111984F565}" type="slidenum">
+              <a:rPr lang="en-US" smtClean="0"/>
+              <a:t>27</a:t>
+            </a:fld>
+            <a:endParaRPr lang="en-US" dirty="0"/>
+          </a:p>
+        </p:txBody>
+      </p:sp>
+    </p:spTree>
+    <p:extLst>
+      <p:ext uri="{BB962C8B-B14F-4D97-AF65-F5344CB8AC3E}">
+        <p14:creationId xmlns:p14="http://schemas.microsoft.com/office/powerpoint/2010/main" val="1646608798"/>
+      </p:ext>
+    </p:extLst>
+  </p:cSld>
+  <p:clrMapOvr>
+    <a:masterClrMapping/>
+  </p:clrMapOvr>
+</p:sld>
+</file>
+
+<file path=ppt/slides/slide28.xml><?xml version="1.0" encoding="utf-8"?>
+<p:sld xmlns:a="http://schemas.openxmlformats.org/drawingml/2006/main" xmlns:r="http://schemas.openxmlformats.org/officeDocument/2006/relationships" xmlns:p="http://schemas.openxmlformats.org/presentationml/2006/main">
+  <p:cSld>
+    <p:spTree>
+      <p:nvGrpSpPr>
+        <p:cNvPr id="1" name=""/>
+        <p:cNvGrpSpPr/>
+        <p:nvPr/>
+      </p:nvGrpSpPr>
+      <p:grpSpPr>
+        <a:xfrm>
+          <a:off x="0" y="0"/>
+          <a:ext cx="0" cy="0"/>
+          <a:chOff x="0" y="0"/>
+          <a:chExt cx="0" cy="0"/>
+        </a:xfrm>
+      </p:grpSpPr>
+      <p:sp>
+        <p:nvSpPr>
+          <p:cNvPr id="2" name="Title 1">
+            <a:extLst>
+              <a:ext uri="{FF2B5EF4-FFF2-40B4-BE49-F238E27FC236}">
+                <a16:creationId xmlns:a16="http://schemas.microsoft.com/office/drawing/2014/main" id="{98EB4F1B-51B3-4B64-8210-21AE8BE64582}"/>
+              </a:ext>
+            </a:extLst>
+          </p:cNvPr>
+          <p:cNvSpPr>
+            <a:spLocks noGrp="1"/>
+          </p:cNvSpPr>
+          <p:nvPr>
+            <p:ph type="title"/>
+          </p:nvPr>
+        </p:nvSpPr>
+        <p:spPr/>
+        <p:txBody>
+          <a:bodyPr/>
+          <a:lstStyle/>
+          <a:p>
+            <a:r>
+              <a:rPr lang="en-US" dirty="0"/>
+              <a:t>AUTOMATION</a:t>
+            </a:r>
+          </a:p>
+        </p:txBody>
+      </p:sp>
+      <p:sp>
+        <p:nvSpPr>
+          <p:cNvPr id="3" name="Content Placeholder 2">
+            <a:extLst>
+              <a:ext uri="{FF2B5EF4-FFF2-40B4-BE49-F238E27FC236}">
+                <a16:creationId xmlns:a16="http://schemas.microsoft.com/office/drawing/2014/main" id="{593AD591-5DD9-410C-B27F-EACDDF765FF4}"/>
+              </a:ext>
+            </a:extLst>
+          </p:cNvPr>
+          <p:cNvSpPr>
+            <a:spLocks noGrp="1"/>
+          </p:cNvSpPr>
+          <p:nvPr>
+            <p:ph idx="1"/>
+          </p:nvPr>
+        </p:nvSpPr>
+        <p:spPr/>
+        <p:txBody>
+          <a:bodyPr/>
+          <a:lstStyle/>
+          <a:p>
+            <a:r>
+              <a:rPr lang="en-US" dirty="0"/>
+              <a:t>Perhaps the best feature of bash and shell environments – easy automation!</a:t>
+            </a:r>
+          </a:p>
+          <a:p>
+            <a:r>
+              <a:rPr lang="en-US" dirty="0"/>
+              <a:t>Want to run a command once a day to clean up cached files? Easy!</a:t>
+            </a:r>
+          </a:p>
+          <a:p>
+            <a:r>
+              <a:rPr lang="en-US" dirty="0"/>
+              <a:t>Want to simplify a complex process so you can do it all by typing one word? Easy!</a:t>
+            </a:r>
+          </a:p>
+          <a:p>
+            <a:endParaRPr lang="en-US" dirty="0"/>
+          </a:p>
+        </p:txBody>
+      </p:sp>
+      <p:sp>
+        <p:nvSpPr>
+          <p:cNvPr id="4" name="Date Placeholder 3">
+            <a:extLst>
+              <a:ext uri="{FF2B5EF4-FFF2-40B4-BE49-F238E27FC236}">
+                <a16:creationId xmlns:a16="http://schemas.microsoft.com/office/drawing/2014/main" id="{17E05AC0-8A63-4FDD-A727-54A8C6040A83}"/>
+              </a:ext>
+            </a:extLst>
+          </p:cNvPr>
+          <p:cNvSpPr>
+            <a:spLocks noGrp="1"/>
+          </p:cNvSpPr>
+          <p:nvPr>
+            <p:ph type="dt" sz="half" idx="10"/>
+          </p:nvPr>
+        </p:nvSpPr>
+        <p:spPr/>
+        <p:txBody>
+          <a:bodyPr/>
+          <a:lstStyle/>
+          <a:p>
+            <a:fld id="{8AAE40A0-A7D8-4DC3-BC9E-BADA32DA2004}" type="datetime4">
+              <a:rPr lang="en-US" smtClean="0"/>
+              <a:t>August 13, 2019</a:t>
+            </a:fld>
+            <a:endParaRPr lang="en-US" dirty="0"/>
+          </a:p>
+        </p:txBody>
+      </p:sp>
+      <p:sp>
+        <p:nvSpPr>
+          <p:cNvPr id="5" name="Footer Placeholder 4">
+            <a:extLst>
+              <a:ext uri="{FF2B5EF4-FFF2-40B4-BE49-F238E27FC236}">
+                <a16:creationId xmlns:a16="http://schemas.microsoft.com/office/drawing/2014/main" id="{9C0CA735-E60F-4094-86F7-D33BB272FA25}"/>
+              </a:ext>
+            </a:extLst>
+          </p:cNvPr>
+          <p:cNvSpPr>
+            <a:spLocks noGrp="1"/>
+          </p:cNvSpPr>
+          <p:nvPr>
+            <p:ph type="ftr" sz="quarter" idx="11"/>
+          </p:nvPr>
+        </p:nvSpPr>
+        <p:spPr/>
+        <p:txBody>
+          <a:bodyPr/>
+          <a:lstStyle/>
+          <a:p>
+            <a:r>
+              <a:rPr lang="en-US"/>
+              <a:t>Digital Scholarship Services </a:t>
+            </a:r>
+            <a:r>
+              <a:rPr lang="en-US">
+                <a:solidFill>
+                  <a:schemeClr val="accent1">
+                    <a:lumMod val="50000"/>
+                  </a:schemeClr>
+                </a:solidFill>
+              </a:rPr>
+              <a:t>| Email</a:t>
+            </a:r>
+            <a:r>
+              <a:rPr lang="en-US"/>
+              <a:t> cf24@rice.edu </a:t>
+            </a:r>
+            <a:r>
+              <a:rPr lang="en-US">
+                <a:solidFill>
+                  <a:schemeClr val="accent1">
+                    <a:lumMod val="50000"/>
+                  </a:schemeClr>
+                </a:solidFill>
+              </a:rPr>
+              <a:t>|</a:t>
+            </a:r>
+            <a:r>
+              <a:rPr lang="en-US"/>
+              <a:t> library.rice.edu/dss</a:t>
+            </a:r>
+            <a:endParaRPr lang="en-US" dirty="0"/>
+          </a:p>
+        </p:txBody>
+      </p:sp>
+      <p:sp>
+        <p:nvSpPr>
+          <p:cNvPr id="6" name="Slide Number Placeholder 5">
+            <a:extLst>
+              <a:ext uri="{FF2B5EF4-FFF2-40B4-BE49-F238E27FC236}">
+                <a16:creationId xmlns:a16="http://schemas.microsoft.com/office/drawing/2014/main" id="{33AAFB92-45C0-421A-AC0A-7A439518D3F4}"/>
+              </a:ext>
+            </a:extLst>
+          </p:cNvPr>
+          <p:cNvSpPr>
+            <a:spLocks noGrp="1"/>
+          </p:cNvSpPr>
+          <p:nvPr>
+            <p:ph type="sldNum" sz="quarter" idx="12"/>
+          </p:nvPr>
+        </p:nvSpPr>
+        <p:spPr/>
+        <p:txBody>
+          <a:bodyPr/>
+          <a:lstStyle/>
+          <a:p>
+            <a:fld id="{D57F1E4F-1CFF-5643-939E-02111984F565}" type="slidenum">
+              <a:rPr lang="en-US" smtClean="0"/>
+              <a:t>28</a:t>
+            </a:fld>
+            <a:endParaRPr lang="en-US" dirty="0"/>
+          </a:p>
+        </p:txBody>
+      </p:sp>
+    </p:spTree>
+    <p:extLst>
+      <p:ext uri="{BB962C8B-B14F-4D97-AF65-F5344CB8AC3E}">
+        <p14:creationId xmlns:p14="http://schemas.microsoft.com/office/powerpoint/2010/main" val="3313557375"/>
+      </p:ext>
+    </p:extLst>
+  </p:cSld>
+  <p:clrMapOvr>
+    <a:masterClrMapping/>
+  </p:clrMapOvr>
+</p:sld>
+</file>
+
+<file path=ppt/slides/slide29.xml><?xml version="1.0" encoding="utf-8"?>
+<p:sld xmlns:a="http://schemas.openxmlformats.org/drawingml/2006/main" xmlns:r="http://schemas.openxmlformats.org/officeDocument/2006/relationships" xmlns:p="http://schemas.openxmlformats.org/presentationml/2006/main">
+  <p:cSld>
+    <p:spTree>
+      <p:nvGrpSpPr>
+        <p:cNvPr id="1" name=""/>
+        <p:cNvGrpSpPr/>
+        <p:nvPr/>
+      </p:nvGrpSpPr>
+      <p:grpSpPr>
+        <a:xfrm>
+          <a:off x="0" y="0"/>
+          <a:ext cx="0" cy="0"/>
+          <a:chOff x="0" y="0"/>
+          <a:chExt cx="0" cy="0"/>
+        </a:xfrm>
+      </p:grpSpPr>
+      <p:sp>
+        <p:nvSpPr>
+          <p:cNvPr id="2" name="Title 1">
+            <a:extLst>
+              <a:ext uri="{FF2B5EF4-FFF2-40B4-BE49-F238E27FC236}">
+                <a16:creationId xmlns:a16="http://schemas.microsoft.com/office/drawing/2014/main" id="{98EB4F1B-51B3-4B64-8210-21AE8BE64582}"/>
+              </a:ext>
+            </a:extLst>
+          </p:cNvPr>
+          <p:cNvSpPr>
+            <a:spLocks noGrp="1"/>
+          </p:cNvSpPr>
+          <p:nvPr>
+            <p:ph type="title"/>
+          </p:nvPr>
+        </p:nvSpPr>
+        <p:spPr/>
+        <p:txBody>
+          <a:bodyPr/>
+          <a:lstStyle/>
+          <a:p>
+            <a:r>
+              <a:rPr lang="en-US" dirty="0"/>
+              <a:t>SCHEDULING WITH CRON</a:t>
+            </a:r>
+          </a:p>
+        </p:txBody>
+      </p:sp>
+      <p:sp>
+        <p:nvSpPr>
+          <p:cNvPr id="3" name="Content Placeholder 2">
+            <a:extLst>
+              <a:ext uri="{FF2B5EF4-FFF2-40B4-BE49-F238E27FC236}">
+                <a16:creationId xmlns:a16="http://schemas.microsoft.com/office/drawing/2014/main" id="{593AD591-5DD9-410C-B27F-EACDDF765FF4}"/>
+              </a:ext>
+            </a:extLst>
+          </p:cNvPr>
+          <p:cNvSpPr>
+            <a:spLocks noGrp="1"/>
+          </p:cNvSpPr>
+          <p:nvPr>
+            <p:ph idx="1"/>
+          </p:nvPr>
+        </p:nvSpPr>
+        <p:spPr/>
+        <p:txBody>
+          <a:bodyPr/>
+          <a:lstStyle/>
+          <a:p>
+            <a:r>
+              <a:rPr lang="en-US" dirty="0"/>
+              <a:t>.</a:t>
+            </a:r>
+            <a:r>
+              <a:rPr lang="en-US" dirty="0" err="1"/>
+              <a:t>bashrc</a:t>
+            </a:r>
+            <a:endParaRPr lang="en-US" dirty="0"/>
+          </a:p>
+          <a:p>
+            <a:pPr lvl="1"/>
+            <a:r>
+              <a:rPr lang="en-US" dirty="0"/>
+              <a:t>Run every time you start bash</a:t>
+            </a:r>
+          </a:p>
+          <a:p>
+            <a:pPr lvl="1"/>
+            <a:r>
+              <a:rPr lang="en-US" dirty="0"/>
+              <a:t>Great for configuring global settings</a:t>
+            </a:r>
+          </a:p>
+          <a:p>
+            <a:r>
+              <a:rPr lang="en-US" dirty="0"/>
+              <a:t>.</a:t>
+            </a:r>
+            <a:r>
+              <a:rPr lang="en-US" dirty="0" err="1"/>
+              <a:t>bash_history</a:t>
+            </a:r>
+            <a:endParaRPr lang="en-US" dirty="0"/>
+          </a:p>
+          <a:p>
+            <a:pPr lvl="1"/>
+            <a:r>
+              <a:rPr lang="en-US" dirty="0"/>
+              <a:t>Re-run previous commands with arrow keys up/down</a:t>
+            </a:r>
+          </a:p>
+        </p:txBody>
+      </p:sp>
+      <p:sp>
+        <p:nvSpPr>
+          <p:cNvPr id="4" name="Date Placeholder 3">
+            <a:extLst>
+              <a:ext uri="{FF2B5EF4-FFF2-40B4-BE49-F238E27FC236}">
+                <a16:creationId xmlns:a16="http://schemas.microsoft.com/office/drawing/2014/main" id="{17E05AC0-8A63-4FDD-A727-54A8C6040A83}"/>
+              </a:ext>
+            </a:extLst>
+          </p:cNvPr>
+          <p:cNvSpPr>
+            <a:spLocks noGrp="1"/>
+          </p:cNvSpPr>
+          <p:nvPr>
+            <p:ph type="dt" sz="half" idx="10"/>
+          </p:nvPr>
+        </p:nvSpPr>
+        <p:spPr/>
+        <p:txBody>
+          <a:bodyPr/>
+          <a:lstStyle/>
+          <a:p>
+            <a:fld id="{8AAE40A0-A7D8-4DC3-BC9E-BADA32DA2004}" type="datetime4">
+              <a:rPr lang="en-US" smtClean="0"/>
+              <a:t>August 13, 2019</a:t>
+            </a:fld>
+            <a:endParaRPr lang="en-US" dirty="0"/>
+          </a:p>
+        </p:txBody>
+      </p:sp>
+      <p:sp>
+        <p:nvSpPr>
+          <p:cNvPr id="5" name="Footer Placeholder 4">
+            <a:extLst>
+              <a:ext uri="{FF2B5EF4-FFF2-40B4-BE49-F238E27FC236}">
+                <a16:creationId xmlns:a16="http://schemas.microsoft.com/office/drawing/2014/main" id="{9C0CA735-E60F-4094-86F7-D33BB272FA25}"/>
+              </a:ext>
+            </a:extLst>
+          </p:cNvPr>
+          <p:cNvSpPr>
+            <a:spLocks noGrp="1"/>
+          </p:cNvSpPr>
+          <p:nvPr>
+            <p:ph type="ftr" sz="quarter" idx="11"/>
+          </p:nvPr>
+        </p:nvSpPr>
+        <p:spPr/>
+        <p:txBody>
+          <a:bodyPr/>
+          <a:lstStyle/>
+          <a:p>
+            <a:r>
+              <a:rPr lang="en-US"/>
+              <a:t>Digital Scholarship Services </a:t>
+            </a:r>
+            <a:r>
+              <a:rPr lang="en-US">
+                <a:solidFill>
+                  <a:schemeClr val="accent1">
+                    <a:lumMod val="50000"/>
+                  </a:schemeClr>
+                </a:solidFill>
+              </a:rPr>
+              <a:t>| Email</a:t>
+            </a:r>
+            <a:r>
+              <a:rPr lang="en-US"/>
+              <a:t> cf24@rice.edu </a:t>
+            </a:r>
+            <a:r>
+              <a:rPr lang="en-US">
+                <a:solidFill>
+                  <a:schemeClr val="accent1">
+                    <a:lumMod val="50000"/>
+                  </a:schemeClr>
+                </a:solidFill>
+              </a:rPr>
+              <a:t>|</a:t>
+            </a:r>
+            <a:r>
+              <a:rPr lang="en-US"/>
+              <a:t> library.rice.edu/dss</a:t>
+            </a:r>
+            <a:endParaRPr lang="en-US" dirty="0"/>
+          </a:p>
+        </p:txBody>
+      </p:sp>
+      <p:sp>
+        <p:nvSpPr>
+          <p:cNvPr id="6" name="Slide Number Placeholder 5">
+            <a:extLst>
+              <a:ext uri="{FF2B5EF4-FFF2-40B4-BE49-F238E27FC236}">
+                <a16:creationId xmlns:a16="http://schemas.microsoft.com/office/drawing/2014/main" id="{33AAFB92-45C0-421A-AC0A-7A439518D3F4}"/>
+              </a:ext>
+            </a:extLst>
+          </p:cNvPr>
+          <p:cNvSpPr>
+            <a:spLocks noGrp="1"/>
+          </p:cNvSpPr>
+          <p:nvPr>
+            <p:ph type="sldNum" sz="quarter" idx="12"/>
+          </p:nvPr>
+        </p:nvSpPr>
+        <p:spPr/>
+        <p:txBody>
+          <a:bodyPr/>
+          <a:lstStyle/>
+          <a:p>
+            <a:fld id="{D57F1E4F-1CFF-5643-939E-02111984F565}" type="slidenum">
+              <a:rPr lang="en-US" smtClean="0"/>
+              <a:t>29</a:t>
+            </a:fld>
+            <a:endParaRPr lang="en-US" dirty="0"/>
+          </a:p>
+        </p:txBody>
+      </p:sp>
+    </p:spTree>
+    <p:extLst>
+      <p:ext uri="{BB962C8B-B14F-4D97-AF65-F5344CB8AC3E}">
+        <p14:creationId xmlns:p14="http://schemas.microsoft.com/office/powerpoint/2010/main" val="4218999613"/>
       </p:ext>
     </p:extLst>
   </p:cSld>
@@ -6172,7 +9186,7 @@
           <a:p>
             <a:fld id="{8AAE40A0-A7D8-4DC3-BC9E-BADA32DA2004}" type="datetime4">
               <a:rPr lang="en-US" smtClean="0"/>
-              <a:t>August 12, 2019</a:t>
+              <a:t>August 13, 2019</a:t>
             </a:fld>
             <a:endParaRPr lang="en-US" dirty="0"/>
           </a:p>
@@ -6268,6 +9282,240 @@
     <p:extLst>
       <p:ext uri="{BB962C8B-B14F-4D97-AF65-F5344CB8AC3E}">
         <p14:creationId xmlns:p14="http://schemas.microsoft.com/office/powerpoint/2010/main" val="3507869141"/>
+      </p:ext>
+    </p:extLst>
+  </p:cSld>
+  <p:clrMapOvr>
+    <a:masterClrMapping/>
+  </p:clrMapOvr>
+</p:sld>
+</file>
+
+<file path=ppt/slides/slide30.xml><?xml version="1.0" encoding="utf-8"?>
+<p:sld xmlns:a="http://schemas.openxmlformats.org/drawingml/2006/main" xmlns:r="http://schemas.openxmlformats.org/officeDocument/2006/relationships" xmlns:p="http://schemas.openxmlformats.org/presentationml/2006/main">
+  <p:cSld>
+    <p:spTree>
+      <p:nvGrpSpPr>
+        <p:cNvPr id="1" name=""/>
+        <p:cNvGrpSpPr/>
+        <p:nvPr/>
+      </p:nvGrpSpPr>
+      <p:grpSpPr>
+        <a:xfrm>
+          <a:off x="0" y="0"/>
+          <a:ext cx="0" cy="0"/>
+          <a:chOff x="0" y="0"/>
+          <a:chExt cx="0" cy="0"/>
+        </a:xfrm>
+      </p:grpSpPr>
+      <p:sp>
+        <p:nvSpPr>
+          <p:cNvPr id="7" name="Title 6">
+            <a:extLst>
+              <a:ext uri="{FF2B5EF4-FFF2-40B4-BE49-F238E27FC236}">
+                <a16:creationId xmlns:a16="http://schemas.microsoft.com/office/drawing/2014/main" id="{495B4BC0-844B-4414-A623-BEF78AAC1BA1}"/>
+              </a:ext>
+            </a:extLst>
+          </p:cNvPr>
+          <p:cNvSpPr>
+            <a:spLocks noGrp="1"/>
+          </p:cNvSpPr>
+          <p:nvPr>
+            <p:ph type="title"/>
+          </p:nvPr>
+        </p:nvSpPr>
+        <p:spPr/>
+        <p:txBody>
+          <a:bodyPr/>
+          <a:lstStyle/>
+          <a:p>
+            <a:r>
+              <a:rPr lang="en-US" dirty="0"/>
+              <a:t>ACKNOWLEDGMENTS</a:t>
+            </a:r>
+          </a:p>
+        </p:txBody>
+      </p:sp>
+      <p:sp>
+        <p:nvSpPr>
+          <p:cNvPr id="8" name="Content Placeholder 7">
+            <a:extLst>
+              <a:ext uri="{FF2B5EF4-FFF2-40B4-BE49-F238E27FC236}">
+                <a16:creationId xmlns:a16="http://schemas.microsoft.com/office/drawing/2014/main" id="{2BED3EB3-7E98-4A82-8335-7321D9E37B16}"/>
+              </a:ext>
+            </a:extLst>
+          </p:cNvPr>
+          <p:cNvSpPr>
+            <a:spLocks noGrp="1"/>
+          </p:cNvSpPr>
+          <p:nvPr>
+            <p:ph idx="1"/>
+          </p:nvPr>
+        </p:nvSpPr>
+        <p:spPr/>
+        <p:txBody>
+          <a:bodyPr/>
+          <a:lstStyle/>
+          <a:p>
+            <a:r>
+              <a:rPr lang="en-US" dirty="0"/>
+              <a:t>The Bash Logo is licensed for free use under the Copyleft license.</a:t>
+            </a:r>
+          </a:p>
+          <a:p>
+            <a:r>
+              <a:rPr lang="en-US" dirty="0"/>
+              <a:t>The bash screenshot on Slide 2 is R and Bash running under a </a:t>
+            </a:r>
+            <a:r>
+              <a:rPr lang="en-US" dirty="0" err="1"/>
+              <a:t>Remmina</a:t>
+            </a:r>
+            <a:r>
+              <a:rPr lang="en-US" dirty="0"/>
+              <a:t> connection.</a:t>
+            </a:r>
+          </a:p>
+          <a:p>
+            <a:r>
+              <a:rPr lang="en-US" dirty="0"/>
+              <a:t>The picture on Slide 6 is licensed under Creative Commons Attribution-</a:t>
+            </a:r>
+            <a:r>
+              <a:rPr lang="en-US" dirty="0" err="1"/>
+              <a:t>ShareAlike</a:t>
+            </a:r>
+            <a:r>
+              <a:rPr lang="en-US" dirty="0"/>
+              <a:t> 4.0 International, created by </a:t>
+            </a:r>
+            <a:r>
+              <a:rPr lang="en-US" dirty="0" err="1"/>
+              <a:t>Gorthmog</a:t>
+            </a:r>
+            <a:endParaRPr lang="en-US" dirty="0"/>
+          </a:p>
+        </p:txBody>
+      </p:sp>
+      <p:sp>
+        <p:nvSpPr>
+          <p:cNvPr id="4" name="Date Placeholder 3">
+            <a:extLst>
+              <a:ext uri="{FF2B5EF4-FFF2-40B4-BE49-F238E27FC236}">
+                <a16:creationId xmlns:a16="http://schemas.microsoft.com/office/drawing/2014/main" id="{540F37F1-4F33-429F-A568-1A3ADC499E54}"/>
+              </a:ext>
+            </a:extLst>
+          </p:cNvPr>
+          <p:cNvSpPr>
+            <a:spLocks noGrp="1"/>
+          </p:cNvSpPr>
+          <p:nvPr>
+            <p:ph type="dt" sz="half" idx="10"/>
+          </p:nvPr>
+        </p:nvSpPr>
+        <p:spPr/>
+        <p:txBody>
+          <a:bodyPr/>
+          <a:lstStyle/>
+          <a:p>
+            <a:fld id="{B08FEED8-D7D4-44E9-BFBC-ED06B5996D94}" type="datetime4">
+              <a:rPr lang="en-US" smtClean="0"/>
+              <a:t>August 13, 2019</a:t>
+            </a:fld>
+            <a:endParaRPr lang="en-US" dirty="0"/>
+          </a:p>
+        </p:txBody>
+      </p:sp>
+      <p:sp>
+        <p:nvSpPr>
+          <p:cNvPr id="5" name="Footer Placeholder 4">
+            <a:extLst>
+              <a:ext uri="{FF2B5EF4-FFF2-40B4-BE49-F238E27FC236}">
+                <a16:creationId xmlns:a16="http://schemas.microsoft.com/office/drawing/2014/main" id="{673FFA57-C126-4795-A5F6-DD33AAC5ACBD}"/>
+              </a:ext>
+            </a:extLst>
+          </p:cNvPr>
+          <p:cNvSpPr>
+            <a:spLocks noGrp="1"/>
+          </p:cNvSpPr>
+          <p:nvPr>
+            <p:ph type="ftr" sz="quarter" idx="11"/>
+          </p:nvPr>
+        </p:nvSpPr>
+        <p:spPr/>
+        <p:txBody>
+          <a:bodyPr/>
+          <a:lstStyle/>
+          <a:p>
+            <a:r>
+              <a:rPr lang="en-US"/>
+              <a:t>Digital Scholarship Services </a:t>
+            </a:r>
+            <a:r>
+              <a:rPr lang="en-US">
+                <a:solidFill>
+                  <a:schemeClr val="accent1">
+                    <a:lumMod val="50000"/>
+                  </a:schemeClr>
+                </a:solidFill>
+              </a:rPr>
+              <a:t>| Email</a:t>
+            </a:r>
+            <a:r>
+              <a:rPr lang="en-US"/>
+              <a:t> cf24@rice.edu </a:t>
+            </a:r>
+            <a:r>
+              <a:rPr lang="en-US">
+                <a:solidFill>
+                  <a:schemeClr val="accent1">
+                    <a:lumMod val="50000"/>
+                  </a:schemeClr>
+                </a:solidFill>
+              </a:rPr>
+              <a:t>|</a:t>
+            </a:r>
+            <a:r>
+              <a:rPr lang="en-US"/>
+              <a:t> library.rice.edu/dss</a:t>
+            </a:r>
+            <a:endParaRPr lang="en-US" dirty="0"/>
+          </a:p>
+        </p:txBody>
+      </p:sp>
+      <p:sp>
+        <p:nvSpPr>
+          <p:cNvPr id="6" name="Slide Number Placeholder 5">
+            <a:extLst>
+              <a:ext uri="{FF2B5EF4-FFF2-40B4-BE49-F238E27FC236}">
+                <a16:creationId xmlns:a16="http://schemas.microsoft.com/office/drawing/2014/main" id="{2FA49567-BB70-4798-8746-D0B522CCEE20}"/>
+              </a:ext>
+            </a:extLst>
+          </p:cNvPr>
+          <p:cNvSpPr>
+            <a:spLocks noGrp="1"/>
+          </p:cNvSpPr>
+          <p:nvPr>
+            <p:ph type="sldNum" sz="quarter" idx="12"/>
+          </p:nvPr>
+        </p:nvSpPr>
+        <p:spPr/>
+        <p:txBody>
+          <a:bodyPr/>
+          <a:lstStyle/>
+          <a:p>
+            <a:fld id="{D57F1E4F-1CFF-5643-939E-02111984F565}" type="slidenum">
+              <a:rPr lang="en-US" smtClean="0"/>
+              <a:t>30</a:t>
+            </a:fld>
+            <a:endParaRPr lang="en-US" dirty="0"/>
+          </a:p>
+        </p:txBody>
+      </p:sp>
+    </p:spTree>
+    <p:extLst>
+      <p:ext uri="{BB962C8B-B14F-4D97-AF65-F5344CB8AC3E}">
+        <p14:creationId xmlns:p14="http://schemas.microsoft.com/office/powerpoint/2010/main" val="1585568494"/>
       </p:ext>
     </p:extLst>
   </p:cSld>
@@ -6366,6 +9614,23 @@
             <a:pPr lvl="1"/>
             <a:r>
               <a:rPr lang="en-US" dirty="0"/>
+              <a:t>Install Ubuntu for Windows</a:t>
+            </a:r>
+          </a:p>
+          <a:p>
+            <a:pPr marL="457200" lvl="1" indent="0">
+              <a:buNone/>
+            </a:pPr>
+            <a:r>
+              <a:rPr lang="en-US"/>
+              <a:t>	or</a:t>
+            </a:r>
+            <a:endParaRPr lang="en-US" dirty="0"/>
+          </a:p>
+          <a:p>
+            <a:pPr lvl="1"/>
+            <a:r>
+              <a:rPr lang="en-US" dirty="0"/>
               <a:t>Install </a:t>
             </a:r>
             <a:r>
@@ -6417,7 +9682,7 @@
           <a:p>
             <a:fld id="{8AAE40A0-A7D8-4DC3-BC9E-BADA32DA2004}" type="datetime4">
               <a:rPr lang="en-US" smtClean="0"/>
-              <a:t>August 12, 2019</a:t>
+              <a:t>August 13, 2019</a:t>
             </a:fld>
             <a:endParaRPr lang="en-US" dirty="0"/>
           </a:p>
@@ -6597,7 +9862,7 @@
             <a:pPr lvl="1"/>
             <a:r>
               <a:rPr lang="en-US" dirty="0"/>
-              <a:t>Bash allows simpler access to commands with extensive shell-specific features, often unsupported by scripting languages</a:t>
+              <a:t>Bash allows simpler access to commands with extensive shell-specific or installation-specific features, often unsupported by scripting languages</a:t>
             </a:r>
           </a:p>
           <a:p>
@@ -6667,7 +9932,7 @@
           <a:p>
             <a:fld id="{8AAE40A0-A7D8-4DC3-BC9E-BADA32DA2004}" type="datetime4">
               <a:rPr lang="en-US" smtClean="0"/>
-              <a:t>August 12, 2019</a:t>
+              <a:t>August 13, 2019</a:t>
             </a:fld>
             <a:endParaRPr lang="en-US" dirty="0"/>
           </a:p>
@@ -6869,7 +10134,7 @@
           <a:p>
             <a:fld id="{8AAE40A0-A7D8-4DC3-BC9E-BADA32DA2004}" type="datetime4">
               <a:rPr lang="en-US" smtClean="0"/>
-              <a:t>August 12, 2019</a:t>
+              <a:t>August 13, 2019</a:t>
             </a:fld>
             <a:endParaRPr lang="en-US" dirty="0"/>
           </a:p>
@@ -7281,7 +10546,7 @@
           <a:p>
             <a:fld id="{8AAE40A0-A7D8-4DC3-BC9E-BADA32DA2004}" type="datetime4">
               <a:rPr lang="en-US" smtClean="0"/>
-              <a:t>August 12, 2019</a:t>
+              <a:t>August 13, 2019</a:t>
             </a:fld>
             <a:endParaRPr lang="en-US" dirty="0"/>
           </a:p>
@@ -7454,7 +10719,7 @@
           <a:p>
             <a:fld id="{B08FEED8-D7D4-44E9-BFBC-ED06B5996D94}" type="datetime4">
               <a:rPr lang="en-US" smtClean="0"/>
-              <a:t>August 12, 2019</a:t>
+              <a:t>August 13, 2019</a:t>
             </a:fld>
             <a:endParaRPr lang="en-US" dirty="0"/>
           </a:p>
@@ -7897,7 +11162,7 @@
           <a:p>
             <a:fld id="{B08FEED8-D7D4-44E9-BFBC-ED06B5996D94}" type="datetime4">
               <a:rPr lang="en-US" smtClean="0"/>
-              <a:t>August 12, 2019</a:t>
+              <a:t>August 13, 2019</a:t>
             </a:fld>
             <a:endParaRPr lang="en-US" dirty="0"/>
           </a:p>
@@ -8183,7 +11448,15 @@
           <a:p>
             <a:r>
               <a:rPr lang="en-US" dirty="0"/>
-              <a:t>First: an executable program</a:t>
+              <a:t>First: an executable program (or shell </a:t>
+            </a:r>
+            <a:r>
+              <a:rPr lang="en-US" dirty="0" err="1"/>
+              <a:t>builtin</a:t>
+            </a:r>
+            <a:r>
+              <a:rPr lang="en-US" dirty="0"/>
+              <a:t>)</a:t>
             </a:r>
           </a:p>
           <a:p>
@@ -8265,6 +11538,27 @@
                 <a:cs typeface="Courier New" panose="02070309020205020404" pitchFamily="49" charset="0"/>
               </a:rPr>
               <a:t> is a folder in the current directory we want the get the contents of</a:t>
+            </a:r>
+          </a:p>
+          <a:p>
+            <a:r>
+              <a:rPr lang="en-US" dirty="0">
+                <a:cs typeface="Courier New" panose="02070309020205020404" pitchFamily="49" charset="0"/>
+              </a:rPr>
+              <a:t>Use </a:t>
+            </a:r>
+            <a:r>
+              <a:rPr lang="en-US" dirty="0">
+                <a:latin typeface="Courier New" panose="02070309020205020404" pitchFamily="49" charset="0"/>
+                <a:cs typeface="Courier New" panose="02070309020205020404" pitchFamily="49" charset="0"/>
+              </a:rPr>
+              <a:t>--help</a:t>
+            </a:r>
+            <a:r>
+              <a:rPr lang="en-US" dirty="0">
+                <a:cs typeface="Courier New" panose="02070309020205020404" pitchFamily="49" charset="0"/>
+              </a:rPr>
+              <a:t>!</a:t>
             </a:r>
           </a:p>
         </p:txBody>

</xml_diff>

<commit_message>
add more useful programs
</commit_message>
<xml_diff>
--- a/bash/Introduction to Bash.pptx
+++ b/bash/Introduction to Bash.pptx
@@ -5,7 +5,7 @@
     <p:sldMasterId id="2147483707" r:id="rId1"/>
   </p:sldMasterIdLst>
   <p:notesMasterIdLst>
-    <p:notesMasterId r:id="rId32"/>
+    <p:notesMasterId r:id="rId36"/>
   </p:notesMasterIdLst>
   <p:sldIdLst>
     <p:sldId id="266" r:id="rId2"/>
@@ -34,10 +34,14 @@
     <p:sldId id="290" r:id="rId25"/>
     <p:sldId id="293" r:id="rId26"/>
     <p:sldId id="292" r:id="rId27"/>
-    <p:sldId id="294" r:id="rId28"/>
-    <p:sldId id="295" r:id="rId29"/>
-    <p:sldId id="296" r:id="rId30"/>
-    <p:sldId id="268" r:id="rId31"/>
+    <p:sldId id="298" r:id="rId28"/>
+    <p:sldId id="299" r:id="rId29"/>
+    <p:sldId id="300" r:id="rId30"/>
+    <p:sldId id="294" r:id="rId31"/>
+    <p:sldId id="295" r:id="rId32"/>
+    <p:sldId id="296" r:id="rId33"/>
+    <p:sldId id="297" r:id="rId34"/>
+    <p:sldId id="268" r:id="rId35"/>
   </p:sldIdLst>
   <p:sldSz cx="12192000" cy="6858000"/>
   <p:notesSz cx="6858000" cy="9144000"/>
@@ -8431,7 +8435,7 @@
           <a:p>
             <a:r>
               <a:rPr lang="en-US" dirty="0"/>
-              <a:t>AUTOMATING TASKS</a:t>
+              <a:t>USEFUL PROGRAMS</a:t>
             </a:r>
           </a:p>
         </p:txBody>
@@ -8461,7 +8465,7 @@
           <a:p>
             <a:r>
               <a:rPr lang="en-US" dirty="0"/>
-              <a:t>A sampling of common use cases</a:t>
+              <a:t>A quick overview of our tools</a:t>
             </a:r>
           </a:p>
         </p:txBody>
@@ -8584,7 +8588,7 @@
     </p:spTree>
     <p:extLst>
       <p:ext uri="{BB962C8B-B14F-4D97-AF65-F5344CB8AC3E}">
-        <p14:creationId xmlns:p14="http://schemas.microsoft.com/office/powerpoint/2010/main" val="1646608798"/>
+        <p14:creationId xmlns:p14="http://schemas.microsoft.com/office/powerpoint/2010/main" val="2388566862"/>
       </p:ext>
     </p:extLst>
   </p:cSld>
@@ -8634,54 +8638,514 @@
           <a:p>
             <a:r>
               <a:rPr lang="en-US" dirty="0"/>
-              <a:t>AUTOMATION</a:t>
-            </a:r>
-          </a:p>
-        </p:txBody>
-      </p:sp>
-      <p:sp>
-        <p:nvSpPr>
-          <p:cNvPr id="3" name="Content Placeholder 2">
-            <a:extLst>
-              <a:ext uri="{FF2B5EF4-FFF2-40B4-BE49-F238E27FC236}">
-                <a16:creationId xmlns:a16="http://schemas.microsoft.com/office/drawing/2014/main" id="{593AD591-5DD9-410C-B27F-EACDDF765FF4}"/>
-              </a:ext>
-            </a:extLst>
-          </p:cNvPr>
-          <p:cNvSpPr>
-            <a:spLocks noGrp="1"/>
-          </p:cNvSpPr>
-          <p:nvPr>
-            <p:ph idx="1"/>
-          </p:nvPr>
-        </p:nvSpPr>
-        <p:spPr/>
-        <p:txBody>
-          <a:bodyPr/>
-          <a:lstStyle/>
-          <a:p>
-            <a:r>
-              <a:rPr lang="en-US" dirty="0"/>
-              <a:t>Perhaps the best feature of bash and shell environments – easy automation!</a:t>
-            </a:r>
-          </a:p>
-          <a:p>
-            <a:r>
-              <a:rPr lang="en-US" dirty="0"/>
-              <a:t>Want to run a command once a day to clean up cached files? Easy!</a:t>
-            </a:r>
-          </a:p>
-          <a:p>
-            <a:r>
-              <a:rPr lang="en-US" dirty="0"/>
-              <a:t>Want to simplify a complex process so you can do it all by typing one word? Easy!</a:t>
-            </a:r>
-          </a:p>
-          <a:p>
-            <a:endParaRPr lang="en-US" dirty="0"/>
-          </a:p>
-        </p:txBody>
-      </p:sp>
+              <a:t>FILES AND DIRECTORIES</a:t>
+            </a:r>
+          </a:p>
+        </p:txBody>
+      </p:sp>
+      <mc:AlternateContent xmlns:mc="http://schemas.openxmlformats.org/markup-compatibility/2006">
+        <mc:Choice xmlns:a14="http://schemas.microsoft.com/office/drawing/2010/main" Requires="a14">
+          <p:sp>
+            <p:nvSpPr>
+              <p:cNvPr id="3" name="Content Placeholder 2">
+                <a:extLst>
+                  <a:ext uri="{FF2B5EF4-FFF2-40B4-BE49-F238E27FC236}">
+                    <a16:creationId xmlns:a16="http://schemas.microsoft.com/office/drawing/2014/main" id="{593AD591-5DD9-410C-B27F-EACDDF765FF4}"/>
+                  </a:ext>
+                </a:extLst>
+              </p:cNvPr>
+              <p:cNvSpPr>
+                <a:spLocks noGrp="1"/>
+              </p:cNvSpPr>
+              <p:nvPr>
+                <p:ph idx="1"/>
+              </p:nvPr>
+            </p:nvSpPr>
+            <p:spPr/>
+            <p:txBody>
+              <a:bodyPr>
+                <a:normAutofit lnSpcReduction="10000"/>
+              </a:bodyPr>
+              <a:lstStyle/>
+              <a:p>
+                <a:r>
+                  <a:rPr lang="en-US" dirty="0">
+                    <a:latin typeface="Courier New" panose="02070309020205020404" pitchFamily="49" charset="0"/>
+                    <a:cs typeface="Courier New" panose="02070309020205020404" pitchFamily="49" charset="0"/>
+                  </a:rPr>
+                  <a:t>ls </a:t>
+                </a:r>
+                <a14:m>
+                  <m:oMath xmlns:m="http://schemas.openxmlformats.org/officeDocument/2006/math">
+                    <m:r>
+                      <a:rPr lang="en-US" i="1" dirty="0" smtClean="0">
+                        <a:latin typeface="Cambria Math" panose="02040503050406030204" pitchFamily="18" charset="0"/>
+                        <a:ea typeface="Cambria Math" panose="02040503050406030204" pitchFamily="18" charset="0"/>
+                        <a:cs typeface="Courier New" panose="02070309020205020404" pitchFamily="49" charset="0"/>
+                      </a:rPr>
+                      <m:t>→</m:t>
+                    </m:r>
+                    <m:r>
+                      <a:rPr lang="en-US" b="0" i="1" dirty="0" smtClean="0">
+                        <a:latin typeface="Cambria Math" panose="02040503050406030204" pitchFamily="18" charset="0"/>
+                        <a:ea typeface="Cambria Math" panose="02040503050406030204" pitchFamily="18" charset="0"/>
+                        <a:cs typeface="Courier New" panose="02070309020205020404" pitchFamily="49" charset="0"/>
+                      </a:rPr>
+                      <m:t> </m:t>
+                    </m:r>
+                  </m:oMath>
+                </a14:m>
+                <a:r>
+                  <a:rPr lang="en-US" dirty="0">
+                    <a:cs typeface="Courier New" panose="02070309020205020404" pitchFamily="49" charset="0"/>
+                  </a:rPr>
+                  <a:t>list current directory contents </a:t>
+                </a:r>
+                <a:r>
+                  <a:rPr lang="en-US" dirty="0">
+                    <a:latin typeface="Courier New" panose="02070309020205020404" pitchFamily="49" charset="0"/>
+                    <a:cs typeface="Courier New" panose="02070309020205020404" pitchFamily="49" charset="0"/>
+                  </a:rPr>
+                  <a:t>(ls)</a:t>
+                </a:r>
+              </a:p>
+              <a:p>
+                <a:r>
+                  <a:rPr lang="en-US" dirty="0">
+                    <a:latin typeface="Courier New" panose="02070309020205020404" pitchFamily="49" charset="0"/>
+                    <a:cs typeface="Courier New" panose="02070309020205020404" pitchFamily="49" charset="0"/>
+                  </a:rPr>
+                  <a:t>cd </a:t>
+                </a:r>
+                <a14:m>
+                  <m:oMath xmlns:m="http://schemas.openxmlformats.org/officeDocument/2006/math">
+                    <m:r>
+                      <a:rPr lang="en-US" i="1" dirty="0">
+                        <a:latin typeface="Cambria Math" panose="02040503050406030204" pitchFamily="18" charset="0"/>
+                        <a:ea typeface="Cambria Math" panose="02040503050406030204" pitchFamily="18" charset="0"/>
+                        <a:cs typeface="Courier New" panose="02070309020205020404" pitchFamily="49" charset="0"/>
+                      </a:rPr>
+                      <m:t>→</m:t>
+                    </m:r>
+                  </m:oMath>
+                </a14:m>
+                <a:r>
+                  <a:rPr lang="en-US" dirty="0">
+                    <a:latin typeface="Courier New" panose="02070309020205020404" pitchFamily="49" charset="0"/>
+                    <a:cs typeface="Courier New" panose="02070309020205020404" pitchFamily="49" charset="0"/>
+                  </a:rPr>
+                  <a:t> </a:t>
+                </a:r>
+                <a:r>
+                  <a:rPr lang="en-US" dirty="0">
+                    <a:cs typeface="Courier New" panose="02070309020205020404" pitchFamily="49" charset="0"/>
+                  </a:rPr>
+                  <a:t>change directory </a:t>
+                </a:r>
+                <a:r>
+                  <a:rPr lang="en-US" dirty="0">
+                    <a:latin typeface="Courier New" panose="02070309020205020404" pitchFamily="49" charset="0"/>
+                    <a:cs typeface="Courier New" panose="02070309020205020404" pitchFamily="49" charset="0"/>
+                  </a:rPr>
+                  <a:t>(cd </a:t>
+                </a:r>
+                <a:r>
+                  <a:rPr lang="en-US" i="1" dirty="0">
+                    <a:latin typeface="Courier New" panose="02070309020205020404" pitchFamily="49" charset="0"/>
+                    <a:cs typeface="Courier New" panose="02070309020205020404" pitchFamily="49" charset="0"/>
+                  </a:rPr>
+                  <a:t>directory</a:t>
+                </a:r>
+                <a:r>
+                  <a:rPr lang="en-US" dirty="0">
+                    <a:latin typeface="Courier New" panose="02070309020205020404" pitchFamily="49" charset="0"/>
+                    <a:cs typeface="Courier New" panose="02070309020205020404" pitchFamily="49" charset="0"/>
+                  </a:rPr>
+                  <a:t>)</a:t>
+                </a:r>
+              </a:p>
+              <a:p>
+                <a:r>
+                  <a:rPr lang="en-US" dirty="0" err="1">
+                    <a:latin typeface="Courier New" panose="02070309020205020404" pitchFamily="49" charset="0"/>
+                    <a:cs typeface="Courier New" panose="02070309020205020404" pitchFamily="49" charset="0"/>
+                  </a:rPr>
+                  <a:t>pwd</a:t>
+                </a:r>
+                <a:r>
+                  <a:rPr lang="en-US" dirty="0">
+                    <a:latin typeface="Courier New" panose="02070309020205020404" pitchFamily="49" charset="0"/>
+                    <a:cs typeface="Courier New" panose="02070309020205020404" pitchFamily="49" charset="0"/>
+                  </a:rPr>
+                  <a:t> </a:t>
+                </a:r>
+                <a14:m>
+                  <m:oMath xmlns:m="http://schemas.openxmlformats.org/officeDocument/2006/math">
+                    <m:r>
+                      <a:rPr lang="en-US" i="1" dirty="0">
+                        <a:latin typeface="Cambria Math" panose="02040503050406030204" pitchFamily="18" charset="0"/>
+                        <a:ea typeface="Cambria Math" panose="02040503050406030204" pitchFamily="18" charset="0"/>
+                        <a:cs typeface="Courier New" panose="02070309020205020404" pitchFamily="49" charset="0"/>
+                      </a:rPr>
+                      <m:t>→</m:t>
+                    </m:r>
+                  </m:oMath>
+                </a14:m>
+                <a:r>
+                  <a:rPr lang="en-US" dirty="0">
+                    <a:latin typeface="Courier New" panose="02070309020205020404" pitchFamily="49" charset="0"/>
+                    <a:cs typeface="Courier New" panose="02070309020205020404" pitchFamily="49" charset="0"/>
+                  </a:rPr>
+                  <a:t> </a:t>
+                </a:r>
+                <a:r>
+                  <a:rPr lang="en-US" dirty="0">
+                    <a:cs typeface="Courier New" panose="02070309020205020404" pitchFamily="49" charset="0"/>
+                  </a:rPr>
+                  <a:t>print working directory </a:t>
+                </a:r>
+                <a:r>
+                  <a:rPr lang="en-US" dirty="0">
+                    <a:latin typeface="Courier New" panose="02070309020205020404" pitchFamily="49" charset="0"/>
+                    <a:cs typeface="Courier New" panose="02070309020205020404" pitchFamily="49" charset="0"/>
+                  </a:rPr>
+                  <a:t>(</a:t>
+                </a:r>
+                <a:r>
+                  <a:rPr lang="en-US" dirty="0" err="1">
+                    <a:latin typeface="Courier New" panose="02070309020205020404" pitchFamily="49" charset="0"/>
+                    <a:cs typeface="Courier New" panose="02070309020205020404" pitchFamily="49" charset="0"/>
+                  </a:rPr>
+                  <a:t>pwd</a:t>
+                </a:r>
+                <a:r>
+                  <a:rPr lang="en-US" dirty="0">
+                    <a:latin typeface="Courier New" panose="02070309020205020404" pitchFamily="49" charset="0"/>
+                    <a:cs typeface="Courier New" panose="02070309020205020404" pitchFamily="49" charset="0"/>
+                  </a:rPr>
+                  <a:t>)</a:t>
+                </a:r>
+              </a:p>
+              <a:p>
+                <a:r>
+                  <a:rPr lang="en-US" dirty="0">
+                    <a:latin typeface="Courier New" panose="02070309020205020404" pitchFamily="49" charset="0"/>
+                    <a:cs typeface="Courier New" panose="02070309020205020404" pitchFamily="49" charset="0"/>
+                  </a:rPr>
+                  <a:t>rm </a:t>
+                </a:r>
+                <a14:m>
+                  <m:oMath xmlns:m="http://schemas.openxmlformats.org/officeDocument/2006/math">
+                    <m:r>
+                      <a:rPr lang="en-US" i="1" dirty="0">
+                        <a:latin typeface="Cambria Math" panose="02040503050406030204" pitchFamily="18" charset="0"/>
+                        <a:ea typeface="Cambria Math" panose="02040503050406030204" pitchFamily="18" charset="0"/>
+                        <a:cs typeface="Courier New" panose="02070309020205020404" pitchFamily="49" charset="0"/>
+                      </a:rPr>
+                      <m:t>→</m:t>
+                    </m:r>
+                  </m:oMath>
+                </a14:m>
+                <a:r>
+                  <a:rPr lang="en-US" dirty="0">
+                    <a:latin typeface="Courier New" panose="02070309020205020404" pitchFamily="49" charset="0"/>
+                    <a:cs typeface="Courier New" panose="02070309020205020404" pitchFamily="49" charset="0"/>
+                  </a:rPr>
+                  <a:t> </a:t>
+                </a:r>
+                <a:r>
+                  <a:rPr lang="en-US" dirty="0">
+                    <a:cs typeface="Courier New" panose="02070309020205020404" pitchFamily="49" charset="0"/>
+                  </a:rPr>
+                  <a:t>remove / delete file</a:t>
+                </a:r>
+                <a:r>
+                  <a:rPr lang="en-US" dirty="0">
+                    <a:latin typeface="Courier New" panose="02070309020205020404" pitchFamily="49" charset="0"/>
+                    <a:cs typeface="Courier New" panose="02070309020205020404" pitchFamily="49" charset="0"/>
+                  </a:rPr>
+                  <a:t> (rm </a:t>
+                </a:r>
+                <a:r>
+                  <a:rPr lang="en-US" i="1" dirty="0">
+                    <a:latin typeface="Courier New" panose="02070309020205020404" pitchFamily="49" charset="0"/>
+                    <a:cs typeface="Courier New" panose="02070309020205020404" pitchFamily="49" charset="0"/>
+                  </a:rPr>
+                  <a:t>target</a:t>
+                </a:r>
+                <a:r>
+                  <a:rPr lang="en-US" dirty="0">
+                    <a:latin typeface="Courier New" panose="02070309020205020404" pitchFamily="49" charset="0"/>
+                    <a:cs typeface="Courier New" panose="02070309020205020404" pitchFamily="49" charset="0"/>
+                  </a:rPr>
+                  <a:t>)</a:t>
+                </a:r>
+              </a:p>
+              <a:p>
+                <a:pPr lvl="1"/>
+                <a:r>
+                  <a:rPr lang="en-US" dirty="0" err="1">
+                    <a:latin typeface="Courier New" panose="02070309020205020404" pitchFamily="49" charset="0"/>
+                    <a:cs typeface="Courier New" panose="02070309020205020404" pitchFamily="49" charset="0"/>
+                  </a:rPr>
+                  <a:t>rmdir</a:t>
+                </a:r>
+                <a:r>
+                  <a:rPr lang="en-US" dirty="0">
+                    <a:latin typeface="Courier New" panose="02070309020205020404" pitchFamily="49" charset="0"/>
+                    <a:cs typeface="Courier New" panose="02070309020205020404" pitchFamily="49" charset="0"/>
+                  </a:rPr>
+                  <a:t>: </a:t>
+                </a:r>
+                <a:r>
+                  <a:rPr lang="en-US" sz="2800" dirty="0">
+                    <a:cs typeface="Courier New" panose="02070309020205020404" pitchFamily="49" charset="0"/>
+                  </a:rPr>
+                  <a:t>empty directory </a:t>
+                </a:r>
+              </a:p>
+              <a:p>
+                <a:pPr lvl="1"/>
+                <a:r>
+                  <a:rPr lang="en-US" dirty="0">
+                    <a:latin typeface="Courier New" panose="02070309020205020404" pitchFamily="49" charset="0"/>
+                    <a:cs typeface="Courier New" panose="02070309020205020404" pitchFamily="49" charset="0"/>
+                  </a:rPr>
+                  <a:t>rm –rf: </a:t>
+                </a:r>
+                <a:r>
+                  <a:rPr lang="en-US" sz="2800" dirty="0">
+                    <a:cs typeface="Courier New" panose="02070309020205020404" pitchFamily="49" charset="0"/>
+                  </a:rPr>
+                  <a:t>directory with files</a:t>
+                </a:r>
+              </a:p>
+              <a:p>
+                <a:r>
+                  <a:rPr lang="en-US" dirty="0" err="1">
+                    <a:latin typeface="Courier New" panose="02070309020205020404" pitchFamily="49" charset="0"/>
+                    <a:cs typeface="Courier New" panose="02070309020205020404" pitchFamily="49" charset="0"/>
+                  </a:rPr>
+                  <a:t>mv</a:t>
+                </a:r>
+                <a:r>
+                  <a:rPr lang="en-US" dirty="0">
+                    <a:latin typeface="Courier New" panose="02070309020205020404" pitchFamily="49" charset="0"/>
+                    <a:cs typeface="Courier New" panose="02070309020205020404" pitchFamily="49" charset="0"/>
+                  </a:rPr>
+                  <a:t> </a:t>
+                </a:r>
+                <a14:m>
+                  <m:oMath xmlns:m="http://schemas.openxmlformats.org/officeDocument/2006/math">
+                    <m:r>
+                      <a:rPr lang="en-US" i="1" dirty="0">
+                        <a:latin typeface="Cambria Math" panose="02040503050406030204" pitchFamily="18" charset="0"/>
+                        <a:ea typeface="Cambria Math" panose="02040503050406030204" pitchFamily="18" charset="0"/>
+                        <a:cs typeface="Courier New" panose="02070309020205020404" pitchFamily="49" charset="0"/>
+                      </a:rPr>
+                      <m:t>→</m:t>
+                    </m:r>
+                  </m:oMath>
+                </a14:m>
+                <a:r>
+                  <a:rPr lang="en-US" dirty="0">
+                    <a:latin typeface="Courier New" panose="02070309020205020404" pitchFamily="49" charset="0"/>
+                    <a:cs typeface="Courier New" panose="02070309020205020404" pitchFamily="49" charset="0"/>
+                  </a:rPr>
+                  <a:t> </a:t>
+                </a:r>
+                <a:r>
+                  <a:rPr lang="en-US" dirty="0">
+                    <a:cs typeface="Courier New" panose="02070309020205020404" pitchFamily="49" charset="0"/>
+                  </a:rPr>
+                  <a:t>move file </a:t>
+                </a:r>
+                <a:r>
+                  <a:rPr lang="en-US" dirty="0">
+                    <a:latin typeface="Courier New" panose="02070309020205020404" pitchFamily="49" charset="0"/>
+                    <a:cs typeface="Courier New" panose="02070309020205020404" pitchFamily="49" charset="0"/>
+                  </a:rPr>
+                  <a:t>(mv </a:t>
+                </a:r>
+                <a:r>
+                  <a:rPr lang="en-US" i="1" dirty="0">
+                    <a:latin typeface="Courier New" panose="02070309020205020404" pitchFamily="49" charset="0"/>
+                    <a:cs typeface="Courier New" panose="02070309020205020404" pitchFamily="49" charset="0"/>
+                  </a:rPr>
+                  <a:t>source destination)</a:t>
+                </a:r>
+                <a:endParaRPr lang="en-US" dirty="0">
+                  <a:latin typeface="Courier New" panose="02070309020205020404" pitchFamily="49" charset="0"/>
+                  <a:cs typeface="Courier New" panose="02070309020205020404" pitchFamily="49" charset="0"/>
+                </a:endParaRPr>
+              </a:p>
+              <a:p>
+                <a:r>
+                  <a:rPr lang="en-US" dirty="0">
+                    <a:latin typeface="Courier New" panose="02070309020205020404" pitchFamily="49" charset="0"/>
+                    <a:cs typeface="Courier New" panose="02070309020205020404" pitchFamily="49" charset="0"/>
+                  </a:rPr>
+                  <a:t>cp </a:t>
+                </a:r>
+                <a14:m>
+                  <m:oMath xmlns:m="http://schemas.openxmlformats.org/officeDocument/2006/math">
+                    <m:r>
+                      <a:rPr lang="en-US" i="1" dirty="0">
+                        <a:latin typeface="Cambria Math" panose="02040503050406030204" pitchFamily="18" charset="0"/>
+                        <a:ea typeface="Cambria Math" panose="02040503050406030204" pitchFamily="18" charset="0"/>
+                        <a:cs typeface="Courier New" panose="02070309020205020404" pitchFamily="49" charset="0"/>
+                      </a:rPr>
+                      <m:t>→</m:t>
+                    </m:r>
+                  </m:oMath>
+                </a14:m>
+                <a:r>
+                  <a:rPr lang="en-US" dirty="0">
+                    <a:latin typeface="Courier New" panose="02070309020205020404" pitchFamily="49" charset="0"/>
+                    <a:cs typeface="Courier New" panose="02070309020205020404" pitchFamily="49" charset="0"/>
+                  </a:rPr>
+                  <a:t> </a:t>
+                </a:r>
+                <a:r>
+                  <a:rPr lang="en-US" dirty="0">
+                    <a:cs typeface="Courier New" panose="02070309020205020404" pitchFamily="49" charset="0"/>
+                  </a:rPr>
+                  <a:t>copy file </a:t>
+                </a:r>
+                <a:r>
+                  <a:rPr lang="en-US" dirty="0">
+                    <a:latin typeface="Courier New" panose="02070309020205020404" pitchFamily="49" charset="0"/>
+                    <a:cs typeface="Courier New" panose="02070309020205020404" pitchFamily="49" charset="0"/>
+                  </a:rPr>
+                  <a:t>(cp </a:t>
+                </a:r>
+                <a:r>
+                  <a:rPr lang="en-US" i="1" dirty="0">
+                    <a:latin typeface="Courier New" panose="02070309020205020404" pitchFamily="49" charset="0"/>
+                    <a:cs typeface="Courier New" panose="02070309020205020404" pitchFamily="49" charset="0"/>
+                  </a:rPr>
+                  <a:t>source</a:t>
+                </a:r>
+                <a:r>
+                  <a:rPr lang="en-US" dirty="0">
+                    <a:latin typeface="Courier New" panose="02070309020205020404" pitchFamily="49" charset="0"/>
+                    <a:cs typeface="Courier New" panose="02070309020205020404" pitchFamily="49" charset="0"/>
+                  </a:rPr>
+                  <a:t> </a:t>
+                </a:r>
+                <a:r>
+                  <a:rPr lang="en-US" i="1" dirty="0">
+                    <a:latin typeface="Courier New" panose="02070309020205020404" pitchFamily="49" charset="0"/>
+                    <a:cs typeface="Courier New" panose="02070309020205020404" pitchFamily="49" charset="0"/>
+                  </a:rPr>
+                  <a:t>destination</a:t>
+                </a:r>
+                <a:r>
+                  <a:rPr lang="en-US" dirty="0">
+                    <a:latin typeface="Courier New" panose="02070309020205020404" pitchFamily="49" charset="0"/>
+                    <a:cs typeface="Courier New" panose="02070309020205020404" pitchFamily="49" charset="0"/>
+                  </a:rPr>
+                  <a:t>)</a:t>
+                </a:r>
+              </a:p>
+              <a:p>
+                <a:r>
+                  <a:rPr lang="en-US" dirty="0">
+                    <a:latin typeface="Courier New" panose="02070309020205020404" pitchFamily="49" charset="0"/>
+                    <a:cs typeface="Courier New" panose="02070309020205020404" pitchFamily="49" charset="0"/>
+                  </a:rPr>
+                  <a:t>ln </a:t>
+                </a:r>
+                <a14:m>
+                  <m:oMath xmlns:m="http://schemas.openxmlformats.org/officeDocument/2006/math">
+                    <m:r>
+                      <a:rPr lang="en-US" i="1" dirty="0">
+                        <a:latin typeface="Cambria Math" panose="02040503050406030204" pitchFamily="18" charset="0"/>
+                        <a:ea typeface="Cambria Math" panose="02040503050406030204" pitchFamily="18" charset="0"/>
+                        <a:cs typeface="Courier New" panose="02070309020205020404" pitchFamily="49" charset="0"/>
+                      </a:rPr>
+                      <m:t>→</m:t>
+                    </m:r>
+                  </m:oMath>
+                </a14:m>
+                <a:r>
+                  <a:rPr lang="en-US" dirty="0">
+                    <a:latin typeface="Courier New" panose="02070309020205020404" pitchFamily="49" charset="0"/>
+                    <a:cs typeface="Courier New" panose="02070309020205020404" pitchFamily="49" charset="0"/>
+                  </a:rPr>
+                  <a:t> </a:t>
+                </a:r>
+                <a:r>
+                  <a:rPr lang="en-US" dirty="0">
+                    <a:cs typeface="Courier New" panose="02070309020205020404" pitchFamily="49" charset="0"/>
+                  </a:rPr>
+                  <a:t>symbolic link </a:t>
+                </a:r>
+                <a:r>
+                  <a:rPr lang="en-US" dirty="0">
+                    <a:latin typeface="Courier New" panose="02070309020205020404" pitchFamily="49" charset="0"/>
+                    <a:cs typeface="Courier New" panose="02070309020205020404" pitchFamily="49" charset="0"/>
+                  </a:rPr>
+                  <a:t>(ln –s </a:t>
+                </a:r>
+                <a:r>
+                  <a:rPr lang="en-US" i="1" dirty="0">
+                    <a:latin typeface="Courier New" panose="02070309020205020404" pitchFamily="49" charset="0"/>
+                    <a:cs typeface="Courier New" panose="02070309020205020404" pitchFamily="49" charset="0"/>
+                  </a:rPr>
+                  <a:t>destination shortcut</a:t>
+                </a:r>
+                <a:r>
+                  <a:rPr lang="en-US" dirty="0">
+                    <a:latin typeface="Courier New" panose="02070309020205020404" pitchFamily="49" charset="0"/>
+                    <a:cs typeface="Courier New" panose="02070309020205020404" pitchFamily="49" charset="0"/>
+                  </a:rPr>
+                  <a:t>)</a:t>
+                </a:r>
+              </a:p>
+            </p:txBody>
+          </p:sp>
+        </mc:Choice>
+        <mc:Fallback>
+          <p:sp>
+            <p:nvSpPr>
+              <p:cNvPr id="3" name="Content Placeholder 2">
+                <a:extLst>
+                  <a:ext uri="{FF2B5EF4-FFF2-40B4-BE49-F238E27FC236}">
+                    <a16:creationId xmlns:a16="http://schemas.microsoft.com/office/drawing/2014/main" id="{593AD591-5DD9-410C-B27F-EACDDF765FF4}"/>
+                  </a:ext>
+                </a:extLst>
+              </p:cNvPr>
+              <p:cNvSpPr>
+                <a:spLocks noGrp="1" noRot="1" noChangeAspect="1" noMove="1" noResize="1" noEditPoints="1" noAdjustHandles="1" noChangeArrowheads="1" noChangeShapeType="1" noTextEdit="1"/>
+              </p:cNvSpPr>
+              <p:nvPr>
+                <p:ph idx="1"/>
+              </p:nvPr>
+            </p:nvSpPr>
+            <p:spPr>
+              <a:blipFill>
+                <a:blip r:embed="rId2"/>
+                <a:stretch>
+                  <a:fillRect l="-1043" t="-3081"/>
+                </a:stretch>
+              </a:blipFill>
+            </p:spPr>
+            <p:txBody>
+              <a:bodyPr/>
+              <a:lstStyle/>
+              <a:p>
+                <a:r>
+                  <a:rPr lang="en-US">
+                    <a:noFill/>
+                  </a:rPr>
+                  <a:t> </a:t>
+                </a:r>
+              </a:p>
+            </p:txBody>
+          </p:sp>
+        </mc:Fallback>
+      </mc:AlternateContent>
       <p:sp>
         <p:nvSpPr>
           <p:cNvPr id="4" name="Date Placeholder 3">
@@ -8800,7 +9264,7 @@
     </p:spTree>
     <p:extLst>
       <p:ext uri="{BB962C8B-B14F-4D97-AF65-F5344CB8AC3E}">
-        <p14:creationId xmlns:p14="http://schemas.microsoft.com/office/powerpoint/2010/main" val="3313557375"/>
+        <p14:creationId xmlns:p14="http://schemas.microsoft.com/office/powerpoint/2010/main" val="226964468"/>
       </p:ext>
     </p:extLst>
   </p:cSld>
@@ -8850,76 +9314,277 @@
           <a:p>
             <a:r>
               <a:rPr lang="en-US" dirty="0"/>
-              <a:t>SCHEDULING WITH CRON</a:t>
-            </a:r>
-          </a:p>
-        </p:txBody>
-      </p:sp>
-      <p:sp>
-        <p:nvSpPr>
-          <p:cNvPr id="3" name="Content Placeholder 2">
-            <a:extLst>
-              <a:ext uri="{FF2B5EF4-FFF2-40B4-BE49-F238E27FC236}">
-                <a16:creationId xmlns:a16="http://schemas.microsoft.com/office/drawing/2014/main" id="{593AD591-5DD9-410C-B27F-EACDDF765FF4}"/>
-              </a:ext>
-            </a:extLst>
-          </p:cNvPr>
-          <p:cNvSpPr>
-            <a:spLocks noGrp="1"/>
-          </p:cNvSpPr>
-          <p:nvPr>
-            <p:ph idx="1"/>
-          </p:nvPr>
-        </p:nvSpPr>
-        <p:spPr/>
-        <p:txBody>
-          <a:bodyPr/>
-          <a:lstStyle/>
-          <a:p>
-            <a:r>
-              <a:rPr lang="en-US" dirty="0"/>
-              <a:t>.</a:t>
-            </a:r>
-            <a:r>
-              <a:rPr lang="en-US" dirty="0" err="1"/>
-              <a:t>bashrc</a:t>
-            </a:r>
-            <a:endParaRPr lang="en-US" dirty="0"/>
-          </a:p>
-          <a:p>
-            <a:pPr lvl="1"/>
-            <a:r>
-              <a:rPr lang="en-US" dirty="0"/>
-              <a:t>Run every time you start bash</a:t>
-            </a:r>
-          </a:p>
-          <a:p>
-            <a:pPr lvl="1"/>
-            <a:r>
-              <a:rPr lang="en-US" dirty="0"/>
-              <a:t>Great for configuring global settings</a:t>
-            </a:r>
-          </a:p>
-          <a:p>
-            <a:r>
-              <a:rPr lang="en-US" dirty="0"/>
-              <a:t>.</a:t>
-            </a:r>
-            <a:r>
-              <a:rPr lang="en-US" dirty="0" err="1"/>
-              <a:t>bash_history</a:t>
-            </a:r>
-            <a:endParaRPr lang="en-US" dirty="0"/>
-          </a:p>
-          <a:p>
-            <a:pPr lvl="1"/>
-            <a:r>
-              <a:rPr lang="en-US" dirty="0"/>
-              <a:t>Re-run previous commands with arrow keys up/down</a:t>
-            </a:r>
-          </a:p>
-        </p:txBody>
-      </p:sp>
+              <a:t>OPERATIONS</a:t>
+            </a:r>
+          </a:p>
+        </p:txBody>
+      </p:sp>
+      <mc:AlternateContent xmlns:mc="http://schemas.openxmlformats.org/markup-compatibility/2006">
+        <mc:Choice xmlns:a14="http://schemas.microsoft.com/office/drawing/2010/main" Requires="a14">
+          <p:sp>
+            <p:nvSpPr>
+              <p:cNvPr id="3" name="Content Placeholder 2">
+                <a:extLst>
+                  <a:ext uri="{FF2B5EF4-FFF2-40B4-BE49-F238E27FC236}">
+                    <a16:creationId xmlns:a16="http://schemas.microsoft.com/office/drawing/2014/main" id="{593AD591-5DD9-410C-B27F-EACDDF765FF4}"/>
+                  </a:ext>
+                </a:extLst>
+              </p:cNvPr>
+              <p:cNvSpPr>
+                <a:spLocks noGrp="1"/>
+              </p:cNvSpPr>
+              <p:nvPr>
+                <p:ph idx="1"/>
+              </p:nvPr>
+            </p:nvSpPr>
+            <p:spPr/>
+            <p:txBody>
+              <a:bodyPr>
+                <a:normAutofit/>
+              </a:bodyPr>
+              <a:lstStyle/>
+              <a:p>
+                <a:r>
+                  <a:rPr lang="en-US" dirty="0">
+                    <a:latin typeface="Courier New" panose="02070309020205020404" pitchFamily="49" charset="0"/>
+                    <a:cs typeface="Courier New" panose="02070309020205020404" pitchFamily="49" charset="0"/>
+                  </a:rPr>
+                  <a:t>Find </a:t>
+                </a:r>
+                <a14:m>
+                  <m:oMath xmlns:m="http://schemas.openxmlformats.org/officeDocument/2006/math">
+                    <m:r>
+                      <a:rPr lang="en-US" i="1" dirty="0">
+                        <a:latin typeface="Cambria Math" panose="02040503050406030204" pitchFamily="18" charset="0"/>
+                        <a:ea typeface="Cambria Math" panose="02040503050406030204" pitchFamily="18" charset="0"/>
+                        <a:cs typeface="Courier New" panose="02070309020205020404" pitchFamily="49" charset="0"/>
+                      </a:rPr>
+                      <m:t>→</m:t>
+                    </m:r>
+                  </m:oMath>
+                </a14:m>
+                <a:r>
+                  <a:rPr lang="en-US" dirty="0">
+                    <a:latin typeface="Courier New" panose="02070309020205020404" pitchFamily="49" charset="0"/>
+                    <a:cs typeface="Courier New" panose="02070309020205020404" pitchFamily="49" charset="0"/>
+                  </a:rPr>
+                  <a:t> </a:t>
+                </a:r>
+              </a:p>
+              <a:p>
+                <a:r>
+                  <a:rPr lang="en-US" dirty="0">
+                    <a:latin typeface="Courier New" panose="02070309020205020404" pitchFamily="49" charset="0"/>
+                    <a:cs typeface="Courier New" panose="02070309020205020404" pitchFamily="49" charset="0"/>
+                  </a:rPr>
+                  <a:t>Grep </a:t>
+                </a:r>
+                <a14:m>
+                  <m:oMath xmlns:m="http://schemas.openxmlformats.org/officeDocument/2006/math">
+                    <m:r>
+                      <a:rPr lang="en-US" i="1" dirty="0">
+                        <a:latin typeface="Cambria Math" panose="02040503050406030204" pitchFamily="18" charset="0"/>
+                        <a:ea typeface="Cambria Math" panose="02040503050406030204" pitchFamily="18" charset="0"/>
+                        <a:cs typeface="Courier New" panose="02070309020205020404" pitchFamily="49" charset="0"/>
+                      </a:rPr>
+                      <m:t>→</m:t>
+                    </m:r>
+                  </m:oMath>
+                </a14:m>
+                <a:endParaRPr lang="en-US" dirty="0">
+                  <a:latin typeface="Courier New" panose="02070309020205020404" pitchFamily="49" charset="0"/>
+                  <a:cs typeface="Courier New" panose="02070309020205020404" pitchFamily="49" charset="0"/>
+                </a:endParaRPr>
+              </a:p>
+              <a:p>
+                <a:r>
+                  <a:rPr lang="en-US" dirty="0">
+                    <a:latin typeface="Courier New" panose="02070309020205020404" pitchFamily="49" charset="0"/>
+                    <a:cs typeface="Courier New" panose="02070309020205020404" pitchFamily="49" charset="0"/>
+                  </a:rPr>
+                  <a:t>Parallel </a:t>
+                </a:r>
+                <a14:m>
+                  <m:oMath xmlns:m="http://schemas.openxmlformats.org/officeDocument/2006/math">
+                    <m:r>
+                      <a:rPr lang="en-US" i="1" dirty="0">
+                        <a:latin typeface="Cambria Math" panose="02040503050406030204" pitchFamily="18" charset="0"/>
+                        <a:ea typeface="Cambria Math" panose="02040503050406030204" pitchFamily="18" charset="0"/>
+                        <a:cs typeface="Courier New" panose="02070309020205020404" pitchFamily="49" charset="0"/>
+                      </a:rPr>
+                      <m:t>→</m:t>
+                    </m:r>
+                  </m:oMath>
+                </a14:m>
+                <a:endParaRPr lang="en-US" dirty="0">
+                  <a:latin typeface="Courier New" panose="02070309020205020404" pitchFamily="49" charset="0"/>
+                  <a:cs typeface="Courier New" panose="02070309020205020404" pitchFamily="49" charset="0"/>
+                </a:endParaRPr>
+              </a:p>
+              <a:p>
+                <a:r>
+                  <a:rPr lang="en-US" dirty="0" err="1">
+                    <a:latin typeface="Courier New" panose="02070309020205020404" pitchFamily="49" charset="0"/>
+                    <a:cs typeface="Courier New" panose="02070309020205020404" pitchFamily="49" charset="0"/>
+                  </a:rPr>
+                  <a:t>Xargs</a:t>
+                </a:r>
+                <a:r>
+                  <a:rPr lang="en-US" dirty="0">
+                    <a:latin typeface="Courier New" panose="02070309020205020404" pitchFamily="49" charset="0"/>
+                    <a:cs typeface="Courier New" panose="02070309020205020404" pitchFamily="49" charset="0"/>
+                  </a:rPr>
+                  <a:t> </a:t>
+                </a:r>
+                <a14:m>
+                  <m:oMath xmlns:m="http://schemas.openxmlformats.org/officeDocument/2006/math">
+                    <m:r>
+                      <a:rPr lang="en-US" i="1" dirty="0">
+                        <a:latin typeface="Cambria Math" panose="02040503050406030204" pitchFamily="18" charset="0"/>
+                        <a:ea typeface="Cambria Math" panose="02040503050406030204" pitchFamily="18" charset="0"/>
+                        <a:cs typeface="Courier New" panose="02070309020205020404" pitchFamily="49" charset="0"/>
+                      </a:rPr>
+                      <m:t>→</m:t>
+                    </m:r>
+                  </m:oMath>
+                </a14:m>
+                <a:endParaRPr lang="en-US" dirty="0">
+                  <a:latin typeface="Courier New" panose="02070309020205020404" pitchFamily="49" charset="0"/>
+                  <a:cs typeface="Courier New" panose="02070309020205020404" pitchFamily="49" charset="0"/>
+                </a:endParaRPr>
+              </a:p>
+              <a:p>
+                <a:r>
+                  <a:rPr lang="en-US" dirty="0">
+                    <a:latin typeface="Courier New" panose="02070309020205020404" pitchFamily="49" charset="0"/>
+                    <a:cs typeface="Courier New" panose="02070309020205020404" pitchFamily="49" charset="0"/>
+                  </a:rPr>
+                  <a:t>Sed </a:t>
+                </a:r>
+                <a14:m>
+                  <m:oMath xmlns:m="http://schemas.openxmlformats.org/officeDocument/2006/math">
+                    <m:r>
+                      <a:rPr lang="en-US" i="1" dirty="0">
+                        <a:latin typeface="Cambria Math" panose="02040503050406030204" pitchFamily="18" charset="0"/>
+                        <a:ea typeface="Cambria Math" panose="02040503050406030204" pitchFamily="18" charset="0"/>
+                        <a:cs typeface="Courier New" panose="02070309020205020404" pitchFamily="49" charset="0"/>
+                      </a:rPr>
+                      <m:t>→</m:t>
+                    </m:r>
+                  </m:oMath>
+                </a14:m>
+                <a:endParaRPr lang="en-US" dirty="0">
+                  <a:latin typeface="Courier New" panose="02070309020205020404" pitchFamily="49" charset="0"/>
+                  <a:cs typeface="Courier New" panose="02070309020205020404" pitchFamily="49" charset="0"/>
+                </a:endParaRPr>
+              </a:p>
+              <a:p>
+                <a:r>
+                  <a:rPr lang="en-US" dirty="0" err="1">
+                    <a:latin typeface="Courier New" panose="02070309020205020404" pitchFamily="49" charset="0"/>
+                    <a:cs typeface="Courier New" panose="02070309020205020404" pitchFamily="49" charset="0"/>
+                  </a:rPr>
+                  <a:t>Bc</a:t>
+                </a:r>
+                <a:r>
+                  <a:rPr lang="en-US" dirty="0">
+                    <a:latin typeface="Courier New" panose="02070309020205020404" pitchFamily="49" charset="0"/>
+                    <a:cs typeface="Courier New" panose="02070309020205020404" pitchFamily="49" charset="0"/>
+                  </a:rPr>
+                  <a:t> </a:t>
+                </a:r>
+                <a14:m>
+                  <m:oMath xmlns:m="http://schemas.openxmlformats.org/officeDocument/2006/math">
+                    <m:r>
+                      <a:rPr lang="en-US" i="1" dirty="0">
+                        <a:latin typeface="Cambria Math" panose="02040503050406030204" pitchFamily="18" charset="0"/>
+                        <a:ea typeface="Cambria Math" panose="02040503050406030204" pitchFamily="18" charset="0"/>
+                        <a:cs typeface="Courier New" panose="02070309020205020404" pitchFamily="49" charset="0"/>
+                      </a:rPr>
+                      <m:t>→</m:t>
+                    </m:r>
+                  </m:oMath>
+                </a14:m>
+                <a:endParaRPr lang="en-US" dirty="0">
+                  <a:latin typeface="Courier New" panose="02070309020205020404" pitchFamily="49" charset="0"/>
+                  <a:cs typeface="Courier New" panose="02070309020205020404" pitchFamily="49" charset="0"/>
+                </a:endParaRPr>
+              </a:p>
+              <a:p>
+                <a:r>
+                  <a:rPr lang="en-US" dirty="0" err="1">
+                    <a:latin typeface="Courier New" panose="02070309020205020404" pitchFamily="49" charset="0"/>
+                    <a:cs typeface="Courier New" panose="02070309020205020404" pitchFamily="49" charset="0"/>
+                  </a:rPr>
+                  <a:t>Wc</a:t>
+                </a:r>
+                <a:r>
+                  <a:rPr lang="en-US" dirty="0">
+                    <a:latin typeface="Courier New" panose="02070309020205020404" pitchFamily="49" charset="0"/>
+                    <a:cs typeface="Courier New" panose="02070309020205020404" pitchFamily="49" charset="0"/>
+                  </a:rPr>
+                  <a:t> </a:t>
+                </a:r>
+                <a14:m>
+                  <m:oMath xmlns:m="http://schemas.openxmlformats.org/officeDocument/2006/math">
+                    <m:r>
+                      <a:rPr lang="en-US" i="1" dirty="0">
+                        <a:latin typeface="Cambria Math" panose="02040503050406030204" pitchFamily="18" charset="0"/>
+                        <a:ea typeface="Cambria Math" panose="02040503050406030204" pitchFamily="18" charset="0"/>
+                        <a:cs typeface="Courier New" panose="02070309020205020404" pitchFamily="49" charset="0"/>
+                      </a:rPr>
+                      <m:t>→</m:t>
+                    </m:r>
+                  </m:oMath>
+                </a14:m>
+                <a:endParaRPr lang="en-US" dirty="0">
+                  <a:latin typeface="Courier New" panose="02070309020205020404" pitchFamily="49" charset="0"/>
+                  <a:cs typeface="Courier New" panose="02070309020205020404" pitchFamily="49" charset="0"/>
+                </a:endParaRPr>
+              </a:p>
+            </p:txBody>
+          </p:sp>
+        </mc:Choice>
+        <mc:Fallback>
+          <p:sp>
+            <p:nvSpPr>
+              <p:cNvPr id="3" name="Content Placeholder 2">
+                <a:extLst>
+                  <a:ext uri="{FF2B5EF4-FFF2-40B4-BE49-F238E27FC236}">
+                    <a16:creationId xmlns:a16="http://schemas.microsoft.com/office/drawing/2014/main" id="{593AD591-5DD9-410C-B27F-EACDDF765FF4}"/>
+                  </a:ext>
+                </a:extLst>
+              </p:cNvPr>
+              <p:cNvSpPr>
+                <a:spLocks noGrp="1" noRot="1" noChangeAspect="1" noMove="1" noResize="1" noEditPoints="1" noAdjustHandles="1" noChangeArrowheads="1" noChangeShapeType="1" noTextEdit="1"/>
+              </p:cNvSpPr>
+              <p:nvPr>
+                <p:ph idx="1"/>
+              </p:nvPr>
+            </p:nvSpPr>
+            <p:spPr>
+              <a:blipFill>
+                <a:blip r:embed="rId2"/>
+                <a:stretch>
+                  <a:fillRect l="-1043" t="-2101"/>
+                </a:stretch>
+              </a:blipFill>
+            </p:spPr>
+            <p:txBody>
+              <a:bodyPr/>
+              <a:lstStyle/>
+              <a:p>
+                <a:r>
+                  <a:rPr lang="en-US">
+                    <a:noFill/>
+                  </a:rPr>
+                  <a:t> </a:t>
+                </a:r>
+              </a:p>
+            </p:txBody>
+          </p:sp>
+        </mc:Fallback>
+      </mc:AlternateContent>
       <p:sp>
         <p:nvSpPr>
           <p:cNvPr id="4" name="Date Placeholder 3">
@@ -9038,7 +9703,7 @@
     </p:spTree>
     <p:extLst>
       <p:ext uri="{BB962C8B-B14F-4D97-AF65-F5344CB8AC3E}">
-        <p14:creationId xmlns:p14="http://schemas.microsoft.com/office/powerpoint/2010/main" val="4218999613"/>
+        <p14:creationId xmlns:p14="http://schemas.microsoft.com/office/powerpoint/2010/main" val="2199655307"/>
       </p:ext>
     </p:extLst>
   </p:cSld>
@@ -9310,6 +9975,884 @@
       </p:grpSpPr>
       <p:sp>
         <p:nvSpPr>
+          <p:cNvPr id="2" name="Title 1">
+            <a:extLst>
+              <a:ext uri="{FF2B5EF4-FFF2-40B4-BE49-F238E27FC236}">
+                <a16:creationId xmlns:a16="http://schemas.microsoft.com/office/drawing/2014/main" id="{98EB4F1B-51B3-4B64-8210-21AE8BE64582}"/>
+              </a:ext>
+            </a:extLst>
+          </p:cNvPr>
+          <p:cNvSpPr>
+            <a:spLocks noGrp="1"/>
+          </p:cNvSpPr>
+          <p:nvPr>
+            <p:ph type="title"/>
+          </p:nvPr>
+        </p:nvSpPr>
+        <p:spPr/>
+        <p:txBody>
+          <a:bodyPr/>
+          <a:lstStyle/>
+          <a:p>
+            <a:r>
+              <a:rPr lang="en-US" dirty="0"/>
+              <a:t>AUTOMATING TASKS</a:t>
+            </a:r>
+          </a:p>
+        </p:txBody>
+      </p:sp>
+      <p:sp>
+        <p:nvSpPr>
+          <p:cNvPr id="3" name="Content Placeholder 2">
+            <a:extLst>
+              <a:ext uri="{FF2B5EF4-FFF2-40B4-BE49-F238E27FC236}">
+                <a16:creationId xmlns:a16="http://schemas.microsoft.com/office/drawing/2014/main" id="{593AD591-5DD9-410C-B27F-EACDDF765FF4}"/>
+              </a:ext>
+            </a:extLst>
+          </p:cNvPr>
+          <p:cNvSpPr>
+            <a:spLocks noGrp="1"/>
+          </p:cNvSpPr>
+          <p:nvPr>
+            <p:ph type="body" idx="1"/>
+          </p:nvPr>
+        </p:nvSpPr>
+        <p:spPr/>
+        <p:txBody>
+          <a:bodyPr>
+            <a:normAutofit/>
+          </a:bodyPr>
+          <a:lstStyle/>
+          <a:p>
+            <a:r>
+              <a:rPr lang="en-US" dirty="0"/>
+              <a:t>A sampling of common use cases</a:t>
+            </a:r>
+          </a:p>
+        </p:txBody>
+      </p:sp>
+      <p:sp>
+        <p:nvSpPr>
+          <p:cNvPr id="4" name="Date Placeholder 3">
+            <a:extLst>
+              <a:ext uri="{FF2B5EF4-FFF2-40B4-BE49-F238E27FC236}">
+                <a16:creationId xmlns:a16="http://schemas.microsoft.com/office/drawing/2014/main" id="{17E05AC0-8A63-4FDD-A727-54A8C6040A83}"/>
+              </a:ext>
+            </a:extLst>
+          </p:cNvPr>
+          <p:cNvSpPr>
+            <a:spLocks noGrp="1"/>
+          </p:cNvSpPr>
+          <p:nvPr>
+            <p:ph type="dt" sz="half" idx="10"/>
+          </p:nvPr>
+        </p:nvSpPr>
+        <p:spPr/>
+        <p:txBody>
+          <a:bodyPr/>
+          <a:lstStyle/>
+          <a:p>
+            <a:fld id="{8AAE40A0-A7D8-4DC3-BC9E-BADA32DA2004}" type="datetime4">
+              <a:rPr lang="en-US" smtClean="0"/>
+              <a:t>August 13, 2019</a:t>
+            </a:fld>
+            <a:endParaRPr lang="en-US" dirty="0"/>
+          </a:p>
+        </p:txBody>
+      </p:sp>
+      <p:sp>
+        <p:nvSpPr>
+          <p:cNvPr id="5" name="Footer Placeholder 4">
+            <a:extLst>
+              <a:ext uri="{FF2B5EF4-FFF2-40B4-BE49-F238E27FC236}">
+                <a16:creationId xmlns:a16="http://schemas.microsoft.com/office/drawing/2014/main" id="{9C0CA735-E60F-4094-86F7-D33BB272FA25}"/>
+              </a:ext>
+            </a:extLst>
+          </p:cNvPr>
+          <p:cNvSpPr>
+            <a:spLocks noGrp="1"/>
+          </p:cNvSpPr>
+          <p:nvPr>
+            <p:ph type="ftr" sz="quarter" idx="11"/>
+          </p:nvPr>
+        </p:nvSpPr>
+        <p:spPr/>
+        <p:txBody>
+          <a:bodyPr/>
+          <a:lstStyle/>
+          <a:p>
+            <a:r>
+              <a:rPr lang="en-US"/>
+              <a:t>Digital Scholarship Services </a:t>
+            </a:r>
+            <a:r>
+              <a:rPr lang="en-US">
+                <a:solidFill>
+                  <a:schemeClr val="accent1">
+                    <a:lumMod val="50000"/>
+                  </a:schemeClr>
+                </a:solidFill>
+              </a:rPr>
+              <a:t>| Email</a:t>
+            </a:r>
+            <a:r>
+              <a:rPr lang="en-US"/>
+              <a:t> cf24@rice.edu </a:t>
+            </a:r>
+            <a:r>
+              <a:rPr lang="en-US">
+                <a:solidFill>
+                  <a:schemeClr val="accent1">
+                    <a:lumMod val="50000"/>
+                  </a:schemeClr>
+                </a:solidFill>
+              </a:rPr>
+              <a:t>|</a:t>
+            </a:r>
+            <a:r>
+              <a:rPr lang="en-US"/>
+              <a:t> library.rice.edu/dss</a:t>
+            </a:r>
+            <a:endParaRPr lang="en-US" dirty="0"/>
+          </a:p>
+        </p:txBody>
+      </p:sp>
+      <p:sp>
+        <p:nvSpPr>
+          <p:cNvPr id="6" name="Slide Number Placeholder 5">
+            <a:extLst>
+              <a:ext uri="{FF2B5EF4-FFF2-40B4-BE49-F238E27FC236}">
+                <a16:creationId xmlns:a16="http://schemas.microsoft.com/office/drawing/2014/main" id="{33AAFB92-45C0-421A-AC0A-7A439518D3F4}"/>
+              </a:ext>
+            </a:extLst>
+          </p:cNvPr>
+          <p:cNvSpPr>
+            <a:spLocks noGrp="1"/>
+          </p:cNvSpPr>
+          <p:nvPr>
+            <p:ph type="sldNum" sz="quarter" idx="12"/>
+          </p:nvPr>
+        </p:nvSpPr>
+        <p:spPr/>
+        <p:txBody>
+          <a:bodyPr/>
+          <a:lstStyle/>
+          <a:p>
+            <a:fld id="{D57F1E4F-1CFF-5643-939E-02111984F565}" type="slidenum">
+              <a:rPr lang="en-US" smtClean="0"/>
+              <a:t>30</a:t>
+            </a:fld>
+            <a:endParaRPr lang="en-US" dirty="0"/>
+          </a:p>
+        </p:txBody>
+      </p:sp>
+    </p:spTree>
+    <p:extLst>
+      <p:ext uri="{BB962C8B-B14F-4D97-AF65-F5344CB8AC3E}">
+        <p14:creationId xmlns:p14="http://schemas.microsoft.com/office/powerpoint/2010/main" val="1646608798"/>
+      </p:ext>
+    </p:extLst>
+  </p:cSld>
+  <p:clrMapOvr>
+    <a:masterClrMapping/>
+  </p:clrMapOvr>
+</p:sld>
+</file>
+
+<file path=ppt/slides/slide31.xml><?xml version="1.0" encoding="utf-8"?>
+<p:sld xmlns:a="http://schemas.openxmlformats.org/drawingml/2006/main" xmlns:r="http://schemas.openxmlformats.org/officeDocument/2006/relationships" xmlns:p="http://schemas.openxmlformats.org/presentationml/2006/main">
+  <p:cSld>
+    <p:spTree>
+      <p:nvGrpSpPr>
+        <p:cNvPr id="1" name=""/>
+        <p:cNvGrpSpPr/>
+        <p:nvPr/>
+      </p:nvGrpSpPr>
+      <p:grpSpPr>
+        <a:xfrm>
+          <a:off x="0" y="0"/>
+          <a:ext cx="0" cy="0"/>
+          <a:chOff x="0" y="0"/>
+          <a:chExt cx="0" cy="0"/>
+        </a:xfrm>
+      </p:grpSpPr>
+      <p:sp>
+        <p:nvSpPr>
+          <p:cNvPr id="2" name="Title 1">
+            <a:extLst>
+              <a:ext uri="{FF2B5EF4-FFF2-40B4-BE49-F238E27FC236}">
+                <a16:creationId xmlns:a16="http://schemas.microsoft.com/office/drawing/2014/main" id="{98EB4F1B-51B3-4B64-8210-21AE8BE64582}"/>
+              </a:ext>
+            </a:extLst>
+          </p:cNvPr>
+          <p:cNvSpPr>
+            <a:spLocks noGrp="1"/>
+          </p:cNvSpPr>
+          <p:nvPr>
+            <p:ph type="title"/>
+          </p:nvPr>
+        </p:nvSpPr>
+        <p:spPr/>
+        <p:txBody>
+          <a:bodyPr/>
+          <a:lstStyle/>
+          <a:p>
+            <a:r>
+              <a:rPr lang="en-US" dirty="0"/>
+              <a:t>AUTOMATION</a:t>
+            </a:r>
+          </a:p>
+        </p:txBody>
+      </p:sp>
+      <p:sp>
+        <p:nvSpPr>
+          <p:cNvPr id="3" name="Content Placeholder 2">
+            <a:extLst>
+              <a:ext uri="{FF2B5EF4-FFF2-40B4-BE49-F238E27FC236}">
+                <a16:creationId xmlns:a16="http://schemas.microsoft.com/office/drawing/2014/main" id="{593AD591-5DD9-410C-B27F-EACDDF765FF4}"/>
+              </a:ext>
+            </a:extLst>
+          </p:cNvPr>
+          <p:cNvSpPr>
+            <a:spLocks noGrp="1"/>
+          </p:cNvSpPr>
+          <p:nvPr>
+            <p:ph idx="1"/>
+          </p:nvPr>
+        </p:nvSpPr>
+        <p:spPr/>
+        <p:txBody>
+          <a:bodyPr/>
+          <a:lstStyle/>
+          <a:p>
+            <a:r>
+              <a:rPr lang="en-US" dirty="0"/>
+              <a:t>Perhaps the best feature of bash and shell environments – easy automation!</a:t>
+            </a:r>
+          </a:p>
+          <a:p>
+            <a:r>
+              <a:rPr lang="en-US" dirty="0"/>
+              <a:t>Want to run a command once a day to clean up cached files? Easy!</a:t>
+            </a:r>
+          </a:p>
+          <a:p>
+            <a:r>
+              <a:rPr lang="en-US" dirty="0"/>
+              <a:t>Want to simplify a complex process so you can do it all by typing one word? Easy!</a:t>
+            </a:r>
+          </a:p>
+          <a:p>
+            <a:endParaRPr lang="en-US" dirty="0"/>
+          </a:p>
+        </p:txBody>
+      </p:sp>
+      <p:sp>
+        <p:nvSpPr>
+          <p:cNvPr id="4" name="Date Placeholder 3">
+            <a:extLst>
+              <a:ext uri="{FF2B5EF4-FFF2-40B4-BE49-F238E27FC236}">
+                <a16:creationId xmlns:a16="http://schemas.microsoft.com/office/drawing/2014/main" id="{17E05AC0-8A63-4FDD-A727-54A8C6040A83}"/>
+              </a:ext>
+            </a:extLst>
+          </p:cNvPr>
+          <p:cNvSpPr>
+            <a:spLocks noGrp="1"/>
+          </p:cNvSpPr>
+          <p:nvPr>
+            <p:ph type="dt" sz="half" idx="10"/>
+          </p:nvPr>
+        </p:nvSpPr>
+        <p:spPr/>
+        <p:txBody>
+          <a:bodyPr/>
+          <a:lstStyle/>
+          <a:p>
+            <a:fld id="{8AAE40A0-A7D8-4DC3-BC9E-BADA32DA2004}" type="datetime4">
+              <a:rPr lang="en-US" smtClean="0"/>
+              <a:t>August 13, 2019</a:t>
+            </a:fld>
+            <a:endParaRPr lang="en-US" dirty="0"/>
+          </a:p>
+        </p:txBody>
+      </p:sp>
+      <p:sp>
+        <p:nvSpPr>
+          <p:cNvPr id="5" name="Footer Placeholder 4">
+            <a:extLst>
+              <a:ext uri="{FF2B5EF4-FFF2-40B4-BE49-F238E27FC236}">
+                <a16:creationId xmlns:a16="http://schemas.microsoft.com/office/drawing/2014/main" id="{9C0CA735-E60F-4094-86F7-D33BB272FA25}"/>
+              </a:ext>
+            </a:extLst>
+          </p:cNvPr>
+          <p:cNvSpPr>
+            <a:spLocks noGrp="1"/>
+          </p:cNvSpPr>
+          <p:nvPr>
+            <p:ph type="ftr" sz="quarter" idx="11"/>
+          </p:nvPr>
+        </p:nvSpPr>
+        <p:spPr/>
+        <p:txBody>
+          <a:bodyPr/>
+          <a:lstStyle/>
+          <a:p>
+            <a:r>
+              <a:rPr lang="en-US"/>
+              <a:t>Digital Scholarship Services </a:t>
+            </a:r>
+            <a:r>
+              <a:rPr lang="en-US">
+                <a:solidFill>
+                  <a:schemeClr val="accent1">
+                    <a:lumMod val="50000"/>
+                  </a:schemeClr>
+                </a:solidFill>
+              </a:rPr>
+              <a:t>| Email</a:t>
+            </a:r>
+            <a:r>
+              <a:rPr lang="en-US"/>
+              <a:t> cf24@rice.edu </a:t>
+            </a:r>
+            <a:r>
+              <a:rPr lang="en-US">
+                <a:solidFill>
+                  <a:schemeClr val="accent1">
+                    <a:lumMod val="50000"/>
+                  </a:schemeClr>
+                </a:solidFill>
+              </a:rPr>
+              <a:t>|</a:t>
+            </a:r>
+            <a:r>
+              <a:rPr lang="en-US"/>
+              <a:t> library.rice.edu/dss</a:t>
+            </a:r>
+            <a:endParaRPr lang="en-US" dirty="0"/>
+          </a:p>
+        </p:txBody>
+      </p:sp>
+      <p:sp>
+        <p:nvSpPr>
+          <p:cNvPr id="6" name="Slide Number Placeholder 5">
+            <a:extLst>
+              <a:ext uri="{FF2B5EF4-FFF2-40B4-BE49-F238E27FC236}">
+                <a16:creationId xmlns:a16="http://schemas.microsoft.com/office/drawing/2014/main" id="{33AAFB92-45C0-421A-AC0A-7A439518D3F4}"/>
+              </a:ext>
+            </a:extLst>
+          </p:cNvPr>
+          <p:cNvSpPr>
+            <a:spLocks noGrp="1"/>
+          </p:cNvSpPr>
+          <p:nvPr>
+            <p:ph type="sldNum" sz="quarter" idx="12"/>
+          </p:nvPr>
+        </p:nvSpPr>
+        <p:spPr/>
+        <p:txBody>
+          <a:bodyPr/>
+          <a:lstStyle/>
+          <a:p>
+            <a:fld id="{D57F1E4F-1CFF-5643-939E-02111984F565}" type="slidenum">
+              <a:rPr lang="en-US" smtClean="0"/>
+              <a:t>31</a:t>
+            </a:fld>
+            <a:endParaRPr lang="en-US" dirty="0"/>
+          </a:p>
+        </p:txBody>
+      </p:sp>
+    </p:spTree>
+    <p:extLst>
+      <p:ext uri="{BB962C8B-B14F-4D97-AF65-F5344CB8AC3E}">
+        <p14:creationId xmlns:p14="http://schemas.microsoft.com/office/powerpoint/2010/main" val="3313557375"/>
+      </p:ext>
+    </p:extLst>
+  </p:cSld>
+  <p:clrMapOvr>
+    <a:masterClrMapping/>
+  </p:clrMapOvr>
+</p:sld>
+</file>
+
+<file path=ppt/slides/slide32.xml><?xml version="1.0" encoding="utf-8"?>
+<p:sld xmlns:a="http://schemas.openxmlformats.org/drawingml/2006/main" xmlns:r="http://schemas.openxmlformats.org/officeDocument/2006/relationships" xmlns:p="http://schemas.openxmlformats.org/presentationml/2006/main">
+  <p:cSld>
+    <p:spTree>
+      <p:nvGrpSpPr>
+        <p:cNvPr id="1" name=""/>
+        <p:cNvGrpSpPr/>
+        <p:nvPr/>
+      </p:nvGrpSpPr>
+      <p:grpSpPr>
+        <a:xfrm>
+          <a:off x="0" y="0"/>
+          <a:ext cx="0" cy="0"/>
+          <a:chOff x="0" y="0"/>
+          <a:chExt cx="0" cy="0"/>
+        </a:xfrm>
+      </p:grpSpPr>
+      <p:sp>
+        <p:nvSpPr>
+          <p:cNvPr id="2" name="Title 1">
+            <a:extLst>
+              <a:ext uri="{FF2B5EF4-FFF2-40B4-BE49-F238E27FC236}">
+                <a16:creationId xmlns:a16="http://schemas.microsoft.com/office/drawing/2014/main" id="{98EB4F1B-51B3-4B64-8210-21AE8BE64582}"/>
+              </a:ext>
+            </a:extLst>
+          </p:cNvPr>
+          <p:cNvSpPr>
+            <a:spLocks noGrp="1"/>
+          </p:cNvSpPr>
+          <p:nvPr>
+            <p:ph type="title"/>
+          </p:nvPr>
+        </p:nvSpPr>
+        <p:spPr/>
+        <p:txBody>
+          <a:bodyPr/>
+          <a:lstStyle/>
+          <a:p>
+            <a:r>
+              <a:rPr lang="en-US" dirty="0"/>
+              <a:t>SCHEDULING WITH CRON</a:t>
+            </a:r>
+          </a:p>
+        </p:txBody>
+      </p:sp>
+      <p:sp>
+        <p:nvSpPr>
+          <p:cNvPr id="3" name="Content Placeholder 2">
+            <a:extLst>
+              <a:ext uri="{FF2B5EF4-FFF2-40B4-BE49-F238E27FC236}">
+                <a16:creationId xmlns:a16="http://schemas.microsoft.com/office/drawing/2014/main" id="{593AD591-5DD9-410C-B27F-EACDDF765FF4}"/>
+              </a:ext>
+            </a:extLst>
+          </p:cNvPr>
+          <p:cNvSpPr>
+            <a:spLocks noGrp="1"/>
+          </p:cNvSpPr>
+          <p:nvPr>
+            <p:ph idx="1"/>
+          </p:nvPr>
+        </p:nvSpPr>
+        <p:spPr/>
+        <p:txBody>
+          <a:bodyPr/>
+          <a:lstStyle/>
+          <a:p>
+            <a:r>
+              <a:rPr lang="en-US" dirty="0"/>
+              <a:t>Crontab: has information for scheduling</a:t>
+            </a:r>
+          </a:p>
+          <a:p>
+            <a:r>
+              <a:rPr lang="en-US" dirty="0"/>
+              <a:t>Use </a:t>
+            </a:r>
+            <a:r>
+              <a:rPr lang="en-US" dirty="0">
+                <a:hlinkClick r:id="rId2"/>
+              </a:rPr>
+              <a:t>https://crontab.guru</a:t>
+            </a:r>
+            <a:r>
+              <a:rPr lang="en-US" dirty="0"/>
+              <a:t> to help with syntax</a:t>
+            </a:r>
+          </a:p>
+          <a:p>
+            <a:r>
+              <a:rPr lang="en-US" dirty="0"/>
+              <a:t>Example:</a:t>
+            </a:r>
+          </a:p>
+          <a:p>
+            <a:pPr marL="457200" lvl="1" indent="0">
+              <a:buNone/>
+            </a:pPr>
+            <a:r>
+              <a:rPr lang="en-US" dirty="0">
+                <a:latin typeface="Courier New" panose="02070309020205020404" pitchFamily="49" charset="0"/>
+                <a:cs typeface="Courier New" panose="02070309020205020404" pitchFamily="49" charset="0"/>
+              </a:rPr>
+              <a:t>30 4 * * MON rm –rf /</a:t>
+            </a:r>
+            <a:r>
+              <a:rPr lang="en-US" dirty="0" err="1">
+                <a:latin typeface="Courier New" panose="02070309020205020404" pitchFamily="49" charset="0"/>
+                <a:cs typeface="Courier New" panose="02070309020205020404" pitchFamily="49" charset="0"/>
+              </a:rPr>
+              <a:t>tmp</a:t>
+            </a:r>
+            <a:r>
+              <a:rPr lang="en-US" dirty="0">
+                <a:latin typeface="Courier New" panose="02070309020205020404" pitchFamily="49" charset="0"/>
+                <a:cs typeface="Courier New" panose="02070309020205020404" pitchFamily="49" charset="0"/>
+              </a:rPr>
+              <a:t>/* </a:t>
+            </a:r>
+            <a:r>
+              <a:rPr lang="en-US" dirty="0">
+                <a:cs typeface="Courier New" panose="02070309020205020404" pitchFamily="49" charset="0"/>
+              </a:rPr>
+              <a:t>means delete all temporary files at 4:30 AM every Monday</a:t>
+            </a:r>
+          </a:p>
+        </p:txBody>
+      </p:sp>
+      <p:sp>
+        <p:nvSpPr>
+          <p:cNvPr id="4" name="Date Placeholder 3">
+            <a:extLst>
+              <a:ext uri="{FF2B5EF4-FFF2-40B4-BE49-F238E27FC236}">
+                <a16:creationId xmlns:a16="http://schemas.microsoft.com/office/drawing/2014/main" id="{17E05AC0-8A63-4FDD-A727-54A8C6040A83}"/>
+              </a:ext>
+            </a:extLst>
+          </p:cNvPr>
+          <p:cNvSpPr>
+            <a:spLocks noGrp="1"/>
+          </p:cNvSpPr>
+          <p:nvPr>
+            <p:ph type="dt" sz="half" idx="10"/>
+          </p:nvPr>
+        </p:nvSpPr>
+        <p:spPr/>
+        <p:txBody>
+          <a:bodyPr/>
+          <a:lstStyle/>
+          <a:p>
+            <a:fld id="{8AAE40A0-A7D8-4DC3-BC9E-BADA32DA2004}" type="datetime4">
+              <a:rPr lang="en-US" smtClean="0"/>
+              <a:t>August 13, 2019</a:t>
+            </a:fld>
+            <a:endParaRPr lang="en-US" dirty="0"/>
+          </a:p>
+        </p:txBody>
+      </p:sp>
+      <p:sp>
+        <p:nvSpPr>
+          <p:cNvPr id="5" name="Footer Placeholder 4">
+            <a:extLst>
+              <a:ext uri="{FF2B5EF4-FFF2-40B4-BE49-F238E27FC236}">
+                <a16:creationId xmlns:a16="http://schemas.microsoft.com/office/drawing/2014/main" id="{9C0CA735-E60F-4094-86F7-D33BB272FA25}"/>
+              </a:ext>
+            </a:extLst>
+          </p:cNvPr>
+          <p:cNvSpPr>
+            <a:spLocks noGrp="1"/>
+          </p:cNvSpPr>
+          <p:nvPr>
+            <p:ph type="ftr" sz="quarter" idx="11"/>
+          </p:nvPr>
+        </p:nvSpPr>
+        <p:spPr/>
+        <p:txBody>
+          <a:bodyPr/>
+          <a:lstStyle/>
+          <a:p>
+            <a:r>
+              <a:rPr lang="en-US"/>
+              <a:t>Digital Scholarship Services </a:t>
+            </a:r>
+            <a:r>
+              <a:rPr lang="en-US">
+                <a:solidFill>
+                  <a:schemeClr val="accent1">
+                    <a:lumMod val="50000"/>
+                  </a:schemeClr>
+                </a:solidFill>
+              </a:rPr>
+              <a:t>| Email</a:t>
+            </a:r>
+            <a:r>
+              <a:rPr lang="en-US"/>
+              <a:t> cf24@rice.edu </a:t>
+            </a:r>
+            <a:r>
+              <a:rPr lang="en-US">
+                <a:solidFill>
+                  <a:schemeClr val="accent1">
+                    <a:lumMod val="50000"/>
+                  </a:schemeClr>
+                </a:solidFill>
+              </a:rPr>
+              <a:t>|</a:t>
+            </a:r>
+            <a:r>
+              <a:rPr lang="en-US"/>
+              <a:t> library.rice.edu/dss</a:t>
+            </a:r>
+            <a:endParaRPr lang="en-US" dirty="0"/>
+          </a:p>
+        </p:txBody>
+      </p:sp>
+      <p:sp>
+        <p:nvSpPr>
+          <p:cNvPr id="6" name="Slide Number Placeholder 5">
+            <a:extLst>
+              <a:ext uri="{FF2B5EF4-FFF2-40B4-BE49-F238E27FC236}">
+                <a16:creationId xmlns:a16="http://schemas.microsoft.com/office/drawing/2014/main" id="{33AAFB92-45C0-421A-AC0A-7A439518D3F4}"/>
+              </a:ext>
+            </a:extLst>
+          </p:cNvPr>
+          <p:cNvSpPr>
+            <a:spLocks noGrp="1"/>
+          </p:cNvSpPr>
+          <p:nvPr>
+            <p:ph type="sldNum" sz="quarter" idx="12"/>
+          </p:nvPr>
+        </p:nvSpPr>
+        <p:spPr/>
+        <p:txBody>
+          <a:bodyPr/>
+          <a:lstStyle/>
+          <a:p>
+            <a:fld id="{D57F1E4F-1CFF-5643-939E-02111984F565}" type="slidenum">
+              <a:rPr lang="en-US" smtClean="0"/>
+              <a:t>32</a:t>
+            </a:fld>
+            <a:endParaRPr lang="en-US" dirty="0"/>
+          </a:p>
+        </p:txBody>
+      </p:sp>
+    </p:spTree>
+    <p:extLst>
+      <p:ext uri="{BB962C8B-B14F-4D97-AF65-F5344CB8AC3E}">
+        <p14:creationId xmlns:p14="http://schemas.microsoft.com/office/powerpoint/2010/main" val="4218999613"/>
+      </p:ext>
+    </p:extLst>
+  </p:cSld>
+  <p:clrMapOvr>
+    <a:masterClrMapping/>
+  </p:clrMapOvr>
+</p:sld>
+</file>
+
+<file path=ppt/slides/slide33.xml><?xml version="1.0" encoding="utf-8"?>
+<p:sld xmlns:a="http://schemas.openxmlformats.org/drawingml/2006/main" xmlns:r="http://schemas.openxmlformats.org/officeDocument/2006/relationships" xmlns:p="http://schemas.openxmlformats.org/presentationml/2006/main">
+  <p:cSld>
+    <p:spTree>
+      <p:nvGrpSpPr>
+        <p:cNvPr id="1" name=""/>
+        <p:cNvGrpSpPr/>
+        <p:nvPr/>
+      </p:nvGrpSpPr>
+      <p:grpSpPr>
+        <a:xfrm>
+          <a:off x="0" y="0"/>
+          <a:ext cx="0" cy="0"/>
+          <a:chOff x="0" y="0"/>
+          <a:chExt cx="0" cy="0"/>
+        </a:xfrm>
+      </p:grpSpPr>
+      <p:sp>
+        <p:nvSpPr>
+          <p:cNvPr id="2" name="Title 1">
+            <a:extLst>
+              <a:ext uri="{FF2B5EF4-FFF2-40B4-BE49-F238E27FC236}">
+                <a16:creationId xmlns:a16="http://schemas.microsoft.com/office/drawing/2014/main" id="{98EB4F1B-51B3-4B64-8210-21AE8BE64582}"/>
+              </a:ext>
+            </a:extLst>
+          </p:cNvPr>
+          <p:cNvSpPr>
+            <a:spLocks noGrp="1"/>
+          </p:cNvSpPr>
+          <p:nvPr>
+            <p:ph type="title"/>
+          </p:nvPr>
+        </p:nvSpPr>
+        <p:spPr/>
+        <p:txBody>
+          <a:bodyPr/>
+          <a:lstStyle/>
+          <a:p>
+            <a:r>
+              <a:rPr lang="en-US" dirty="0"/>
+              <a:t>BASH FUNCTIONS</a:t>
+            </a:r>
+          </a:p>
+        </p:txBody>
+      </p:sp>
+      <p:sp>
+        <p:nvSpPr>
+          <p:cNvPr id="3" name="Content Placeholder 2">
+            <a:extLst>
+              <a:ext uri="{FF2B5EF4-FFF2-40B4-BE49-F238E27FC236}">
+                <a16:creationId xmlns:a16="http://schemas.microsoft.com/office/drawing/2014/main" id="{593AD591-5DD9-410C-B27F-EACDDF765FF4}"/>
+              </a:ext>
+            </a:extLst>
+          </p:cNvPr>
+          <p:cNvSpPr>
+            <a:spLocks noGrp="1"/>
+          </p:cNvSpPr>
+          <p:nvPr>
+            <p:ph idx="1"/>
+          </p:nvPr>
+        </p:nvSpPr>
+        <p:spPr/>
+        <p:txBody>
+          <a:bodyPr/>
+          <a:lstStyle/>
+          <a:p>
+            <a:r>
+              <a:rPr lang="en-US" dirty="0"/>
+              <a:t>Great for writing quick functions that don’t quite fit into alias form</a:t>
+            </a:r>
+            <a:endParaRPr lang="en-US" dirty="0">
+              <a:cs typeface="Courier New" panose="02070309020205020404" pitchFamily="49" charset="0"/>
+            </a:endParaRPr>
+          </a:p>
+        </p:txBody>
+      </p:sp>
+      <p:sp>
+        <p:nvSpPr>
+          <p:cNvPr id="4" name="Date Placeholder 3">
+            <a:extLst>
+              <a:ext uri="{FF2B5EF4-FFF2-40B4-BE49-F238E27FC236}">
+                <a16:creationId xmlns:a16="http://schemas.microsoft.com/office/drawing/2014/main" id="{17E05AC0-8A63-4FDD-A727-54A8C6040A83}"/>
+              </a:ext>
+            </a:extLst>
+          </p:cNvPr>
+          <p:cNvSpPr>
+            <a:spLocks noGrp="1"/>
+          </p:cNvSpPr>
+          <p:nvPr>
+            <p:ph type="dt" sz="half" idx="10"/>
+          </p:nvPr>
+        </p:nvSpPr>
+        <p:spPr/>
+        <p:txBody>
+          <a:bodyPr/>
+          <a:lstStyle/>
+          <a:p>
+            <a:fld id="{8AAE40A0-A7D8-4DC3-BC9E-BADA32DA2004}" type="datetime4">
+              <a:rPr lang="en-US" smtClean="0"/>
+              <a:t>August 13, 2019</a:t>
+            </a:fld>
+            <a:endParaRPr lang="en-US" dirty="0"/>
+          </a:p>
+        </p:txBody>
+      </p:sp>
+      <p:sp>
+        <p:nvSpPr>
+          <p:cNvPr id="5" name="Footer Placeholder 4">
+            <a:extLst>
+              <a:ext uri="{FF2B5EF4-FFF2-40B4-BE49-F238E27FC236}">
+                <a16:creationId xmlns:a16="http://schemas.microsoft.com/office/drawing/2014/main" id="{9C0CA735-E60F-4094-86F7-D33BB272FA25}"/>
+              </a:ext>
+            </a:extLst>
+          </p:cNvPr>
+          <p:cNvSpPr>
+            <a:spLocks noGrp="1"/>
+          </p:cNvSpPr>
+          <p:nvPr>
+            <p:ph type="ftr" sz="quarter" idx="11"/>
+          </p:nvPr>
+        </p:nvSpPr>
+        <p:spPr/>
+        <p:txBody>
+          <a:bodyPr/>
+          <a:lstStyle/>
+          <a:p>
+            <a:r>
+              <a:rPr lang="en-US"/>
+              <a:t>Digital Scholarship Services </a:t>
+            </a:r>
+            <a:r>
+              <a:rPr lang="en-US">
+                <a:solidFill>
+                  <a:schemeClr val="accent1">
+                    <a:lumMod val="50000"/>
+                  </a:schemeClr>
+                </a:solidFill>
+              </a:rPr>
+              <a:t>| Email</a:t>
+            </a:r>
+            <a:r>
+              <a:rPr lang="en-US"/>
+              <a:t> cf24@rice.edu </a:t>
+            </a:r>
+            <a:r>
+              <a:rPr lang="en-US">
+                <a:solidFill>
+                  <a:schemeClr val="accent1">
+                    <a:lumMod val="50000"/>
+                  </a:schemeClr>
+                </a:solidFill>
+              </a:rPr>
+              <a:t>|</a:t>
+            </a:r>
+            <a:r>
+              <a:rPr lang="en-US"/>
+              <a:t> library.rice.edu/dss</a:t>
+            </a:r>
+            <a:endParaRPr lang="en-US" dirty="0"/>
+          </a:p>
+        </p:txBody>
+      </p:sp>
+      <p:sp>
+        <p:nvSpPr>
+          <p:cNvPr id="6" name="Slide Number Placeholder 5">
+            <a:extLst>
+              <a:ext uri="{FF2B5EF4-FFF2-40B4-BE49-F238E27FC236}">
+                <a16:creationId xmlns:a16="http://schemas.microsoft.com/office/drawing/2014/main" id="{33AAFB92-45C0-421A-AC0A-7A439518D3F4}"/>
+              </a:ext>
+            </a:extLst>
+          </p:cNvPr>
+          <p:cNvSpPr>
+            <a:spLocks noGrp="1"/>
+          </p:cNvSpPr>
+          <p:nvPr>
+            <p:ph type="sldNum" sz="quarter" idx="12"/>
+          </p:nvPr>
+        </p:nvSpPr>
+        <p:spPr/>
+        <p:txBody>
+          <a:bodyPr/>
+          <a:lstStyle/>
+          <a:p>
+            <a:fld id="{D57F1E4F-1CFF-5643-939E-02111984F565}" type="slidenum">
+              <a:rPr lang="en-US" smtClean="0"/>
+              <a:t>33</a:t>
+            </a:fld>
+            <a:endParaRPr lang="en-US" dirty="0"/>
+          </a:p>
+        </p:txBody>
+      </p:sp>
+    </p:spTree>
+    <p:extLst>
+      <p:ext uri="{BB962C8B-B14F-4D97-AF65-F5344CB8AC3E}">
+        <p14:creationId xmlns:p14="http://schemas.microsoft.com/office/powerpoint/2010/main" val="3721287351"/>
+      </p:ext>
+    </p:extLst>
+  </p:cSld>
+  <p:clrMapOvr>
+    <a:masterClrMapping/>
+  </p:clrMapOvr>
+</p:sld>
+</file>
+
+<file path=ppt/slides/slide34.xml><?xml version="1.0" encoding="utf-8"?>
+<p:sld xmlns:a="http://schemas.openxmlformats.org/drawingml/2006/main" xmlns:r="http://schemas.openxmlformats.org/officeDocument/2006/relationships" xmlns:p="http://schemas.openxmlformats.org/presentationml/2006/main">
+  <p:cSld>
+    <p:spTree>
+      <p:nvGrpSpPr>
+        <p:cNvPr id="1" name=""/>
+        <p:cNvGrpSpPr/>
+        <p:nvPr/>
+      </p:nvGrpSpPr>
+      <p:grpSpPr>
+        <a:xfrm>
+          <a:off x="0" y="0"/>
+          <a:ext cx="0" cy="0"/>
+          <a:chOff x="0" y="0"/>
+          <a:chExt cx="0" cy="0"/>
+        </a:xfrm>
+      </p:grpSpPr>
+      <p:sp>
+        <p:nvSpPr>
           <p:cNvPr id="7" name="Title 6">
             <a:extLst>
               <a:ext uri="{FF2B5EF4-FFF2-40B4-BE49-F238E27FC236}">
@@ -9506,7 +11049,7 @@
           <a:p>
             <a:fld id="{D57F1E4F-1CFF-5643-939E-02111984F565}" type="slidenum">
               <a:rPr lang="en-US" smtClean="0"/>
-              <a:t>30</a:t>
+              <a:t>34</a:t>
             </a:fld>
             <a:endParaRPr lang="en-US" dirty="0"/>
           </a:p>

</xml_diff>

<commit_message>
add globbing, brace expansions, more on redirects
</commit_message>
<xml_diff>
--- a/bash/Introduction to Bash.pptx
+++ b/bash/Introduction to Bash.pptx
@@ -5,7 +5,7 @@
     <p:sldMasterId id="2147483707" r:id="rId1"/>
   </p:sldMasterIdLst>
   <p:notesMasterIdLst>
-    <p:notesMasterId r:id="rId46"/>
+    <p:notesMasterId r:id="rId47"/>
   </p:notesMasterIdLst>
   <p:sldIdLst>
     <p:sldId id="266" r:id="rId2"/>
@@ -22,36 +22,37 @@
     <p:sldId id="279" r:id="rId13"/>
     <p:sldId id="280" r:id="rId14"/>
     <p:sldId id="274" r:id="rId15"/>
-    <p:sldId id="281" r:id="rId16"/>
-    <p:sldId id="282" r:id="rId17"/>
+    <p:sldId id="292" r:id="rId16"/>
+    <p:sldId id="281" r:id="rId17"/>
     <p:sldId id="275" r:id="rId18"/>
     <p:sldId id="283" r:id="rId19"/>
-    <p:sldId id="285" r:id="rId20"/>
-    <p:sldId id="284" r:id="rId21"/>
-    <p:sldId id="286" r:id="rId22"/>
-    <p:sldId id="287" r:id="rId23"/>
-    <p:sldId id="288" r:id="rId24"/>
-    <p:sldId id="289" r:id="rId25"/>
-    <p:sldId id="291" r:id="rId26"/>
-    <p:sldId id="290" r:id="rId27"/>
-    <p:sldId id="293" r:id="rId28"/>
-    <p:sldId id="292" r:id="rId29"/>
-    <p:sldId id="297" r:id="rId30"/>
-    <p:sldId id="298" r:id="rId31"/>
-    <p:sldId id="299" r:id="rId32"/>
-    <p:sldId id="300" r:id="rId33"/>
-    <p:sldId id="303" r:id="rId34"/>
-    <p:sldId id="304" r:id="rId35"/>
-    <p:sldId id="305" r:id="rId36"/>
-    <p:sldId id="306" r:id="rId37"/>
-    <p:sldId id="307" r:id="rId38"/>
-    <p:sldId id="308" r:id="rId39"/>
-    <p:sldId id="309" r:id="rId40"/>
-    <p:sldId id="310" r:id="rId41"/>
-    <p:sldId id="311" r:id="rId42"/>
-    <p:sldId id="295" r:id="rId43"/>
-    <p:sldId id="296" r:id="rId44"/>
-    <p:sldId id="268" r:id="rId45"/>
+    <p:sldId id="312" r:id="rId20"/>
+    <p:sldId id="313" r:id="rId21"/>
+    <p:sldId id="285" r:id="rId22"/>
+    <p:sldId id="284" r:id="rId23"/>
+    <p:sldId id="286" r:id="rId24"/>
+    <p:sldId id="287" r:id="rId25"/>
+    <p:sldId id="288" r:id="rId26"/>
+    <p:sldId id="289" r:id="rId27"/>
+    <p:sldId id="291" r:id="rId28"/>
+    <p:sldId id="290" r:id="rId29"/>
+    <p:sldId id="293" r:id="rId30"/>
+    <p:sldId id="297" r:id="rId31"/>
+    <p:sldId id="298" r:id="rId32"/>
+    <p:sldId id="299" r:id="rId33"/>
+    <p:sldId id="300" r:id="rId34"/>
+    <p:sldId id="303" r:id="rId35"/>
+    <p:sldId id="304" r:id="rId36"/>
+    <p:sldId id="305" r:id="rId37"/>
+    <p:sldId id="306" r:id="rId38"/>
+    <p:sldId id="307" r:id="rId39"/>
+    <p:sldId id="308" r:id="rId40"/>
+    <p:sldId id="309" r:id="rId41"/>
+    <p:sldId id="310" r:id="rId42"/>
+    <p:sldId id="311" r:id="rId43"/>
+    <p:sldId id="295" r:id="rId44"/>
+    <p:sldId id="296" r:id="rId45"/>
+    <p:sldId id="268" r:id="rId46"/>
   </p:sldIdLst>
   <p:sldSz cx="12192000" cy="6858000"/>
   <p:notesSz cx="6858000" cy="9144000"/>
@@ -240,7 +241,7 @@
           <a:p>
             <a:fld id="{D46E3B93-8523-4DBC-8FC5-65A9B9CDE5EE}" type="datetimeFigureOut">
               <a:rPr lang="en-US" smtClean="0"/>
-              <a:t>8/15/2019</a:t>
+              <a:t>8/16/2019</a:t>
             </a:fld>
             <a:endParaRPr lang="en-US"/>
           </a:p>
@@ -636,7 +637,7 @@
           <a:p>
             <a:fld id="{CE8F6EB4-B6EF-44F6-BBD1-CD5E279CFAE2}" type="datetime4">
               <a:rPr lang="en-US" smtClean="0"/>
-              <a:t>August 15, 2019</a:t>
+              <a:t>August 16, 2019</a:t>
             </a:fld>
             <a:endParaRPr lang="en-US" dirty="0"/>
           </a:p>
@@ -808,7 +809,7 @@
           <a:p>
             <a:fld id="{8A405AA7-4C18-4A99-8AAA-8677C1976FC9}" type="datetime4">
               <a:rPr lang="en-US" smtClean="0"/>
-              <a:t>August 15, 2019</a:t>
+              <a:t>August 16, 2019</a:t>
             </a:fld>
             <a:endParaRPr lang="en-US" dirty="0"/>
           </a:p>
@@ -990,7 +991,7 @@
           <a:p>
             <a:fld id="{4EA0D668-33DD-41B9-B668-7E7FF430C345}" type="datetime4">
               <a:rPr lang="en-US" smtClean="0"/>
-              <a:t>August 15, 2019</a:t>
+              <a:t>August 16, 2019</a:t>
             </a:fld>
             <a:endParaRPr lang="en-US" dirty="0"/>
           </a:p>
@@ -1173,7 +1174,7 @@
           <a:p>
             <a:fld id="{8AAE40A0-A7D8-4DC3-BC9E-BADA32DA2004}" type="datetime4">
               <a:rPr lang="en-US" smtClean="0"/>
-              <a:t>August 15, 2019</a:t>
+              <a:t>August 16, 2019</a:t>
             </a:fld>
             <a:endParaRPr lang="en-US" dirty="0"/>
           </a:p>
@@ -1500,7 +1501,7 @@
           <a:p>
             <a:fld id="{B08FEED8-D7D4-44E9-BFBC-ED06B5996D94}" type="datetime4">
               <a:rPr lang="en-US" smtClean="0"/>
-              <a:t>August 15, 2019</a:t>
+              <a:t>August 16, 2019</a:t>
             </a:fld>
             <a:endParaRPr lang="en-US" dirty="0"/>
           </a:p>
@@ -1810,7 +1811,7 @@
           <a:p>
             <a:fld id="{A143C325-9442-4629-8CC6-5CAC69736C93}" type="datetime4">
               <a:rPr lang="en-US" smtClean="0"/>
-              <a:t>August 15, 2019</a:t>
+              <a:t>August 16, 2019</a:t>
             </a:fld>
             <a:endParaRPr lang="en-US" dirty="0"/>
           </a:p>
@@ -2178,7 +2179,7 @@
           <a:p>
             <a:fld id="{EEDAFACB-3FED-4607-9FDD-34A82581A119}" type="datetime4">
               <a:rPr lang="en-US" smtClean="0"/>
-              <a:t>August 15, 2019</a:t>
+              <a:t>August 16, 2019</a:t>
             </a:fld>
             <a:endParaRPr lang="en-US" dirty="0"/>
           </a:p>
@@ -2299,7 +2300,7 @@
           <a:p>
             <a:fld id="{EC2805D6-2E3E-42F7-ABBA-DCD51C704328}" type="datetime4">
               <a:rPr lang="en-US" smtClean="0"/>
-              <a:t>August 15, 2019</a:t>
+              <a:t>August 16, 2019</a:t>
             </a:fld>
             <a:endParaRPr lang="en-US" dirty="0"/>
           </a:p>
@@ -2398,7 +2399,7 @@
           <a:p>
             <a:fld id="{7A745AAB-8888-45FB-8C4E-B86AF9A05200}" type="datetime4">
               <a:rPr lang="en-US" smtClean="0"/>
-              <a:t>August 15, 2019</a:t>
+              <a:t>August 16, 2019</a:t>
             </a:fld>
             <a:endParaRPr lang="en-US" dirty="0"/>
           </a:p>
@@ -2677,7 +2678,7 @@
           <a:p>
             <a:fld id="{9F896CED-8AFA-412F-B61A-472E6093CDBA}" type="datetime4">
               <a:rPr lang="en-US" smtClean="0"/>
-              <a:t>August 15, 2019</a:t>
+              <a:t>August 16, 2019</a:t>
             </a:fld>
             <a:endParaRPr lang="en-US" dirty="0"/>
           </a:p>
@@ -2936,7 +2937,7 @@
           <a:p>
             <a:fld id="{61078AB2-2970-444D-B1FF-A9F37FC020F5}" type="datetime4">
               <a:rPr lang="en-US" smtClean="0"/>
-              <a:t>August 15, 2019</a:t>
+              <a:t>August 16, 2019</a:t>
             </a:fld>
             <a:endParaRPr lang="en-US" dirty="0"/>
           </a:p>
@@ -3154,7 +3155,7 @@
           <a:p>
             <a:fld id="{1148AE1E-D441-45CD-8192-49B13802301D}" type="datetime4">
               <a:rPr lang="en-US" smtClean="0"/>
-              <a:t>August 15, 2019</a:t>
+              <a:t>August 16, 2019</a:t>
             </a:fld>
             <a:endParaRPr lang="en-US" dirty="0"/>
           </a:p>
@@ -3951,7 +3952,7 @@
           <a:p>
             <a:fld id="{B08FEED8-D7D4-44E9-BFBC-ED06B5996D94}" type="datetime4">
               <a:rPr lang="en-US" smtClean="0"/>
-              <a:t>August 15, 2019</a:t>
+              <a:t>August 16, 2019</a:t>
             </a:fld>
             <a:endParaRPr lang="en-US" dirty="0"/>
           </a:p>
@@ -4394,7 +4395,7 @@
           <a:p>
             <a:fld id="{B08FEED8-D7D4-44E9-BFBC-ED06B5996D94}" type="datetime4">
               <a:rPr lang="en-US" smtClean="0"/>
-              <a:t>August 15, 2019</a:t>
+              <a:t>August 16, 2019</a:t>
             </a:fld>
             <a:endParaRPr lang="en-US" dirty="0"/>
           </a:p>
@@ -4876,7 +4877,7 @@
           <a:p>
             <a:fld id="{B08FEED8-D7D4-44E9-BFBC-ED06B5996D94}" type="datetime4">
               <a:rPr lang="en-US" smtClean="0"/>
-              <a:t>August 15, 2019</a:t>
+              <a:t>August 16, 2019</a:t>
             </a:fld>
             <a:endParaRPr lang="en-US" dirty="0"/>
           </a:p>
@@ -5344,7 +5345,7 @@
           <a:p>
             <a:fld id="{B08FEED8-D7D4-44E9-BFBC-ED06B5996D94}" type="datetime4">
               <a:rPr lang="en-US" smtClean="0"/>
-              <a:t>August 15, 2019</a:t>
+              <a:t>August 16, 2019</a:t>
             </a:fld>
             <a:endParaRPr lang="en-US" dirty="0"/>
           </a:p>
@@ -5844,7 +5845,7 @@
           <a:p>
             <a:fld id="{8AAE40A0-A7D8-4DC3-BC9E-BADA32DA2004}" type="datetime4">
               <a:rPr lang="en-US" smtClean="0"/>
-              <a:t>August 15, 2019</a:t>
+              <a:t>August 16, 2019</a:t>
             </a:fld>
             <a:endParaRPr lang="en-US" dirty="0"/>
           </a:p>
@@ -5971,7 +5972,7 @@
           <p:cNvPr id="2" name="Title 1">
             <a:extLst>
               <a:ext uri="{FF2B5EF4-FFF2-40B4-BE49-F238E27FC236}">
-                <a16:creationId xmlns:a16="http://schemas.microsoft.com/office/drawing/2014/main" id="{763619FC-2C00-4A86-9CDA-1BF3459DAC50}"/>
+                <a16:creationId xmlns:a16="http://schemas.microsoft.com/office/drawing/2014/main" id="{98EB4F1B-51B3-4B64-8210-21AE8BE64582}"/>
               </a:ext>
             </a:extLst>
           </p:cNvPr>
@@ -5989,17 +5990,17 @@
           <a:p>
             <a:r>
               <a:rPr lang="en-US" dirty="0"/>
-              <a:t>COLORS</a:t>
-            </a:r>
-          </a:p>
-        </p:txBody>
-      </p:sp>
-      <p:sp>
-        <p:nvSpPr>
-          <p:cNvPr id="3" name="Text Placeholder 2">
-            <a:extLst>
-              <a:ext uri="{FF2B5EF4-FFF2-40B4-BE49-F238E27FC236}">
-                <a16:creationId xmlns:a16="http://schemas.microsoft.com/office/drawing/2014/main" id="{14188AF0-954F-45E0-97B5-73D18A416CC7}"/>
+              <a:t>SPECIAL FILES</a:t>
+            </a:r>
+          </a:p>
+        </p:txBody>
+      </p:sp>
+      <p:sp>
+        <p:nvSpPr>
+          <p:cNvPr id="3" name="Content Placeholder 2">
+            <a:extLst>
+              <a:ext uri="{FF2B5EF4-FFF2-40B4-BE49-F238E27FC236}">
+                <a16:creationId xmlns:a16="http://schemas.microsoft.com/office/drawing/2014/main" id="{593AD591-5DD9-410C-B27F-EACDDF765FF4}"/>
               </a:ext>
             </a:extLst>
           </p:cNvPr>
@@ -6017,18 +6018,77 @@
           <a:p>
             <a:r>
               <a:rPr lang="en-US" dirty="0"/>
-              <a:t>Modern shells have support for colors</a:t>
-            </a:r>
+              <a:t>.</a:t>
+            </a:r>
+            <a:r>
+              <a:rPr lang="en-US" dirty="0" err="1"/>
+              <a:t>bashrc</a:t>
+            </a:r>
+            <a:endParaRPr lang="en-US" dirty="0"/>
           </a:p>
           <a:p>
             <a:pPr lvl="1"/>
             <a:r>
               <a:rPr lang="en-US" dirty="0"/>
-              <a:t>Great for distinguishing between file types (directory versus program versus document)</a:t>
-            </a:r>
-          </a:p>
-          <a:p>
-            <a:endParaRPr lang="en-US" dirty="0"/>
+              <a:t>Run every time you start bash</a:t>
+            </a:r>
+          </a:p>
+          <a:p>
+            <a:pPr lvl="1"/>
+            <a:r>
+              <a:rPr lang="en-US" dirty="0"/>
+              <a:t>Great for configuring global settings</a:t>
+            </a:r>
+          </a:p>
+          <a:p>
+            <a:r>
+              <a:rPr lang="en-US" dirty="0"/>
+              <a:t>.</a:t>
+            </a:r>
+            <a:r>
+              <a:rPr lang="en-US" dirty="0" err="1"/>
+              <a:t>bash_profile</a:t>
+            </a:r>
+            <a:endParaRPr lang="en-US" dirty="0"/>
+          </a:p>
+          <a:p>
+            <a:pPr lvl="1"/>
+            <a:r>
+              <a:rPr lang="en-US" dirty="0"/>
+              <a:t>Run even when you don’t run bash interactively</a:t>
+            </a:r>
+          </a:p>
+          <a:p>
+            <a:pPr lvl="1"/>
+            <a:r>
+              <a:rPr lang="en-US" dirty="0"/>
+              <a:t>Useful for scripts!</a:t>
+            </a:r>
+          </a:p>
+          <a:p>
+            <a:r>
+              <a:rPr lang="en-US" dirty="0"/>
+              <a:t>.</a:t>
+            </a:r>
+            <a:r>
+              <a:rPr lang="en-US" dirty="0" err="1"/>
+              <a:t>bash_history</a:t>
+            </a:r>
+            <a:endParaRPr lang="en-US" dirty="0"/>
+          </a:p>
+          <a:p>
+            <a:pPr lvl="1"/>
+            <a:r>
+              <a:rPr lang="en-US" dirty="0"/>
+              <a:t>Re-run previous commands with arrow keys up/down</a:t>
+            </a:r>
+          </a:p>
+          <a:p>
+            <a:pPr lvl="1"/>
+            <a:r>
+              <a:rPr lang="en-US" dirty="0"/>
+              <a:t>HUGE time saver if you mistype commands</a:t>
+            </a:r>
           </a:p>
         </p:txBody>
       </p:sp>
@@ -6037,7 +6097,7 @@
           <p:cNvPr id="4" name="Date Placeholder 3">
             <a:extLst>
               <a:ext uri="{FF2B5EF4-FFF2-40B4-BE49-F238E27FC236}">
-                <a16:creationId xmlns:a16="http://schemas.microsoft.com/office/drawing/2014/main" id="{6D5133BD-4847-4D49-B5BF-4CC178F8FDB8}"/>
+                <a16:creationId xmlns:a16="http://schemas.microsoft.com/office/drawing/2014/main" id="{17E05AC0-8A63-4FDD-A727-54A8C6040A83}"/>
               </a:ext>
             </a:extLst>
           </p:cNvPr>
@@ -6055,7 +6115,7 @@
           <a:p>
             <a:fld id="{8AAE40A0-A7D8-4DC3-BC9E-BADA32DA2004}" type="datetime4">
               <a:rPr lang="en-US" smtClean="0"/>
-              <a:t>August 15, 2019</a:t>
+              <a:t>August 16, 2019</a:t>
             </a:fld>
             <a:endParaRPr lang="en-US" dirty="0"/>
           </a:p>
@@ -6066,7 +6126,7 @@
           <p:cNvPr id="5" name="Footer Placeholder 4">
             <a:extLst>
               <a:ext uri="{FF2B5EF4-FFF2-40B4-BE49-F238E27FC236}">
-                <a16:creationId xmlns:a16="http://schemas.microsoft.com/office/drawing/2014/main" id="{5963B75A-EC19-4470-9F8C-1E2C1FB85999}"/>
+                <a16:creationId xmlns:a16="http://schemas.microsoft.com/office/drawing/2014/main" id="{9C0CA735-E60F-4094-86F7-D33BB272FA25}"/>
               </a:ext>
             </a:extLst>
           </p:cNvPr>
@@ -6123,7 +6183,7 @@
           <p:cNvPr id="6" name="Slide Number Placeholder 5">
             <a:extLst>
               <a:ext uri="{FF2B5EF4-FFF2-40B4-BE49-F238E27FC236}">
-                <a16:creationId xmlns:a16="http://schemas.microsoft.com/office/drawing/2014/main" id="{BDAB3897-F226-4B28-B7E1-52A0CDB34A2C}"/>
+                <a16:creationId xmlns:a16="http://schemas.microsoft.com/office/drawing/2014/main" id="{33AAFB92-45C0-421A-AC0A-7A439518D3F4}"/>
               </a:ext>
             </a:extLst>
           </p:cNvPr>
@@ -6150,7 +6210,7 @@
     </p:spTree>
     <p:extLst>
       <p:ext uri="{BB962C8B-B14F-4D97-AF65-F5344CB8AC3E}">
-        <p14:creationId xmlns:p14="http://schemas.microsoft.com/office/powerpoint/2010/main" val="2818230357"/>
+        <p14:creationId xmlns:p14="http://schemas.microsoft.com/office/powerpoint/2010/main" val="1466830417"/>
       </p:ext>
     </p:extLst>
   </p:cSld>
@@ -6200,7 +6260,7 @@
           <a:p>
             <a:r>
               <a:rPr lang="en-US" dirty="0"/>
-              <a:t>FONTS</a:t>
+              <a:t>COLORS AND FONTS</a:t>
             </a:r>
           </a:p>
         </p:txBody>
@@ -6229,6 +6289,43 @@
             <a:r>
               <a:rPr lang="en-US" dirty="0"/>
               <a:t>Technically, a feature of your terminal emulator, not the terminal itself</a:t>
+            </a:r>
+          </a:p>
+          <a:p>
+            <a:pPr lvl="1"/>
+            <a:r>
+              <a:rPr lang="en-US" dirty="0"/>
+              <a:t>Terminal emulator is basically just the window running the shell and allowing input</a:t>
+            </a:r>
+          </a:p>
+          <a:p>
+            <a:r>
+              <a:rPr lang="en-US" dirty="0"/>
+              <a:t>Modern shells have support for colors</a:t>
+            </a:r>
+          </a:p>
+          <a:p>
+            <a:pPr lvl="1"/>
+            <a:r>
+              <a:rPr lang="en-US" dirty="0"/>
+              <a:t>Great for distinguishing between file types (directory versus program versus document)</a:t>
+            </a:r>
+          </a:p>
+          <a:p>
+            <a:pPr lvl="1"/>
+            <a:r>
+              <a:rPr lang="en-US" dirty="0"/>
+              <a:t>Check out </a:t>
+            </a:r>
+            <a:r>
+              <a:rPr lang="en-US" dirty="0">
+                <a:hlinkClick r:id="rId2"/>
+              </a:rPr>
+              <a:t>https://misc.flogisoft.com/bash/tip_colors_and_formatting/</a:t>
+            </a:r>
+            <a:r>
+              <a:rPr lang="en-US" dirty="0"/>
+              <a:t> for instructions!</a:t>
             </a:r>
           </a:p>
           <a:p>
@@ -6259,7 +6356,7 @@
           <a:p>
             <a:fld id="{8AAE40A0-A7D8-4DC3-BC9E-BADA32DA2004}" type="datetime4">
               <a:rPr lang="en-US" smtClean="0"/>
-              <a:t>August 15, 2019</a:t>
+              <a:t>August 16, 2019</a:t>
             </a:fld>
             <a:endParaRPr lang="en-US" dirty="0"/>
           </a:p>
@@ -6354,7 +6451,7 @@
     </p:spTree>
     <p:extLst>
       <p:ext uri="{BB962C8B-B14F-4D97-AF65-F5344CB8AC3E}">
-        <p14:creationId xmlns:p14="http://schemas.microsoft.com/office/powerpoint/2010/main" val="2923682881"/>
+        <p14:creationId xmlns:p14="http://schemas.microsoft.com/office/powerpoint/2010/main" val="2818230357"/>
       </p:ext>
     </p:extLst>
   </p:cSld>
@@ -6436,6 +6533,61 @@
             </a:r>
           </a:p>
           <a:p>
+            <a:r>
+              <a:rPr lang="en-US" dirty="0"/>
+              <a:t>If you want to customize what information shows in your prompt, open up your </a:t>
+            </a:r>
+            <a:r>
+              <a:rPr lang="en-US" dirty="0">
+                <a:latin typeface="Courier New" panose="02070309020205020404" pitchFamily="49" charset="0"/>
+                <a:cs typeface="Courier New" panose="02070309020205020404" pitchFamily="49" charset="0"/>
+              </a:rPr>
+              <a:t>~/.</a:t>
+            </a:r>
+            <a:r>
+              <a:rPr lang="en-US" dirty="0" err="1">
+                <a:latin typeface="Courier New" panose="02070309020205020404" pitchFamily="49" charset="0"/>
+                <a:cs typeface="Courier New" panose="02070309020205020404" pitchFamily="49" charset="0"/>
+              </a:rPr>
+              <a:t>bashrc</a:t>
+            </a:r>
+            <a:r>
+              <a:rPr lang="en-US" dirty="0">
+                <a:latin typeface="Courier New" panose="02070309020205020404" pitchFamily="49" charset="0"/>
+                <a:cs typeface="Courier New" panose="02070309020205020404" pitchFamily="49" charset="0"/>
+              </a:rPr>
+              <a:t> </a:t>
+            </a:r>
+            <a:r>
+              <a:rPr lang="en-US" dirty="0"/>
+              <a:t>file and change things</a:t>
+            </a:r>
+          </a:p>
+          <a:p>
+            <a:pPr lvl="1"/>
+            <a:r>
+              <a:rPr lang="en-US" dirty="0"/>
+              <a:t>Remember to enclose formatting characters in </a:t>
+            </a:r>
+            <a:r>
+              <a:rPr lang="en-US" sz="2800" dirty="0">
+                <a:latin typeface="Courier New" panose="02070309020205020404" pitchFamily="49" charset="0"/>
+                <a:cs typeface="Courier New" panose="02070309020205020404" pitchFamily="49" charset="0"/>
+              </a:rPr>
+              <a:t>\[ \]!</a:t>
+            </a:r>
+          </a:p>
+          <a:p>
+            <a:pPr lvl="1"/>
+            <a:endParaRPr lang="en-US" sz="2800" dirty="0">
+              <a:latin typeface="Courier New" panose="02070309020205020404" pitchFamily="49" charset="0"/>
+              <a:cs typeface="Courier New" panose="02070309020205020404" pitchFamily="49" charset="0"/>
+            </a:endParaRPr>
+          </a:p>
+          <a:p>
+            <a:endParaRPr lang="en-US" dirty="0"/>
+          </a:p>
+          <a:p>
             <a:endParaRPr lang="en-US" dirty="0"/>
           </a:p>
         </p:txBody>
@@ -6463,7 +6615,7 @@
           <a:p>
             <a:fld id="{8AAE40A0-A7D8-4DC3-BC9E-BADA32DA2004}" type="datetime4">
               <a:rPr lang="en-US" smtClean="0"/>
-              <a:t>August 15, 2019</a:t>
+              <a:t>August 16, 2019</a:t>
             </a:fld>
             <a:endParaRPr lang="en-US" dirty="0"/>
           </a:p>
@@ -6640,7 +6792,15 @@
             </a:r>
             <a:r>
               <a:rPr lang="en-US" dirty="0"/>
-              <a:t> communication, signals, jobs, and more</a:t>
+              <a:t> communication, signals, jobs, </a:t>
+            </a:r>
+            <a:r>
+              <a:rPr lang="en-US" dirty="0" err="1"/>
+              <a:t>globbing</a:t>
+            </a:r>
+            <a:r>
+              <a:rPr lang="en-US" dirty="0"/>
+              <a:t>, and more</a:t>
             </a:r>
           </a:p>
         </p:txBody>
@@ -6668,7 +6828,7 @@
           <a:p>
             <a:fld id="{8AAE40A0-A7D8-4DC3-BC9E-BADA32DA2004}" type="datetime4">
               <a:rPr lang="en-US" smtClean="0"/>
-              <a:t>August 15, 2019</a:t>
+              <a:t>August 16, 2019</a:t>
             </a:fld>
             <a:endParaRPr lang="en-US" dirty="0"/>
           </a:p>
@@ -6813,7 +6973,7 @@
           <a:p>
             <a:r>
               <a:rPr lang="en-US" dirty="0"/>
-              <a:t>INPUT AND OUTPUT</a:t>
+              <a:t>GLOBBING</a:t>
             </a:r>
           </a:p>
         </p:txBody>
@@ -6841,38 +7001,27 @@
           <a:p>
             <a:r>
               <a:rPr lang="en-US" dirty="0"/>
-              <a:t>3 separate input/output streams</a:t>
+              <a:t>A way to match files effectively</a:t>
+            </a:r>
+          </a:p>
+          <a:p>
+            <a:r>
+              <a:rPr lang="en-US" dirty="0"/>
+              <a:t>More powerful ways to do this exist called regular expressions</a:t>
             </a:r>
           </a:p>
           <a:p>
             <a:pPr lvl="1"/>
             <a:r>
               <a:rPr lang="en-US" dirty="0"/>
-              <a:t>Standard Output</a:t>
-            </a:r>
-          </a:p>
-          <a:p>
-            <a:pPr lvl="1"/>
-            <a:r>
-              <a:rPr lang="en-US" dirty="0"/>
-              <a:t>Standard Input</a:t>
-            </a:r>
-          </a:p>
-          <a:p>
-            <a:pPr lvl="1"/>
-            <a:r>
-              <a:rPr lang="en-US" dirty="0"/>
-              <a:t>Standard Error</a:t>
-            </a:r>
-          </a:p>
-          <a:p>
-            <a:r>
-              <a:rPr lang="en-US" dirty="0"/>
-              <a:t>Redirection</a:t>
-            </a:r>
-          </a:p>
-          <a:p>
-            <a:endParaRPr lang="en-US" dirty="0"/>
+              <a:t>We’ll cover these very briefly later</a:t>
+            </a:r>
+          </a:p>
+          <a:p>
+            <a:r>
+              <a:rPr lang="en-US" dirty="0"/>
+              <a:t>*</a:t>
+            </a:r>
           </a:p>
         </p:txBody>
       </p:sp>
@@ -6899,7 +7048,7 @@
           <a:p>
             <a:fld id="{8AAE40A0-A7D8-4DC3-BC9E-BADA32DA2004}" type="datetime4">
               <a:rPr lang="en-US" smtClean="0"/>
-              <a:t>August 15, 2019</a:t>
+              <a:t>August 16, 2019</a:t>
             </a:fld>
             <a:endParaRPr lang="en-US" dirty="0"/>
           </a:p>
@@ -6994,7 +7143,7 @@
     </p:spTree>
     <p:extLst>
       <p:ext uri="{BB962C8B-B14F-4D97-AF65-F5344CB8AC3E}">
-        <p14:creationId xmlns:p14="http://schemas.microsoft.com/office/powerpoint/2010/main" val="98178358"/>
+        <p14:creationId xmlns:p14="http://schemas.microsoft.com/office/powerpoint/2010/main" val="39492658"/>
       </p:ext>
     </p:extLst>
   </p:cSld>
@@ -7102,7 +7251,7 @@
             <a:fld id="{8AAE40A0-A7D8-4DC3-BC9E-BADA32DA2004}" type="datetime4">
               <a:rPr lang="en-US" smtClean="0"/>
               <a:pPr/>
-              <a:t>August 15, 2019</a:t>
+              <a:t>August 16, 2019</a:t>
             </a:fld>
             <a:endParaRPr lang="en-US" dirty="0"/>
           </a:p>
@@ -7437,7 +7586,7 @@
           <a:p>
             <a:r>
               <a:rPr lang="en-US" dirty="0"/>
-              <a:t>PIPES</a:t>
+              <a:t>BRACE EXPANSIONS</a:t>
             </a:r>
           </a:p>
         </p:txBody>
@@ -7465,8 +7614,40 @@
           <a:p>
             <a:r>
               <a:rPr lang="en-US" dirty="0"/>
-              <a:t>Sending output to a different program</a:t>
-            </a:r>
+              <a:t>Essentially giving options</a:t>
+            </a:r>
+          </a:p>
+          <a:p>
+            <a:r>
+              <a:rPr lang="en-US" dirty="0">
+                <a:latin typeface="Courier New" panose="02070309020205020404" pitchFamily="49" charset="0"/>
+                <a:cs typeface="Courier New" panose="02070309020205020404" pitchFamily="49" charset="0"/>
+              </a:rPr>
+              <a:t>d{</a:t>
+            </a:r>
+            <a:r>
+              <a:rPr lang="en-US" dirty="0" err="1">
+                <a:latin typeface="Courier New" panose="02070309020205020404" pitchFamily="49" charset="0"/>
+                <a:cs typeface="Courier New" panose="02070309020205020404" pitchFamily="49" charset="0"/>
+              </a:rPr>
+              <a:t>o,u,ou</a:t>
+            </a:r>
+            <a:r>
+              <a:rPr lang="en-US" dirty="0">
+                <a:latin typeface="Courier New" panose="02070309020205020404" pitchFamily="49" charset="0"/>
+                <a:cs typeface="Courier New" panose="02070309020205020404" pitchFamily="49" charset="0"/>
+              </a:rPr>
+              <a:t>}g</a:t>
+            </a:r>
+            <a:r>
+              <a:rPr lang="en-US" dirty="0"/>
+              <a:t> means dog, dug, </a:t>
+            </a:r>
+            <a:r>
+              <a:rPr lang="en-US" dirty="0" err="1"/>
+              <a:t>doug</a:t>
+            </a:r>
+            <a:endParaRPr lang="en-US" dirty="0"/>
           </a:p>
           <a:p>
             <a:endParaRPr lang="en-US" dirty="0"/>
@@ -7496,7 +7677,7 @@
           <a:p>
             <a:fld id="{8AAE40A0-A7D8-4DC3-BC9E-BADA32DA2004}" type="datetime4">
               <a:rPr lang="en-US" smtClean="0"/>
-              <a:t>August 15, 2019</a:t>
+              <a:t>August 16, 2019</a:t>
             </a:fld>
             <a:endParaRPr lang="en-US" dirty="0"/>
           </a:p>
@@ -7591,7 +7772,7 @@
     </p:spTree>
     <p:extLst>
       <p:ext uri="{BB962C8B-B14F-4D97-AF65-F5344CB8AC3E}">
-        <p14:creationId xmlns:p14="http://schemas.microsoft.com/office/powerpoint/2010/main" val="4096482738"/>
+        <p14:creationId xmlns:p14="http://schemas.microsoft.com/office/powerpoint/2010/main" val="702090128"/>
       </p:ext>
     </p:extLst>
   </p:cSld>
@@ -7641,7 +7822,7 @@
           <a:p>
             <a:r>
               <a:rPr lang="en-US" dirty="0"/>
-              <a:t>VARIABLES</a:t>
+              <a:t>INPUT AND OUTPUT</a:t>
             </a:r>
           </a:p>
         </p:txBody>
@@ -7669,13 +7850,127 @@
           <a:p>
             <a:r>
               <a:rPr lang="en-US" dirty="0"/>
-              <a:t>Can name pieces of information and refer to them </a:t>
+              <a:t>3 separate input/output streams</a:t>
+            </a:r>
+          </a:p>
+          <a:p>
+            <a:pPr lvl="1"/>
+            <a:r>
+              <a:rPr lang="en-US" dirty="0"/>
+              <a:t>Standard Output (</a:t>
             </a:r>
             <a:r>
               <a:rPr lang="en-US" dirty="0" err="1"/>
-              <a:t>laters</a:t>
-            </a:r>
-            <a:endParaRPr lang="en-US" dirty="0"/>
+              <a:t>stdout</a:t>
+            </a:r>
+            <a:r>
+              <a:rPr lang="en-US" dirty="0"/>
+              <a:t>)</a:t>
+            </a:r>
+          </a:p>
+          <a:p>
+            <a:pPr lvl="1"/>
+            <a:r>
+              <a:rPr lang="en-US" dirty="0"/>
+              <a:t>Standard Input (stdin)</a:t>
+            </a:r>
+          </a:p>
+          <a:p>
+            <a:pPr lvl="1"/>
+            <a:r>
+              <a:rPr lang="en-US" dirty="0"/>
+              <a:t>Standard Error (stderr)</a:t>
+            </a:r>
+          </a:p>
+          <a:p>
+            <a:r>
+              <a:rPr lang="en-US" dirty="0"/>
+              <a:t>Redirection</a:t>
+            </a:r>
+          </a:p>
+          <a:p>
+            <a:pPr lvl="1"/>
+            <a:r>
+              <a:rPr lang="en-US" dirty="0"/>
+              <a:t>Input: </a:t>
+            </a:r>
+            <a:r>
+              <a:rPr lang="en-US" dirty="0">
+                <a:latin typeface="Courier New" panose="02070309020205020404" pitchFamily="49" charset="0"/>
+                <a:cs typeface="Courier New" panose="02070309020205020404" pitchFamily="49" charset="0"/>
+              </a:rPr>
+              <a:t>&lt; </a:t>
+            </a:r>
+            <a:r>
+              <a:rPr lang="en-US" i="1" dirty="0">
+                <a:latin typeface="Courier New" panose="02070309020205020404" pitchFamily="49" charset="0"/>
+                <a:cs typeface="Courier New" panose="02070309020205020404" pitchFamily="49" charset="0"/>
+              </a:rPr>
+              <a:t>file</a:t>
+            </a:r>
+          </a:p>
+          <a:p>
+            <a:pPr lvl="1"/>
+            <a:r>
+              <a:rPr lang="en-US" dirty="0"/>
+              <a:t>Standard Output: </a:t>
+            </a:r>
+            <a:r>
+              <a:rPr lang="en-US" dirty="0">
+                <a:latin typeface="Courier New" panose="02070309020205020404" pitchFamily="49" charset="0"/>
+                <a:cs typeface="Courier New" panose="02070309020205020404" pitchFamily="49" charset="0"/>
+              </a:rPr>
+              <a:t>&gt; </a:t>
+            </a:r>
+            <a:r>
+              <a:rPr lang="en-US" i="1" dirty="0">
+                <a:latin typeface="Courier New" panose="02070309020205020404" pitchFamily="49" charset="0"/>
+                <a:cs typeface="Courier New" panose="02070309020205020404" pitchFamily="49" charset="0"/>
+              </a:rPr>
+              <a:t>file</a:t>
+            </a:r>
+          </a:p>
+          <a:p>
+            <a:pPr lvl="1"/>
+            <a:r>
+              <a:rPr lang="en-US" dirty="0"/>
+              <a:t>Standard Error: </a:t>
+            </a:r>
+            <a:r>
+              <a:rPr lang="en-US" dirty="0">
+                <a:latin typeface="Courier New" panose="02070309020205020404" pitchFamily="49" charset="0"/>
+                <a:cs typeface="Courier New" panose="02070309020205020404" pitchFamily="49" charset="0"/>
+              </a:rPr>
+              <a:t>2&gt; </a:t>
+            </a:r>
+            <a:r>
+              <a:rPr lang="en-US" i="1" dirty="0">
+                <a:latin typeface="Courier New" panose="02070309020205020404" pitchFamily="49" charset="0"/>
+                <a:cs typeface="Courier New" panose="02070309020205020404" pitchFamily="49" charset="0"/>
+              </a:rPr>
+              <a:t>file</a:t>
+            </a:r>
+          </a:p>
+          <a:p>
+            <a:pPr lvl="1"/>
+            <a:r>
+              <a:rPr lang="en-US" dirty="0"/>
+              <a:t>Standard Output and Error: </a:t>
+            </a:r>
+            <a:r>
+              <a:rPr lang="en-US" dirty="0">
+                <a:latin typeface="Courier New" panose="02070309020205020404" pitchFamily="49" charset="0"/>
+                <a:cs typeface="Courier New" panose="02070309020205020404" pitchFamily="49" charset="0"/>
+              </a:rPr>
+              <a:t>&amp;&gt; </a:t>
+            </a:r>
+            <a:r>
+              <a:rPr lang="en-US" i="1" dirty="0">
+                <a:latin typeface="Courier New" panose="02070309020205020404" pitchFamily="49" charset="0"/>
+                <a:cs typeface="Courier New" panose="02070309020205020404" pitchFamily="49" charset="0"/>
+              </a:rPr>
+              <a:t>file</a:t>
+            </a:r>
           </a:p>
           <a:p>
             <a:endParaRPr lang="en-US" dirty="0"/>
@@ -7705,7 +8000,7 @@
           <a:p>
             <a:fld id="{8AAE40A0-A7D8-4DC3-BC9E-BADA32DA2004}" type="datetime4">
               <a:rPr lang="en-US" smtClean="0"/>
-              <a:t>August 15, 2019</a:t>
+              <a:t>August 16, 2019</a:t>
             </a:fld>
             <a:endParaRPr lang="en-US" dirty="0"/>
           </a:p>
@@ -7800,7 +8095,7 @@
     </p:spTree>
     <p:extLst>
       <p:ext uri="{BB962C8B-B14F-4D97-AF65-F5344CB8AC3E}">
-        <p14:creationId xmlns:p14="http://schemas.microsoft.com/office/powerpoint/2010/main" val="3531683742"/>
+        <p14:creationId xmlns:p14="http://schemas.microsoft.com/office/powerpoint/2010/main" val="98178358"/>
       </p:ext>
     </p:extLst>
   </p:cSld>
@@ -7850,7 +8145,7 @@
           <a:p>
             <a:r>
               <a:rPr lang="en-US" dirty="0"/>
-              <a:t>IF STATEMENTS</a:t>
+              <a:t>PIPES</a:t>
             </a:r>
           </a:p>
         </p:txBody>
@@ -7878,7 +8173,32 @@
           <a:p>
             <a:r>
               <a:rPr lang="en-US" dirty="0"/>
-              <a:t>Conditionals:</a:t>
+              <a:t>Sending output to a different program</a:t>
+            </a:r>
+          </a:p>
+          <a:p>
+            <a:r>
+              <a:rPr lang="en-US" dirty="0"/>
+              <a:t>By default, only </a:t>
+            </a:r>
+            <a:r>
+              <a:rPr lang="en-US" dirty="0" err="1"/>
+              <a:t>stdout</a:t>
+            </a:r>
+            <a:endParaRPr lang="en-US" dirty="0"/>
+          </a:p>
+          <a:p>
+            <a:pPr lvl="1"/>
+            <a:r>
+              <a:rPr lang="en-US" dirty="0"/>
+              <a:t>Can pipe stderr with </a:t>
+            </a:r>
+            <a:r>
+              <a:rPr lang="en-US" dirty="0">
+                <a:latin typeface="Courier New" panose="02070309020205020404" pitchFamily="49" charset="0"/>
+                <a:cs typeface="Courier New" panose="02070309020205020404" pitchFamily="49" charset="0"/>
+              </a:rPr>
+              <a:t>|&amp;</a:t>
             </a:r>
           </a:p>
           <a:p>
@@ -7909,7 +8229,7 @@
           <a:p>
             <a:fld id="{8AAE40A0-A7D8-4DC3-BC9E-BADA32DA2004}" type="datetime4">
               <a:rPr lang="en-US" smtClean="0"/>
-              <a:t>August 15, 2019</a:t>
+              <a:t>August 16, 2019</a:t>
             </a:fld>
             <a:endParaRPr lang="en-US" dirty="0"/>
           </a:p>
@@ -8004,7 +8324,7 @@
     </p:spTree>
     <p:extLst>
       <p:ext uri="{BB962C8B-B14F-4D97-AF65-F5344CB8AC3E}">
-        <p14:creationId xmlns:p14="http://schemas.microsoft.com/office/powerpoint/2010/main" val="3349014258"/>
+        <p14:creationId xmlns:p14="http://schemas.microsoft.com/office/powerpoint/2010/main" val="4096482738"/>
       </p:ext>
     </p:extLst>
   </p:cSld>
@@ -8054,7 +8374,7 @@
           <a:p>
             <a:r>
               <a:rPr lang="en-US" dirty="0"/>
-              <a:t>FOR LOOPS</a:t>
+              <a:t>VARIABLES</a:t>
             </a:r>
           </a:p>
         </p:txBody>
@@ -8082,14 +8402,13 @@
           <a:p>
             <a:r>
               <a:rPr lang="en-US" dirty="0"/>
-              <a:t>Good for ranges of values (i.e. a-z, 0-9)</a:t>
-            </a:r>
-          </a:p>
-          <a:p>
-            <a:r>
-              <a:rPr lang="en-US" dirty="0"/>
-              <a:t>Or, for lists of values (“cat”, “dog”, “frog”)</a:t>
-            </a:r>
+              <a:t>Can name pieces of information and refer to them </a:t>
+            </a:r>
+            <a:r>
+              <a:rPr lang="en-US" dirty="0" err="1"/>
+              <a:t>laters</a:t>
+            </a:r>
+            <a:endParaRPr lang="en-US" dirty="0"/>
           </a:p>
           <a:p>
             <a:endParaRPr lang="en-US" dirty="0"/>
@@ -8119,7 +8438,7 @@
           <a:p>
             <a:fld id="{8AAE40A0-A7D8-4DC3-BC9E-BADA32DA2004}" type="datetime4">
               <a:rPr lang="en-US" smtClean="0"/>
-              <a:t>August 15, 2019</a:t>
+              <a:t>August 16, 2019</a:t>
             </a:fld>
             <a:endParaRPr lang="en-US" dirty="0"/>
           </a:p>
@@ -8214,7 +8533,7 @@
     </p:spTree>
     <p:extLst>
       <p:ext uri="{BB962C8B-B14F-4D97-AF65-F5344CB8AC3E}">
-        <p14:creationId xmlns:p14="http://schemas.microsoft.com/office/powerpoint/2010/main" val="3700336351"/>
+        <p14:creationId xmlns:p14="http://schemas.microsoft.com/office/powerpoint/2010/main" val="3531683742"/>
       </p:ext>
     </p:extLst>
   </p:cSld>
@@ -8264,7 +8583,7 @@
           <a:p>
             <a:r>
               <a:rPr lang="en-US" dirty="0"/>
-              <a:t>WHILE LOOPS</a:t>
+              <a:t>IF STATEMENTS</a:t>
             </a:r>
           </a:p>
         </p:txBody>
@@ -8292,7 +8611,7 @@
           <a:p>
             <a:r>
               <a:rPr lang="en-US" dirty="0"/>
-              <a:t>Do something over and over, until the condition is false</a:t>
+              <a:t>Conditionals:</a:t>
             </a:r>
           </a:p>
           <a:p>
@@ -8323,7 +8642,7 @@
           <a:p>
             <a:fld id="{8AAE40A0-A7D8-4DC3-BC9E-BADA32DA2004}" type="datetime4">
               <a:rPr lang="en-US" smtClean="0"/>
-              <a:t>August 15, 2019</a:t>
+              <a:t>August 16, 2019</a:t>
             </a:fld>
             <a:endParaRPr lang="en-US" dirty="0"/>
           </a:p>
@@ -8418,7 +8737,7 @@
     </p:spTree>
     <p:extLst>
       <p:ext uri="{BB962C8B-B14F-4D97-AF65-F5344CB8AC3E}">
-        <p14:creationId xmlns:p14="http://schemas.microsoft.com/office/powerpoint/2010/main" val="1249293789"/>
+        <p14:creationId xmlns:p14="http://schemas.microsoft.com/office/powerpoint/2010/main" val="3349014258"/>
       </p:ext>
     </p:extLst>
   </p:cSld>
@@ -8468,7 +8787,7 @@
           <a:p>
             <a:r>
               <a:rPr lang="en-US" dirty="0"/>
-              <a:t>JOBS</a:t>
+              <a:t>FOR LOOPS</a:t>
             </a:r>
           </a:p>
         </p:txBody>
@@ -8496,31 +8815,17 @@
           <a:p>
             <a:r>
               <a:rPr lang="en-US" dirty="0"/>
-              <a:t>Multiple processes can be running in the shell at the same time</a:t>
-            </a:r>
-          </a:p>
-          <a:p>
-            <a:r>
-              <a:rPr lang="en-US" dirty="0"/>
-              <a:t>Start a job in the background by ending the line with &amp;</a:t>
-            </a:r>
-          </a:p>
-          <a:p>
-            <a:r>
-              <a:rPr lang="en-US" dirty="0"/>
-              <a:t>Switch it back to foreground with </a:t>
-            </a:r>
-            <a:r>
-              <a:rPr lang="en-US" dirty="0" err="1"/>
-              <a:t>fg</a:t>
-            </a:r>
-            <a:endParaRPr lang="en-US" dirty="0"/>
-          </a:p>
-          <a:p>
-            <a:r>
-              <a:rPr lang="en-US" dirty="0"/>
-              <a:t>Great for long running processes</a:t>
-            </a:r>
+              <a:t>Good for ranges of values (i.e. a-z, 0-9)</a:t>
+            </a:r>
+          </a:p>
+          <a:p>
+            <a:r>
+              <a:rPr lang="en-US" dirty="0"/>
+              <a:t>Or, for lists of values (“cat”, “dog”, “frog”)</a:t>
+            </a:r>
+          </a:p>
+          <a:p>
+            <a:endParaRPr lang="en-US" dirty="0"/>
           </a:p>
         </p:txBody>
       </p:sp>
@@ -8547,7 +8852,7 @@
           <a:p>
             <a:fld id="{8AAE40A0-A7D8-4DC3-BC9E-BADA32DA2004}" type="datetime4">
               <a:rPr lang="en-US" smtClean="0"/>
-              <a:t>August 15, 2019</a:t>
+              <a:t>August 16, 2019</a:t>
             </a:fld>
             <a:endParaRPr lang="en-US" dirty="0"/>
           </a:p>
@@ -8642,7 +8947,7 @@
     </p:spTree>
     <p:extLst>
       <p:ext uri="{BB962C8B-B14F-4D97-AF65-F5344CB8AC3E}">
-        <p14:creationId xmlns:p14="http://schemas.microsoft.com/office/powerpoint/2010/main" val="4077320852"/>
+        <p14:creationId xmlns:p14="http://schemas.microsoft.com/office/powerpoint/2010/main" val="3700336351"/>
       </p:ext>
     </p:extLst>
   </p:cSld>
@@ -8692,7 +8997,7 @@
           <a:p>
             <a:r>
               <a:rPr lang="en-US" dirty="0"/>
-              <a:t>SIGNALS</a:t>
+              <a:t>WHILE LOOPS</a:t>
             </a:r>
           </a:p>
         </p:txBody>
@@ -8719,27 +9024,9 @@
           <a:lstStyle/>
           <a:p>
             <a:r>
-              <a:rPr lang="en-US" dirty="0" err="1"/>
-              <a:t>Ctrl+D</a:t>
-            </a:r>
-            <a:endParaRPr lang="en-US" dirty="0"/>
-          </a:p>
-          <a:p>
-            <a:r>
-              <a:rPr lang="en-US" dirty="0" err="1"/>
-              <a:t>Ctrl+C</a:t>
-            </a:r>
-            <a:endParaRPr lang="en-US" dirty="0"/>
-          </a:p>
-          <a:p>
-            <a:r>
-              <a:rPr lang="en-US" dirty="0" err="1"/>
-              <a:t>Ctrl+Z</a:t>
-            </a:r>
-            <a:endParaRPr lang="en-US" dirty="0"/>
-          </a:p>
-          <a:p>
-            <a:endParaRPr lang="en-US" dirty="0"/>
+              <a:rPr lang="en-US" dirty="0"/>
+              <a:t>Do something over and over, until the condition is false</a:t>
+            </a:r>
           </a:p>
           <a:p>
             <a:endParaRPr lang="en-US" dirty="0"/>
@@ -8769,7 +9056,7 @@
           <a:p>
             <a:fld id="{8AAE40A0-A7D8-4DC3-BC9E-BADA32DA2004}" type="datetime4">
               <a:rPr lang="en-US" smtClean="0"/>
-              <a:t>August 15, 2019</a:t>
+              <a:t>August 16, 2019</a:t>
             </a:fld>
             <a:endParaRPr lang="en-US" dirty="0"/>
           </a:p>
@@ -8864,7 +9151,7 @@
     </p:spTree>
     <p:extLst>
       <p:ext uri="{BB962C8B-B14F-4D97-AF65-F5344CB8AC3E}">
-        <p14:creationId xmlns:p14="http://schemas.microsoft.com/office/powerpoint/2010/main" val="1683568060"/>
+        <p14:creationId xmlns:p14="http://schemas.microsoft.com/office/powerpoint/2010/main" val="1249293789"/>
       </p:ext>
     </p:extLst>
   </p:cSld>
@@ -8914,7 +9201,7 @@
           <a:p>
             <a:r>
               <a:rPr lang="en-US" dirty="0"/>
-              <a:t>ALIASES</a:t>
+              <a:t>JOBS</a:t>
             </a:r>
           </a:p>
         </p:txBody>
@@ -8942,14 +9229,44 @@
           <a:p>
             <a:r>
               <a:rPr lang="en-US" dirty="0"/>
-              <a:t>Handy shortcuts for long commands with lots of arguments</a:t>
-            </a:r>
-          </a:p>
-          <a:p>
-            <a:endParaRPr lang="en-US" dirty="0"/>
-          </a:p>
-          <a:p>
-            <a:endParaRPr lang="en-US" dirty="0"/>
+              <a:t>Multiple processes can be running in the shell at the same time</a:t>
+            </a:r>
+          </a:p>
+          <a:p>
+            <a:r>
+              <a:rPr lang="en-US" dirty="0"/>
+              <a:t>Start a job in the background by ending the line with </a:t>
+            </a:r>
+            <a:r>
+              <a:rPr lang="en-US" sz="2400" dirty="0">
+                <a:latin typeface="Courier New" panose="02070309020205020404" pitchFamily="49" charset="0"/>
+                <a:cs typeface="Courier New" panose="02070309020205020404" pitchFamily="49" charset="0"/>
+              </a:rPr>
+              <a:t>&amp;</a:t>
+            </a:r>
+          </a:p>
+          <a:p>
+            <a:r>
+              <a:rPr lang="en-US" dirty="0"/>
+              <a:t>Switch it back to foreground with </a:t>
+            </a:r>
+            <a:r>
+              <a:rPr lang="en-US" sz="2400" dirty="0" err="1">
+                <a:latin typeface="Courier New" panose="02070309020205020404" pitchFamily="49" charset="0"/>
+                <a:cs typeface="Courier New" panose="02070309020205020404" pitchFamily="49" charset="0"/>
+              </a:rPr>
+              <a:t>fg</a:t>
+            </a:r>
+            <a:endParaRPr lang="en-US" sz="2400" dirty="0">
+              <a:latin typeface="Courier New" panose="02070309020205020404" pitchFamily="49" charset="0"/>
+              <a:cs typeface="Courier New" panose="02070309020205020404" pitchFamily="49" charset="0"/>
+            </a:endParaRPr>
+          </a:p>
+          <a:p>
+            <a:r>
+              <a:rPr lang="en-US" dirty="0"/>
+              <a:t>Great for long running processes</a:t>
+            </a:r>
           </a:p>
         </p:txBody>
       </p:sp>
@@ -8976,7 +9293,7 @@
           <a:p>
             <a:fld id="{8AAE40A0-A7D8-4DC3-BC9E-BADA32DA2004}" type="datetime4">
               <a:rPr lang="en-US" smtClean="0"/>
-              <a:t>August 15, 2019</a:t>
+              <a:t>August 16, 2019</a:t>
             </a:fld>
             <a:endParaRPr lang="en-US" dirty="0"/>
           </a:p>
@@ -9071,7 +9388,7 @@
     </p:spTree>
     <p:extLst>
       <p:ext uri="{BB962C8B-B14F-4D97-AF65-F5344CB8AC3E}">
-        <p14:creationId xmlns:p14="http://schemas.microsoft.com/office/powerpoint/2010/main" val="3102884327"/>
+        <p14:creationId xmlns:p14="http://schemas.microsoft.com/office/powerpoint/2010/main" val="4077320852"/>
       </p:ext>
     </p:extLst>
   </p:cSld>
@@ -9103,7 +9420,7 @@
           <p:cNvPr id="2" name="Title 1">
             <a:extLst>
               <a:ext uri="{FF2B5EF4-FFF2-40B4-BE49-F238E27FC236}">
-                <a16:creationId xmlns:a16="http://schemas.microsoft.com/office/drawing/2014/main" id="{98EB4F1B-51B3-4B64-8210-21AE8BE64582}"/>
+                <a16:creationId xmlns:a16="http://schemas.microsoft.com/office/drawing/2014/main" id="{763619FC-2C00-4A86-9CDA-1BF3459DAC50}"/>
               </a:ext>
             </a:extLst>
           </p:cNvPr>
@@ -9121,17 +9438,17 @@
           <a:p>
             <a:r>
               <a:rPr lang="en-US" dirty="0"/>
-              <a:t>SPECIAL FILES</a:t>
-            </a:r>
-          </a:p>
-        </p:txBody>
-      </p:sp>
-      <p:sp>
-        <p:nvSpPr>
-          <p:cNvPr id="3" name="Content Placeholder 2">
-            <a:extLst>
-              <a:ext uri="{FF2B5EF4-FFF2-40B4-BE49-F238E27FC236}">
-                <a16:creationId xmlns:a16="http://schemas.microsoft.com/office/drawing/2014/main" id="{593AD591-5DD9-410C-B27F-EACDDF765FF4}"/>
+              <a:t>SIGNALS</a:t>
+            </a:r>
+          </a:p>
+        </p:txBody>
+      </p:sp>
+      <p:sp>
+        <p:nvSpPr>
+          <p:cNvPr id="3" name="Text Placeholder 2">
+            <a:extLst>
+              <a:ext uri="{FF2B5EF4-FFF2-40B4-BE49-F238E27FC236}">
+                <a16:creationId xmlns:a16="http://schemas.microsoft.com/office/drawing/2014/main" id="{14188AF0-954F-45E0-97B5-73D18A416CC7}"/>
               </a:ext>
             </a:extLst>
           </p:cNvPr>
@@ -9148,64 +9465,30 @@
           <a:lstStyle/>
           <a:p>
             <a:r>
-              <a:rPr lang="en-US" dirty="0"/>
-              <a:t>.</a:t>
-            </a:r>
-            <a:r>
               <a:rPr lang="en-US" dirty="0" err="1"/>
-              <a:t>bashrc</a:t>
-            </a:r>
-            <a:endParaRPr lang="en-US" dirty="0"/>
-          </a:p>
-          <a:p>
-            <a:pPr lvl="1"/>
-            <a:r>
-              <a:rPr lang="en-US" dirty="0"/>
-              <a:t>Run every time you start bash</a:t>
-            </a:r>
-          </a:p>
-          <a:p>
-            <a:pPr lvl="1"/>
-            <a:r>
-              <a:rPr lang="en-US" dirty="0"/>
-              <a:t>Great for configuring global settings</a:t>
-            </a:r>
-          </a:p>
-          <a:p>
-            <a:r>
-              <a:rPr lang="en-US" dirty="0"/>
-              <a:t>.</a:t>
-            </a:r>
+              <a:t>Ctrl+D</a:t>
+            </a:r>
+            <a:endParaRPr lang="en-US" dirty="0"/>
+          </a:p>
+          <a:p>
             <a:r>
               <a:rPr lang="en-US" dirty="0" err="1"/>
-              <a:t>bash_profile</a:t>
-            </a:r>
-            <a:endParaRPr lang="en-US" dirty="0"/>
-          </a:p>
-          <a:p>
-            <a:pPr lvl="1"/>
-            <a:r>
-              <a:rPr lang="en-US" dirty="0"/>
-              <a:t>Run even when you don’t run bash interactively</a:t>
-            </a:r>
-          </a:p>
-          <a:p>
-            <a:r>
-              <a:rPr lang="en-US" dirty="0"/>
-              <a:t>.</a:t>
-            </a:r>
+              <a:t>Ctrl+C</a:t>
+            </a:r>
+            <a:endParaRPr lang="en-US" dirty="0"/>
+          </a:p>
+          <a:p>
             <a:r>
               <a:rPr lang="en-US" dirty="0" err="1"/>
-              <a:t>bash_history</a:t>
-            </a:r>
-            <a:endParaRPr lang="en-US" dirty="0"/>
-          </a:p>
-          <a:p>
-            <a:pPr lvl="1"/>
-            <a:r>
-              <a:rPr lang="en-US" dirty="0"/>
-              <a:t>Re-run previous commands with arrow keys up/down</a:t>
-            </a:r>
+              <a:t>Ctrl+Z</a:t>
+            </a:r>
+            <a:endParaRPr lang="en-US" dirty="0"/>
+          </a:p>
+          <a:p>
+            <a:endParaRPr lang="en-US" dirty="0"/>
+          </a:p>
+          <a:p>
+            <a:endParaRPr lang="en-US" dirty="0"/>
           </a:p>
         </p:txBody>
       </p:sp>
@@ -9214,7 +9497,7 @@
           <p:cNvPr id="4" name="Date Placeholder 3">
             <a:extLst>
               <a:ext uri="{FF2B5EF4-FFF2-40B4-BE49-F238E27FC236}">
-                <a16:creationId xmlns:a16="http://schemas.microsoft.com/office/drawing/2014/main" id="{17E05AC0-8A63-4FDD-A727-54A8C6040A83}"/>
+                <a16:creationId xmlns:a16="http://schemas.microsoft.com/office/drawing/2014/main" id="{6D5133BD-4847-4D49-B5BF-4CC178F8FDB8}"/>
               </a:ext>
             </a:extLst>
           </p:cNvPr>
@@ -9232,7 +9515,7 @@
           <a:p>
             <a:fld id="{8AAE40A0-A7D8-4DC3-BC9E-BADA32DA2004}" type="datetime4">
               <a:rPr lang="en-US" smtClean="0"/>
-              <a:t>August 15, 2019</a:t>
+              <a:t>August 16, 2019</a:t>
             </a:fld>
             <a:endParaRPr lang="en-US" dirty="0"/>
           </a:p>
@@ -9243,7 +9526,7 @@
           <p:cNvPr id="5" name="Footer Placeholder 4">
             <a:extLst>
               <a:ext uri="{FF2B5EF4-FFF2-40B4-BE49-F238E27FC236}">
-                <a16:creationId xmlns:a16="http://schemas.microsoft.com/office/drawing/2014/main" id="{9C0CA735-E60F-4094-86F7-D33BB272FA25}"/>
+                <a16:creationId xmlns:a16="http://schemas.microsoft.com/office/drawing/2014/main" id="{5963B75A-EC19-4470-9F8C-1E2C1FB85999}"/>
               </a:ext>
             </a:extLst>
           </p:cNvPr>
@@ -9300,7 +9583,7 @@
           <p:cNvPr id="6" name="Slide Number Placeholder 5">
             <a:extLst>
               <a:ext uri="{FF2B5EF4-FFF2-40B4-BE49-F238E27FC236}">
-                <a16:creationId xmlns:a16="http://schemas.microsoft.com/office/drawing/2014/main" id="{33AAFB92-45C0-421A-AC0A-7A439518D3F4}"/>
+                <a16:creationId xmlns:a16="http://schemas.microsoft.com/office/drawing/2014/main" id="{BDAB3897-F226-4B28-B7E1-52A0CDB34A2C}"/>
               </a:ext>
             </a:extLst>
           </p:cNvPr>
@@ -9327,7 +9610,7 @@
     </p:spTree>
     <p:extLst>
       <p:ext uri="{BB962C8B-B14F-4D97-AF65-F5344CB8AC3E}">
-        <p14:creationId xmlns:p14="http://schemas.microsoft.com/office/powerpoint/2010/main" val="1466830417"/>
+        <p14:creationId xmlns:p14="http://schemas.microsoft.com/office/powerpoint/2010/main" val="1683568060"/>
       </p:ext>
     </p:extLst>
   </p:cSld>
@@ -9359,7 +9642,7 @@
           <p:cNvPr id="2" name="Title 1">
             <a:extLst>
               <a:ext uri="{FF2B5EF4-FFF2-40B4-BE49-F238E27FC236}">
-                <a16:creationId xmlns:a16="http://schemas.microsoft.com/office/drawing/2014/main" id="{98EB4F1B-51B3-4B64-8210-21AE8BE64582}"/>
+                <a16:creationId xmlns:a16="http://schemas.microsoft.com/office/drawing/2014/main" id="{763619FC-2C00-4A86-9CDA-1BF3459DAC50}"/>
               </a:ext>
             </a:extLst>
           </p:cNvPr>
@@ -9377,17 +9660,17 @@
           <a:p>
             <a:r>
               <a:rPr lang="en-US" dirty="0"/>
-              <a:t>BASH FUNCTIONS</a:t>
-            </a:r>
-          </a:p>
-        </p:txBody>
-      </p:sp>
-      <p:sp>
-        <p:nvSpPr>
-          <p:cNvPr id="3" name="Content Placeholder 2">
-            <a:extLst>
-              <a:ext uri="{FF2B5EF4-FFF2-40B4-BE49-F238E27FC236}">
-                <a16:creationId xmlns:a16="http://schemas.microsoft.com/office/drawing/2014/main" id="{593AD591-5DD9-410C-B27F-EACDDF765FF4}"/>
+              <a:t>ALIASES</a:t>
+            </a:r>
+          </a:p>
+        </p:txBody>
+      </p:sp>
+      <p:sp>
+        <p:nvSpPr>
+          <p:cNvPr id="3" name="Text Placeholder 2">
+            <a:extLst>
+              <a:ext uri="{FF2B5EF4-FFF2-40B4-BE49-F238E27FC236}">
+                <a16:creationId xmlns:a16="http://schemas.microsoft.com/office/drawing/2014/main" id="{14188AF0-954F-45E0-97B5-73D18A416CC7}"/>
               </a:ext>
             </a:extLst>
           </p:cNvPr>
@@ -9405,11 +9688,14 @@
           <a:p>
             <a:r>
               <a:rPr lang="en-US" dirty="0"/>
-              <a:t>Great for writing quick, reusable programs that don’t quite fit into alias form</a:t>
-            </a:r>
-            <a:endParaRPr lang="en-US" dirty="0">
-              <a:cs typeface="Courier New" panose="02070309020205020404" pitchFamily="49" charset="0"/>
-            </a:endParaRPr>
+              <a:t>Handy shortcuts for long commands with lots of arguments</a:t>
+            </a:r>
+          </a:p>
+          <a:p>
+            <a:endParaRPr lang="en-US" dirty="0"/>
+          </a:p>
+          <a:p>
+            <a:endParaRPr lang="en-US" dirty="0"/>
           </a:p>
         </p:txBody>
       </p:sp>
@@ -9418,7 +9704,7 @@
           <p:cNvPr id="4" name="Date Placeholder 3">
             <a:extLst>
               <a:ext uri="{FF2B5EF4-FFF2-40B4-BE49-F238E27FC236}">
-                <a16:creationId xmlns:a16="http://schemas.microsoft.com/office/drawing/2014/main" id="{17E05AC0-8A63-4FDD-A727-54A8C6040A83}"/>
+                <a16:creationId xmlns:a16="http://schemas.microsoft.com/office/drawing/2014/main" id="{6D5133BD-4847-4D49-B5BF-4CC178F8FDB8}"/>
               </a:ext>
             </a:extLst>
           </p:cNvPr>
@@ -9436,7 +9722,7 @@
           <a:p>
             <a:fld id="{8AAE40A0-A7D8-4DC3-BC9E-BADA32DA2004}" type="datetime4">
               <a:rPr lang="en-US" smtClean="0"/>
-              <a:t>August 15, 2019</a:t>
+              <a:t>August 16, 2019</a:t>
             </a:fld>
             <a:endParaRPr lang="en-US" dirty="0"/>
           </a:p>
@@ -9447,7 +9733,7 @@
           <p:cNvPr id="5" name="Footer Placeholder 4">
             <a:extLst>
               <a:ext uri="{FF2B5EF4-FFF2-40B4-BE49-F238E27FC236}">
-                <a16:creationId xmlns:a16="http://schemas.microsoft.com/office/drawing/2014/main" id="{9C0CA735-E60F-4094-86F7-D33BB272FA25}"/>
+                <a16:creationId xmlns:a16="http://schemas.microsoft.com/office/drawing/2014/main" id="{5963B75A-EC19-4470-9F8C-1E2C1FB85999}"/>
               </a:ext>
             </a:extLst>
           </p:cNvPr>
@@ -9504,7 +9790,7 @@
           <p:cNvPr id="6" name="Slide Number Placeholder 5">
             <a:extLst>
               <a:ext uri="{FF2B5EF4-FFF2-40B4-BE49-F238E27FC236}">
-                <a16:creationId xmlns:a16="http://schemas.microsoft.com/office/drawing/2014/main" id="{33AAFB92-45C0-421A-AC0A-7A439518D3F4}"/>
+                <a16:creationId xmlns:a16="http://schemas.microsoft.com/office/drawing/2014/main" id="{BDAB3897-F226-4B28-B7E1-52A0CDB34A2C}"/>
               </a:ext>
             </a:extLst>
           </p:cNvPr>
@@ -9531,7 +9817,7 @@
     </p:spTree>
     <p:extLst>
       <p:ext uri="{BB962C8B-B14F-4D97-AF65-F5344CB8AC3E}">
-        <p14:creationId xmlns:p14="http://schemas.microsoft.com/office/powerpoint/2010/main" val="3721287351"/>
+        <p14:creationId xmlns:p14="http://schemas.microsoft.com/office/powerpoint/2010/main" val="3102884327"/>
       </p:ext>
     </p:extLst>
   </p:cSld>
@@ -9679,7 +9965,7 @@
           <a:p>
             <a:fld id="{8AAE40A0-A7D8-4DC3-BC9E-BADA32DA2004}" type="datetime4">
               <a:rPr lang="en-US" smtClean="0"/>
-              <a:t>August 15, 2019</a:t>
+              <a:t>August 16, 2019</a:t>
             </a:fld>
             <a:endParaRPr lang="en-US" dirty="0"/>
           </a:p>
@@ -9824,7 +10110,7 @@
           <a:p>
             <a:r>
               <a:rPr lang="en-US" dirty="0"/>
-              <a:t>USEFUL PROGRAMS</a:t>
+              <a:t>BASH FUNCTIONS</a:t>
             </a:r>
           </a:p>
         </p:txBody>
@@ -9842,20 +10128,21 @@
             <a:spLocks noGrp="1"/>
           </p:cNvSpPr>
           <p:nvPr>
-            <p:ph type="body" idx="1"/>
-          </p:nvPr>
-        </p:nvSpPr>
-        <p:spPr/>
-        <p:txBody>
-          <a:bodyPr>
-            <a:normAutofit/>
-          </a:bodyPr>
-          <a:lstStyle/>
-          <a:p>
-            <a:r>
-              <a:rPr lang="en-US" dirty="0"/>
-              <a:t>Getting to know our tools</a:t>
-            </a:r>
+            <p:ph idx="1"/>
+          </p:nvPr>
+        </p:nvSpPr>
+        <p:spPr/>
+        <p:txBody>
+          <a:bodyPr/>
+          <a:lstStyle/>
+          <a:p>
+            <a:r>
+              <a:rPr lang="en-US" dirty="0"/>
+              <a:t>Great for writing quick, reusable programs that don’t quite fit into alias form</a:t>
+            </a:r>
+            <a:endParaRPr lang="en-US" dirty="0">
+              <a:cs typeface="Courier New" panose="02070309020205020404" pitchFamily="49" charset="0"/>
+            </a:endParaRPr>
           </a:p>
         </p:txBody>
       </p:sp>
@@ -9882,7 +10169,7 @@
           <a:p>
             <a:fld id="{8AAE40A0-A7D8-4DC3-BC9E-BADA32DA2004}" type="datetime4">
               <a:rPr lang="en-US" smtClean="0"/>
-              <a:t>August 15, 2019</a:t>
+              <a:t>August 16, 2019</a:t>
             </a:fld>
             <a:endParaRPr lang="en-US" dirty="0"/>
           </a:p>
@@ -9977,7 +10264,7 @@
     </p:spTree>
     <p:extLst>
       <p:ext uri="{BB962C8B-B14F-4D97-AF65-F5344CB8AC3E}">
-        <p14:creationId xmlns:p14="http://schemas.microsoft.com/office/powerpoint/2010/main" val="2388566862"/>
+        <p14:creationId xmlns:p14="http://schemas.microsoft.com/office/powerpoint/2010/main" val="3721287351"/>
       </p:ext>
     </p:extLst>
   </p:cSld>
@@ -10027,13 +10314,216 @@
           <a:p>
             <a:r>
               <a:rPr lang="en-US" dirty="0"/>
+              <a:t>USEFUL PROGRAMS</a:t>
+            </a:r>
+          </a:p>
+        </p:txBody>
+      </p:sp>
+      <p:sp>
+        <p:nvSpPr>
+          <p:cNvPr id="3" name="Content Placeholder 2">
+            <a:extLst>
+              <a:ext uri="{FF2B5EF4-FFF2-40B4-BE49-F238E27FC236}">
+                <a16:creationId xmlns:a16="http://schemas.microsoft.com/office/drawing/2014/main" id="{593AD591-5DD9-410C-B27F-EACDDF765FF4}"/>
+              </a:ext>
+            </a:extLst>
+          </p:cNvPr>
+          <p:cNvSpPr>
+            <a:spLocks noGrp="1"/>
+          </p:cNvSpPr>
+          <p:nvPr>
+            <p:ph type="body" idx="1"/>
+          </p:nvPr>
+        </p:nvSpPr>
+        <p:spPr/>
+        <p:txBody>
+          <a:bodyPr>
+            <a:normAutofit/>
+          </a:bodyPr>
+          <a:lstStyle/>
+          <a:p>
+            <a:r>
+              <a:rPr lang="en-US" dirty="0"/>
+              <a:t>Getting to know our tools</a:t>
+            </a:r>
+          </a:p>
+        </p:txBody>
+      </p:sp>
+      <p:sp>
+        <p:nvSpPr>
+          <p:cNvPr id="4" name="Date Placeholder 3">
+            <a:extLst>
+              <a:ext uri="{FF2B5EF4-FFF2-40B4-BE49-F238E27FC236}">
+                <a16:creationId xmlns:a16="http://schemas.microsoft.com/office/drawing/2014/main" id="{17E05AC0-8A63-4FDD-A727-54A8C6040A83}"/>
+              </a:ext>
+            </a:extLst>
+          </p:cNvPr>
+          <p:cNvSpPr>
+            <a:spLocks noGrp="1"/>
+          </p:cNvSpPr>
+          <p:nvPr>
+            <p:ph type="dt" sz="half" idx="10"/>
+          </p:nvPr>
+        </p:nvSpPr>
+        <p:spPr/>
+        <p:txBody>
+          <a:bodyPr/>
+          <a:lstStyle/>
+          <a:p>
+            <a:fld id="{8AAE40A0-A7D8-4DC3-BC9E-BADA32DA2004}" type="datetime4">
+              <a:rPr lang="en-US" smtClean="0"/>
+              <a:t>August 16, 2019</a:t>
+            </a:fld>
+            <a:endParaRPr lang="en-US" dirty="0"/>
+          </a:p>
+        </p:txBody>
+      </p:sp>
+      <p:sp>
+        <p:nvSpPr>
+          <p:cNvPr id="5" name="Footer Placeholder 4">
+            <a:extLst>
+              <a:ext uri="{FF2B5EF4-FFF2-40B4-BE49-F238E27FC236}">
+                <a16:creationId xmlns:a16="http://schemas.microsoft.com/office/drawing/2014/main" id="{9C0CA735-E60F-4094-86F7-D33BB272FA25}"/>
+              </a:ext>
+            </a:extLst>
+          </p:cNvPr>
+          <p:cNvSpPr>
+            <a:spLocks noGrp="1"/>
+          </p:cNvSpPr>
+          <p:nvPr>
+            <p:ph type="ftr" sz="quarter" idx="11"/>
+          </p:nvPr>
+        </p:nvSpPr>
+        <p:spPr/>
+        <p:txBody>
+          <a:bodyPr/>
+          <a:lstStyle/>
+          <a:p>
+            <a:r>
+              <a:rPr lang="en-US"/>
+              <a:t>Digital Scholarship Services </a:t>
+            </a:r>
+            <a:r>
+              <a:rPr lang="en-US">
+                <a:solidFill>
+                  <a:schemeClr val="accent1">
+                    <a:lumMod val="50000"/>
+                  </a:schemeClr>
+                </a:solidFill>
+              </a:rPr>
+              <a:t>| Email</a:t>
+            </a:r>
+            <a:r>
+              <a:rPr lang="en-US"/>
+              <a:t> cf24@rice.edu </a:t>
+            </a:r>
+            <a:r>
+              <a:rPr lang="en-US">
+                <a:solidFill>
+                  <a:schemeClr val="accent1">
+                    <a:lumMod val="50000"/>
+                  </a:schemeClr>
+                </a:solidFill>
+              </a:rPr>
+              <a:t>|</a:t>
+            </a:r>
+            <a:r>
+              <a:rPr lang="en-US"/>
+              <a:t> library.rice.edu/dss</a:t>
+            </a:r>
+            <a:endParaRPr lang="en-US" dirty="0"/>
+          </a:p>
+        </p:txBody>
+      </p:sp>
+      <p:sp>
+        <p:nvSpPr>
+          <p:cNvPr id="6" name="Slide Number Placeholder 5">
+            <a:extLst>
+              <a:ext uri="{FF2B5EF4-FFF2-40B4-BE49-F238E27FC236}">
+                <a16:creationId xmlns:a16="http://schemas.microsoft.com/office/drawing/2014/main" id="{33AAFB92-45C0-421A-AC0A-7A439518D3F4}"/>
+              </a:ext>
+            </a:extLst>
+          </p:cNvPr>
+          <p:cNvSpPr>
+            <a:spLocks noGrp="1"/>
+          </p:cNvSpPr>
+          <p:nvPr>
+            <p:ph type="sldNum" sz="quarter" idx="12"/>
+          </p:nvPr>
+        </p:nvSpPr>
+        <p:spPr/>
+        <p:txBody>
+          <a:bodyPr/>
+          <a:lstStyle/>
+          <a:p>
+            <a:fld id="{D57F1E4F-1CFF-5643-939E-02111984F565}" type="slidenum">
+              <a:rPr lang="en-US" smtClean="0"/>
+              <a:t>31</a:t>
+            </a:fld>
+            <a:endParaRPr lang="en-US" dirty="0"/>
+          </a:p>
+        </p:txBody>
+      </p:sp>
+    </p:spTree>
+    <p:extLst>
+      <p:ext uri="{BB962C8B-B14F-4D97-AF65-F5344CB8AC3E}">
+        <p14:creationId xmlns:p14="http://schemas.microsoft.com/office/powerpoint/2010/main" val="2388566862"/>
+      </p:ext>
+    </p:extLst>
+  </p:cSld>
+  <p:clrMapOvr>
+    <a:masterClrMapping/>
+  </p:clrMapOvr>
+</p:sld>
+</file>
+
+<file path=ppt/slides/slide32.xml><?xml version="1.0" encoding="utf-8"?>
+<p:sld xmlns:a="http://schemas.openxmlformats.org/drawingml/2006/main" xmlns:r="http://schemas.openxmlformats.org/officeDocument/2006/relationships" xmlns:p="http://schemas.openxmlformats.org/presentationml/2006/main">
+  <p:cSld>
+    <p:spTree>
+      <p:nvGrpSpPr>
+        <p:cNvPr id="1" name=""/>
+        <p:cNvGrpSpPr/>
+        <p:nvPr/>
+      </p:nvGrpSpPr>
+      <p:grpSpPr>
+        <a:xfrm>
+          <a:off x="0" y="0"/>
+          <a:ext cx="0" cy="0"/>
+          <a:chOff x="0" y="0"/>
+          <a:chExt cx="0" cy="0"/>
+        </a:xfrm>
+      </p:grpSpPr>
+      <p:sp>
+        <p:nvSpPr>
+          <p:cNvPr id="2" name="Title 1">
+            <a:extLst>
+              <a:ext uri="{FF2B5EF4-FFF2-40B4-BE49-F238E27FC236}">
+                <a16:creationId xmlns:a16="http://schemas.microsoft.com/office/drawing/2014/main" id="{98EB4F1B-51B3-4B64-8210-21AE8BE64582}"/>
+              </a:ext>
+            </a:extLst>
+          </p:cNvPr>
+          <p:cNvSpPr>
+            <a:spLocks noGrp="1"/>
+          </p:cNvSpPr>
+          <p:nvPr>
+            <p:ph type="title"/>
+          </p:nvPr>
+        </p:nvSpPr>
+        <p:spPr/>
+        <p:txBody>
+          <a:bodyPr/>
+          <a:lstStyle/>
+          <a:p>
+            <a:r>
+              <a:rPr lang="en-US" dirty="0"/>
               <a:t>FILES AND DIRECTORIES</a:t>
             </a:r>
           </a:p>
         </p:txBody>
       </p:sp>
-      <mc:AlternateContent xmlns:mc="http://schemas.openxmlformats.org/markup-compatibility/2006">
-        <mc:Choice xmlns:a14="http://schemas.microsoft.com/office/drawing/2010/main" Requires="a14">
+      <mc:AlternateContent xmlns:mc="http://schemas.openxmlformats.org/markup-compatibility/2006" xmlns:a14="http://schemas.microsoft.com/office/drawing/2010/main">
+        <mc:Choice Requires="a14">
           <p:sp>
             <p:nvSpPr>
               <p:cNvPr id="3" name="Content Placeholder 2">
@@ -10509,7 +10999,7 @@
             </p:txBody>
           </p:sp>
         </mc:Choice>
-        <mc:Fallback>
+        <mc:Fallback xmlns="">
           <p:sp>
             <p:nvSpPr>
               <p:cNvPr id="3" name="Content Placeholder 2">
@@ -10572,7 +11062,7 @@
           <a:p>
             <a:fld id="{8AAE40A0-A7D8-4DC3-BC9E-BADA32DA2004}" type="datetime4">
               <a:rPr lang="en-US" smtClean="0"/>
-              <a:t>August 15, 2019</a:t>
+              <a:t>August 16, 2019</a:t>
             </a:fld>
             <a:endParaRPr lang="en-US" dirty="0"/>
           </a:p>
@@ -10658,7 +11148,7 @@
           <a:p>
             <a:fld id="{D57F1E4F-1CFF-5643-939E-02111984F565}" type="slidenum">
               <a:rPr lang="en-US" smtClean="0"/>
-              <a:t>31</a:t>
+              <a:t>32</a:t>
             </a:fld>
             <a:endParaRPr lang="en-US" dirty="0"/>
           </a:p>
@@ -10677,7 +11167,7 @@
 </p:sld>
 </file>
 
-<file path=ppt/slides/slide32.xml><?xml version="1.0" encoding="utf-8"?>
+<file path=ppt/slides/slide33.xml><?xml version="1.0" encoding="utf-8"?>
 <p:sld xmlns:a="http://schemas.openxmlformats.org/drawingml/2006/main" xmlns:r="http://schemas.openxmlformats.org/officeDocument/2006/relationships" xmlns:p="http://schemas.openxmlformats.org/presentationml/2006/main">
   <p:cSld>
     <p:spTree>
@@ -10722,8 +11212,8 @@
           </a:p>
         </p:txBody>
       </p:sp>
-      <mc:AlternateContent xmlns:mc="http://schemas.openxmlformats.org/markup-compatibility/2006">
-        <mc:Choice xmlns:a14="http://schemas.microsoft.com/office/drawing/2010/main" Requires="a14">
+      <mc:AlternateContent xmlns:mc="http://schemas.openxmlformats.org/markup-compatibility/2006" xmlns:a14="http://schemas.microsoft.com/office/drawing/2010/main">
+        <mc:Choice Requires="a14">
           <p:sp>
             <p:nvSpPr>
               <p:cNvPr id="3" name="Content Placeholder 2">
@@ -11031,7 +11521,7 @@
             </p:txBody>
           </p:sp>
         </mc:Choice>
-        <mc:Fallback>
+        <mc:Fallback xmlns="">
           <p:sp>
             <p:nvSpPr>
               <p:cNvPr id="3" name="Content Placeholder 2">
@@ -11094,7 +11584,7 @@
           <a:p>
             <a:fld id="{8AAE40A0-A7D8-4DC3-BC9E-BADA32DA2004}" type="datetime4">
               <a:rPr lang="en-US" smtClean="0"/>
-              <a:t>August 15, 2019</a:t>
+              <a:t>August 16, 2019</a:t>
             </a:fld>
             <a:endParaRPr lang="en-US" dirty="0"/>
           </a:p>
@@ -11180,7 +11670,7 @@
           <a:p>
             <a:fld id="{D57F1E4F-1CFF-5643-939E-02111984F565}" type="slidenum">
               <a:rPr lang="en-US" smtClean="0"/>
-              <a:t>32</a:t>
+              <a:t>33</a:t>
             </a:fld>
             <a:endParaRPr lang="en-US" dirty="0"/>
           </a:p>
@@ -11190,204 +11680,6 @@
     <p:extLst>
       <p:ext uri="{BB962C8B-B14F-4D97-AF65-F5344CB8AC3E}">
         <p14:creationId xmlns:p14="http://schemas.microsoft.com/office/powerpoint/2010/main" val="2199655307"/>
-      </p:ext>
-    </p:extLst>
-  </p:cSld>
-  <p:clrMapOvr>
-    <a:masterClrMapping/>
-  </p:clrMapOvr>
-</p:sld>
-</file>
-
-<file path=ppt/slides/slide33.xml><?xml version="1.0" encoding="utf-8"?>
-<p:sld xmlns:a="http://schemas.openxmlformats.org/drawingml/2006/main" xmlns:r="http://schemas.openxmlformats.org/officeDocument/2006/relationships" xmlns:p="http://schemas.openxmlformats.org/presentationml/2006/main">
-  <p:cSld>
-    <p:spTree>
-      <p:nvGrpSpPr>
-        <p:cNvPr id="1" name=""/>
-        <p:cNvGrpSpPr/>
-        <p:nvPr/>
-      </p:nvGrpSpPr>
-      <p:grpSpPr>
-        <a:xfrm>
-          <a:off x="0" y="0"/>
-          <a:ext cx="0" cy="0"/>
-          <a:chOff x="0" y="0"/>
-          <a:chExt cx="0" cy="0"/>
-        </a:xfrm>
-      </p:grpSpPr>
-      <p:sp>
-        <p:nvSpPr>
-          <p:cNvPr id="2" name="Title 1">
-            <a:extLst>
-              <a:ext uri="{FF2B5EF4-FFF2-40B4-BE49-F238E27FC236}">
-                <a16:creationId xmlns:a16="http://schemas.microsoft.com/office/drawing/2014/main" id="{76118556-0187-4732-968E-C78D95EB2A6D}"/>
-              </a:ext>
-            </a:extLst>
-          </p:cNvPr>
-          <p:cNvSpPr>
-            <a:spLocks noGrp="1"/>
-          </p:cNvSpPr>
-          <p:nvPr>
-            <p:ph type="title"/>
-          </p:nvPr>
-        </p:nvSpPr>
-        <p:spPr/>
-        <p:txBody>
-          <a:bodyPr/>
-          <a:lstStyle/>
-          <a:p>
-            <a:r>
-              <a:rPr lang="en-US" dirty="0"/>
-              <a:t>FIND</a:t>
-            </a:r>
-          </a:p>
-        </p:txBody>
-      </p:sp>
-      <p:sp>
-        <p:nvSpPr>
-          <p:cNvPr id="3" name="Content Placeholder 2">
-            <a:extLst>
-              <a:ext uri="{FF2B5EF4-FFF2-40B4-BE49-F238E27FC236}">
-                <a16:creationId xmlns:a16="http://schemas.microsoft.com/office/drawing/2014/main" id="{F18436D4-BA46-47E0-BD91-51D2DE314892}"/>
-              </a:ext>
-            </a:extLst>
-          </p:cNvPr>
-          <p:cNvSpPr>
-            <a:spLocks noGrp="1"/>
-          </p:cNvSpPr>
-          <p:nvPr>
-            <p:ph idx="1"/>
-          </p:nvPr>
-        </p:nvSpPr>
-        <p:spPr/>
-        <p:txBody>
-          <a:bodyPr/>
-          <a:lstStyle/>
-          <a:p>
-            <a:endParaRPr lang="en-US"/>
-          </a:p>
-        </p:txBody>
-      </p:sp>
-      <p:sp>
-        <p:nvSpPr>
-          <p:cNvPr id="4" name="Date Placeholder 3">
-            <a:extLst>
-              <a:ext uri="{FF2B5EF4-FFF2-40B4-BE49-F238E27FC236}">
-                <a16:creationId xmlns:a16="http://schemas.microsoft.com/office/drawing/2014/main" id="{F8BB5762-D626-4F41-BFE6-A11AF777F6D8}"/>
-              </a:ext>
-            </a:extLst>
-          </p:cNvPr>
-          <p:cNvSpPr>
-            <a:spLocks noGrp="1"/>
-          </p:cNvSpPr>
-          <p:nvPr>
-            <p:ph type="dt" sz="half" idx="10"/>
-          </p:nvPr>
-        </p:nvSpPr>
-        <p:spPr/>
-        <p:txBody>
-          <a:bodyPr/>
-          <a:lstStyle/>
-          <a:p>
-            <a:fld id="{8AAE40A0-A7D8-4DC3-BC9E-BADA32DA2004}" type="datetime4">
-              <a:rPr lang="en-US" smtClean="0"/>
-              <a:t>August 15, 2019</a:t>
-            </a:fld>
-            <a:endParaRPr lang="en-US" dirty="0"/>
-          </a:p>
-        </p:txBody>
-      </p:sp>
-      <p:sp>
-        <p:nvSpPr>
-          <p:cNvPr id="5" name="Footer Placeholder 4">
-            <a:extLst>
-              <a:ext uri="{FF2B5EF4-FFF2-40B4-BE49-F238E27FC236}">
-                <a16:creationId xmlns:a16="http://schemas.microsoft.com/office/drawing/2014/main" id="{8EDB9D35-56C5-4AA6-8252-57704C4A289F}"/>
-              </a:ext>
-            </a:extLst>
-          </p:cNvPr>
-          <p:cNvSpPr>
-            <a:spLocks noGrp="1"/>
-          </p:cNvSpPr>
-          <p:nvPr>
-            <p:ph type="ftr" sz="quarter" idx="11"/>
-          </p:nvPr>
-        </p:nvSpPr>
-        <p:spPr/>
-        <p:txBody>
-          <a:bodyPr/>
-          <a:lstStyle/>
-          <a:p>
-            <a:r>
-              <a:rPr lang="en-US"/>
-              <a:t>Digital Scholarship Services </a:t>
-            </a:r>
-            <a:r>
-              <a:rPr lang="en-US">
-                <a:solidFill>
-                  <a:schemeClr val="accent1">
-                    <a:lumMod val="50000"/>
-                  </a:schemeClr>
-                </a:solidFill>
-              </a:rPr>
-              <a:t>| Email</a:t>
-            </a:r>
-            <a:r>
-              <a:rPr lang="en-US"/>
-              <a:t> cf24@rice.edu </a:t>
-            </a:r>
-            <a:r>
-              <a:rPr lang="en-US">
-                <a:solidFill>
-                  <a:schemeClr val="accent1">
-                    <a:lumMod val="50000"/>
-                  </a:schemeClr>
-                </a:solidFill>
-              </a:rPr>
-              <a:t>|</a:t>
-            </a:r>
-            <a:r>
-              <a:rPr lang="en-US"/>
-              <a:t> library.rice.edu/dss</a:t>
-            </a:r>
-            <a:endParaRPr lang="en-US" dirty="0"/>
-          </a:p>
-        </p:txBody>
-      </p:sp>
-      <p:sp>
-        <p:nvSpPr>
-          <p:cNvPr id="6" name="Slide Number Placeholder 5">
-            <a:extLst>
-              <a:ext uri="{FF2B5EF4-FFF2-40B4-BE49-F238E27FC236}">
-                <a16:creationId xmlns:a16="http://schemas.microsoft.com/office/drawing/2014/main" id="{11295AC8-69BA-4E0A-953B-3E0CD278C2ED}"/>
-              </a:ext>
-            </a:extLst>
-          </p:cNvPr>
-          <p:cNvSpPr>
-            <a:spLocks noGrp="1"/>
-          </p:cNvSpPr>
-          <p:nvPr>
-            <p:ph type="sldNum" sz="quarter" idx="12"/>
-          </p:nvPr>
-        </p:nvSpPr>
-        <p:spPr/>
-        <p:txBody>
-          <a:bodyPr/>
-          <a:lstStyle/>
-          <a:p>
-            <a:fld id="{D57F1E4F-1CFF-5643-939E-02111984F565}" type="slidenum">
-              <a:rPr lang="en-US" smtClean="0"/>
-              <a:t>33</a:t>
-            </a:fld>
-            <a:endParaRPr lang="en-US" dirty="0"/>
-          </a:p>
-        </p:txBody>
-      </p:sp>
-    </p:spTree>
-    <p:extLst>
-      <p:ext uri="{BB962C8B-B14F-4D97-AF65-F5344CB8AC3E}">
-        <p14:creationId xmlns:p14="http://schemas.microsoft.com/office/powerpoint/2010/main" val="353424622"/>
       </p:ext>
     </p:extLst>
   </p:cSld>
@@ -11437,7 +11729,7 @@
           <a:p>
             <a:r>
               <a:rPr lang="en-US" dirty="0"/>
-              <a:t>REGULAR EXPRESSIONS</a:t>
+              <a:t>FIND</a:t>
             </a:r>
           </a:p>
         </p:txBody>
@@ -11490,7 +11782,7 @@
           <a:p>
             <a:fld id="{8AAE40A0-A7D8-4DC3-BC9E-BADA32DA2004}" type="datetime4">
               <a:rPr lang="en-US" smtClean="0"/>
-              <a:t>August 15, 2019</a:t>
+              <a:t>August 16, 2019</a:t>
             </a:fld>
             <a:endParaRPr lang="en-US" dirty="0"/>
           </a:p>
@@ -11585,7 +11877,7 @@
     </p:spTree>
     <p:extLst>
       <p:ext uri="{BB962C8B-B14F-4D97-AF65-F5344CB8AC3E}">
-        <p14:creationId xmlns:p14="http://schemas.microsoft.com/office/powerpoint/2010/main" val="568956256"/>
+        <p14:creationId xmlns:p14="http://schemas.microsoft.com/office/powerpoint/2010/main" val="353424622"/>
       </p:ext>
     </p:extLst>
   </p:cSld>
@@ -11635,7 +11927,7 @@
           <a:p>
             <a:r>
               <a:rPr lang="en-US" dirty="0"/>
-              <a:t>GREP</a:t>
+              <a:t>REGULAR EXPRESSIONS</a:t>
             </a:r>
           </a:p>
         </p:txBody>
@@ -11688,7 +11980,7 @@
           <a:p>
             <a:fld id="{8AAE40A0-A7D8-4DC3-BC9E-BADA32DA2004}" type="datetime4">
               <a:rPr lang="en-US" smtClean="0"/>
-              <a:t>August 15, 2019</a:t>
+              <a:t>August 16, 2019</a:t>
             </a:fld>
             <a:endParaRPr lang="en-US" dirty="0"/>
           </a:p>
@@ -11783,7 +12075,7 @@
     </p:spTree>
     <p:extLst>
       <p:ext uri="{BB962C8B-B14F-4D97-AF65-F5344CB8AC3E}">
-        <p14:creationId xmlns:p14="http://schemas.microsoft.com/office/powerpoint/2010/main" val="3954158399"/>
+        <p14:creationId xmlns:p14="http://schemas.microsoft.com/office/powerpoint/2010/main" val="568956256"/>
       </p:ext>
     </p:extLst>
   </p:cSld>
@@ -11833,7 +12125,7 @@
           <a:p>
             <a:r>
               <a:rPr lang="en-US" dirty="0"/>
-              <a:t>PARALLEL &amp; XARGS</a:t>
+              <a:t>GREP</a:t>
             </a:r>
           </a:p>
         </p:txBody>
@@ -11886,7 +12178,7 @@
           <a:p>
             <a:fld id="{8AAE40A0-A7D8-4DC3-BC9E-BADA32DA2004}" type="datetime4">
               <a:rPr lang="en-US" smtClean="0"/>
-              <a:t>August 15, 2019</a:t>
+              <a:t>August 16, 2019</a:t>
             </a:fld>
             <a:endParaRPr lang="en-US" dirty="0"/>
           </a:p>
@@ -11981,7 +12273,7 @@
     </p:spTree>
     <p:extLst>
       <p:ext uri="{BB962C8B-B14F-4D97-AF65-F5344CB8AC3E}">
-        <p14:creationId xmlns:p14="http://schemas.microsoft.com/office/powerpoint/2010/main" val="1447133799"/>
+        <p14:creationId xmlns:p14="http://schemas.microsoft.com/office/powerpoint/2010/main" val="3954158399"/>
       </p:ext>
     </p:extLst>
   </p:cSld>
@@ -12031,7 +12323,7 @@
           <a:p>
             <a:r>
               <a:rPr lang="en-US" dirty="0"/>
-              <a:t>SED</a:t>
+              <a:t>PARALLEL &amp; XARGS</a:t>
             </a:r>
           </a:p>
         </p:txBody>
@@ -12084,7 +12376,7 @@
           <a:p>
             <a:fld id="{8AAE40A0-A7D8-4DC3-BC9E-BADA32DA2004}" type="datetime4">
               <a:rPr lang="en-US" smtClean="0"/>
-              <a:t>August 15, 2019</a:t>
+              <a:t>August 16, 2019</a:t>
             </a:fld>
             <a:endParaRPr lang="en-US" dirty="0"/>
           </a:p>
@@ -12179,7 +12471,7 @@
     </p:spTree>
     <p:extLst>
       <p:ext uri="{BB962C8B-B14F-4D97-AF65-F5344CB8AC3E}">
-        <p14:creationId xmlns:p14="http://schemas.microsoft.com/office/powerpoint/2010/main" val="2118282884"/>
+        <p14:creationId xmlns:p14="http://schemas.microsoft.com/office/powerpoint/2010/main" val="1447133799"/>
       </p:ext>
     </p:extLst>
   </p:cSld>
@@ -12211,7 +12503,7 @@
           <p:cNvPr id="2" name="Title 1">
             <a:extLst>
               <a:ext uri="{FF2B5EF4-FFF2-40B4-BE49-F238E27FC236}">
-                <a16:creationId xmlns:a16="http://schemas.microsoft.com/office/drawing/2014/main" id="{2C388064-E4E4-4FA8-957E-42BFB02BCE6B}"/>
+                <a16:creationId xmlns:a16="http://schemas.microsoft.com/office/drawing/2014/main" id="{76118556-0187-4732-968E-C78D95EB2A6D}"/>
               </a:ext>
             </a:extLst>
           </p:cNvPr>
@@ -12229,7 +12521,7 @@
           <a:p>
             <a:r>
               <a:rPr lang="en-US" dirty="0"/>
-              <a:t>BC</a:t>
+              <a:t>SED</a:t>
             </a:r>
           </a:p>
         </p:txBody>
@@ -12239,7 +12531,7 @@
           <p:cNvPr id="3" name="Content Placeholder 2">
             <a:extLst>
               <a:ext uri="{FF2B5EF4-FFF2-40B4-BE49-F238E27FC236}">
-                <a16:creationId xmlns:a16="http://schemas.microsoft.com/office/drawing/2014/main" id="{F0681ACD-79CA-4D91-A3E6-4AE79B6D42BE}"/>
+                <a16:creationId xmlns:a16="http://schemas.microsoft.com/office/drawing/2014/main" id="{F18436D4-BA46-47E0-BD91-51D2DE314892}"/>
               </a:ext>
             </a:extLst>
           </p:cNvPr>
@@ -12264,7 +12556,7 @@
           <p:cNvPr id="4" name="Date Placeholder 3">
             <a:extLst>
               <a:ext uri="{FF2B5EF4-FFF2-40B4-BE49-F238E27FC236}">
-                <a16:creationId xmlns:a16="http://schemas.microsoft.com/office/drawing/2014/main" id="{0B425C7F-5A6A-4513-AD27-F5A864BEEA23}"/>
+                <a16:creationId xmlns:a16="http://schemas.microsoft.com/office/drawing/2014/main" id="{F8BB5762-D626-4F41-BFE6-A11AF777F6D8}"/>
               </a:ext>
             </a:extLst>
           </p:cNvPr>
@@ -12282,7 +12574,7 @@
           <a:p>
             <a:fld id="{8AAE40A0-A7D8-4DC3-BC9E-BADA32DA2004}" type="datetime4">
               <a:rPr lang="en-US" smtClean="0"/>
-              <a:t>August 15, 2019</a:t>
+              <a:t>August 16, 2019</a:t>
             </a:fld>
             <a:endParaRPr lang="en-US" dirty="0"/>
           </a:p>
@@ -12293,7 +12585,7 @@
           <p:cNvPr id="5" name="Footer Placeholder 4">
             <a:extLst>
               <a:ext uri="{FF2B5EF4-FFF2-40B4-BE49-F238E27FC236}">
-                <a16:creationId xmlns:a16="http://schemas.microsoft.com/office/drawing/2014/main" id="{005CCDF3-2A99-4DE6-A187-EA07BA452E75}"/>
+                <a16:creationId xmlns:a16="http://schemas.microsoft.com/office/drawing/2014/main" id="{8EDB9D35-56C5-4AA6-8252-57704C4A289F}"/>
               </a:ext>
             </a:extLst>
           </p:cNvPr>
@@ -12350,7 +12642,7 @@
           <p:cNvPr id="6" name="Slide Number Placeholder 5">
             <a:extLst>
               <a:ext uri="{FF2B5EF4-FFF2-40B4-BE49-F238E27FC236}">
-                <a16:creationId xmlns:a16="http://schemas.microsoft.com/office/drawing/2014/main" id="{69681AB4-1640-4191-93C2-23256A204419}"/>
+                <a16:creationId xmlns:a16="http://schemas.microsoft.com/office/drawing/2014/main" id="{11295AC8-69BA-4E0A-953B-3E0CD278C2ED}"/>
               </a:ext>
             </a:extLst>
           </p:cNvPr>
@@ -12377,7 +12669,7 @@
     </p:spTree>
     <p:extLst>
       <p:ext uri="{BB962C8B-B14F-4D97-AF65-F5344CB8AC3E}">
-        <p14:creationId xmlns:p14="http://schemas.microsoft.com/office/powerpoint/2010/main" val="3106157084"/>
+        <p14:creationId xmlns:p14="http://schemas.microsoft.com/office/powerpoint/2010/main" val="2118282884"/>
       </p:ext>
     </p:extLst>
   </p:cSld>
@@ -12409,7 +12701,7 @@
           <p:cNvPr id="2" name="Title 1">
             <a:extLst>
               <a:ext uri="{FF2B5EF4-FFF2-40B4-BE49-F238E27FC236}">
-                <a16:creationId xmlns:a16="http://schemas.microsoft.com/office/drawing/2014/main" id="{76118556-0187-4732-968E-C78D95EB2A6D}"/>
+                <a16:creationId xmlns:a16="http://schemas.microsoft.com/office/drawing/2014/main" id="{2C388064-E4E4-4FA8-957E-42BFB02BCE6B}"/>
               </a:ext>
             </a:extLst>
           </p:cNvPr>
@@ -12427,7 +12719,7 @@
           <a:p>
             <a:r>
               <a:rPr lang="en-US" dirty="0"/>
-              <a:t>PS</a:t>
+              <a:t>BC</a:t>
             </a:r>
           </a:p>
         </p:txBody>
@@ -12437,7 +12729,7 @@
           <p:cNvPr id="3" name="Content Placeholder 2">
             <a:extLst>
               <a:ext uri="{FF2B5EF4-FFF2-40B4-BE49-F238E27FC236}">
-                <a16:creationId xmlns:a16="http://schemas.microsoft.com/office/drawing/2014/main" id="{F18436D4-BA46-47E0-BD91-51D2DE314892}"/>
+                <a16:creationId xmlns:a16="http://schemas.microsoft.com/office/drawing/2014/main" id="{F0681ACD-79CA-4D91-A3E6-4AE79B6D42BE}"/>
               </a:ext>
             </a:extLst>
           </p:cNvPr>
@@ -12462,7 +12754,7 @@
           <p:cNvPr id="4" name="Date Placeholder 3">
             <a:extLst>
               <a:ext uri="{FF2B5EF4-FFF2-40B4-BE49-F238E27FC236}">
-                <a16:creationId xmlns:a16="http://schemas.microsoft.com/office/drawing/2014/main" id="{F8BB5762-D626-4F41-BFE6-A11AF777F6D8}"/>
+                <a16:creationId xmlns:a16="http://schemas.microsoft.com/office/drawing/2014/main" id="{0B425C7F-5A6A-4513-AD27-F5A864BEEA23}"/>
               </a:ext>
             </a:extLst>
           </p:cNvPr>
@@ -12480,7 +12772,7 @@
           <a:p>
             <a:fld id="{8AAE40A0-A7D8-4DC3-BC9E-BADA32DA2004}" type="datetime4">
               <a:rPr lang="en-US" smtClean="0"/>
-              <a:t>August 15, 2019</a:t>
+              <a:t>August 16, 2019</a:t>
             </a:fld>
             <a:endParaRPr lang="en-US" dirty="0"/>
           </a:p>
@@ -12491,7 +12783,7 @@
           <p:cNvPr id="5" name="Footer Placeholder 4">
             <a:extLst>
               <a:ext uri="{FF2B5EF4-FFF2-40B4-BE49-F238E27FC236}">
-                <a16:creationId xmlns:a16="http://schemas.microsoft.com/office/drawing/2014/main" id="{8EDB9D35-56C5-4AA6-8252-57704C4A289F}"/>
+                <a16:creationId xmlns:a16="http://schemas.microsoft.com/office/drawing/2014/main" id="{005CCDF3-2A99-4DE6-A187-EA07BA452E75}"/>
               </a:ext>
             </a:extLst>
           </p:cNvPr>
@@ -12548,7 +12840,7 @@
           <p:cNvPr id="6" name="Slide Number Placeholder 5">
             <a:extLst>
               <a:ext uri="{FF2B5EF4-FFF2-40B4-BE49-F238E27FC236}">
-                <a16:creationId xmlns:a16="http://schemas.microsoft.com/office/drawing/2014/main" id="{11295AC8-69BA-4E0A-953B-3E0CD278C2ED}"/>
+                <a16:creationId xmlns:a16="http://schemas.microsoft.com/office/drawing/2014/main" id="{69681AB4-1640-4191-93C2-23256A204419}"/>
               </a:ext>
             </a:extLst>
           </p:cNvPr>
@@ -12575,7 +12867,7 @@
     </p:spTree>
     <p:extLst>
       <p:ext uri="{BB962C8B-B14F-4D97-AF65-F5344CB8AC3E}">
-        <p14:creationId xmlns:p14="http://schemas.microsoft.com/office/powerpoint/2010/main" val="467895165"/>
+        <p14:creationId xmlns:p14="http://schemas.microsoft.com/office/powerpoint/2010/main" val="3106157084"/>
       </p:ext>
     </p:extLst>
   </p:cSld>
@@ -12748,7 +13040,7 @@
           <a:p>
             <a:fld id="{8AAE40A0-A7D8-4DC3-BC9E-BADA32DA2004}" type="datetime4">
               <a:rPr lang="en-US" smtClean="0"/>
-              <a:t>August 15, 2019</a:t>
+              <a:t>August 16, 2019</a:t>
             </a:fld>
             <a:endParaRPr lang="en-US" dirty="0"/>
           </a:p>
@@ -12893,7 +13185,7 @@
           <a:p>
             <a:r>
               <a:rPr lang="en-US" dirty="0"/>
-              <a:t>KILL</a:t>
+              <a:t>PS</a:t>
             </a:r>
           </a:p>
         </p:txBody>
@@ -12946,7 +13238,7 @@
           <a:p>
             <a:fld id="{8AAE40A0-A7D8-4DC3-BC9E-BADA32DA2004}" type="datetime4">
               <a:rPr lang="en-US" smtClean="0"/>
-              <a:t>August 15, 2019</a:t>
+              <a:t>August 16, 2019</a:t>
             </a:fld>
             <a:endParaRPr lang="en-US" dirty="0"/>
           </a:p>
@@ -13041,7 +13333,7 @@
     </p:spTree>
     <p:extLst>
       <p:ext uri="{BB962C8B-B14F-4D97-AF65-F5344CB8AC3E}">
-        <p14:creationId xmlns:p14="http://schemas.microsoft.com/office/powerpoint/2010/main" val="3123161210"/>
+        <p14:creationId xmlns:p14="http://schemas.microsoft.com/office/powerpoint/2010/main" val="467895165"/>
       </p:ext>
     </p:extLst>
   </p:cSld>
@@ -13070,10 +13362,10 @@
       </p:grpSpPr>
       <p:sp>
         <p:nvSpPr>
-          <p:cNvPr id="7" name="Title 6">
-            <a:extLst>
-              <a:ext uri="{FF2B5EF4-FFF2-40B4-BE49-F238E27FC236}">
-                <a16:creationId xmlns:a16="http://schemas.microsoft.com/office/drawing/2014/main" id="{7DEA6DEB-D593-40CA-83FE-502379BE5D84}"/>
+          <p:cNvPr id="2" name="Title 1">
+            <a:extLst>
+              <a:ext uri="{FF2B5EF4-FFF2-40B4-BE49-F238E27FC236}">
+                <a16:creationId xmlns:a16="http://schemas.microsoft.com/office/drawing/2014/main" id="{76118556-0187-4732-968E-C78D95EB2A6D}"/>
               </a:ext>
             </a:extLst>
           </p:cNvPr>
@@ -13091,48 +13383,33 @@
           <a:p>
             <a:r>
               <a:rPr lang="en-US" dirty="0"/>
-              <a:t>A FEW MORE</a:t>
-            </a:r>
-            <a:br>
-              <a:rPr lang="en-US" dirty="0"/>
-            </a:br>
-            <a:r>
-              <a:rPr lang="en-US" dirty="0"/>
-              <a:t>COMMON USE CASES</a:t>
-            </a:r>
-          </a:p>
-        </p:txBody>
-      </p:sp>
-      <p:sp>
-        <p:nvSpPr>
-          <p:cNvPr id="8" name="Text Placeholder 7">
-            <a:extLst>
-              <a:ext uri="{FF2B5EF4-FFF2-40B4-BE49-F238E27FC236}">
-                <a16:creationId xmlns:a16="http://schemas.microsoft.com/office/drawing/2014/main" id="{AE944EF3-ABF7-481D-A3C8-68ED267ADFF3}"/>
-              </a:ext>
-            </a:extLst>
-          </p:cNvPr>
-          <p:cNvSpPr>
-            <a:spLocks noGrp="1"/>
-          </p:cNvSpPr>
-          <p:nvPr>
-            <p:ph type="body" idx="1"/>
-          </p:nvPr>
-        </p:nvSpPr>
-        <p:spPr/>
-        <p:txBody>
-          <a:bodyPr/>
-          <a:lstStyle/>
-          <a:p>
-            <a:r>
-              <a:rPr lang="en-US" dirty="0"/>
-              <a:t>The best </a:t>
-            </a:r>
-            <a:r>
-              <a:rPr lang="en-US"/>
-              <a:t>of automation and beyond</a:t>
-            </a:r>
-            <a:endParaRPr lang="en-US" dirty="0"/>
+              <a:t>KILL</a:t>
+            </a:r>
+          </a:p>
+        </p:txBody>
+      </p:sp>
+      <p:sp>
+        <p:nvSpPr>
+          <p:cNvPr id="3" name="Content Placeholder 2">
+            <a:extLst>
+              <a:ext uri="{FF2B5EF4-FFF2-40B4-BE49-F238E27FC236}">
+                <a16:creationId xmlns:a16="http://schemas.microsoft.com/office/drawing/2014/main" id="{F18436D4-BA46-47E0-BD91-51D2DE314892}"/>
+              </a:ext>
+            </a:extLst>
+          </p:cNvPr>
+          <p:cNvSpPr>
+            <a:spLocks noGrp="1"/>
+          </p:cNvSpPr>
+          <p:nvPr>
+            <p:ph idx="1"/>
+          </p:nvPr>
+        </p:nvSpPr>
+        <p:spPr/>
+        <p:txBody>
+          <a:bodyPr/>
+          <a:lstStyle/>
+          <a:p>
+            <a:endParaRPr lang="en-US"/>
           </a:p>
         </p:txBody>
       </p:sp>
@@ -13141,7 +13418,7 @@
           <p:cNvPr id="4" name="Date Placeholder 3">
             <a:extLst>
               <a:ext uri="{FF2B5EF4-FFF2-40B4-BE49-F238E27FC236}">
-                <a16:creationId xmlns:a16="http://schemas.microsoft.com/office/drawing/2014/main" id="{A6D1E9DA-9755-48F7-A76D-75CF03204498}"/>
+                <a16:creationId xmlns:a16="http://schemas.microsoft.com/office/drawing/2014/main" id="{F8BB5762-D626-4F41-BFE6-A11AF777F6D8}"/>
               </a:ext>
             </a:extLst>
           </p:cNvPr>
@@ -13159,7 +13436,7 @@
           <a:p>
             <a:fld id="{8AAE40A0-A7D8-4DC3-BC9E-BADA32DA2004}" type="datetime4">
               <a:rPr lang="en-US" smtClean="0"/>
-              <a:t>August 15, 2019</a:t>
+              <a:t>August 16, 2019</a:t>
             </a:fld>
             <a:endParaRPr lang="en-US" dirty="0"/>
           </a:p>
@@ -13170,7 +13447,7 @@
           <p:cNvPr id="5" name="Footer Placeholder 4">
             <a:extLst>
               <a:ext uri="{FF2B5EF4-FFF2-40B4-BE49-F238E27FC236}">
-                <a16:creationId xmlns:a16="http://schemas.microsoft.com/office/drawing/2014/main" id="{CED6753D-9982-40F5-A2F1-14CE4CDFE833}"/>
+                <a16:creationId xmlns:a16="http://schemas.microsoft.com/office/drawing/2014/main" id="{8EDB9D35-56C5-4AA6-8252-57704C4A289F}"/>
               </a:ext>
             </a:extLst>
           </p:cNvPr>
@@ -13227,7 +13504,7 @@
           <p:cNvPr id="6" name="Slide Number Placeholder 5">
             <a:extLst>
               <a:ext uri="{FF2B5EF4-FFF2-40B4-BE49-F238E27FC236}">
-                <a16:creationId xmlns:a16="http://schemas.microsoft.com/office/drawing/2014/main" id="{8079A50D-A0B5-4649-BD03-A96B4890EF93}"/>
+                <a16:creationId xmlns:a16="http://schemas.microsoft.com/office/drawing/2014/main" id="{11295AC8-69BA-4E0A-953B-3E0CD278C2ED}"/>
               </a:ext>
             </a:extLst>
           </p:cNvPr>
@@ -13254,7 +13531,7 @@
     </p:spTree>
     <p:extLst>
       <p:ext uri="{BB962C8B-B14F-4D97-AF65-F5344CB8AC3E}">
-        <p14:creationId xmlns:p14="http://schemas.microsoft.com/office/powerpoint/2010/main" val="649678634"/>
+        <p14:creationId xmlns:p14="http://schemas.microsoft.com/office/powerpoint/2010/main" val="3123161210"/>
       </p:ext>
     </p:extLst>
   </p:cSld>
@@ -13283,10 +13560,10 @@
       </p:grpSpPr>
       <p:sp>
         <p:nvSpPr>
-          <p:cNvPr id="2" name="Title 1">
-            <a:extLst>
-              <a:ext uri="{FF2B5EF4-FFF2-40B4-BE49-F238E27FC236}">
-                <a16:creationId xmlns:a16="http://schemas.microsoft.com/office/drawing/2014/main" id="{98EB4F1B-51B3-4B64-8210-21AE8BE64582}"/>
+          <p:cNvPr id="7" name="Title 6">
+            <a:extLst>
+              <a:ext uri="{FF2B5EF4-FFF2-40B4-BE49-F238E27FC236}">
+                <a16:creationId xmlns:a16="http://schemas.microsoft.com/office/drawing/2014/main" id="{7DEA6DEB-D593-40CA-83FE-502379BE5D84}"/>
               </a:ext>
             </a:extLst>
           </p:cNvPr>
@@ -13304,50 +13581,47 @@
           <a:p>
             <a:r>
               <a:rPr lang="en-US" dirty="0"/>
-              <a:t>AUTOMATION</a:t>
-            </a:r>
-          </a:p>
-        </p:txBody>
-      </p:sp>
-      <p:sp>
-        <p:nvSpPr>
-          <p:cNvPr id="3" name="Content Placeholder 2">
-            <a:extLst>
-              <a:ext uri="{FF2B5EF4-FFF2-40B4-BE49-F238E27FC236}">
-                <a16:creationId xmlns:a16="http://schemas.microsoft.com/office/drawing/2014/main" id="{593AD591-5DD9-410C-B27F-EACDDF765FF4}"/>
-              </a:ext>
-            </a:extLst>
-          </p:cNvPr>
-          <p:cNvSpPr>
-            <a:spLocks noGrp="1"/>
-          </p:cNvSpPr>
-          <p:nvPr>
-            <p:ph idx="1"/>
-          </p:nvPr>
-        </p:nvSpPr>
-        <p:spPr/>
-        <p:txBody>
-          <a:bodyPr/>
-          <a:lstStyle/>
-          <a:p>
-            <a:r>
-              <a:rPr lang="en-US" dirty="0"/>
-              <a:t>Perhaps the best feature of bash and shell environments – easy automation!</a:t>
-            </a:r>
-          </a:p>
-          <a:p>
-            <a:r>
-              <a:rPr lang="en-US" dirty="0"/>
-              <a:t>Want to run a command once a day to clean up cached files? Easy!</a:t>
-            </a:r>
-          </a:p>
-          <a:p>
-            <a:r>
-              <a:rPr lang="en-US" dirty="0"/>
-              <a:t>Want to simplify a complex process so you can do it all by typing one word? Easy!</a:t>
-            </a:r>
-          </a:p>
-          <a:p>
+              <a:t>A FEW MORE</a:t>
+            </a:r>
+            <a:br>
+              <a:rPr lang="en-US" dirty="0"/>
+            </a:br>
+            <a:r>
+              <a:rPr lang="en-US" dirty="0"/>
+              <a:t>COMMON USE CASES</a:t>
+            </a:r>
+          </a:p>
+        </p:txBody>
+      </p:sp>
+      <p:sp>
+        <p:nvSpPr>
+          <p:cNvPr id="8" name="Text Placeholder 7">
+            <a:extLst>
+              <a:ext uri="{FF2B5EF4-FFF2-40B4-BE49-F238E27FC236}">
+                <a16:creationId xmlns:a16="http://schemas.microsoft.com/office/drawing/2014/main" id="{AE944EF3-ABF7-481D-A3C8-68ED267ADFF3}"/>
+              </a:ext>
+            </a:extLst>
+          </p:cNvPr>
+          <p:cNvSpPr>
+            <a:spLocks noGrp="1"/>
+          </p:cNvSpPr>
+          <p:nvPr>
+            <p:ph type="body" idx="1"/>
+          </p:nvPr>
+        </p:nvSpPr>
+        <p:spPr/>
+        <p:txBody>
+          <a:bodyPr/>
+          <a:lstStyle/>
+          <a:p>
+            <a:r>
+              <a:rPr lang="en-US" dirty="0"/>
+              <a:t>The best </a:t>
+            </a:r>
+            <a:r>
+              <a:rPr lang="en-US"/>
+              <a:t>of automation and beyond</a:t>
+            </a:r>
             <a:endParaRPr lang="en-US" dirty="0"/>
           </a:p>
         </p:txBody>
@@ -13357,7 +13631,7 @@
           <p:cNvPr id="4" name="Date Placeholder 3">
             <a:extLst>
               <a:ext uri="{FF2B5EF4-FFF2-40B4-BE49-F238E27FC236}">
-                <a16:creationId xmlns:a16="http://schemas.microsoft.com/office/drawing/2014/main" id="{17E05AC0-8A63-4FDD-A727-54A8C6040A83}"/>
+                <a16:creationId xmlns:a16="http://schemas.microsoft.com/office/drawing/2014/main" id="{A6D1E9DA-9755-48F7-A76D-75CF03204498}"/>
               </a:ext>
             </a:extLst>
           </p:cNvPr>
@@ -13375,7 +13649,7 @@
           <a:p>
             <a:fld id="{8AAE40A0-A7D8-4DC3-BC9E-BADA32DA2004}" type="datetime4">
               <a:rPr lang="en-US" smtClean="0"/>
-              <a:t>August 15, 2019</a:t>
+              <a:t>August 16, 2019</a:t>
             </a:fld>
             <a:endParaRPr lang="en-US" dirty="0"/>
           </a:p>
@@ -13386,7 +13660,7 @@
           <p:cNvPr id="5" name="Footer Placeholder 4">
             <a:extLst>
               <a:ext uri="{FF2B5EF4-FFF2-40B4-BE49-F238E27FC236}">
-                <a16:creationId xmlns:a16="http://schemas.microsoft.com/office/drawing/2014/main" id="{9C0CA735-E60F-4094-86F7-D33BB272FA25}"/>
+                <a16:creationId xmlns:a16="http://schemas.microsoft.com/office/drawing/2014/main" id="{CED6753D-9982-40F5-A2F1-14CE4CDFE833}"/>
               </a:ext>
             </a:extLst>
           </p:cNvPr>
@@ -13443,7 +13717,7 @@
           <p:cNvPr id="6" name="Slide Number Placeholder 5">
             <a:extLst>
               <a:ext uri="{FF2B5EF4-FFF2-40B4-BE49-F238E27FC236}">
-                <a16:creationId xmlns:a16="http://schemas.microsoft.com/office/drawing/2014/main" id="{33AAFB92-45C0-421A-AC0A-7A439518D3F4}"/>
+                <a16:creationId xmlns:a16="http://schemas.microsoft.com/office/drawing/2014/main" id="{8079A50D-A0B5-4649-BD03-A96B4890EF93}"/>
               </a:ext>
             </a:extLst>
           </p:cNvPr>
@@ -13470,7 +13744,7 @@
     </p:spTree>
     <p:extLst>
       <p:ext uri="{BB962C8B-B14F-4D97-AF65-F5344CB8AC3E}">
-        <p14:creationId xmlns:p14="http://schemas.microsoft.com/office/powerpoint/2010/main" val="3313557375"/>
+        <p14:creationId xmlns:p14="http://schemas.microsoft.com/office/powerpoint/2010/main" val="649678634"/>
       </p:ext>
     </p:extLst>
   </p:cSld>
@@ -13520,7 +13794,7 @@
           <a:p>
             <a:r>
               <a:rPr lang="en-US" dirty="0"/>
-              <a:t>SCHEDULING WITH CRON</a:t>
+              <a:t>AUTOMATION</a:t>
             </a:r>
           </a:p>
         </p:txBody>
@@ -13548,62 +13822,23 @@
           <a:p>
             <a:r>
               <a:rPr lang="en-US" dirty="0"/>
-              <a:t>Crontab: has information for scheduling</a:t>
-            </a:r>
-          </a:p>
-          <a:p>
-            <a:r>
-              <a:rPr lang="en-US" dirty="0"/>
-              <a:t>Use </a:t>
-            </a:r>
-            <a:r>
-              <a:rPr lang="en-US" dirty="0">
-                <a:hlinkClick r:id="rId2"/>
-              </a:rPr>
-              <a:t>https://crontab.guru</a:t>
-            </a:r>
-            <a:r>
-              <a:rPr lang="en-US" dirty="0"/>
-              <a:t> to help with syntax</a:t>
-            </a:r>
-          </a:p>
-          <a:p>
-            <a:r>
-              <a:rPr lang="en-US" dirty="0"/>
-              <a:t>Example:</a:t>
-            </a:r>
-          </a:p>
-          <a:p>
-            <a:pPr marL="457200" lvl="1" indent="0">
-              <a:buNone/>
-            </a:pPr>
-            <a:r>
-              <a:rPr lang="en-US" dirty="0">
-                <a:latin typeface="Courier New" panose="02070309020205020404" pitchFamily="49" charset="0"/>
-                <a:cs typeface="Courier New" panose="02070309020205020404" pitchFamily="49" charset="0"/>
-              </a:rPr>
-              <a:t>30 4 * * MON rm –rf /</a:t>
-            </a:r>
-            <a:r>
-              <a:rPr lang="en-US" dirty="0" err="1">
-                <a:latin typeface="Courier New" panose="02070309020205020404" pitchFamily="49" charset="0"/>
-                <a:cs typeface="Courier New" panose="02070309020205020404" pitchFamily="49" charset="0"/>
-              </a:rPr>
-              <a:t>tmp</a:t>
-            </a:r>
-            <a:r>
-              <a:rPr lang="en-US" dirty="0">
-                <a:latin typeface="Courier New" panose="02070309020205020404" pitchFamily="49" charset="0"/>
-                <a:cs typeface="Courier New" panose="02070309020205020404" pitchFamily="49" charset="0"/>
-              </a:rPr>
-              <a:t>/* </a:t>
-            </a:r>
-            <a:r>
-              <a:rPr lang="en-US" dirty="0">
-                <a:cs typeface="Courier New" panose="02070309020205020404" pitchFamily="49" charset="0"/>
-              </a:rPr>
-              <a:t>means delete all temporary files at 4:30 AM every Monday</a:t>
-            </a:r>
+              <a:t>Perhaps the best feature of bash and shell environments – easy automation!</a:t>
+            </a:r>
+          </a:p>
+          <a:p>
+            <a:r>
+              <a:rPr lang="en-US" dirty="0"/>
+              <a:t>Want to run a command once a day to clean up cached files? Easy!</a:t>
+            </a:r>
+          </a:p>
+          <a:p>
+            <a:r>
+              <a:rPr lang="en-US" dirty="0"/>
+              <a:t>Want to simplify a complex process so you can do it all by typing one word? Easy!</a:t>
+            </a:r>
+          </a:p>
+          <a:p>
+            <a:endParaRPr lang="en-US" dirty="0"/>
           </a:p>
         </p:txBody>
       </p:sp>
@@ -13630,7 +13865,7 @@
           <a:p>
             <a:fld id="{8AAE40A0-A7D8-4DC3-BC9E-BADA32DA2004}" type="datetime4">
               <a:rPr lang="en-US" smtClean="0"/>
-              <a:t>August 15, 2019</a:t>
+              <a:t>August 16, 2019</a:t>
             </a:fld>
             <a:endParaRPr lang="en-US" dirty="0"/>
           </a:p>
@@ -13725,7 +13960,7 @@
     </p:spTree>
     <p:extLst>
       <p:ext uri="{BB962C8B-B14F-4D97-AF65-F5344CB8AC3E}">
-        <p14:creationId xmlns:p14="http://schemas.microsoft.com/office/powerpoint/2010/main" val="4218999613"/>
+        <p14:creationId xmlns:p14="http://schemas.microsoft.com/office/powerpoint/2010/main" val="3313557375"/>
       </p:ext>
     </p:extLst>
   </p:cSld>
@@ -13754,10 +13989,10 @@
       </p:grpSpPr>
       <p:sp>
         <p:nvSpPr>
-          <p:cNvPr id="7" name="Title 6">
-            <a:extLst>
-              <a:ext uri="{FF2B5EF4-FFF2-40B4-BE49-F238E27FC236}">
-                <a16:creationId xmlns:a16="http://schemas.microsoft.com/office/drawing/2014/main" id="{495B4BC0-844B-4414-A623-BEF78AAC1BA1}"/>
+          <p:cNvPr id="2" name="Title 1">
+            <a:extLst>
+              <a:ext uri="{FF2B5EF4-FFF2-40B4-BE49-F238E27FC236}">
+                <a16:creationId xmlns:a16="http://schemas.microsoft.com/office/drawing/2014/main" id="{98EB4F1B-51B3-4B64-8210-21AE8BE64582}"/>
               </a:ext>
             </a:extLst>
           </p:cNvPr>
@@ -13775,17 +14010,17 @@
           <a:p>
             <a:r>
               <a:rPr lang="en-US" dirty="0"/>
-              <a:t>ACKNOWLEDGMENTS</a:t>
-            </a:r>
-          </a:p>
-        </p:txBody>
-      </p:sp>
-      <p:sp>
-        <p:nvSpPr>
-          <p:cNvPr id="8" name="Content Placeholder 7">
-            <a:extLst>
-              <a:ext uri="{FF2B5EF4-FFF2-40B4-BE49-F238E27FC236}">
-                <a16:creationId xmlns:a16="http://schemas.microsoft.com/office/drawing/2014/main" id="{2BED3EB3-7E98-4A82-8335-7321D9E37B16}"/>
+              <a:t>SCHEDULING WITH CRON</a:t>
+            </a:r>
+          </a:p>
+        </p:txBody>
+      </p:sp>
+      <p:sp>
+        <p:nvSpPr>
+          <p:cNvPr id="3" name="Content Placeholder 2">
+            <a:extLst>
+              <a:ext uri="{FF2B5EF4-FFF2-40B4-BE49-F238E27FC236}">
+                <a16:creationId xmlns:a16="http://schemas.microsoft.com/office/drawing/2014/main" id="{593AD591-5DD9-410C-B27F-EACDDF765FF4}"/>
               </a:ext>
             </a:extLst>
           </p:cNvPr>
@@ -13803,41 +14038,62 @@
           <a:p>
             <a:r>
               <a:rPr lang="en-US" dirty="0"/>
-              <a:t>The Bash Logo is licensed for free use under the Copyleft license.</a:t>
-            </a:r>
-          </a:p>
-          <a:p>
-            <a:r>
-              <a:rPr lang="en-US" dirty="0"/>
-              <a:t>The bash screenshot on Slide 2 is R and Bash running under a </a:t>
-            </a:r>
-            <a:r>
-              <a:rPr lang="en-US" dirty="0" err="1"/>
-              <a:t>Remmina</a:t>
-            </a:r>
-            <a:r>
-              <a:rPr lang="en-US" dirty="0"/>
-              <a:t> connection.</a:t>
-            </a:r>
-          </a:p>
-          <a:p>
-            <a:r>
-              <a:rPr lang="en-US" dirty="0"/>
-              <a:t>The picture on Slide 6 is licensed under Creative Commons Attribution-</a:t>
-            </a:r>
-            <a:r>
-              <a:rPr lang="en-US" dirty="0" err="1"/>
-              <a:t>ShareAlike</a:t>
-            </a:r>
-            <a:r>
-              <a:rPr lang="en-US" dirty="0"/>
-              <a:t> 4.0 International, created by </a:t>
-            </a:r>
-            <a:r>
-              <a:rPr lang="en-US" dirty="0" err="1"/>
-              <a:t>Gorthmog</a:t>
-            </a:r>
-            <a:endParaRPr lang="en-US" dirty="0"/>
+              <a:t>Crontab: has information for scheduling</a:t>
+            </a:r>
+          </a:p>
+          <a:p>
+            <a:r>
+              <a:rPr lang="en-US" dirty="0"/>
+              <a:t>Use </a:t>
+            </a:r>
+            <a:r>
+              <a:rPr lang="en-US" dirty="0">
+                <a:hlinkClick r:id="rId2"/>
+              </a:rPr>
+              <a:t>https://crontab.guru</a:t>
+            </a:r>
+            <a:r>
+              <a:rPr lang="en-US" dirty="0"/>
+              <a:t> to help with syntax</a:t>
+            </a:r>
+          </a:p>
+          <a:p>
+            <a:r>
+              <a:rPr lang="en-US" dirty="0"/>
+              <a:t>Example:</a:t>
+            </a:r>
+          </a:p>
+          <a:p>
+            <a:pPr marL="457200" lvl="1" indent="0">
+              <a:buNone/>
+            </a:pPr>
+            <a:r>
+              <a:rPr lang="en-US" dirty="0">
+                <a:latin typeface="Courier New" panose="02070309020205020404" pitchFamily="49" charset="0"/>
+                <a:cs typeface="Courier New" panose="02070309020205020404" pitchFamily="49" charset="0"/>
+              </a:rPr>
+              <a:t>30 4 * * MON rm –rf /</a:t>
+            </a:r>
+            <a:r>
+              <a:rPr lang="en-US" dirty="0" err="1">
+                <a:latin typeface="Courier New" panose="02070309020205020404" pitchFamily="49" charset="0"/>
+                <a:cs typeface="Courier New" panose="02070309020205020404" pitchFamily="49" charset="0"/>
+              </a:rPr>
+              <a:t>tmp</a:t>
+            </a:r>
+            <a:r>
+              <a:rPr lang="en-US" dirty="0">
+                <a:latin typeface="Courier New" panose="02070309020205020404" pitchFamily="49" charset="0"/>
+                <a:cs typeface="Courier New" panose="02070309020205020404" pitchFamily="49" charset="0"/>
+              </a:rPr>
+              <a:t>/* </a:t>
+            </a:r>
+            <a:r>
+              <a:rPr lang="en-US" dirty="0">
+                <a:cs typeface="Courier New" panose="02070309020205020404" pitchFamily="49" charset="0"/>
+              </a:rPr>
+              <a:t>means delete all temporary files at 4:30 AM every Monday</a:t>
+            </a:r>
           </a:p>
         </p:txBody>
       </p:sp>
@@ -13846,7 +14102,7 @@
           <p:cNvPr id="4" name="Date Placeholder 3">
             <a:extLst>
               <a:ext uri="{FF2B5EF4-FFF2-40B4-BE49-F238E27FC236}">
-                <a16:creationId xmlns:a16="http://schemas.microsoft.com/office/drawing/2014/main" id="{540F37F1-4F33-429F-A568-1A3ADC499E54}"/>
+                <a16:creationId xmlns:a16="http://schemas.microsoft.com/office/drawing/2014/main" id="{17E05AC0-8A63-4FDD-A727-54A8C6040A83}"/>
               </a:ext>
             </a:extLst>
           </p:cNvPr>
@@ -13862,9 +14118,9 @@
           <a:bodyPr/>
           <a:lstStyle/>
           <a:p>
-            <a:fld id="{B08FEED8-D7D4-44E9-BFBC-ED06B5996D94}" type="datetime4">
+            <a:fld id="{8AAE40A0-A7D8-4DC3-BC9E-BADA32DA2004}" type="datetime4">
               <a:rPr lang="en-US" smtClean="0"/>
-              <a:t>August 15, 2019</a:t>
+              <a:t>August 16, 2019</a:t>
             </a:fld>
             <a:endParaRPr lang="en-US" dirty="0"/>
           </a:p>
@@ -13875,7 +14131,7 @@
           <p:cNvPr id="5" name="Footer Placeholder 4">
             <a:extLst>
               <a:ext uri="{FF2B5EF4-FFF2-40B4-BE49-F238E27FC236}">
-                <a16:creationId xmlns:a16="http://schemas.microsoft.com/office/drawing/2014/main" id="{673FFA57-C126-4795-A5F6-DD33AAC5ACBD}"/>
+                <a16:creationId xmlns:a16="http://schemas.microsoft.com/office/drawing/2014/main" id="{9C0CA735-E60F-4094-86F7-D33BB272FA25}"/>
               </a:ext>
             </a:extLst>
           </p:cNvPr>
@@ -13932,7 +14188,7 @@
           <p:cNvPr id="6" name="Slide Number Placeholder 5">
             <a:extLst>
               <a:ext uri="{FF2B5EF4-FFF2-40B4-BE49-F238E27FC236}">
-                <a16:creationId xmlns:a16="http://schemas.microsoft.com/office/drawing/2014/main" id="{2FA49567-BB70-4798-8746-D0B522CCEE20}"/>
+                <a16:creationId xmlns:a16="http://schemas.microsoft.com/office/drawing/2014/main" id="{33AAFB92-45C0-421A-AC0A-7A439518D3F4}"/>
               </a:ext>
             </a:extLst>
           </p:cNvPr>
@@ -13951,6 +14207,240 @@
             <a:fld id="{D57F1E4F-1CFF-5643-939E-02111984F565}" type="slidenum">
               <a:rPr lang="en-US" smtClean="0"/>
               <a:t>44</a:t>
+            </a:fld>
+            <a:endParaRPr lang="en-US" dirty="0"/>
+          </a:p>
+        </p:txBody>
+      </p:sp>
+    </p:spTree>
+    <p:extLst>
+      <p:ext uri="{BB962C8B-B14F-4D97-AF65-F5344CB8AC3E}">
+        <p14:creationId xmlns:p14="http://schemas.microsoft.com/office/powerpoint/2010/main" val="4218999613"/>
+      </p:ext>
+    </p:extLst>
+  </p:cSld>
+  <p:clrMapOvr>
+    <a:masterClrMapping/>
+  </p:clrMapOvr>
+</p:sld>
+</file>
+
+<file path=ppt/slides/slide45.xml><?xml version="1.0" encoding="utf-8"?>
+<p:sld xmlns:a="http://schemas.openxmlformats.org/drawingml/2006/main" xmlns:r="http://schemas.openxmlformats.org/officeDocument/2006/relationships" xmlns:p="http://schemas.openxmlformats.org/presentationml/2006/main">
+  <p:cSld>
+    <p:spTree>
+      <p:nvGrpSpPr>
+        <p:cNvPr id="1" name=""/>
+        <p:cNvGrpSpPr/>
+        <p:nvPr/>
+      </p:nvGrpSpPr>
+      <p:grpSpPr>
+        <a:xfrm>
+          <a:off x="0" y="0"/>
+          <a:ext cx="0" cy="0"/>
+          <a:chOff x="0" y="0"/>
+          <a:chExt cx="0" cy="0"/>
+        </a:xfrm>
+      </p:grpSpPr>
+      <p:sp>
+        <p:nvSpPr>
+          <p:cNvPr id="7" name="Title 6">
+            <a:extLst>
+              <a:ext uri="{FF2B5EF4-FFF2-40B4-BE49-F238E27FC236}">
+                <a16:creationId xmlns:a16="http://schemas.microsoft.com/office/drawing/2014/main" id="{495B4BC0-844B-4414-A623-BEF78AAC1BA1}"/>
+              </a:ext>
+            </a:extLst>
+          </p:cNvPr>
+          <p:cNvSpPr>
+            <a:spLocks noGrp="1"/>
+          </p:cNvSpPr>
+          <p:nvPr>
+            <p:ph type="title"/>
+          </p:nvPr>
+        </p:nvSpPr>
+        <p:spPr/>
+        <p:txBody>
+          <a:bodyPr/>
+          <a:lstStyle/>
+          <a:p>
+            <a:r>
+              <a:rPr lang="en-US" dirty="0"/>
+              <a:t>ACKNOWLEDGMENTS</a:t>
+            </a:r>
+          </a:p>
+        </p:txBody>
+      </p:sp>
+      <p:sp>
+        <p:nvSpPr>
+          <p:cNvPr id="8" name="Content Placeholder 7">
+            <a:extLst>
+              <a:ext uri="{FF2B5EF4-FFF2-40B4-BE49-F238E27FC236}">
+                <a16:creationId xmlns:a16="http://schemas.microsoft.com/office/drawing/2014/main" id="{2BED3EB3-7E98-4A82-8335-7321D9E37B16}"/>
+              </a:ext>
+            </a:extLst>
+          </p:cNvPr>
+          <p:cNvSpPr>
+            <a:spLocks noGrp="1"/>
+          </p:cNvSpPr>
+          <p:nvPr>
+            <p:ph idx="1"/>
+          </p:nvPr>
+        </p:nvSpPr>
+        <p:spPr/>
+        <p:txBody>
+          <a:bodyPr/>
+          <a:lstStyle/>
+          <a:p>
+            <a:r>
+              <a:rPr lang="en-US" dirty="0"/>
+              <a:t>The Bash Logo is licensed for free use under the Copyleft license.</a:t>
+            </a:r>
+          </a:p>
+          <a:p>
+            <a:r>
+              <a:rPr lang="en-US" dirty="0"/>
+              <a:t>The bash screenshot on Slide 2 is R and Bash running under a </a:t>
+            </a:r>
+            <a:r>
+              <a:rPr lang="en-US" dirty="0" err="1"/>
+              <a:t>Remmina</a:t>
+            </a:r>
+            <a:r>
+              <a:rPr lang="en-US" dirty="0"/>
+              <a:t> connection.</a:t>
+            </a:r>
+          </a:p>
+          <a:p>
+            <a:r>
+              <a:rPr lang="en-US" dirty="0"/>
+              <a:t>The picture on Slide 6 is licensed under Creative Commons Attribution-</a:t>
+            </a:r>
+            <a:r>
+              <a:rPr lang="en-US" dirty="0" err="1"/>
+              <a:t>ShareAlike</a:t>
+            </a:r>
+            <a:r>
+              <a:rPr lang="en-US" dirty="0"/>
+              <a:t> 4.0 International, created by </a:t>
+            </a:r>
+            <a:r>
+              <a:rPr lang="en-US" dirty="0" err="1"/>
+              <a:t>Gorthmog</a:t>
+            </a:r>
+            <a:endParaRPr lang="en-US" dirty="0"/>
+          </a:p>
+        </p:txBody>
+      </p:sp>
+      <p:sp>
+        <p:nvSpPr>
+          <p:cNvPr id="4" name="Date Placeholder 3">
+            <a:extLst>
+              <a:ext uri="{FF2B5EF4-FFF2-40B4-BE49-F238E27FC236}">
+                <a16:creationId xmlns:a16="http://schemas.microsoft.com/office/drawing/2014/main" id="{540F37F1-4F33-429F-A568-1A3ADC499E54}"/>
+              </a:ext>
+            </a:extLst>
+          </p:cNvPr>
+          <p:cNvSpPr>
+            <a:spLocks noGrp="1"/>
+          </p:cNvSpPr>
+          <p:nvPr>
+            <p:ph type="dt" sz="half" idx="10"/>
+          </p:nvPr>
+        </p:nvSpPr>
+        <p:spPr/>
+        <p:txBody>
+          <a:bodyPr/>
+          <a:lstStyle/>
+          <a:p>
+            <a:fld id="{B08FEED8-D7D4-44E9-BFBC-ED06B5996D94}" type="datetime4">
+              <a:rPr lang="en-US" smtClean="0"/>
+              <a:t>August 16, 2019</a:t>
+            </a:fld>
+            <a:endParaRPr lang="en-US" dirty="0"/>
+          </a:p>
+        </p:txBody>
+      </p:sp>
+      <p:sp>
+        <p:nvSpPr>
+          <p:cNvPr id="5" name="Footer Placeholder 4">
+            <a:extLst>
+              <a:ext uri="{FF2B5EF4-FFF2-40B4-BE49-F238E27FC236}">
+                <a16:creationId xmlns:a16="http://schemas.microsoft.com/office/drawing/2014/main" id="{673FFA57-C126-4795-A5F6-DD33AAC5ACBD}"/>
+              </a:ext>
+            </a:extLst>
+          </p:cNvPr>
+          <p:cNvSpPr>
+            <a:spLocks noGrp="1"/>
+          </p:cNvSpPr>
+          <p:nvPr>
+            <p:ph type="ftr" sz="quarter" idx="11"/>
+          </p:nvPr>
+        </p:nvSpPr>
+        <p:spPr/>
+        <p:txBody>
+          <a:bodyPr/>
+          <a:lstStyle/>
+          <a:p>
+            <a:r>
+              <a:rPr lang="en-US"/>
+              <a:t>Digital Scholarship Services </a:t>
+            </a:r>
+            <a:r>
+              <a:rPr lang="en-US">
+                <a:solidFill>
+                  <a:schemeClr val="accent1">
+                    <a:lumMod val="50000"/>
+                  </a:schemeClr>
+                </a:solidFill>
+              </a:rPr>
+              <a:t>| Email</a:t>
+            </a:r>
+            <a:r>
+              <a:rPr lang="en-US"/>
+              <a:t> cf24@rice.edu </a:t>
+            </a:r>
+            <a:r>
+              <a:rPr lang="en-US">
+                <a:solidFill>
+                  <a:schemeClr val="accent1">
+                    <a:lumMod val="50000"/>
+                  </a:schemeClr>
+                </a:solidFill>
+              </a:rPr>
+              <a:t>|</a:t>
+            </a:r>
+            <a:r>
+              <a:rPr lang="en-US"/>
+              <a:t> library.rice.edu/dss</a:t>
+            </a:r>
+            <a:endParaRPr lang="en-US" dirty="0"/>
+          </a:p>
+        </p:txBody>
+      </p:sp>
+      <p:sp>
+        <p:nvSpPr>
+          <p:cNvPr id="6" name="Slide Number Placeholder 5">
+            <a:extLst>
+              <a:ext uri="{FF2B5EF4-FFF2-40B4-BE49-F238E27FC236}">
+                <a16:creationId xmlns:a16="http://schemas.microsoft.com/office/drawing/2014/main" id="{2FA49567-BB70-4798-8746-D0B522CCEE20}"/>
+              </a:ext>
+            </a:extLst>
+          </p:cNvPr>
+          <p:cNvSpPr>
+            <a:spLocks noGrp="1"/>
+          </p:cNvSpPr>
+          <p:nvPr>
+            <p:ph type="sldNum" sz="quarter" idx="12"/>
+          </p:nvPr>
+        </p:nvSpPr>
+        <p:spPr/>
+        <p:txBody>
+          <a:bodyPr/>
+          <a:lstStyle/>
+          <a:p>
+            <a:fld id="{D57F1E4F-1CFF-5643-939E-02111984F565}" type="slidenum">
+              <a:rPr lang="en-US" smtClean="0"/>
+              <a:t>45</a:t>
             </a:fld>
             <a:endParaRPr lang="en-US" dirty="0"/>
           </a:p>
@@ -14100,7 +14590,7 @@
           <a:p>
             <a:fld id="{8AAE40A0-A7D8-4DC3-BC9E-BADA32DA2004}" type="datetime4">
               <a:rPr lang="en-US" smtClean="0"/>
-              <a:t>August 15, 2019</a:t>
+              <a:t>August 16, 2019</a:t>
             </a:fld>
             <a:endParaRPr lang="en-US" dirty="0"/>
           </a:p>
@@ -14351,7 +14841,7 @@
           <a:p>
             <a:fld id="{8AAE40A0-A7D8-4DC3-BC9E-BADA32DA2004}" type="datetime4">
               <a:rPr lang="en-US" smtClean="0"/>
-              <a:t>August 15, 2019</a:t>
+              <a:t>August 16, 2019</a:t>
             </a:fld>
             <a:endParaRPr lang="en-US" dirty="0"/>
           </a:p>
@@ -14553,7 +15043,7 @@
           <a:p>
             <a:fld id="{8AAE40A0-A7D8-4DC3-BC9E-BADA32DA2004}" type="datetime4">
               <a:rPr lang="en-US" smtClean="0"/>
-              <a:t>August 15, 2019</a:t>
+              <a:t>August 16, 2019</a:t>
             </a:fld>
             <a:endParaRPr lang="en-US" dirty="0"/>
           </a:p>
@@ -14991,7 +15481,7 @@
           <a:p>
             <a:fld id="{8AAE40A0-A7D8-4DC3-BC9E-BADA32DA2004}" type="datetime4">
               <a:rPr lang="en-US" smtClean="0"/>
-              <a:t>August 15, 2019</a:t>
+              <a:t>August 16, 2019</a:t>
             </a:fld>
             <a:endParaRPr lang="en-US" dirty="0"/>
           </a:p>
@@ -15192,7 +15682,7 @@
           <a:p>
             <a:fld id="{8AAE40A0-A7D8-4DC3-BC9E-BADA32DA2004}" type="datetime4">
               <a:rPr lang="en-US" smtClean="0"/>
-              <a:t>August 15, 2019</a:t>
+              <a:t>August 16, 2019</a:t>
             </a:fld>
             <a:endParaRPr lang="en-US" dirty="0"/>
           </a:p>

</xml_diff>

<commit_message>
add more on regex and matching
</commit_message>
<xml_diff>
--- a/bash/Introduction to Bash.pptx
+++ b/bash/Introduction to Bash.pptx
@@ -5,7 +5,7 @@
     <p:sldMasterId id="2147483707" r:id="rId1"/>
   </p:sldMasterIdLst>
   <p:notesMasterIdLst>
-    <p:notesMasterId r:id="rId49"/>
+    <p:notesMasterId r:id="rId50"/>
   </p:notesMasterIdLst>
   <p:sldIdLst>
     <p:sldId id="266" r:id="rId2"/>
@@ -29,32 +29,33 @@
     <p:sldId id="298" r:id="rId20"/>
     <p:sldId id="299" r:id="rId21"/>
     <p:sldId id="300" r:id="rId22"/>
-    <p:sldId id="303" r:id="rId23"/>
+    <p:sldId id="312" r:id="rId23"/>
     <p:sldId id="304" r:id="rId24"/>
-    <p:sldId id="305" r:id="rId25"/>
-    <p:sldId id="306" r:id="rId26"/>
-    <p:sldId id="307" r:id="rId27"/>
-    <p:sldId id="308" r:id="rId28"/>
-    <p:sldId id="309" r:id="rId29"/>
-    <p:sldId id="290" r:id="rId30"/>
-    <p:sldId id="310" r:id="rId31"/>
-    <p:sldId id="296" r:id="rId32"/>
-    <p:sldId id="283" r:id="rId33"/>
-    <p:sldId id="312" r:id="rId34"/>
-    <p:sldId id="313" r:id="rId35"/>
-    <p:sldId id="285" r:id="rId36"/>
-    <p:sldId id="316" r:id="rId37"/>
-    <p:sldId id="284" r:id="rId38"/>
-    <p:sldId id="286" r:id="rId39"/>
-    <p:sldId id="287" r:id="rId40"/>
-    <p:sldId id="288" r:id="rId41"/>
-    <p:sldId id="289" r:id="rId42"/>
-    <p:sldId id="291" r:id="rId43"/>
-    <p:sldId id="293" r:id="rId44"/>
-    <p:sldId id="297" r:id="rId45"/>
-    <p:sldId id="315" r:id="rId46"/>
-    <p:sldId id="314" r:id="rId47"/>
-    <p:sldId id="268" r:id="rId48"/>
+    <p:sldId id="318" r:id="rId25"/>
+    <p:sldId id="303" r:id="rId26"/>
+    <p:sldId id="305" r:id="rId27"/>
+    <p:sldId id="307" r:id="rId28"/>
+    <p:sldId id="306" r:id="rId29"/>
+    <p:sldId id="308" r:id="rId30"/>
+    <p:sldId id="309" r:id="rId31"/>
+    <p:sldId id="290" r:id="rId32"/>
+    <p:sldId id="310" r:id="rId33"/>
+    <p:sldId id="296" r:id="rId34"/>
+    <p:sldId id="283" r:id="rId35"/>
+    <p:sldId id="313" r:id="rId36"/>
+    <p:sldId id="285" r:id="rId37"/>
+    <p:sldId id="316" r:id="rId38"/>
+    <p:sldId id="284" r:id="rId39"/>
+    <p:sldId id="286" r:id="rId40"/>
+    <p:sldId id="287" r:id="rId41"/>
+    <p:sldId id="288" r:id="rId42"/>
+    <p:sldId id="289" r:id="rId43"/>
+    <p:sldId id="291" r:id="rId44"/>
+    <p:sldId id="293" r:id="rId45"/>
+    <p:sldId id="297" r:id="rId46"/>
+    <p:sldId id="315" r:id="rId47"/>
+    <p:sldId id="314" r:id="rId48"/>
+    <p:sldId id="268" r:id="rId49"/>
   </p:sldIdLst>
   <p:sldSz cx="12192000" cy="6858000"/>
   <p:notesSz cx="6858000" cy="9144000"/>
@@ -243,7 +244,7 @@
           <a:p>
             <a:fld id="{D46E3B93-8523-4DBC-8FC5-65A9B9CDE5EE}" type="datetimeFigureOut">
               <a:rPr lang="en-US" smtClean="0"/>
-              <a:t>8/16/2019</a:t>
+              <a:t>8/19/2019</a:t>
             </a:fld>
             <a:endParaRPr lang="en-US"/>
           </a:p>
@@ -639,7 +640,7 @@
           <a:p>
             <a:fld id="{CE8F6EB4-B6EF-44F6-BBD1-CD5E279CFAE2}" type="datetime4">
               <a:rPr lang="en-US" smtClean="0"/>
-              <a:t>August 16, 2019</a:t>
+              <a:t>August 19, 2019</a:t>
             </a:fld>
             <a:endParaRPr lang="en-US" dirty="0"/>
           </a:p>
@@ -811,7 +812,7 @@
           <a:p>
             <a:fld id="{8A405AA7-4C18-4A99-8AAA-8677C1976FC9}" type="datetime4">
               <a:rPr lang="en-US" smtClean="0"/>
-              <a:t>August 16, 2019</a:t>
+              <a:t>August 19, 2019</a:t>
             </a:fld>
             <a:endParaRPr lang="en-US" dirty="0"/>
           </a:p>
@@ -993,7 +994,7 @@
           <a:p>
             <a:fld id="{4EA0D668-33DD-41B9-B668-7E7FF430C345}" type="datetime4">
               <a:rPr lang="en-US" smtClean="0"/>
-              <a:t>August 16, 2019</a:t>
+              <a:t>August 19, 2019</a:t>
             </a:fld>
             <a:endParaRPr lang="en-US" dirty="0"/>
           </a:p>
@@ -1176,7 +1177,7 @@
           <a:p>
             <a:fld id="{8AAE40A0-A7D8-4DC3-BC9E-BADA32DA2004}" type="datetime4">
               <a:rPr lang="en-US" smtClean="0"/>
-              <a:t>August 16, 2019</a:t>
+              <a:t>August 19, 2019</a:t>
             </a:fld>
             <a:endParaRPr lang="en-US" dirty="0"/>
           </a:p>
@@ -1503,7 +1504,7 @@
           <a:p>
             <a:fld id="{B08FEED8-D7D4-44E9-BFBC-ED06B5996D94}" type="datetime4">
               <a:rPr lang="en-US" smtClean="0"/>
-              <a:t>August 16, 2019</a:t>
+              <a:t>August 19, 2019</a:t>
             </a:fld>
             <a:endParaRPr lang="en-US" dirty="0"/>
           </a:p>
@@ -1813,7 +1814,7 @@
           <a:p>
             <a:fld id="{A143C325-9442-4629-8CC6-5CAC69736C93}" type="datetime4">
               <a:rPr lang="en-US" smtClean="0"/>
-              <a:t>August 16, 2019</a:t>
+              <a:t>August 19, 2019</a:t>
             </a:fld>
             <a:endParaRPr lang="en-US" dirty="0"/>
           </a:p>
@@ -2181,7 +2182,7 @@
           <a:p>
             <a:fld id="{EEDAFACB-3FED-4607-9FDD-34A82581A119}" type="datetime4">
               <a:rPr lang="en-US" smtClean="0"/>
-              <a:t>August 16, 2019</a:t>
+              <a:t>August 19, 2019</a:t>
             </a:fld>
             <a:endParaRPr lang="en-US" dirty="0"/>
           </a:p>
@@ -2302,7 +2303,7 @@
           <a:p>
             <a:fld id="{EC2805D6-2E3E-42F7-ABBA-DCD51C704328}" type="datetime4">
               <a:rPr lang="en-US" smtClean="0"/>
-              <a:t>August 16, 2019</a:t>
+              <a:t>August 19, 2019</a:t>
             </a:fld>
             <a:endParaRPr lang="en-US" dirty="0"/>
           </a:p>
@@ -2401,7 +2402,7 @@
           <a:p>
             <a:fld id="{7A745AAB-8888-45FB-8C4E-B86AF9A05200}" type="datetime4">
               <a:rPr lang="en-US" smtClean="0"/>
-              <a:t>August 16, 2019</a:t>
+              <a:t>August 19, 2019</a:t>
             </a:fld>
             <a:endParaRPr lang="en-US" dirty="0"/>
           </a:p>
@@ -2680,7 +2681,7 @@
           <a:p>
             <a:fld id="{9F896CED-8AFA-412F-B61A-472E6093CDBA}" type="datetime4">
               <a:rPr lang="en-US" smtClean="0"/>
-              <a:t>August 16, 2019</a:t>
+              <a:t>August 19, 2019</a:t>
             </a:fld>
             <a:endParaRPr lang="en-US" dirty="0"/>
           </a:p>
@@ -2939,7 +2940,7 @@
           <a:p>
             <a:fld id="{61078AB2-2970-444D-B1FF-A9F37FC020F5}" type="datetime4">
               <a:rPr lang="en-US" smtClean="0"/>
-              <a:t>August 16, 2019</a:t>
+              <a:t>August 19, 2019</a:t>
             </a:fld>
             <a:endParaRPr lang="en-US" dirty="0"/>
           </a:p>
@@ -3157,7 +3158,7 @@
           <a:p>
             <a:fld id="{1148AE1E-D441-45CD-8192-49B13802301D}" type="datetime4">
               <a:rPr lang="en-US" smtClean="0"/>
-              <a:t>August 16, 2019</a:t>
+              <a:t>August 19, 2019</a:t>
             </a:fld>
             <a:endParaRPr lang="en-US" dirty="0"/>
           </a:p>
@@ -3954,7 +3955,7 @@
           <a:p>
             <a:fld id="{B08FEED8-D7D4-44E9-BFBC-ED06B5996D94}" type="datetime4">
               <a:rPr lang="en-US" smtClean="0"/>
-              <a:t>August 16, 2019</a:t>
+              <a:t>August 19, 2019</a:t>
             </a:fld>
             <a:endParaRPr lang="en-US" dirty="0"/>
           </a:p>
@@ -4397,7 +4398,7 @@
           <a:p>
             <a:fld id="{B08FEED8-D7D4-44E9-BFBC-ED06B5996D94}" type="datetime4">
               <a:rPr lang="en-US" smtClean="0"/>
-              <a:t>August 16, 2019</a:t>
+              <a:t>August 19, 2019</a:t>
             </a:fld>
             <a:endParaRPr lang="en-US" dirty="0"/>
           </a:p>
@@ -4787,7 +4788,27 @@
                 <a:latin typeface="Courier New" panose="02070309020205020404" pitchFamily="49" charset="0"/>
                 <a:cs typeface="Courier New" panose="02070309020205020404" pitchFamily="49" charset="0"/>
               </a:rPr>
-              <a:t>--help</a:t>
+              <a:t>--help </a:t>
+            </a:r>
+            <a:r>
+              <a:rPr lang="en-US" dirty="0">
+                <a:cs typeface="Courier New" panose="02070309020205020404" pitchFamily="49" charset="0"/>
+              </a:rPr>
+              <a:t>and/or </a:t>
+            </a:r>
+            <a:r>
+              <a:rPr lang="en-US" dirty="0">
+                <a:latin typeface="Courier New" panose="02070309020205020404" pitchFamily="49" charset="0"/>
+                <a:cs typeface="Courier New" panose="02070309020205020404" pitchFamily="49" charset="0"/>
+              </a:rPr>
+              <a:t>man </a:t>
+            </a:r>
+            <a:r>
+              <a:rPr lang="en-US" i="1" dirty="0">
+                <a:latin typeface="Courier New" panose="02070309020205020404" pitchFamily="49" charset="0"/>
+                <a:cs typeface="Courier New" panose="02070309020205020404" pitchFamily="49" charset="0"/>
+              </a:rPr>
+              <a:t>command</a:t>
             </a:r>
             <a:r>
               <a:rPr lang="en-US" dirty="0">
@@ -4879,7 +4900,7 @@
           <a:p>
             <a:fld id="{B08FEED8-D7D4-44E9-BFBC-ED06B5996D94}" type="datetime4">
               <a:rPr lang="en-US" smtClean="0"/>
-              <a:t>August 16, 2019</a:t>
+              <a:t>August 19, 2019</a:t>
             </a:fld>
             <a:endParaRPr lang="en-US" dirty="0"/>
           </a:p>
@@ -5347,7 +5368,7 @@
           <a:p>
             <a:fld id="{B08FEED8-D7D4-44E9-BFBC-ED06B5996D94}" type="datetime4">
               <a:rPr lang="en-US" smtClean="0"/>
-              <a:t>August 16, 2019</a:t>
+              <a:t>August 19, 2019</a:t>
             </a:fld>
             <a:endParaRPr lang="en-US" dirty="0"/>
           </a:p>
@@ -5819,7 +5840,7 @@
           <a:p>
             <a:fld id="{B08FEED8-D7D4-44E9-BFBC-ED06B5996D94}" type="datetime4">
               <a:rPr lang="en-US" smtClean="0"/>
-              <a:t>August 16, 2019</a:t>
+              <a:t>August 19, 2019</a:t>
             </a:fld>
             <a:endParaRPr lang="en-US" dirty="0"/>
           </a:p>
@@ -6111,7 +6132,23 @@
           <a:p>
             <a:r>
               <a:rPr lang="en-US" dirty="0"/>
-              <a:t>If you have a file called my file.docx, you need to type “my file.docx” to refer to it in a shell environment</a:t>
+              <a:t>If you have a file called </a:t>
+            </a:r>
+            <a:r>
+              <a:rPr lang="en-US" i="1" dirty="0"/>
+              <a:t>my file.docx</a:t>
+            </a:r>
+            <a:r>
+              <a:rPr lang="en-US" dirty="0"/>
+              <a:t>, you need to type </a:t>
+            </a:r>
+            <a:r>
+              <a:rPr lang="en-US" i="1" dirty="0"/>
+              <a:t>“my file.docx” </a:t>
+            </a:r>
+            <a:r>
+              <a:rPr lang="en-US" dirty="0"/>
+              <a:t>to refer to it in a shell environment</a:t>
             </a:r>
           </a:p>
         </p:txBody>
@@ -6225,7 +6262,7 @@
           <a:p>
             <a:fld id="{8AAE40A0-A7D8-4DC3-BC9E-BADA32DA2004}" type="datetime4">
               <a:rPr lang="en-US" smtClean="0"/>
-              <a:t>August 16, 2019</a:t>
+              <a:t>August 19, 2019</a:t>
             </a:fld>
             <a:endParaRPr lang="en-US" dirty="0"/>
           </a:p>
@@ -6417,7 +6454,7 @@
             <a:pPr lvl="1"/>
             <a:r>
               <a:rPr lang="en-US" dirty="0"/>
-              <a:t>Great for configuring global settings</a:t>
+              <a:t>Great for configuring global settings and define useful things</a:t>
             </a:r>
           </a:p>
           <a:p>
@@ -6495,7 +6532,7 @@
           <a:p>
             <a:fld id="{8AAE40A0-A7D8-4DC3-BC9E-BADA32DA2004}" type="datetime4">
               <a:rPr lang="en-US" smtClean="0"/>
-              <a:t>August 16, 2019</a:t>
+              <a:t>August 19, 2019</a:t>
             </a:fld>
             <a:endParaRPr lang="en-US" dirty="0"/>
           </a:p>
@@ -6736,7 +6773,7 @@
           <a:p>
             <a:fld id="{8AAE40A0-A7D8-4DC3-BC9E-BADA32DA2004}" type="datetime4">
               <a:rPr lang="en-US" smtClean="0"/>
-              <a:t>August 16, 2019</a:t>
+              <a:t>August 19, 2019</a:t>
             </a:fld>
             <a:endParaRPr lang="en-US" dirty="0"/>
           </a:p>
@@ -6995,7 +7032,7 @@
           <a:p>
             <a:fld id="{8AAE40A0-A7D8-4DC3-BC9E-BADA32DA2004}" type="datetime4">
               <a:rPr lang="en-US" smtClean="0"/>
-              <a:t>August 16, 2019</a:t>
+              <a:t>August 19, 2019</a:t>
             </a:fld>
             <a:endParaRPr lang="en-US" dirty="0"/>
           </a:p>
@@ -7198,7 +7235,7 @@
           <a:p>
             <a:fld id="{8AAE40A0-A7D8-4DC3-BC9E-BADA32DA2004}" type="datetime4">
               <a:rPr lang="en-US" smtClean="0"/>
-              <a:t>August 16, 2019</a:t>
+              <a:t>August 19, 2019</a:t>
             </a:fld>
             <a:endParaRPr lang="en-US" dirty="0"/>
           </a:p>
@@ -7401,7 +7438,7 @@
             <a:fld id="{8AAE40A0-A7D8-4DC3-BC9E-BADA32DA2004}" type="datetime4">
               <a:rPr lang="en-US" smtClean="0"/>
               <a:pPr/>
-              <a:t>August 16, 2019</a:t>
+              <a:t>August 19, 2019</a:t>
             </a:fld>
             <a:endParaRPr lang="en-US" dirty="0"/>
           </a:p>
@@ -7741,8 +7778,8 @@
           </a:p>
         </p:txBody>
       </p:sp>
-      <mc:AlternateContent xmlns:mc="http://schemas.openxmlformats.org/markup-compatibility/2006">
-        <mc:Choice xmlns:a14="http://schemas.microsoft.com/office/drawing/2010/main" Requires="a14">
+      <mc:AlternateContent xmlns:mc="http://schemas.openxmlformats.org/markup-compatibility/2006" xmlns:a14="http://schemas.microsoft.com/office/drawing/2010/main">
+        <mc:Choice Requires="a14">
           <p:sp>
             <p:nvSpPr>
               <p:cNvPr id="3" name="Content Placeholder 2">
@@ -8362,7 +8399,7 @@
             </p:txBody>
           </p:sp>
         </mc:Choice>
-        <mc:Fallback>
+        <mc:Fallback xmlns="">
           <p:sp>
             <p:nvSpPr>
               <p:cNvPr id="3" name="Content Placeholder 2">
@@ -8425,7 +8462,7 @@
           <a:p>
             <a:fld id="{8AAE40A0-A7D8-4DC3-BC9E-BADA32DA2004}" type="datetime4">
               <a:rPr lang="en-US" smtClean="0"/>
-              <a:t>August 16, 2019</a:t>
+              <a:t>August 19, 2019</a:t>
             </a:fld>
             <a:endParaRPr lang="en-US" dirty="0"/>
           </a:p>
@@ -8575,8 +8612,8 @@
           </a:p>
         </p:txBody>
       </p:sp>
-      <mc:AlternateContent xmlns:mc="http://schemas.openxmlformats.org/markup-compatibility/2006">
-        <mc:Choice xmlns:a14="http://schemas.microsoft.com/office/drawing/2010/main" Requires="a14">
+      <mc:AlternateContent xmlns:mc="http://schemas.openxmlformats.org/markup-compatibility/2006" xmlns:a14="http://schemas.microsoft.com/office/drawing/2010/main">
+        <mc:Choice Requires="a14">
           <p:sp>
             <p:nvSpPr>
               <p:cNvPr id="3" name="Content Placeholder 2">
@@ -8956,7 +8993,7 @@
             </p:txBody>
           </p:sp>
         </mc:Choice>
-        <mc:Fallback>
+        <mc:Fallback xmlns="">
           <p:sp>
             <p:nvSpPr>
               <p:cNvPr id="3" name="Content Placeholder 2">
@@ -9019,7 +9056,7 @@
           <a:p>
             <a:fld id="{8AAE40A0-A7D8-4DC3-BC9E-BADA32DA2004}" type="datetime4">
               <a:rPr lang="en-US" smtClean="0"/>
-              <a:t>August 16, 2019</a:t>
+              <a:t>August 19, 2019</a:t>
             </a:fld>
             <a:endParaRPr lang="en-US" dirty="0"/>
           </a:p>
@@ -9146,7 +9183,7 @@
           <p:cNvPr id="2" name="Title 1">
             <a:extLst>
               <a:ext uri="{FF2B5EF4-FFF2-40B4-BE49-F238E27FC236}">
-                <a16:creationId xmlns:a16="http://schemas.microsoft.com/office/drawing/2014/main" id="{76118556-0187-4732-968E-C78D95EB2A6D}"/>
+                <a16:creationId xmlns:a16="http://schemas.microsoft.com/office/drawing/2014/main" id="{763619FC-2C00-4A86-9CDA-1BF3459DAC50}"/>
               </a:ext>
             </a:extLst>
           </p:cNvPr>
@@ -9164,17 +9201,17 @@
           <a:p>
             <a:r>
               <a:rPr lang="en-US" dirty="0"/>
-              <a:t>FIND</a:t>
-            </a:r>
-          </a:p>
-        </p:txBody>
-      </p:sp>
-      <p:sp>
-        <p:nvSpPr>
-          <p:cNvPr id="3" name="Content Placeholder 2">
-            <a:extLst>
-              <a:ext uri="{FF2B5EF4-FFF2-40B4-BE49-F238E27FC236}">
-                <a16:creationId xmlns:a16="http://schemas.microsoft.com/office/drawing/2014/main" id="{F18436D4-BA46-47E0-BD91-51D2DE314892}"/>
+              <a:t>GLOBBING</a:t>
+            </a:r>
+          </a:p>
+        </p:txBody>
+      </p:sp>
+      <p:sp>
+        <p:nvSpPr>
+          <p:cNvPr id="3" name="Text Placeholder 2">
+            <a:extLst>
+              <a:ext uri="{FF2B5EF4-FFF2-40B4-BE49-F238E27FC236}">
+                <a16:creationId xmlns:a16="http://schemas.microsoft.com/office/drawing/2014/main" id="{14188AF0-954F-45E0-97B5-73D18A416CC7}"/>
               </a:ext>
             </a:extLst>
           </p:cNvPr>
@@ -9190,7 +9227,42 @@
           <a:bodyPr/>
           <a:lstStyle/>
           <a:p>
-            <a:endParaRPr lang="en-US"/>
+            <a:r>
+              <a:rPr lang="en-US" dirty="0"/>
+              <a:t>A way to match files effectively</a:t>
+            </a:r>
+          </a:p>
+          <a:p>
+            <a:r>
+              <a:rPr lang="en-US" dirty="0"/>
+              <a:t>Less powerful than regular expressions, but much simpler and quicker</a:t>
+            </a:r>
+          </a:p>
+          <a:p>
+            <a:r>
+              <a:rPr lang="en-US" dirty="0"/>
+              <a:t>Essentially, just use * to match any number of any kind of characters</a:t>
+            </a:r>
+          </a:p>
+          <a:p>
+            <a:pPr lvl="1"/>
+            <a:r>
+              <a:rPr lang="en-US" dirty="0"/>
+              <a:t>*.txt will find all text files, for instance</a:t>
+            </a:r>
+          </a:p>
+          <a:p>
+            <a:r>
+              <a:rPr lang="en-US" dirty="0"/>
+              <a:t>But what if you want to match only files that start with numbers?</a:t>
+            </a:r>
+          </a:p>
+          <a:p>
+            <a:pPr lvl="1"/>
+            <a:r>
+              <a:rPr lang="en-US" dirty="0"/>
+              <a:t>You’ll need regular expressions!</a:t>
+            </a:r>
           </a:p>
         </p:txBody>
       </p:sp>
@@ -9199,7 +9271,7 @@
           <p:cNvPr id="4" name="Date Placeholder 3">
             <a:extLst>
               <a:ext uri="{FF2B5EF4-FFF2-40B4-BE49-F238E27FC236}">
-                <a16:creationId xmlns:a16="http://schemas.microsoft.com/office/drawing/2014/main" id="{F8BB5762-D626-4F41-BFE6-A11AF777F6D8}"/>
+                <a16:creationId xmlns:a16="http://schemas.microsoft.com/office/drawing/2014/main" id="{6D5133BD-4847-4D49-B5BF-4CC178F8FDB8}"/>
               </a:ext>
             </a:extLst>
           </p:cNvPr>
@@ -9217,7 +9289,7 @@
           <a:p>
             <a:fld id="{8AAE40A0-A7D8-4DC3-BC9E-BADA32DA2004}" type="datetime4">
               <a:rPr lang="en-US" smtClean="0"/>
-              <a:t>August 16, 2019</a:t>
+              <a:t>August 19, 2019</a:t>
             </a:fld>
             <a:endParaRPr lang="en-US" dirty="0"/>
           </a:p>
@@ -9228,7 +9300,7 @@
           <p:cNvPr id="5" name="Footer Placeholder 4">
             <a:extLst>
               <a:ext uri="{FF2B5EF4-FFF2-40B4-BE49-F238E27FC236}">
-                <a16:creationId xmlns:a16="http://schemas.microsoft.com/office/drawing/2014/main" id="{8EDB9D35-56C5-4AA6-8252-57704C4A289F}"/>
+                <a16:creationId xmlns:a16="http://schemas.microsoft.com/office/drawing/2014/main" id="{5963B75A-EC19-4470-9F8C-1E2C1FB85999}"/>
               </a:ext>
             </a:extLst>
           </p:cNvPr>
@@ -9285,7 +9357,7 @@
           <p:cNvPr id="6" name="Slide Number Placeholder 5">
             <a:extLst>
               <a:ext uri="{FF2B5EF4-FFF2-40B4-BE49-F238E27FC236}">
-                <a16:creationId xmlns:a16="http://schemas.microsoft.com/office/drawing/2014/main" id="{11295AC8-69BA-4E0A-953B-3E0CD278C2ED}"/>
+                <a16:creationId xmlns:a16="http://schemas.microsoft.com/office/drawing/2014/main" id="{BDAB3897-F226-4B28-B7E1-52A0CDB34A2C}"/>
               </a:ext>
             </a:extLst>
           </p:cNvPr>
@@ -9312,7 +9384,7 @@
     </p:spTree>
     <p:extLst>
       <p:ext uri="{BB962C8B-B14F-4D97-AF65-F5344CB8AC3E}">
-        <p14:creationId xmlns:p14="http://schemas.microsoft.com/office/powerpoint/2010/main" val="2971331421"/>
+        <p14:creationId xmlns:p14="http://schemas.microsoft.com/office/powerpoint/2010/main" val="2768233316"/>
       </p:ext>
     </p:extLst>
   </p:cSld>
@@ -9388,7 +9460,35 @@
           <a:bodyPr/>
           <a:lstStyle/>
           <a:p>
-            <a:endParaRPr lang="en-US"/>
+            <a:r>
+              <a:rPr lang="en-US" dirty="0"/>
+              <a:t>The gold standard for text matching</a:t>
+            </a:r>
+          </a:p>
+          <a:p>
+            <a:r>
+              <a:rPr lang="en-US" dirty="0"/>
+              <a:t>Extraordinarily useful, but notoriously tough and error-prone</a:t>
+            </a:r>
+          </a:p>
+          <a:p>
+            <a:r>
+              <a:rPr lang="en-US" dirty="0"/>
+              <a:t>Never match by regular expression if you don’t have to!</a:t>
+            </a:r>
+          </a:p>
+          <a:p>
+            <a:pPr lvl="1"/>
+            <a:r>
+              <a:rPr lang="en-US" dirty="0"/>
+              <a:t>If you can glob, glob!</a:t>
+            </a:r>
+          </a:p>
+          <a:p>
+            <a:r>
+              <a:rPr lang="en-US" dirty="0"/>
+              <a:t>*, +, | , ., \s, \d, \w, \b, [], [^]</a:t>
+            </a:r>
           </a:p>
         </p:txBody>
       </p:sp>
@@ -9415,7 +9515,7 @@
           <a:p>
             <a:fld id="{8AAE40A0-A7D8-4DC3-BC9E-BADA32DA2004}" type="datetime4">
               <a:rPr lang="en-US" smtClean="0"/>
-              <a:t>August 16, 2019</a:t>
+              <a:t>August 19, 2019</a:t>
             </a:fld>
             <a:endParaRPr lang="en-US" dirty="0"/>
           </a:p>
@@ -9560,7 +9660,7 @@
           <a:p>
             <a:r>
               <a:rPr lang="en-US" dirty="0"/>
-              <a:t>GREP</a:t>
+              <a:t>REGULAR EXPRESSION EXAMPLES</a:t>
             </a:r>
           </a:p>
         </p:txBody>
@@ -9586,7 +9686,7 @@
           <a:bodyPr/>
           <a:lstStyle/>
           <a:p>
-            <a:endParaRPr lang="en-US"/>
+            <a:endParaRPr lang="en-US" dirty="0"/>
           </a:p>
         </p:txBody>
       </p:sp>
@@ -9613,7 +9713,7 @@
           <a:p>
             <a:fld id="{8AAE40A0-A7D8-4DC3-BC9E-BADA32DA2004}" type="datetime4">
               <a:rPr lang="en-US" smtClean="0"/>
-              <a:t>August 16, 2019</a:t>
+              <a:t>August 19, 2019</a:t>
             </a:fld>
             <a:endParaRPr lang="en-US" dirty="0"/>
           </a:p>
@@ -9708,7 +9808,7 @@
     </p:spTree>
     <p:extLst>
       <p:ext uri="{BB962C8B-B14F-4D97-AF65-F5344CB8AC3E}">
-        <p14:creationId xmlns:p14="http://schemas.microsoft.com/office/powerpoint/2010/main" val="852774768"/>
+        <p14:creationId xmlns:p14="http://schemas.microsoft.com/office/powerpoint/2010/main" val="766468663"/>
       </p:ext>
     </p:extLst>
   </p:cSld>
@@ -9758,7 +9858,7 @@
           <a:p>
             <a:r>
               <a:rPr lang="en-US" dirty="0"/>
-              <a:t>PARALLEL &amp; XARGS</a:t>
+              <a:t>FIND</a:t>
             </a:r>
           </a:p>
         </p:txBody>
@@ -9781,10 +9881,118 @@
         </p:nvSpPr>
         <p:spPr/>
         <p:txBody>
-          <a:bodyPr/>
-          <a:lstStyle/>
-          <a:p>
-            <a:endParaRPr lang="en-US"/>
+          <a:bodyPr>
+            <a:normAutofit lnSpcReduction="10000"/>
+          </a:bodyPr>
+          <a:lstStyle/>
+          <a:p>
+            <a:r>
+              <a:rPr lang="en-US" dirty="0"/>
+              <a:t>General syntax: find (</a:t>
+            </a:r>
+            <a:r>
+              <a:rPr lang="en-US" i="1" dirty="0"/>
+              <a:t>starting directory) (expression)</a:t>
+            </a:r>
+          </a:p>
+          <a:p>
+            <a:r>
+              <a:rPr lang="en-US" dirty="0"/>
+              <a:t>Often use starting directory as </a:t>
+            </a:r>
+            <a:r>
+              <a:rPr lang="en-US" i="1" dirty="0"/>
+              <a:t>. </a:t>
+            </a:r>
+            <a:r>
+              <a:rPr lang="en-US" dirty="0"/>
+              <a:t>(current directory)</a:t>
+            </a:r>
+          </a:p>
+          <a:p>
+            <a:r>
+              <a:rPr lang="en-US" dirty="0"/>
+              <a:t>Common expression types:</a:t>
+            </a:r>
+          </a:p>
+          <a:p>
+            <a:pPr lvl="1"/>
+            <a:r>
+              <a:rPr lang="en-US" dirty="0"/>
+              <a:t>-name </a:t>
+            </a:r>
+            <a:r>
+              <a:rPr lang="en-US" i="1" dirty="0"/>
+              <a:t>fragment</a:t>
+            </a:r>
+            <a:endParaRPr lang="en-US" dirty="0"/>
+          </a:p>
+          <a:p>
+            <a:pPr lvl="1"/>
+            <a:r>
+              <a:rPr lang="en-US" dirty="0"/>
+              <a:t>-</a:t>
+            </a:r>
+            <a:r>
+              <a:rPr lang="en-US" dirty="0" err="1"/>
+              <a:t>mmin</a:t>
+            </a:r>
+            <a:r>
+              <a:rPr lang="en-US" dirty="0"/>
+              <a:t> / -</a:t>
+            </a:r>
+            <a:r>
+              <a:rPr lang="en-US" dirty="0" err="1"/>
+              <a:t>mtime</a:t>
+            </a:r>
+            <a:r>
+              <a:rPr lang="en-US" dirty="0"/>
+              <a:t> </a:t>
+            </a:r>
+            <a:r>
+              <a:rPr lang="en-US" i="1" dirty="0"/>
+              <a:t>time in minutes / hours</a:t>
+            </a:r>
+            <a:endParaRPr lang="en-US" dirty="0"/>
+          </a:p>
+          <a:p>
+            <a:pPr lvl="1"/>
+            <a:r>
+              <a:rPr lang="en-US" dirty="0"/>
+              <a:t>-size </a:t>
+            </a:r>
+            <a:r>
+              <a:rPr lang="en-US" i="1" dirty="0" err="1"/>
+              <a:t>size</a:t>
+            </a:r>
+            <a:r>
+              <a:rPr lang="en-US" i="1" dirty="0"/>
+              <a:t> (G, M, k) </a:t>
+            </a:r>
+            <a:r>
+              <a:rPr lang="en-US" i="1" dirty="0" err="1"/>
+              <a:t>etc</a:t>
+            </a:r>
+            <a:endParaRPr lang="en-US" dirty="0"/>
+          </a:p>
+          <a:p>
+            <a:pPr lvl="1"/>
+            <a:r>
+              <a:rPr lang="en-US" dirty="0"/>
+              <a:t>-type (d for directory, f for file, l for link)</a:t>
+            </a:r>
+          </a:p>
+          <a:p>
+            <a:r>
+              <a:rPr lang="en-US" dirty="0"/>
+              <a:t>Can combine them as well</a:t>
+            </a:r>
+          </a:p>
+          <a:p>
+            <a:r>
+              <a:rPr lang="en-US" dirty="0"/>
+              <a:t>Sizes and minutes can be specified as exact, less than or greater than (-/+)</a:t>
+            </a:r>
           </a:p>
         </p:txBody>
       </p:sp>
@@ -9811,7 +10019,7 @@
           <a:p>
             <a:fld id="{8AAE40A0-A7D8-4DC3-BC9E-BADA32DA2004}" type="datetime4">
               <a:rPr lang="en-US" smtClean="0"/>
-              <a:t>August 16, 2019</a:t>
+              <a:t>August 19, 2019</a:t>
             </a:fld>
             <a:endParaRPr lang="en-US" dirty="0"/>
           </a:p>
@@ -9906,7 +10114,7 @@
     </p:spTree>
     <p:extLst>
       <p:ext uri="{BB962C8B-B14F-4D97-AF65-F5344CB8AC3E}">
-        <p14:creationId xmlns:p14="http://schemas.microsoft.com/office/powerpoint/2010/main" val="784628981"/>
+        <p14:creationId xmlns:p14="http://schemas.microsoft.com/office/powerpoint/2010/main" val="2971331421"/>
       </p:ext>
     </p:extLst>
   </p:cSld>
@@ -9956,7 +10164,7 @@
           <a:p>
             <a:r>
               <a:rPr lang="en-US" dirty="0"/>
-              <a:t>SED</a:t>
+              <a:t>GREP</a:t>
             </a:r>
           </a:p>
         </p:txBody>
@@ -10009,7 +10217,7 @@
           <a:p>
             <a:fld id="{8AAE40A0-A7D8-4DC3-BC9E-BADA32DA2004}" type="datetime4">
               <a:rPr lang="en-US" smtClean="0"/>
-              <a:t>August 16, 2019</a:t>
+              <a:t>August 19, 2019</a:t>
             </a:fld>
             <a:endParaRPr lang="en-US" dirty="0"/>
           </a:p>
@@ -10104,7 +10312,7 @@
     </p:spTree>
     <p:extLst>
       <p:ext uri="{BB962C8B-B14F-4D97-AF65-F5344CB8AC3E}">
-        <p14:creationId xmlns:p14="http://schemas.microsoft.com/office/powerpoint/2010/main" val="747457746"/>
+        <p14:creationId xmlns:p14="http://schemas.microsoft.com/office/powerpoint/2010/main" val="852774768"/>
       </p:ext>
     </p:extLst>
   </p:cSld>
@@ -10136,7 +10344,7 @@
           <p:cNvPr id="2" name="Title 1">
             <a:extLst>
               <a:ext uri="{FF2B5EF4-FFF2-40B4-BE49-F238E27FC236}">
-                <a16:creationId xmlns:a16="http://schemas.microsoft.com/office/drawing/2014/main" id="{2C388064-E4E4-4FA8-957E-42BFB02BCE6B}"/>
+                <a16:creationId xmlns:a16="http://schemas.microsoft.com/office/drawing/2014/main" id="{76118556-0187-4732-968E-C78D95EB2A6D}"/>
               </a:ext>
             </a:extLst>
           </p:cNvPr>
@@ -10154,7 +10362,7 @@
           <a:p>
             <a:r>
               <a:rPr lang="en-US" dirty="0"/>
-              <a:t>BC</a:t>
+              <a:t>SED</a:t>
             </a:r>
           </a:p>
         </p:txBody>
@@ -10164,7 +10372,7 @@
           <p:cNvPr id="3" name="Content Placeholder 2">
             <a:extLst>
               <a:ext uri="{FF2B5EF4-FFF2-40B4-BE49-F238E27FC236}">
-                <a16:creationId xmlns:a16="http://schemas.microsoft.com/office/drawing/2014/main" id="{F0681ACD-79CA-4D91-A3E6-4AE79B6D42BE}"/>
+                <a16:creationId xmlns:a16="http://schemas.microsoft.com/office/drawing/2014/main" id="{F18436D4-BA46-47E0-BD91-51D2DE314892}"/>
               </a:ext>
             </a:extLst>
           </p:cNvPr>
@@ -10189,7 +10397,7 @@
           <p:cNvPr id="4" name="Date Placeholder 3">
             <a:extLst>
               <a:ext uri="{FF2B5EF4-FFF2-40B4-BE49-F238E27FC236}">
-                <a16:creationId xmlns:a16="http://schemas.microsoft.com/office/drawing/2014/main" id="{0B425C7F-5A6A-4513-AD27-F5A864BEEA23}"/>
+                <a16:creationId xmlns:a16="http://schemas.microsoft.com/office/drawing/2014/main" id="{F8BB5762-D626-4F41-BFE6-A11AF777F6D8}"/>
               </a:ext>
             </a:extLst>
           </p:cNvPr>
@@ -10207,7 +10415,7 @@
           <a:p>
             <a:fld id="{8AAE40A0-A7D8-4DC3-BC9E-BADA32DA2004}" type="datetime4">
               <a:rPr lang="en-US" smtClean="0"/>
-              <a:t>August 16, 2019</a:t>
+              <a:t>August 19, 2019</a:t>
             </a:fld>
             <a:endParaRPr lang="en-US" dirty="0"/>
           </a:p>
@@ -10218,7 +10426,7 @@
           <p:cNvPr id="5" name="Footer Placeholder 4">
             <a:extLst>
               <a:ext uri="{FF2B5EF4-FFF2-40B4-BE49-F238E27FC236}">
-                <a16:creationId xmlns:a16="http://schemas.microsoft.com/office/drawing/2014/main" id="{005CCDF3-2A99-4DE6-A187-EA07BA452E75}"/>
+                <a16:creationId xmlns:a16="http://schemas.microsoft.com/office/drawing/2014/main" id="{8EDB9D35-56C5-4AA6-8252-57704C4A289F}"/>
               </a:ext>
             </a:extLst>
           </p:cNvPr>
@@ -10275,7 +10483,7 @@
           <p:cNvPr id="6" name="Slide Number Placeholder 5">
             <a:extLst>
               <a:ext uri="{FF2B5EF4-FFF2-40B4-BE49-F238E27FC236}">
-                <a16:creationId xmlns:a16="http://schemas.microsoft.com/office/drawing/2014/main" id="{69681AB4-1640-4191-93C2-23256A204419}"/>
+                <a16:creationId xmlns:a16="http://schemas.microsoft.com/office/drawing/2014/main" id="{11295AC8-69BA-4E0A-953B-3E0CD278C2ED}"/>
               </a:ext>
             </a:extLst>
           </p:cNvPr>
@@ -10302,7 +10510,7 @@
     </p:spTree>
     <p:extLst>
       <p:ext uri="{BB962C8B-B14F-4D97-AF65-F5344CB8AC3E}">
-        <p14:creationId xmlns:p14="http://schemas.microsoft.com/office/powerpoint/2010/main" val="894012806"/>
+        <p14:creationId xmlns:p14="http://schemas.microsoft.com/office/powerpoint/2010/main" val="747457746"/>
       </p:ext>
     </p:extLst>
   </p:cSld>
@@ -10352,7 +10560,7 @@
           <a:p>
             <a:r>
               <a:rPr lang="en-US" dirty="0"/>
-              <a:t>PS</a:t>
+              <a:t>PARALLEL &amp; XARGS</a:t>
             </a:r>
           </a:p>
         </p:txBody>
@@ -10405,7 +10613,7 @@
           <a:p>
             <a:fld id="{8AAE40A0-A7D8-4DC3-BC9E-BADA32DA2004}" type="datetime4">
               <a:rPr lang="en-US" smtClean="0"/>
-              <a:t>August 16, 2019</a:t>
+              <a:t>August 19, 2019</a:t>
             </a:fld>
             <a:endParaRPr lang="en-US" dirty="0"/>
           </a:p>
@@ -10500,7 +10708,7 @@
     </p:spTree>
     <p:extLst>
       <p:ext uri="{BB962C8B-B14F-4D97-AF65-F5344CB8AC3E}">
-        <p14:creationId xmlns:p14="http://schemas.microsoft.com/office/powerpoint/2010/main" val="4246124459"/>
+        <p14:creationId xmlns:p14="http://schemas.microsoft.com/office/powerpoint/2010/main" val="784628981"/>
       </p:ext>
     </p:extLst>
   </p:cSld>
@@ -10532,7 +10740,7 @@
           <p:cNvPr id="2" name="Title 1">
             <a:extLst>
               <a:ext uri="{FF2B5EF4-FFF2-40B4-BE49-F238E27FC236}">
-                <a16:creationId xmlns:a16="http://schemas.microsoft.com/office/drawing/2014/main" id="{763619FC-2C00-4A86-9CDA-1BF3459DAC50}"/>
+                <a16:creationId xmlns:a16="http://schemas.microsoft.com/office/drawing/2014/main" id="{2C388064-E4E4-4FA8-957E-42BFB02BCE6B}"/>
               </a:ext>
             </a:extLst>
           </p:cNvPr>
@@ -10550,17 +10758,17 @@
           <a:p>
             <a:r>
               <a:rPr lang="en-US" dirty="0"/>
-              <a:t>SIGNALS</a:t>
-            </a:r>
-          </a:p>
-        </p:txBody>
-      </p:sp>
-      <p:sp>
-        <p:nvSpPr>
-          <p:cNvPr id="3" name="Text Placeholder 2">
-            <a:extLst>
-              <a:ext uri="{FF2B5EF4-FFF2-40B4-BE49-F238E27FC236}">
-                <a16:creationId xmlns:a16="http://schemas.microsoft.com/office/drawing/2014/main" id="{14188AF0-954F-45E0-97B5-73D18A416CC7}"/>
+              <a:t>BC</a:t>
+            </a:r>
+          </a:p>
+        </p:txBody>
+      </p:sp>
+      <p:sp>
+        <p:nvSpPr>
+          <p:cNvPr id="3" name="Content Placeholder 2">
+            <a:extLst>
+              <a:ext uri="{FF2B5EF4-FFF2-40B4-BE49-F238E27FC236}">
+                <a16:creationId xmlns:a16="http://schemas.microsoft.com/office/drawing/2014/main" id="{F0681ACD-79CA-4D91-A3E6-4AE79B6D42BE}"/>
               </a:ext>
             </a:extLst>
           </p:cNvPr>
@@ -10573,113 +10781,10 @@
         </p:nvSpPr>
         <p:spPr/>
         <p:txBody>
-          <a:bodyPr>
-            <a:normAutofit lnSpcReduction="10000"/>
-          </a:bodyPr>
-          <a:lstStyle/>
-          <a:p>
-            <a:r>
-              <a:rPr lang="en-US" dirty="0"/>
-              <a:t>Shown as </a:t>
-            </a:r>
-            <a:r>
-              <a:rPr lang="en-US" dirty="0">
-                <a:latin typeface="Courier New" panose="02070309020205020404" pitchFamily="49" charset="0"/>
-                <a:cs typeface="Courier New" panose="02070309020205020404" pitchFamily="49" charset="0"/>
-              </a:rPr>
-              <a:t>^D</a:t>
-            </a:r>
-          </a:p>
-          <a:p>
-            <a:r>
-              <a:rPr lang="en-US" dirty="0" err="1"/>
-              <a:t>Ctrl+D</a:t>
-            </a:r>
-            <a:endParaRPr lang="en-US" dirty="0"/>
-          </a:p>
-          <a:p>
-            <a:pPr lvl="1"/>
-            <a:r>
-              <a:rPr lang="en-US" dirty="0"/>
-              <a:t>End of input</a:t>
-            </a:r>
-          </a:p>
-          <a:p>
-            <a:r>
-              <a:rPr lang="en-US" dirty="0" err="1"/>
-              <a:t>Ctrl+C</a:t>
-            </a:r>
-            <a:endParaRPr lang="en-US" dirty="0"/>
-          </a:p>
-          <a:p>
-            <a:pPr lvl="1"/>
-            <a:r>
-              <a:rPr lang="en-US" dirty="0"/>
-              <a:t>Exit</a:t>
-            </a:r>
-          </a:p>
-          <a:p>
-            <a:r>
-              <a:rPr lang="en-US" dirty="0" err="1"/>
-              <a:t>Ctrl+Z</a:t>
-            </a:r>
-            <a:endParaRPr lang="en-US" dirty="0"/>
-          </a:p>
-          <a:p>
-            <a:pPr lvl="1"/>
-            <a:r>
-              <a:rPr lang="en-US" dirty="0"/>
-              <a:t>Pause running program</a:t>
-            </a:r>
-          </a:p>
-          <a:p>
-            <a:pPr lvl="1"/>
-            <a:r>
-              <a:rPr lang="en-US" dirty="0"/>
-              <a:t>Restart with </a:t>
-            </a:r>
-            <a:r>
-              <a:rPr lang="en-US" dirty="0" err="1">
-                <a:latin typeface="Courier New" panose="02070309020205020404" pitchFamily="49" charset="0"/>
-                <a:cs typeface="Courier New" panose="02070309020205020404" pitchFamily="49" charset="0"/>
-              </a:rPr>
-              <a:t>fg</a:t>
-            </a:r>
-            <a:r>
-              <a:rPr lang="en-US" dirty="0"/>
-              <a:t> or </a:t>
-            </a:r>
-            <a:r>
-              <a:rPr lang="en-US" dirty="0" err="1">
-                <a:latin typeface="Courier New" panose="02070309020205020404" pitchFamily="49" charset="0"/>
-                <a:cs typeface="Courier New" panose="02070309020205020404" pitchFamily="49" charset="0"/>
-              </a:rPr>
-              <a:t>bg</a:t>
-            </a:r>
-            <a:endParaRPr lang="en-US" dirty="0">
-              <a:latin typeface="Courier New" panose="02070309020205020404" pitchFamily="49" charset="0"/>
-              <a:cs typeface="Courier New" panose="02070309020205020404" pitchFamily="49" charset="0"/>
-            </a:endParaRPr>
-          </a:p>
-          <a:p>
-            <a:r>
-              <a:rPr lang="en-US" dirty="0"/>
-              <a:t>Program can respond to these in other ways. Use </a:t>
-            </a:r>
-            <a:r>
-              <a:rPr lang="en-US" dirty="0">
-                <a:latin typeface="Courier New" panose="02070309020205020404" pitchFamily="49" charset="0"/>
-                <a:cs typeface="Courier New" panose="02070309020205020404" pitchFamily="49" charset="0"/>
-              </a:rPr>
-              <a:t>kill</a:t>
-            </a:r>
-            <a:r>
-              <a:rPr lang="en-US" dirty="0"/>
-              <a:t> (we’ll talk about it later) to send other signals</a:t>
-            </a:r>
-          </a:p>
-          <a:p>
-            <a:endParaRPr lang="en-US" dirty="0"/>
+          <a:bodyPr/>
+          <a:lstStyle/>
+          <a:p>
+            <a:endParaRPr lang="en-US"/>
           </a:p>
         </p:txBody>
       </p:sp>
@@ -10688,7 +10793,7 @@
           <p:cNvPr id="4" name="Date Placeholder 3">
             <a:extLst>
               <a:ext uri="{FF2B5EF4-FFF2-40B4-BE49-F238E27FC236}">
-                <a16:creationId xmlns:a16="http://schemas.microsoft.com/office/drawing/2014/main" id="{6D5133BD-4847-4D49-B5BF-4CC178F8FDB8}"/>
+                <a16:creationId xmlns:a16="http://schemas.microsoft.com/office/drawing/2014/main" id="{0B425C7F-5A6A-4513-AD27-F5A864BEEA23}"/>
               </a:ext>
             </a:extLst>
           </p:cNvPr>
@@ -10706,7 +10811,7 @@
           <a:p>
             <a:fld id="{8AAE40A0-A7D8-4DC3-BC9E-BADA32DA2004}" type="datetime4">
               <a:rPr lang="en-US" smtClean="0"/>
-              <a:t>August 16, 2019</a:t>
+              <a:t>August 19, 2019</a:t>
             </a:fld>
             <a:endParaRPr lang="en-US" dirty="0"/>
           </a:p>
@@ -10717,7 +10822,7 @@
           <p:cNvPr id="5" name="Footer Placeholder 4">
             <a:extLst>
               <a:ext uri="{FF2B5EF4-FFF2-40B4-BE49-F238E27FC236}">
-                <a16:creationId xmlns:a16="http://schemas.microsoft.com/office/drawing/2014/main" id="{5963B75A-EC19-4470-9F8C-1E2C1FB85999}"/>
+                <a16:creationId xmlns:a16="http://schemas.microsoft.com/office/drawing/2014/main" id="{005CCDF3-2A99-4DE6-A187-EA07BA452E75}"/>
               </a:ext>
             </a:extLst>
           </p:cNvPr>
@@ -10774,7 +10879,7 @@
           <p:cNvPr id="6" name="Slide Number Placeholder 5">
             <a:extLst>
               <a:ext uri="{FF2B5EF4-FFF2-40B4-BE49-F238E27FC236}">
-                <a16:creationId xmlns:a16="http://schemas.microsoft.com/office/drawing/2014/main" id="{BDAB3897-F226-4B28-B7E1-52A0CDB34A2C}"/>
+                <a16:creationId xmlns:a16="http://schemas.microsoft.com/office/drawing/2014/main" id="{69681AB4-1640-4191-93C2-23256A204419}"/>
               </a:ext>
             </a:extLst>
           </p:cNvPr>
@@ -10801,7 +10906,7 @@
     </p:spTree>
     <p:extLst>
       <p:ext uri="{BB962C8B-B14F-4D97-AF65-F5344CB8AC3E}">
-        <p14:creationId xmlns:p14="http://schemas.microsoft.com/office/powerpoint/2010/main" val="222456776"/>
+        <p14:creationId xmlns:p14="http://schemas.microsoft.com/office/powerpoint/2010/main" val="894012806"/>
       </p:ext>
     </p:extLst>
   </p:cSld>
@@ -10949,7 +11054,7 @@
           <a:p>
             <a:fld id="{8AAE40A0-A7D8-4DC3-BC9E-BADA32DA2004}" type="datetime4">
               <a:rPr lang="en-US" smtClean="0"/>
-              <a:t>August 16, 2019</a:t>
+              <a:t>August 19, 2019</a:t>
             </a:fld>
             <a:endParaRPr lang="en-US" dirty="0"/>
           </a:p>
@@ -11094,7 +11199,7 @@
           <a:p>
             <a:r>
               <a:rPr lang="en-US" dirty="0"/>
-              <a:t>KILL</a:t>
+              <a:t>PS</a:t>
             </a:r>
           </a:p>
         </p:txBody>
@@ -11147,7 +11252,7 @@
           <a:p>
             <a:fld id="{8AAE40A0-A7D8-4DC3-BC9E-BADA32DA2004}" type="datetime4">
               <a:rPr lang="en-US" smtClean="0"/>
-              <a:t>August 16, 2019</a:t>
+              <a:t>August 19, 2019</a:t>
             </a:fld>
             <a:endParaRPr lang="en-US" dirty="0"/>
           </a:p>
@@ -11242,7 +11347,7 @@
     </p:spTree>
     <p:extLst>
       <p:ext uri="{BB962C8B-B14F-4D97-AF65-F5344CB8AC3E}">
-        <p14:creationId xmlns:p14="http://schemas.microsoft.com/office/powerpoint/2010/main" val="1352129933"/>
+        <p14:creationId xmlns:p14="http://schemas.microsoft.com/office/powerpoint/2010/main" val="4246124459"/>
       </p:ext>
     </p:extLst>
   </p:cSld>
@@ -11274,7 +11379,7 @@
           <p:cNvPr id="2" name="Title 1">
             <a:extLst>
               <a:ext uri="{FF2B5EF4-FFF2-40B4-BE49-F238E27FC236}">
-                <a16:creationId xmlns:a16="http://schemas.microsoft.com/office/drawing/2014/main" id="{98EB4F1B-51B3-4B64-8210-21AE8BE64582}"/>
+                <a16:creationId xmlns:a16="http://schemas.microsoft.com/office/drawing/2014/main" id="{763619FC-2C00-4A86-9CDA-1BF3459DAC50}"/>
               </a:ext>
             </a:extLst>
           </p:cNvPr>
@@ -11292,17 +11397,17 @@
           <a:p>
             <a:r>
               <a:rPr lang="en-US" dirty="0"/>
-              <a:t>SCHEDULING WITH CRON</a:t>
-            </a:r>
-          </a:p>
-        </p:txBody>
-      </p:sp>
-      <p:sp>
-        <p:nvSpPr>
-          <p:cNvPr id="3" name="Content Placeholder 2">
-            <a:extLst>
-              <a:ext uri="{FF2B5EF4-FFF2-40B4-BE49-F238E27FC236}">
-                <a16:creationId xmlns:a16="http://schemas.microsoft.com/office/drawing/2014/main" id="{593AD591-5DD9-410C-B27F-EACDDF765FF4}"/>
+              <a:t>SIGNALS</a:t>
+            </a:r>
+          </a:p>
+        </p:txBody>
+      </p:sp>
+      <p:sp>
+        <p:nvSpPr>
+          <p:cNvPr id="3" name="Text Placeholder 2">
+            <a:extLst>
+              <a:ext uri="{FF2B5EF4-FFF2-40B4-BE49-F238E27FC236}">
+                <a16:creationId xmlns:a16="http://schemas.microsoft.com/office/drawing/2014/main" id="{14188AF0-954F-45E0-97B5-73D18A416CC7}"/>
               </a:ext>
             </a:extLst>
           </p:cNvPr>
@@ -11315,67 +11420,113 @@
         </p:nvSpPr>
         <p:spPr/>
         <p:txBody>
-          <a:bodyPr/>
-          <a:lstStyle/>
-          <a:p>
-            <a:r>
-              <a:rPr lang="en-US" dirty="0"/>
-              <a:t>Crontab: has information for scheduling</a:t>
-            </a:r>
-          </a:p>
-          <a:p>
-            <a:r>
-              <a:rPr lang="en-US" dirty="0"/>
-              <a:t>Use </a:t>
-            </a:r>
-            <a:r>
-              <a:rPr lang="en-US" dirty="0">
-                <a:hlinkClick r:id="rId2"/>
-              </a:rPr>
-              <a:t>https://crontab.guru</a:t>
-            </a:r>
-            <a:r>
-              <a:rPr lang="en-US" dirty="0"/>
-              <a:t> to help with syntax</a:t>
-            </a:r>
-          </a:p>
-          <a:p>
-            <a:r>
-              <a:rPr lang="en-US" dirty="0"/>
-              <a:t>Example:</a:t>
-            </a:r>
-          </a:p>
-          <a:p>
-            <a:pPr marL="457200" lvl="1" indent="0">
-              <a:buNone/>
-            </a:pPr>
+          <a:bodyPr>
+            <a:normAutofit lnSpcReduction="10000"/>
+          </a:bodyPr>
+          <a:lstStyle/>
+          <a:p>
+            <a:r>
+              <a:rPr lang="en-US" dirty="0"/>
+              <a:t>Shown as </a:t>
+            </a:r>
             <a:r>
               <a:rPr lang="en-US" dirty="0">
                 <a:latin typeface="Courier New" panose="02070309020205020404" pitchFamily="49" charset="0"/>
                 <a:cs typeface="Courier New" panose="02070309020205020404" pitchFamily="49" charset="0"/>
               </a:rPr>
-              <a:t>30 4 * * MON rm –rf /</a:t>
+              <a:t>^D</a:t>
+            </a:r>
+          </a:p>
+          <a:p>
+            <a:r>
+              <a:rPr lang="en-US" dirty="0" err="1"/>
+              <a:t>Ctrl+D</a:t>
+            </a:r>
+            <a:endParaRPr lang="en-US" dirty="0"/>
+          </a:p>
+          <a:p>
+            <a:pPr lvl="1"/>
+            <a:r>
+              <a:rPr lang="en-US" dirty="0"/>
+              <a:t>End of input</a:t>
+            </a:r>
+          </a:p>
+          <a:p>
+            <a:r>
+              <a:rPr lang="en-US" dirty="0" err="1"/>
+              <a:t>Ctrl+C</a:t>
+            </a:r>
+            <a:endParaRPr lang="en-US" dirty="0"/>
+          </a:p>
+          <a:p>
+            <a:pPr lvl="1"/>
+            <a:r>
+              <a:rPr lang="en-US" dirty="0"/>
+              <a:t>Exit</a:t>
+            </a:r>
+          </a:p>
+          <a:p>
+            <a:r>
+              <a:rPr lang="en-US" dirty="0" err="1"/>
+              <a:t>Ctrl+Z</a:t>
+            </a:r>
+            <a:endParaRPr lang="en-US" dirty="0"/>
+          </a:p>
+          <a:p>
+            <a:pPr lvl="1"/>
+            <a:r>
+              <a:rPr lang="en-US" dirty="0"/>
+              <a:t>Pause running program</a:t>
+            </a:r>
+          </a:p>
+          <a:p>
+            <a:pPr lvl="1"/>
+            <a:r>
+              <a:rPr lang="en-US" dirty="0"/>
+              <a:t>Restart with </a:t>
             </a:r>
             <a:r>
               <a:rPr lang="en-US" dirty="0" err="1">
                 <a:latin typeface="Courier New" panose="02070309020205020404" pitchFamily="49" charset="0"/>
                 <a:cs typeface="Courier New" panose="02070309020205020404" pitchFamily="49" charset="0"/>
               </a:rPr>
-              <a:t>tmp</a:t>
+              <a:t>fg</a:t>
+            </a:r>
+            <a:r>
+              <a:rPr lang="en-US" dirty="0"/>
+              <a:t> or </a:t>
+            </a:r>
+            <a:r>
+              <a:rPr lang="en-US" dirty="0" err="1">
+                <a:latin typeface="Courier New" panose="02070309020205020404" pitchFamily="49" charset="0"/>
+                <a:cs typeface="Courier New" panose="02070309020205020404" pitchFamily="49" charset="0"/>
+              </a:rPr>
+              <a:t>bg</a:t>
+            </a:r>
+            <a:endParaRPr lang="en-US" dirty="0">
+              <a:latin typeface="Courier New" panose="02070309020205020404" pitchFamily="49" charset="0"/>
+              <a:cs typeface="Courier New" panose="02070309020205020404" pitchFamily="49" charset="0"/>
+            </a:endParaRPr>
+          </a:p>
+          <a:p>
+            <a:r>
+              <a:rPr lang="en-US" dirty="0"/>
+              <a:t>Program can respond to these in other ways. Use </a:t>
             </a:r>
             <a:r>
               <a:rPr lang="en-US" dirty="0">
                 <a:latin typeface="Courier New" panose="02070309020205020404" pitchFamily="49" charset="0"/>
                 <a:cs typeface="Courier New" panose="02070309020205020404" pitchFamily="49" charset="0"/>
               </a:rPr>
-              <a:t>/* </a:t>
-            </a:r>
-            <a:r>
-              <a:rPr lang="en-US" dirty="0">
-                <a:cs typeface="Courier New" panose="02070309020205020404" pitchFamily="49" charset="0"/>
-              </a:rPr>
-              <a:t>means delete all temporary files at 4:30 AM every Monday</a:t>
-            </a:r>
+              <a:t>kill</a:t>
+            </a:r>
+            <a:r>
+              <a:rPr lang="en-US" dirty="0"/>
+              <a:t> (we’ll talk about it later) to send other signals</a:t>
+            </a:r>
+          </a:p>
+          <a:p>
+            <a:endParaRPr lang="en-US" dirty="0"/>
           </a:p>
         </p:txBody>
       </p:sp>
@@ -11384,7 +11535,7 @@
           <p:cNvPr id="4" name="Date Placeholder 3">
             <a:extLst>
               <a:ext uri="{FF2B5EF4-FFF2-40B4-BE49-F238E27FC236}">
-                <a16:creationId xmlns:a16="http://schemas.microsoft.com/office/drawing/2014/main" id="{17E05AC0-8A63-4FDD-A727-54A8C6040A83}"/>
+                <a16:creationId xmlns:a16="http://schemas.microsoft.com/office/drawing/2014/main" id="{6D5133BD-4847-4D49-B5BF-4CC178F8FDB8}"/>
               </a:ext>
             </a:extLst>
           </p:cNvPr>
@@ -11402,7 +11553,7 @@
           <a:p>
             <a:fld id="{8AAE40A0-A7D8-4DC3-BC9E-BADA32DA2004}" type="datetime4">
               <a:rPr lang="en-US" smtClean="0"/>
-              <a:t>August 16, 2019</a:t>
+              <a:t>August 19, 2019</a:t>
             </a:fld>
             <a:endParaRPr lang="en-US" dirty="0"/>
           </a:p>
@@ -11413,7 +11564,7 @@
           <p:cNvPr id="5" name="Footer Placeholder 4">
             <a:extLst>
               <a:ext uri="{FF2B5EF4-FFF2-40B4-BE49-F238E27FC236}">
-                <a16:creationId xmlns:a16="http://schemas.microsoft.com/office/drawing/2014/main" id="{9C0CA735-E60F-4094-86F7-D33BB272FA25}"/>
+                <a16:creationId xmlns:a16="http://schemas.microsoft.com/office/drawing/2014/main" id="{5963B75A-EC19-4470-9F8C-1E2C1FB85999}"/>
               </a:ext>
             </a:extLst>
           </p:cNvPr>
@@ -11470,7 +11621,7 @@
           <p:cNvPr id="6" name="Slide Number Placeholder 5">
             <a:extLst>
               <a:ext uri="{FF2B5EF4-FFF2-40B4-BE49-F238E27FC236}">
-                <a16:creationId xmlns:a16="http://schemas.microsoft.com/office/drawing/2014/main" id="{33AAFB92-45C0-421A-AC0A-7A439518D3F4}"/>
+                <a16:creationId xmlns:a16="http://schemas.microsoft.com/office/drawing/2014/main" id="{BDAB3897-F226-4B28-B7E1-52A0CDB34A2C}"/>
               </a:ext>
             </a:extLst>
           </p:cNvPr>
@@ -11497,7 +11648,7 @@
     </p:spTree>
     <p:extLst>
       <p:ext uri="{BB962C8B-B14F-4D97-AF65-F5344CB8AC3E}">
-        <p14:creationId xmlns:p14="http://schemas.microsoft.com/office/powerpoint/2010/main" val="768433680"/>
+        <p14:creationId xmlns:p14="http://schemas.microsoft.com/office/powerpoint/2010/main" val="222456776"/>
       </p:ext>
     </p:extLst>
   </p:cSld>
@@ -11529,7 +11680,7 @@
           <p:cNvPr id="2" name="Title 1">
             <a:extLst>
               <a:ext uri="{FF2B5EF4-FFF2-40B4-BE49-F238E27FC236}">
-                <a16:creationId xmlns:a16="http://schemas.microsoft.com/office/drawing/2014/main" id="{763619FC-2C00-4A86-9CDA-1BF3459DAC50}"/>
+                <a16:creationId xmlns:a16="http://schemas.microsoft.com/office/drawing/2014/main" id="{76118556-0187-4732-968E-C78D95EB2A6D}"/>
               </a:ext>
             </a:extLst>
           </p:cNvPr>
@@ -11547,48 +11698,33 @@
           <a:p>
             <a:r>
               <a:rPr lang="en-US" dirty="0"/>
-              <a:t>ADVANCED FEATURES</a:t>
-            </a:r>
-          </a:p>
-        </p:txBody>
-      </p:sp>
-      <p:sp>
-        <p:nvSpPr>
-          <p:cNvPr id="3" name="Text Placeholder 2">
-            <a:extLst>
-              <a:ext uri="{FF2B5EF4-FFF2-40B4-BE49-F238E27FC236}">
-                <a16:creationId xmlns:a16="http://schemas.microsoft.com/office/drawing/2014/main" id="{14188AF0-954F-45E0-97B5-73D18A416CC7}"/>
-              </a:ext>
-            </a:extLst>
-          </p:cNvPr>
-          <p:cNvSpPr>
-            <a:spLocks noGrp="1"/>
-          </p:cNvSpPr>
-          <p:nvPr>
-            <p:ph type="body" idx="1"/>
-          </p:nvPr>
-        </p:nvSpPr>
-        <p:spPr/>
-        <p:txBody>
-          <a:bodyPr/>
-          <a:lstStyle/>
-          <a:p>
-            <a:r>
-              <a:rPr lang="en-US" dirty="0" err="1"/>
-              <a:t>Interprocess</a:t>
-            </a:r>
-            <a:r>
-              <a:rPr lang="en-US" dirty="0"/>
-              <a:t> communication, signals, jobs, </a:t>
-            </a:r>
-            <a:r>
-              <a:rPr lang="en-US" dirty="0" err="1"/>
-              <a:t>globbing</a:t>
-            </a:r>
-            <a:r>
-              <a:rPr lang="en-US" dirty="0"/>
-              <a:t>, and more</a:t>
-            </a:r>
+              <a:t>KILL</a:t>
+            </a:r>
+          </a:p>
+        </p:txBody>
+      </p:sp>
+      <p:sp>
+        <p:nvSpPr>
+          <p:cNvPr id="3" name="Content Placeholder 2">
+            <a:extLst>
+              <a:ext uri="{FF2B5EF4-FFF2-40B4-BE49-F238E27FC236}">
+                <a16:creationId xmlns:a16="http://schemas.microsoft.com/office/drawing/2014/main" id="{F18436D4-BA46-47E0-BD91-51D2DE314892}"/>
+              </a:ext>
+            </a:extLst>
+          </p:cNvPr>
+          <p:cNvSpPr>
+            <a:spLocks noGrp="1"/>
+          </p:cNvSpPr>
+          <p:nvPr>
+            <p:ph idx="1"/>
+          </p:nvPr>
+        </p:nvSpPr>
+        <p:spPr/>
+        <p:txBody>
+          <a:bodyPr/>
+          <a:lstStyle/>
+          <a:p>
+            <a:endParaRPr lang="en-US"/>
           </a:p>
         </p:txBody>
       </p:sp>
@@ -11597,7 +11733,7 @@
           <p:cNvPr id="4" name="Date Placeholder 3">
             <a:extLst>
               <a:ext uri="{FF2B5EF4-FFF2-40B4-BE49-F238E27FC236}">
-                <a16:creationId xmlns:a16="http://schemas.microsoft.com/office/drawing/2014/main" id="{6D5133BD-4847-4D49-B5BF-4CC178F8FDB8}"/>
+                <a16:creationId xmlns:a16="http://schemas.microsoft.com/office/drawing/2014/main" id="{F8BB5762-D626-4F41-BFE6-A11AF777F6D8}"/>
               </a:ext>
             </a:extLst>
           </p:cNvPr>
@@ -11615,7 +11751,7 @@
           <a:p>
             <a:fld id="{8AAE40A0-A7D8-4DC3-BC9E-BADA32DA2004}" type="datetime4">
               <a:rPr lang="en-US" smtClean="0"/>
-              <a:t>August 16, 2019</a:t>
+              <a:t>August 19, 2019</a:t>
             </a:fld>
             <a:endParaRPr lang="en-US" dirty="0"/>
           </a:p>
@@ -11626,7 +11762,7 @@
           <p:cNvPr id="5" name="Footer Placeholder 4">
             <a:extLst>
               <a:ext uri="{FF2B5EF4-FFF2-40B4-BE49-F238E27FC236}">
-                <a16:creationId xmlns:a16="http://schemas.microsoft.com/office/drawing/2014/main" id="{5963B75A-EC19-4470-9F8C-1E2C1FB85999}"/>
+                <a16:creationId xmlns:a16="http://schemas.microsoft.com/office/drawing/2014/main" id="{8EDB9D35-56C5-4AA6-8252-57704C4A289F}"/>
               </a:ext>
             </a:extLst>
           </p:cNvPr>
@@ -11683,7 +11819,7 @@
           <p:cNvPr id="6" name="Slide Number Placeholder 5">
             <a:extLst>
               <a:ext uri="{FF2B5EF4-FFF2-40B4-BE49-F238E27FC236}">
-                <a16:creationId xmlns:a16="http://schemas.microsoft.com/office/drawing/2014/main" id="{BDAB3897-F226-4B28-B7E1-52A0CDB34A2C}"/>
+                <a16:creationId xmlns:a16="http://schemas.microsoft.com/office/drawing/2014/main" id="{11295AC8-69BA-4E0A-953B-3E0CD278C2ED}"/>
               </a:ext>
             </a:extLst>
           </p:cNvPr>
@@ -11710,7 +11846,7 @@
     </p:spTree>
     <p:extLst>
       <p:ext uri="{BB962C8B-B14F-4D97-AF65-F5344CB8AC3E}">
-        <p14:creationId xmlns:p14="http://schemas.microsoft.com/office/powerpoint/2010/main" val="1005120841"/>
+        <p14:creationId xmlns:p14="http://schemas.microsoft.com/office/powerpoint/2010/main" val="1352129933"/>
       </p:ext>
     </p:extLst>
   </p:cSld>
@@ -11742,7 +11878,7 @@
           <p:cNvPr id="2" name="Title 1">
             <a:extLst>
               <a:ext uri="{FF2B5EF4-FFF2-40B4-BE49-F238E27FC236}">
-                <a16:creationId xmlns:a16="http://schemas.microsoft.com/office/drawing/2014/main" id="{763619FC-2C00-4A86-9CDA-1BF3459DAC50}"/>
+                <a16:creationId xmlns:a16="http://schemas.microsoft.com/office/drawing/2014/main" id="{98EB4F1B-51B3-4B64-8210-21AE8BE64582}"/>
               </a:ext>
             </a:extLst>
           </p:cNvPr>
@@ -11760,17 +11896,17 @@
           <a:p>
             <a:r>
               <a:rPr lang="en-US" dirty="0"/>
-              <a:t>GLOBBING</a:t>
-            </a:r>
-          </a:p>
-        </p:txBody>
-      </p:sp>
-      <p:sp>
-        <p:nvSpPr>
-          <p:cNvPr id="3" name="Text Placeholder 2">
-            <a:extLst>
-              <a:ext uri="{FF2B5EF4-FFF2-40B4-BE49-F238E27FC236}">
-                <a16:creationId xmlns:a16="http://schemas.microsoft.com/office/drawing/2014/main" id="{14188AF0-954F-45E0-97B5-73D18A416CC7}"/>
+              <a:t>SCHEDULING WITH CRON</a:t>
+            </a:r>
+          </a:p>
+        </p:txBody>
+      </p:sp>
+      <p:sp>
+        <p:nvSpPr>
+          <p:cNvPr id="3" name="Content Placeholder 2">
+            <a:extLst>
+              <a:ext uri="{FF2B5EF4-FFF2-40B4-BE49-F238E27FC236}">
+                <a16:creationId xmlns:a16="http://schemas.microsoft.com/office/drawing/2014/main" id="{593AD591-5DD9-410C-B27F-EACDDF765FF4}"/>
               </a:ext>
             </a:extLst>
           </p:cNvPr>
@@ -11788,13 +11924,61 @@
           <a:p>
             <a:r>
               <a:rPr lang="en-US" dirty="0"/>
-              <a:t>A way to match files effectively</a:t>
-            </a:r>
-          </a:p>
-          <a:p>
-            <a:r>
-              <a:rPr lang="en-US" dirty="0"/>
-              <a:t>Less powerful than regular expressions, but much quicker</a:t>
+              <a:t>Crontab: has information for scheduling</a:t>
+            </a:r>
+          </a:p>
+          <a:p>
+            <a:r>
+              <a:rPr lang="en-US" dirty="0"/>
+              <a:t>Use </a:t>
+            </a:r>
+            <a:r>
+              <a:rPr lang="en-US" dirty="0">
+                <a:hlinkClick r:id="rId2"/>
+              </a:rPr>
+              <a:t>https://crontab.guru</a:t>
+            </a:r>
+            <a:r>
+              <a:rPr lang="en-US" dirty="0"/>
+              <a:t> to help with syntax</a:t>
+            </a:r>
+          </a:p>
+          <a:p>
+            <a:r>
+              <a:rPr lang="en-US" dirty="0"/>
+              <a:t>Example:</a:t>
+            </a:r>
+          </a:p>
+          <a:p>
+            <a:pPr marL="457200" lvl="1" indent="0">
+              <a:buNone/>
+            </a:pPr>
+            <a:r>
+              <a:rPr lang="en-US" dirty="0">
+                <a:latin typeface="Courier New" panose="02070309020205020404" pitchFamily="49" charset="0"/>
+                <a:cs typeface="Courier New" panose="02070309020205020404" pitchFamily="49" charset="0"/>
+              </a:rPr>
+              <a:t>30 4 * * MON rm –rf /</a:t>
+            </a:r>
+            <a:r>
+              <a:rPr lang="en-US" dirty="0" err="1">
+                <a:latin typeface="Courier New" panose="02070309020205020404" pitchFamily="49" charset="0"/>
+                <a:cs typeface="Courier New" panose="02070309020205020404" pitchFamily="49" charset="0"/>
+              </a:rPr>
+              <a:t>tmp</a:t>
+            </a:r>
+            <a:r>
+              <a:rPr lang="en-US" dirty="0">
+                <a:latin typeface="Courier New" panose="02070309020205020404" pitchFamily="49" charset="0"/>
+                <a:cs typeface="Courier New" panose="02070309020205020404" pitchFamily="49" charset="0"/>
+              </a:rPr>
+              <a:t>/* </a:t>
+            </a:r>
+            <a:r>
+              <a:rPr lang="en-US" dirty="0">
+                <a:cs typeface="Courier New" panose="02070309020205020404" pitchFamily="49" charset="0"/>
+              </a:rPr>
+              <a:t>means delete all temporary files at 4:30 AM every Monday</a:t>
             </a:r>
           </a:p>
         </p:txBody>
@@ -11804,7 +11988,7 @@
           <p:cNvPr id="4" name="Date Placeholder 3">
             <a:extLst>
               <a:ext uri="{FF2B5EF4-FFF2-40B4-BE49-F238E27FC236}">
-                <a16:creationId xmlns:a16="http://schemas.microsoft.com/office/drawing/2014/main" id="{6D5133BD-4847-4D49-B5BF-4CC178F8FDB8}"/>
+                <a16:creationId xmlns:a16="http://schemas.microsoft.com/office/drawing/2014/main" id="{17E05AC0-8A63-4FDD-A727-54A8C6040A83}"/>
               </a:ext>
             </a:extLst>
           </p:cNvPr>
@@ -11822,7 +12006,7 @@
           <a:p>
             <a:fld id="{8AAE40A0-A7D8-4DC3-BC9E-BADA32DA2004}" type="datetime4">
               <a:rPr lang="en-US" smtClean="0"/>
-              <a:t>August 16, 2019</a:t>
+              <a:t>August 19, 2019</a:t>
             </a:fld>
             <a:endParaRPr lang="en-US" dirty="0"/>
           </a:p>
@@ -11833,7 +12017,7 @@
           <p:cNvPr id="5" name="Footer Placeholder 4">
             <a:extLst>
               <a:ext uri="{FF2B5EF4-FFF2-40B4-BE49-F238E27FC236}">
-                <a16:creationId xmlns:a16="http://schemas.microsoft.com/office/drawing/2014/main" id="{5963B75A-EC19-4470-9F8C-1E2C1FB85999}"/>
+                <a16:creationId xmlns:a16="http://schemas.microsoft.com/office/drawing/2014/main" id="{9C0CA735-E60F-4094-86F7-D33BB272FA25}"/>
               </a:ext>
             </a:extLst>
           </p:cNvPr>
@@ -11890,7 +12074,7 @@
           <p:cNvPr id="6" name="Slide Number Placeholder 5">
             <a:extLst>
               <a:ext uri="{FF2B5EF4-FFF2-40B4-BE49-F238E27FC236}">
-                <a16:creationId xmlns:a16="http://schemas.microsoft.com/office/drawing/2014/main" id="{BDAB3897-F226-4B28-B7E1-52A0CDB34A2C}"/>
+                <a16:creationId xmlns:a16="http://schemas.microsoft.com/office/drawing/2014/main" id="{33AAFB92-45C0-421A-AC0A-7A439518D3F4}"/>
               </a:ext>
             </a:extLst>
           </p:cNvPr>
@@ -11917,7 +12101,7 @@
     </p:spTree>
     <p:extLst>
       <p:ext uri="{BB962C8B-B14F-4D97-AF65-F5344CB8AC3E}">
-        <p14:creationId xmlns:p14="http://schemas.microsoft.com/office/powerpoint/2010/main" val="39492658"/>
+        <p14:creationId xmlns:p14="http://schemas.microsoft.com/office/powerpoint/2010/main" val="768433680"/>
       </p:ext>
     </p:extLst>
   </p:cSld>
@@ -11967,7 +12151,7 @@
           <a:p>
             <a:r>
               <a:rPr lang="en-US" dirty="0"/>
-              <a:t>BRACE EXPANSIONS</a:t>
+              <a:t>ADVANCED FEATURES</a:t>
             </a:r>
           </a:p>
         </p:txBody>
@@ -11985,53 +12169,30 @@
             <a:spLocks noGrp="1"/>
           </p:cNvSpPr>
           <p:nvPr>
-            <p:ph idx="1"/>
-          </p:nvPr>
-        </p:nvSpPr>
-        <p:spPr/>
-        <p:txBody>
-          <a:bodyPr/>
-          <a:lstStyle/>
-          <a:p>
-            <a:r>
-              <a:rPr lang="en-US" dirty="0"/>
-              <a:t>Essentially giving options</a:t>
-            </a:r>
-          </a:p>
-          <a:p>
-            <a:r>
-              <a:rPr lang="en-US" dirty="0">
-                <a:latin typeface="Courier New" panose="02070309020205020404" pitchFamily="49" charset="0"/>
-                <a:cs typeface="Courier New" panose="02070309020205020404" pitchFamily="49" charset="0"/>
-              </a:rPr>
-              <a:t>d{</a:t>
-            </a:r>
-            <a:r>
-              <a:rPr lang="en-US" dirty="0" err="1">
-                <a:latin typeface="Courier New" panose="02070309020205020404" pitchFamily="49" charset="0"/>
-                <a:cs typeface="Courier New" panose="02070309020205020404" pitchFamily="49" charset="0"/>
-              </a:rPr>
-              <a:t>o,u,ou</a:t>
-            </a:r>
-            <a:r>
-              <a:rPr lang="en-US" dirty="0">
-                <a:latin typeface="Courier New" panose="02070309020205020404" pitchFamily="49" charset="0"/>
-                <a:cs typeface="Courier New" panose="02070309020205020404" pitchFamily="49" charset="0"/>
-              </a:rPr>
-              <a:t>}g</a:t>
-            </a:r>
-            <a:r>
-              <a:rPr lang="en-US" dirty="0"/>
-              <a:t> gives dog, dug, </a:t>
-            </a:r>
+            <p:ph type="body" idx="1"/>
+          </p:nvPr>
+        </p:nvSpPr>
+        <p:spPr/>
+        <p:txBody>
+          <a:bodyPr/>
+          <a:lstStyle/>
+          <a:p>
             <a:r>
               <a:rPr lang="en-US" dirty="0" err="1"/>
-              <a:t>doug</a:t>
-            </a:r>
-            <a:endParaRPr lang="en-US" dirty="0"/>
-          </a:p>
-          <a:p>
-            <a:endParaRPr lang="en-US" dirty="0"/>
+              <a:t>Interprocess</a:t>
+            </a:r>
+            <a:r>
+              <a:rPr lang="en-US" dirty="0"/>
+              <a:t> communication, signals, jobs, </a:t>
+            </a:r>
+            <a:r>
+              <a:rPr lang="en-US" dirty="0" err="1"/>
+              <a:t>globbing</a:t>
+            </a:r>
+            <a:r>
+              <a:rPr lang="en-US" dirty="0"/>
+              <a:t>, and more</a:t>
+            </a:r>
           </a:p>
         </p:txBody>
       </p:sp>
@@ -12058,7 +12219,7 @@
           <a:p>
             <a:fld id="{8AAE40A0-A7D8-4DC3-BC9E-BADA32DA2004}" type="datetime4">
               <a:rPr lang="en-US" smtClean="0"/>
-              <a:t>August 16, 2019</a:t>
+              <a:t>August 19, 2019</a:t>
             </a:fld>
             <a:endParaRPr lang="en-US" dirty="0"/>
           </a:p>
@@ -12153,7 +12314,7 @@
     </p:spTree>
     <p:extLst>
       <p:ext uri="{BB962C8B-B14F-4D97-AF65-F5344CB8AC3E}">
-        <p14:creationId xmlns:p14="http://schemas.microsoft.com/office/powerpoint/2010/main" val="702090128"/>
+        <p14:creationId xmlns:p14="http://schemas.microsoft.com/office/powerpoint/2010/main" val="1005120841"/>
       </p:ext>
     </p:extLst>
   </p:cSld>
@@ -12203,7 +12364,7 @@
           <a:p>
             <a:r>
               <a:rPr lang="en-US" dirty="0"/>
-              <a:t>INPUT AND OUTPUT</a:t>
+              <a:t>BRACE EXPANSIONS</a:t>
             </a:r>
           </a:p>
         </p:txBody>
@@ -12231,157 +12392,40 @@
           <a:p>
             <a:r>
               <a:rPr lang="en-US" dirty="0"/>
-              <a:t>3 separate input/output streams</a:t>
-            </a:r>
-          </a:p>
-          <a:p>
-            <a:pPr lvl="1"/>
-            <a:r>
-              <a:rPr lang="en-US" dirty="0"/>
-              <a:t>Standard Output (</a:t>
-            </a:r>
-            <a:r>
-              <a:rPr lang="en-US" dirty="0" err="1"/>
-              <a:t>stdout</a:t>
-            </a:r>
-            <a:r>
-              <a:rPr lang="en-US" dirty="0"/>
-              <a:t>)</a:t>
-            </a:r>
-          </a:p>
-          <a:p>
-            <a:pPr lvl="1"/>
-            <a:r>
-              <a:rPr lang="en-US" dirty="0"/>
-              <a:t>Standard Input (stdin)</a:t>
-            </a:r>
-          </a:p>
-          <a:p>
-            <a:pPr lvl="1"/>
-            <a:r>
-              <a:rPr lang="en-US" dirty="0"/>
-              <a:t>Standard Error (stderr)</a:t>
-            </a:r>
-          </a:p>
-          <a:p>
-            <a:r>
-              <a:rPr lang="en-US" dirty="0"/>
-              <a:t>Redirection</a:t>
-            </a:r>
-          </a:p>
-          <a:p>
-            <a:pPr lvl="1"/>
-            <a:r>
-              <a:rPr lang="en-US" dirty="0"/>
-              <a:t>Input: </a:t>
-            </a:r>
+              <a:t>Essentially giving options</a:t>
+            </a:r>
+          </a:p>
+          <a:p>
             <a:r>
               <a:rPr lang="en-US" dirty="0">
                 <a:latin typeface="Courier New" panose="02070309020205020404" pitchFamily="49" charset="0"/>
                 <a:cs typeface="Courier New" panose="02070309020205020404" pitchFamily="49" charset="0"/>
               </a:rPr>
-              <a:t>&lt; </a:t>
-            </a:r>
-            <a:r>
-              <a:rPr lang="en-US" i="1" dirty="0">
+              <a:t>d{</a:t>
+            </a:r>
+            <a:r>
+              <a:rPr lang="en-US" dirty="0" err="1">
                 <a:latin typeface="Courier New" panose="02070309020205020404" pitchFamily="49" charset="0"/>
                 <a:cs typeface="Courier New" panose="02070309020205020404" pitchFamily="49" charset="0"/>
               </a:rPr>
-              <a:t>file</a:t>
-            </a:r>
-          </a:p>
-          <a:p>
-            <a:pPr lvl="1"/>
-            <a:r>
-              <a:rPr lang="en-US" dirty="0"/>
-              <a:t>Standard Output: </a:t>
+              <a:t>o,u,ou</a:t>
             </a:r>
             <a:r>
               <a:rPr lang="en-US" dirty="0">
                 <a:latin typeface="Courier New" panose="02070309020205020404" pitchFamily="49" charset="0"/>
                 <a:cs typeface="Courier New" panose="02070309020205020404" pitchFamily="49" charset="0"/>
               </a:rPr>
-              <a:t>&gt; </a:t>
-            </a:r>
-            <a:r>
-              <a:rPr lang="en-US" i="1" dirty="0">
-                <a:latin typeface="Courier New" panose="02070309020205020404" pitchFamily="49" charset="0"/>
-                <a:cs typeface="Courier New" panose="02070309020205020404" pitchFamily="49" charset="0"/>
-              </a:rPr>
-              <a:t>file</a:t>
-            </a:r>
-          </a:p>
-          <a:p>
-            <a:pPr lvl="1"/>
-            <a:r>
-              <a:rPr lang="en-US" dirty="0"/>
-              <a:t>Standard Error: </a:t>
-            </a:r>
-            <a:r>
-              <a:rPr lang="en-US" dirty="0">
-                <a:latin typeface="Courier New" panose="02070309020205020404" pitchFamily="49" charset="0"/>
-                <a:cs typeface="Courier New" panose="02070309020205020404" pitchFamily="49" charset="0"/>
-              </a:rPr>
-              <a:t>2&gt; </a:t>
-            </a:r>
-            <a:r>
-              <a:rPr lang="en-US" i="1" dirty="0">
-                <a:latin typeface="Courier New" panose="02070309020205020404" pitchFamily="49" charset="0"/>
-                <a:cs typeface="Courier New" panose="02070309020205020404" pitchFamily="49" charset="0"/>
-              </a:rPr>
-              <a:t>file</a:t>
-            </a:r>
-          </a:p>
-          <a:p>
-            <a:pPr lvl="1"/>
-            <a:r>
-              <a:rPr lang="en-US" dirty="0"/>
-              <a:t>Standard Output and Error: </a:t>
-            </a:r>
-            <a:r>
-              <a:rPr lang="en-US" dirty="0">
-                <a:latin typeface="Courier New" panose="02070309020205020404" pitchFamily="49" charset="0"/>
-                <a:cs typeface="Courier New" panose="02070309020205020404" pitchFamily="49" charset="0"/>
-              </a:rPr>
-              <a:t>&amp;&gt; </a:t>
-            </a:r>
-            <a:r>
-              <a:rPr lang="en-US" i="1" dirty="0">
-                <a:latin typeface="Courier New" panose="02070309020205020404" pitchFamily="49" charset="0"/>
-                <a:cs typeface="Courier New" panose="02070309020205020404" pitchFamily="49" charset="0"/>
-              </a:rPr>
-              <a:t>file</a:t>
-            </a:r>
-          </a:p>
-          <a:p>
-            <a:pPr lvl="1"/>
-            <a:r>
-              <a:rPr lang="en-US" dirty="0">
-                <a:cs typeface="Courier New" panose="02070309020205020404" pitchFamily="49" charset="0"/>
-              </a:rPr>
-              <a:t>Append with</a:t>
-            </a:r>
-            <a:r>
-              <a:rPr lang="en-US" dirty="0">
-                <a:latin typeface="Courier New" panose="02070309020205020404" pitchFamily="49" charset="0"/>
-                <a:cs typeface="Courier New" panose="02070309020205020404" pitchFamily="49" charset="0"/>
-              </a:rPr>
-              <a:t> &gt;&gt; (&gt;&gt; </a:t>
-            </a:r>
-            <a:r>
-              <a:rPr lang="en-US" i="1" dirty="0">
-                <a:latin typeface="Courier New" panose="02070309020205020404" pitchFamily="49" charset="0"/>
-                <a:cs typeface="Courier New" panose="02070309020205020404" pitchFamily="49" charset="0"/>
-              </a:rPr>
-              <a:t>file</a:t>
-            </a:r>
-            <a:r>
-              <a:rPr lang="en-US" dirty="0">
-                <a:latin typeface="Courier New" panose="02070309020205020404" pitchFamily="49" charset="0"/>
-                <a:cs typeface="Courier New" panose="02070309020205020404" pitchFamily="49" charset="0"/>
-              </a:rPr>
-              <a:t>)</a:t>
-            </a:r>
+              <a:t>}g</a:t>
+            </a:r>
+            <a:r>
+              <a:rPr lang="en-US" dirty="0"/>
+              <a:t> gives dog, dug, </a:t>
+            </a:r>
+            <a:r>
+              <a:rPr lang="en-US" dirty="0" err="1"/>
+              <a:t>doug</a:t>
+            </a:r>
+            <a:endParaRPr lang="en-US" dirty="0"/>
           </a:p>
           <a:p>
             <a:endParaRPr lang="en-US" dirty="0"/>
@@ -12411,7 +12455,7 @@
           <a:p>
             <a:fld id="{8AAE40A0-A7D8-4DC3-BC9E-BADA32DA2004}" type="datetime4">
               <a:rPr lang="en-US" smtClean="0"/>
-              <a:t>August 16, 2019</a:t>
+              <a:t>August 19, 2019</a:t>
             </a:fld>
             <a:endParaRPr lang="en-US" dirty="0"/>
           </a:p>
@@ -12506,7 +12550,7 @@
     </p:spTree>
     <p:extLst>
       <p:ext uri="{BB962C8B-B14F-4D97-AF65-F5344CB8AC3E}">
-        <p14:creationId xmlns:p14="http://schemas.microsoft.com/office/powerpoint/2010/main" val="98178358"/>
+        <p14:creationId xmlns:p14="http://schemas.microsoft.com/office/powerpoint/2010/main" val="702090128"/>
       </p:ext>
     </p:extLst>
   </p:cSld>
@@ -12556,7 +12600,7 @@
           <a:p>
             <a:r>
               <a:rPr lang="en-US" dirty="0"/>
-              <a:t>SPECIAL/USEFUL FILES</a:t>
+              <a:t>INPUT AND OUTPUT</a:t>
             </a:r>
           </a:p>
         </p:txBody>
@@ -12584,67 +12628,156 @@
           <a:p>
             <a:r>
               <a:rPr lang="en-US" dirty="0"/>
-              <a:t>/dev/null</a:t>
+              <a:t>3 separate input/output streams</a:t>
             </a:r>
           </a:p>
           <a:p>
             <a:pPr lvl="1"/>
             <a:r>
-              <a:rPr lang="en-US" dirty="0">
-                <a:cs typeface="Courier New" panose="02070309020205020404" pitchFamily="49" charset="0"/>
-              </a:rPr>
-              <a:t>Basically just means ignore</a:t>
+              <a:rPr lang="en-US" dirty="0"/>
+              <a:t>Standard Output (</a:t>
+            </a:r>
+            <a:r>
+              <a:rPr lang="en-US" dirty="0" err="1"/>
+              <a:t>stdout</a:t>
+            </a:r>
+            <a:r>
+              <a:rPr lang="en-US" dirty="0"/>
+              <a:t>)</a:t>
             </a:r>
           </a:p>
           <a:p>
             <a:pPr lvl="1"/>
+            <a:r>
+              <a:rPr lang="en-US" dirty="0"/>
+              <a:t>Standard Input (stdin)</a:t>
+            </a:r>
+          </a:p>
+          <a:p>
+            <a:pPr lvl="1"/>
+            <a:r>
+              <a:rPr lang="en-US" dirty="0"/>
+              <a:t>Standard Error (stderr)</a:t>
+            </a:r>
+          </a:p>
+          <a:p>
+            <a:r>
+              <a:rPr lang="en-US" dirty="0"/>
+              <a:t>Redirection</a:t>
+            </a:r>
+          </a:p>
+          <a:p>
+            <a:pPr lvl="1"/>
+            <a:r>
+              <a:rPr lang="en-US" dirty="0"/>
+              <a:t>Input: </a:t>
+            </a:r>
             <a:r>
               <a:rPr lang="en-US" dirty="0">
                 <a:latin typeface="Courier New" panose="02070309020205020404" pitchFamily="49" charset="0"/>
                 <a:cs typeface="Courier New" panose="02070309020205020404" pitchFamily="49" charset="0"/>
               </a:rPr>
-              <a:t>2&gt;/dev/null: </a:t>
-            </a:r>
+              <a:t>&lt; </a:t>
+            </a:r>
+            <a:r>
+              <a:rPr lang="en-US" i="1" dirty="0">
+                <a:latin typeface="Courier New" panose="02070309020205020404" pitchFamily="49" charset="0"/>
+                <a:cs typeface="Courier New" panose="02070309020205020404" pitchFamily="49" charset="0"/>
+              </a:rPr>
+              <a:t>file</a:t>
+            </a:r>
+          </a:p>
+          <a:p>
+            <a:pPr lvl="1"/>
+            <a:r>
+              <a:rPr lang="en-US" dirty="0"/>
+              <a:t>Standard Output: </a:t>
+            </a:r>
+            <a:r>
+              <a:rPr lang="en-US" dirty="0">
+                <a:latin typeface="Courier New" panose="02070309020205020404" pitchFamily="49" charset="0"/>
+                <a:cs typeface="Courier New" panose="02070309020205020404" pitchFamily="49" charset="0"/>
+              </a:rPr>
+              <a:t>&gt; </a:t>
+            </a:r>
+            <a:r>
+              <a:rPr lang="en-US" i="1" dirty="0">
+                <a:latin typeface="Courier New" panose="02070309020205020404" pitchFamily="49" charset="0"/>
+                <a:cs typeface="Courier New" panose="02070309020205020404" pitchFamily="49" charset="0"/>
+              </a:rPr>
+              <a:t>file</a:t>
+            </a:r>
+          </a:p>
+          <a:p>
+            <a:pPr lvl="1"/>
+            <a:r>
+              <a:rPr lang="en-US" dirty="0"/>
+              <a:t>Standard Error: </a:t>
+            </a:r>
+            <a:r>
+              <a:rPr lang="en-US" dirty="0">
+                <a:latin typeface="Courier New" panose="02070309020205020404" pitchFamily="49" charset="0"/>
+                <a:cs typeface="Courier New" panose="02070309020205020404" pitchFamily="49" charset="0"/>
+              </a:rPr>
+              <a:t>2&gt; </a:t>
+            </a:r>
+            <a:r>
+              <a:rPr lang="en-US" i="1" dirty="0">
+                <a:latin typeface="Courier New" panose="02070309020205020404" pitchFamily="49" charset="0"/>
+                <a:cs typeface="Courier New" panose="02070309020205020404" pitchFamily="49" charset="0"/>
+              </a:rPr>
+              <a:t>file</a:t>
+            </a:r>
+          </a:p>
+          <a:p>
+            <a:pPr lvl="1"/>
+            <a:r>
+              <a:rPr lang="en-US" dirty="0"/>
+              <a:t>Standard Output and Error: </a:t>
+            </a:r>
+            <a:r>
+              <a:rPr lang="en-US" dirty="0">
+                <a:latin typeface="Courier New" panose="02070309020205020404" pitchFamily="49" charset="0"/>
+                <a:cs typeface="Courier New" panose="02070309020205020404" pitchFamily="49" charset="0"/>
+              </a:rPr>
+              <a:t>&amp;&gt; </a:t>
+            </a:r>
+            <a:r>
+              <a:rPr lang="en-US" i="1" dirty="0">
+                <a:latin typeface="Courier New" panose="02070309020205020404" pitchFamily="49" charset="0"/>
+                <a:cs typeface="Courier New" panose="02070309020205020404" pitchFamily="49" charset="0"/>
+              </a:rPr>
+              <a:t>file</a:t>
+            </a:r>
+          </a:p>
+          <a:p>
+            <a:pPr lvl="1"/>
             <a:r>
               <a:rPr lang="en-US" dirty="0">
                 <a:cs typeface="Courier New" panose="02070309020205020404" pitchFamily="49" charset="0"/>
               </a:rPr>
-              <a:t>ignore error output</a:t>
-            </a:r>
-          </a:p>
-          <a:p>
+              <a:t>Append with</a:t>
+            </a:r>
             <a:r>
               <a:rPr lang="en-US" dirty="0">
+                <a:latin typeface="Courier New" panose="02070309020205020404" pitchFamily="49" charset="0"/>
                 <a:cs typeface="Courier New" panose="02070309020205020404" pitchFamily="49" charset="0"/>
               </a:rPr>
-              <a:t>/dev/</a:t>
-            </a:r>
-            <a:r>
-              <a:rPr lang="en-US" dirty="0" err="1">
+              <a:t> &gt;&gt; (&gt;&gt; </a:t>
+            </a:r>
+            <a:r>
+              <a:rPr lang="en-US" i="1" dirty="0">
+                <a:latin typeface="Courier New" panose="02070309020205020404" pitchFamily="49" charset="0"/>
                 <a:cs typeface="Courier New" panose="02070309020205020404" pitchFamily="49" charset="0"/>
               </a:rPr>
-              <a:t>urandom</a:t>
-            </a:r>
-            <a:endParaRPr lang="en-US" dirty="0">
-              <a:cs typeface="Courier New" panose="02070309020205020404" pitchFamily="49" charset="0"/>
-            </a:endParaRPr>
-          </a:p>
-          <a:p>
-            <a:pPr lvl="1"/>
+              <a:t>file</a:t>
+            </a:r>
             <a:r>
               <a:rPr lang="en-US" dirty="0">
+                <a:latin typeface="Courier New" panose="02070309020205020404" pitchFamily="49" charset="0"/>
                 <a:cs typeface="Courier New" panose="02070309020205020404" pitchFamily="49" charset="0"/>
               </a:rPr>
-              <a:t>Read from this to get random data</a:t>
-            </a:r>
-          </a:p>
-          <a:p>
-            <a:pPr lvl="1"/>
-            <a:r>
-              <a:rPr lang="en-US" dirty="0">
-                <a:cs typeface="Courier New" panose="02070309020205020404" pitchFamily="49" charset="0"/>
-              </a:rPr>
-              <a:t>Good for cryptography!</a:t>
+              <a:t>)</a:t>
             </a:r>
           </a:p>
           <a:p>
@@ -12675,7 +12808,7 @@
           <a:p>
             <a:fld id="{8AAE40A0-A7D8-4DC3-BC9E-BADA32DA2004}" type="datetime4">
               <a:rPr lang="en-US" smtClean="0"/>
-              <a:t>August 16, 2019</a:t>
+              <a:t>August 19, 2019</a:t>
             </a:fld>
             <a:endParaRPr lang="en-US" dirty="0"/>
           </a:p>
@@ -12770,7 +12903,7 @@
     </p:spTree>
     <p:extLst>
       <p:ext uri="{BB962C8B-B14F-4D97-AF65-F5344CB8AC3E}">
-        <p14:creationId xmlns:p14="http://schemas.microsoft.com/office/powerpoint/2010/main" val="3113982168"/>
+        <p14:creationId xmlns:p14="http://schemas.microsoft.com/office/powerpoint/2010/main" val="98178358"/>
       </p:ext>
     </p:extLst>
   </p:cSld>
@@ -12820,7 +12953,7 @@
           <a:p>
             <a:r>
               <a:rPr lang="en-US" dirty="0"/>
-              <a:t>PIPES</a:t>
+              <a:t>SPECIAL/USEFUL FILES</a:t>
             </a:r>
           </a:p>
         </p:txBody>
@@ -12848,67 +12981,70 @@
           <a:p>
             <a:r>
               <a:rPr lang="en-US" dirty="0"/>
-              <a:t>Sending output to a different program</a:t>
-            </a:r>
-          </a:p>
-          <a:p>
-            <a:r>
-              <a:rPr lang="en-US" dirty="0"/>
-              <a:t>By default, only </a:t>
-            </a:r>
-            <a:r>
-              <a:rPr lang="en-US" dirty="0" err="1"/>
-              <a:t>stdout</a:t>
-            </a:r>
-            <a:endParaRPr lang="en-US" dirty="0"/>
+              <a:t>/dev/null</a:t>
+            </a:r>
           </a:p>
           <a:p>
             <a:pPr lvl="1"/>
             <a:r>
-              <a:rPr lang="en-US" dirty="0"/>
-              <a:t>Can pipe stderr with </a:t>
-            </a:r>
+              <a:rPr lang="en-US" dirty="0">
+                <a:cs typeface="Courier New" panose="02070309020205020404" pitchFamily="49" charset="0"/>
+              </a:rPr>
+              <a:t>Basically just means ignore</a:t>
+            </a:r>
+          </a:p>
+          <a:p>
+            <a:pPr lvl="1"/>
             <a:r>
               <a:rPr lang="en-US" dirty="0">
                 <a:latin typeface="Courier New" panose="02070309020205020404" pitchFamily="49" charset="0"/>
                 <a:cs typeface="Courier New" panose="02070309020205020404" pitchFamily="49" charset="0"/>
               </a:rPr>
-              <a:t>|&amp;</a:t>
-            </a:r>
-          </a:p>
-          <a:p>
+              <a:t>2&gt;/dev/null: </a:t>
+            </a:r>
             <a:r>
               <a:rPr lang="en-US" dirty="0">
                 <a:cs typeface="Courier New" panose="02070309020205020404" pitchFamily="49" charset="0"/>
               </a:rPr>
-              <a:t>We’ve seen them with </a:t>
-            </a:r>
-            <a:r>
-              <a:rPr lang="en-US" dirty="0">
-                <a:latin typeface="Courier New" panose="02070309020205020404" pitchFamily="49" charset="0"/>
-                <a:cs typeface="Courier New" panose="02070309020205020404" pitchFamily="49" charset="0"/>
-              </a:rPr>
-              <a:t>parallel</a:t>
-            </a:r>
+              <a:t>ignore error output</a:t>
+            </a:r>
+          </a:p>
+          <a:p>
             <a:r>
               <a:rPr lang="en-US" dirty="0">
                 <a:cs typeface="Courier New" panose="02070309020205020404" pitchFamily="49" charset="0"/>
               </a:rPr>
-              <a:t> and </a:t>
+              <a:t>/dev/</a:t>
             </a:r>
             <a:r>
               <a:rPr lang="en-US" dirty="0" err="1">
-                <a:latin typeface="Courier New" panose="02070309020205020404" pitchFamily="49" charset="0"/>
                 <a:cs typeface="Courier New" panose="02070309020205020404" pitchFamily="49" charset="0"/>
               </a:rPr>
-              <a:t>xargs</a:t>
+              <a:t>urandom</a:t>
             </a:r>
             <a:endParaRPr lang="en-US" dirty="0">
-              <a:latin typeface="Courier New" panose="02070309020205020404" pitchFamily="49" charset="0"/>
               <a:cs typeface="Courier New" panose="02070309020205020404" pitchFamily="49" charset="0"/>
             </a:endParaRPr>
           </a:p>
           <a:p>
+            <a:pPr lvl="1"/>
+            <a:r>
+              <a:rPr lang="en-US" dirty="0">
+                <a:cs typeface="Courier New" panose="02070309020205020404" pitchFamily="49" charset="0"/>
+              </a:rPr>
+              <a:t>Read from this to get random data</a:t>
+            </a:r>
+          </a:p>
+          <a:p>
+            <a:pPr lvl="1"/>
+            <a:r>
+              <a:rPr lang="en-US" dirty="0">
+                <a:cs typeface="Courier New" panose="02070309020205020404" pitchFamily="49" charset="0"/>
+              </a:rPr>
+              <a:t>Good for cryptography!</a:t>
+            </a:r>
+          </a:p>
+          <a:p>
             <a:endParaRPr lang="en-US" dirty="0"/>
           </a:p>
         </p:txBody>
@@ -12936,7 +13072,7 @@
           <a:p>
             <a:fld id="{8AAE40A0-A7D8-4DC3-BC9E-BADA32DA2004}" type="datetime4">
               <a:rPr lang="en-US" smtClean="0"/>
-              <a:t>August 16, 2019</a:t>
+              <a:t>August 19, 2019</a:t>
             </a:fld>
             <a:endParaRPr lang="en-US" dirty="0"/>
           </a:p>
@@ -13031,7 +13167,7 @@
     </p:spTree>
     <p:extLst>
       <p:ext uri="{BB962C8B-B14F-4D97-AF65-F5344CB8AC3E}">
-        <p14:creationId xmlns:p14="http://schemas.microsoft.com/office/powerpoint/2010/main" val="4096482738"/>
+        <p14:creationId xmlns:p14="http://schemas.microsoft.com/office/powerpoint/2010/main" val="3113982168"/>
       </p:ext>
     </p:extLst>
   </p:cSld>
@@ -13081,7 +13217,7 @@
           <a:p>
             <a:r>
               <a:rPr lang="en-US" dirty="0"/>
-              <a:t>VARIABLES</a:t>
+              <a:t>PIPES</a:t>
             </a:r>
           </a:p>
         </p:txBody>
@@ -13109,54 +13245,65 @@
           <a:p>
             <a:r>
               <a:rPr lang="en-US" dirty="0"/>
-              <a:t>Can name pieces of information and refer to them later</a:t>
-            </a:r>
-          </a:p>
-          <a:p>
-            <a:r>
-              <a:rPr lang="en-US" dirty="0"/>
-              <a:t>Define with let</a:t>
-            </a:r>
+              <a:t>Sending output to a different program</a:t>
+            </a:r>
+          </a:p>
+          <a:p>
+            <a:r>
+              <a:rPr lang="en-US" dirty="0"/>
+              <a:t>By default, only </a:t>
+            </a:r>
+            <a:r>
+              <a:rPr lang="en-US" dirty="0" err="1"/>
+              <a:t>stdout</a:t>
+            </a:r>
+            <a:endParaRPr lang="en-US" dirty="0"/>
           </a:p>
           <a:p>
             <a:pPr lvl="1"/>
             <a:r>
               <a:rPr lang="en-US" dirty="0"/>
-              <a:t>Ex: let a=3</a:t>
-            </a:r>
-          </a:p>
-          <a:p>
-            <a:r>
-              <a:rPr lang="en-US" dirty="0"/>
-              <a:t>Refer with $</a:t>
-            </a:r>
-          </a:p>
-          <a:p>
-            <a:pPr lvl="1"/>
-            <a:r>
-              <a:rPr lang="en-US" dirty="0"/>
-              <a:t>echo $a</a:t>
-            </a:r>
-          </a:p>
-          <a:p>
-            <a:r>
-              <a:rPr lang="en-US" dirty="0"/>
-              <a:t>Delete with unset</a:t>
-            </a:r>
-          </a:p>
-          <a:p>
-            <a:pPr lvl="1"/>
-            <a:r>
-              <a:rPr lang="en-US" dirty="0"/>
-              <a:t>Unset $a</a:t>
-            </a:r>
-          </a:p>
-          <a:p>
-            <a:pPr lvl="1"/>
-            <a:r>
-              <a:rPr lang="en-US" dirty="0"/>
-              <a:t>Echo $a #can’t find it!</a:t>
-            </a:r>
+              <a:t>Can pipe stderr with </a:t>
+            </a:r>
+            <a:r>
+              <a:rPr lang="en-US" dirty="0">
+                <a:latin typeface="Courier New" panose="02070309020205020404" pitchFamily="49" charset="0"/>
+                <a:cs typeface="Courier New" panose="02070309020205020404" pitchFamily="49" charset="0"/>
+              </a:rPr>
+              <a:t>|&amp;</a:t>
+            </a:r>
+          </a:p>
+          <a:p>
+            <a:r>
+              <a:rPr lang="en-US" dirty="0">
+                <a:cs typeface="Courier New" panose="02070309020205020404" pitchFamily="49" charset="0"/>
+              </a:rPr>
+              <a:t>We’ve seen them with </a:t>
+            </a:r>
+            <a:r>
+              <a:rPr lang="en-US" dirty="0">
+                <a:latin typeface="Courier New" panose="02070309020205020404" pitchFamily="49" charset="0"/>
+                <a:cs typeface="Courier New" panose="02070309020205020404" pitchFamily="49" charset="0"/>
+              </a:rPr>
+              <a:t>parallel</a:t>
+            </a:r>
+            <a:r>
+              <a:rPr lang="en-US" dirty="0">
+                <a:cs typeface="Courier New" panose="02070309020205020404" pitchFamily="49" charset="0"/>
+              </a:rPr>
+              <a:t> and </a:t>
+            </a:r>
+            <a:r>
+              <a:rPr lang="en-US" dirty="0" err="1">
+                <a:latin typeface="Courier New" panose="02070309020205020404" pitchFamily="49" charset="0"/>
+                <a:cs typeface="Courier New" panose="02070309020205020404" pitchFamily="49" charset="0"/>
+              </a:rPr>
+              <a:t>xargs</a:t>
+            </a:r>
+            <a:endParaRPr lang="en-US" dirty="0">
+              <a:latin typeface="Courier New" panose="02070309020205020404" pitchFamily="49" charset="0"/>
+              <a:cs typeface="Courier New" panose="02070309020205020404" pitchFamily="49" charset="0"/>
+            </a:endParaRPr>
           </a:p>
           <a:p>
             <a:endParaRPr lang="en-US" dirty="0"/>
@@ -13186,7 +13333,7 @@
           <a:p>
             <a:fld id="{8AAE40A0-A7D8-4DC3-BC9E-BADA32DA2004}" type="datetime4">
               <a:rPr lang="en-US" smtClean="0"/>
-              <a:t>August 16, 2019</a:t>
+              <a:t>August 19, 2019</a:t>
             </a:fld>
             <a:endParaRPr lang="en-US" dirty="0"/>
           </a:p>
@@ -13281,7 +13428,7 @@
     </p:spTree>
     <p:extLst>
       <p:ext uri="{BB962C8B-B14F-4D97-AF65-F5344CB8AC3E}">
-        <p14:creationId xmlns:p14="http://schemas.microsoft.com/office/powerpoint/2010/main" val="3531683742"/>
+        <p14:creationId xmlns:p14="http://schemas.microsoft.com/office/powerpoint/2010/main" val="4096482738"/>
       </p:ext>
     </p:extLst>
   </p:cSld>
@@ -13331,7 +13478,7 @@
           <a:p>
             <a:r>
               <a:rPr lang="en-US" dirty="0"/>
-              <a:t>IF STATEMENTS</a:t>
+              <a:t>VARIABLES</a:t>
             </a:r>
           </a:p>
         </p:txBody>
@@ -13359,7 +13506,53 @@
           <a:p>
             <a:r>
               <a:rPr lang="en-US" dirty="0"/>
-              <a:t>Conditionals:</a:t>
+              <a:t>Can name pieces of information and refer to them later</a:t>
+            </a:r>
+          </a:p>
+          <a:p>
+            <a:r>
+              <a:rPr lang="en-US" dirty="0"/>
+              <a:t>Define with let</a:t>
+            </a:r>
+          </a:p>
+          <a:p>
+            <a:pPr lvl="1"/>
+            <a:r>
+              <a:rPr lang="en-US" dirty="0"/>
+              <a:t>Ex: let a=3</a:t>
+            </a:r>
+          </a:p>
+          <a:p>
+            <a:r>
+              <a:rPr lang="en-US" dirty="0"/>
+              <a:t>Refer with $</a:t>
+            </a:r>
+          </a:p>
+          <a:p>
+            <a:pPr lvl="1"/>
+            <a:r>
+              <a:rPr lang="en-US" dirty="0"/>
+              <a:t>echo $a</a:t>
+            </a:r>
+          </a:p>
+          <a:p>
+            <a:r>
+              <a:rPr lang="en-US" dirty="0"/>
+              <a:t>Delete with unset</a:t>
+            </a:r>
+          </a:p>
+          <a:p>
+            <a:pPr lvl="1"/>
+            <a:r>
+              <a:rPr lang="en-US" dirty="0"/>
+              <a:t>Unset $a</a:t>
+            </a:r>
+          </a:p>
+          <a:p>
+            <a:pPr lvl="1"/>
+            <a:r>
+              <a:rPr lang="en-US" dirty="0"/>
+              <a:t>Echo $a #can’t find it!</a:t>
             </a:r>
           </a:p>
           <a:p>
@@ -13390,7 +13583,7 @@
           <a:p>
             <a:fld id="{8AAE40A0-A7D8-4DC3-BC9E-BADA32DA2004}" type="datetime4">
               <a:rPr lang="en-US" smtClean="0"/>
-              <a:t>August 16, 2019</a:t>
+              <a:t>August 19, 2019</a:t>
             </a:fld>
             <a:endParaRPr lang="en-US" dirty="0"/>
           </a:p>
@@ -13485,7 +13678,7 @@
     </p:spTree>
     <p:extLst>
       <p:ext uri="{BB962C8B-B14F-4D97-AF65-F5344CB8AC3E}">
-        <p14:creationId xmlns:p14="http://schemas.microsoft.com/office/powerpoint/2010/main" val="3349014258"/>
+        <p14:creationId xmlns:p14="http://schemas.microsoft.com/office/powerpoint/2010/main" val="3531683742"/>
       </p:ext>
     </p:extLst>
   </p:cSld>
@@ -13658,7 +13851,7 @@
           <a:p>
             <a:fld id="{8AAE40A0-A7D8-4DC3-BC9E-BADA32DA2004}" type="datetime4">
               <a:rPr lang="en-US" smtClean="0"/>
-              <a:t>August 16, 2019</a:t>
+              <a:t>August 19, 2019</a:t>
             </a:fld>
             <a:endParaRPr lang="en-US" dirty="0"/>
           </a:p>
@@ -13803,7 +13996,7 @@
           <a:p>
             <a:r>
               <a:rPr lang="en-US" dirty="0"/>
-              <a:t>FOR LOOPS</a:t>
+              <a:t>IF STATEMENTS</a:t>
             </a:r>
           </a:p>
         </p:txBody>
@@ -13831,13 +14024,7 @@
           <a:p>
             <a:r>
               <a:rPr lang="en-US" dirty="0"/>
-              <a:t>Good for ranges of values (i.e. a-z, 0-9)</a:t>
-            </a:r>
-          </a:p>
-          <a:p>
-            <a:r>
-              <a:rPr lang="en-US" dirty="0"/>
-              <a:t>Or, for lists of values (“cat”, “dog”, “frog”)</a:t>
+              <a:t>Conditionals:</a:t>
             </a:r>
           </a:p>
           <a:p>
@@ -13868,7 +14055,7 @@
           <a:p>
             <a:fld id="{8AAE40A0-A7D8-4DC3-BC9E-BADA32DA2004}" type="datetime4">
               <a:rPr lang="en-US" smtClean="0"/>
-              <a:t>August 16, 2019</a:t>
+              <a:t>August 19, 2019</a:t>
             </a:fld>
             <a:endParaRPr lang="en-US" dirty="0"/>
           </a:p>
@@ -13963,7 +14150,7 @@
     </p:spTree>
     <p:extLst>
       <p:ext uri="{BB962C8B-B14F-4D97-AF65-F5344CB8AC3E}">
-        <p14:creationId xmlns:p14="http://schemas.microsoft.com/office/powerpoint/2010/main" val="3700336351"/>
+        <p14:creationId xmlns:p14="http://schemas.microsoft.com/office/powerpoint/2010/main" val="3349014258"/>
       </p:ext>
     </p:extLst>
   </p:cSld>
@@ -14013,7 +14200,7 @@
           <a:p>
             <a:r>
               <a:rPr lang="en-US" dirty="0"/>
-              <a:t>WHILE LOOPS</a:t>
+              <a:t>FOR LOOPS</a:t>
             </a:r>
           </a:p>
         </p:txBody>
@@ -14041,7 +14228,13 @@
           <a:p>
             <a:r>
               <a:rPr lang="en-US" dirty="0"/>
-              <a:t>Do something over and over, as long as the condition is still true</a:t>
+              <a:t>Good for ranges of values (i.e. a-z, 0-9)</a:t>
+            </a:r>
+          </a:p>
+          <a:p>
+            <a:r>
+              <a:rPr lang="en-US" dirty="0"/>
+              <a:t>Or, for lists of values (“cat”, “dog”, “frog”)</a:t>
             </a:r>
           </a:p>
           <a:p>
@@ -14072,7 +14265,7 @@
           <a:p>
             <a:fld id="{8AAE40A0-A7D8-4DC3-BC9E-BADA32DA2004}" type="datetime4">
               <a:rPr lang="en-US" smtClean="0"/>
-              <a:t>August 16, 2019</a:t>
+              <a:t>August 19, 2019</a:t>
             </a:fld>
             <a:endParaRPr lang="en-US" dirty="0"/>
           </a:p>
@@ -14167,7 +14360,7 @@
     </p:spTree>
     <p:extLst>
       <p:ext uri="{BB962C8B-B14F-4D97-AF65-F5344CB8AC3E}">
-        <p14:creationId xmlns:p14="http://schemas.microsoft.com/office/powerpoint/2010/main" val="1249293789"/>
+        <p14:creationId xmlns:p14="http://schemas.microsoft.com/office/powerpoint/2010/main" val="3700336351"/>
       </p:ext>
     </p:extLst>
   </p:cSld>
@@ -14217,7 +14410,7 @@
           <a:p>
             <a:r>
               <a:rPr lang="en-US" dirty="0"/>
-              <a:t>JOBS</a:t>
+              <a:t>WHILE LOOPS</a:t>
             </a:r>
           </a:p>
         </p:txBody>
@@ -14245,44 +14438,11 @@
           <a:p>
             <a:r>
               <a:rPr lang="en-US" dirty="0"/>
-              <a:t>Multiple processes can be running in the shell at the same time</a:t>
-            </a:r>
-          </a:p>
-          <a:p>
-            <a:r>
-              <a:rPr lang="en-US" dirty="0"/>
-              <a:t>Start a job in the background by ending the line with </a:t>
-            </a:r>
-            <a:r>
-              <a:rPr lang="en-US" sz="2400" dirty="0">
-                <a:latin typeface="Courier New" panose="02070309020205020404" pitchFamily="49" charset="0"/>
-                <a:cs typeface="Courier New" panose="02070309020205020404" pitchFamily="49" charset="0"/>
-              </a:rPr>
-              <a:t>&amp;</a:t>
-            </a:r>
-          </a:p>
-          <a:p>
-            <a:r>
-              <a:rPr lang="en-US" dirty="0"/>
-              <a:t>Switch it back to foreground with </a:t>
-            </a:r>
-            <a:r>
-              <a:rPr lang="en-US" sz="2400" dirty="0" err="1">
-                <a:latin typeface="Courier New" panose="02070309020205020404" pitchFamily="49" charset="0"/>
-                <a:cs typeface="Courier New" panose="02070309020205020404" pitchFamily="49" charset="0"/>
-              </a:rPr>
-              <a:t>fg</a:t>
-            </a:r>
-            <a:endParaRPr lang="en-US" sz="2400" dirty="0">
-              <a:latin typeface="Courier New" panose="02070309020205020404" pitchFamily="49" charset="0"/>
-              <a:cs typeface="Courier New" panose="02070309020205020404" pitchFamily="49" charset="0"/>
-            </a:endParaRPr>
-          </a:p>
-          <a:p>
-            <a:r>
-              <a:rPr lang="en-US" dirty="0"/>
-              <a:t>Great for long running processes – I use this with visual text editors all the time!</a:t>
-            </a:r>
+              <a:t>Do something over and over, as long as the condition is still true</a:t>
+            </a:r>
+          </a:p>
+          <a:p>
+            <a:endParaRPr lang="en-US" dirty="0"/>
           </a:p>
         </p:txBody>
       </p:sp>
@@ -14309,7 +14469,7 @@
           <a:p>
             <a:fld id="{8AAE40A0-A7D8-4DC3-BC9E-BADA32DA2004}" type="datetime4">
               <a:rPr lang="en-US" smtClean="0"/>
-              <a:t>August 16, 2019</a:t>
+              <a:t>August 19, 2019</a:t>
             </a:fld>
             <a:endParaRPr lang="en-US" dirty="0"/>
           </a:p>
@@ -14404,7 +14564,7 @@
     </p:spTree>
     <p:extLst>
       <p:ext uri="{BB962C8B-B14F-4D97-AF65-F5344CB8AC3E}">
-        <p14:creationId xmlns:p14="http://schemas.microsoft.com/office/powerpoint/2010/main" val="4077320852"/>
+        <p14:creationId xmlns:p14="http://schemas.microsoft.com/office/powerpoint/2010/main" val="1249293789"/>
       </p:ext>
     </p:extLst>
   </p:cSld>
@@ -14454,7 +14614,7 @@
           <a:p>
             <a:r>
               <a:rPr lang="en-US" dirty="0"/>
-              <a:t>ALIASES</a:t>
+              <a:t>JOBS</a:t>
             </a:r>
           </a:p>
         </p:txBody>
@@ -14482,77 +14642,44 @@
           <a:p>
             <a:r>
               <a:rPr lang="en-US" dirty="0"/>
-              <a:t>Handy shortcuts for long commands with lots of arguments</a:t>
-            </a:r>
-          </a:p>
-          <a:p>
-            <a:r>
-              <a:rPr lang="en-US" dirty="0"/>
-              <a:t>Don’t want to have to remember which options you need? Just make an alias!</a:t>
-            </a:r>
-          </a:p>
-          <a:p>
-            <a:pPr lvl="1"/>
-            <a:r>
-              <a:rPr lang="en-US" dirty="0"/>
-              <a:t>Example: </a:t>
-            </a:r>
-            <a:r>
-              <a:rPr lang="en-US" dirty="0">
+              <a:t>Multiple processes can be running in the shell at the same time</a:t>
+            </a:r>
+          </a:p>
+          <a:p>
+            <a:r>
+              <a:rPr lang="en-US" dirty="0"/>
+              <a:t>Start a job in the background by ending the line with </a:t>
+            </a:r>
+            <a:r>
+              <a:rPr lang="en-US" sz="2400" dirty="0">
                 <a:latin typeface="Courier New" panose="02070309020205020404" pitchFamily="49" charset="0"/>
                 <a:cs typeface="Courier New" panose="02070309020205020404" pitchFamily="49" charset="0"/>
               </a:rPr>
-              <a:t>alias </a:t>
-            </a:r>
-            <a:r>
-              <a:rPr lang="en-US" dirty="0" err="1">
+              <a:t>&amp;</a:t>
+            </a:r>
+          </a:p>
+          <a:p>
+            <a:r>
+              <a:rPr lang="en-US" dirty="0"/>
+              <a:t>Switch it back to foreground with </a:t>
+            </a:r>
+            <a:r>
+              <a:rPr lang="en-US" sz="2400" dirty="0" err="1">
                 <a:latin typeface="Courier New" panose="02070309020205020404" pitchFamily="49" charset="0"/>
                 <a:cs typeface="Courier New" panose="02070309020205020404" pitchFamily="49" charset="0"/>
               </a:rPr>
-              <a:t>tarx</a:t>
-            </a:r>
-            <a:r>
-              <a:rPr lang="en-US" dirty="0">
-                <a:latin typeface="Courier New" panose="02070309020205020404" pitchFamily="49" charset="0"/>
-                <a:cs typeface="Courier New" panose="02070309020205020404" pitchFamily="49" charset="0"/>
-              </a:rPr>
-              <a:t>=“tar -</a:t>
-            </a:r>
-            <a:r>
-              <a:rPr lang="en-US" dirty="0" err="1">
-                <a:latin typeface="Courier New" panose="02070309020205020404" pitchFamily="49" charset="0"/>
-                <a:cs typeface="Courier New" panose="02070309020205020404" pitchFamily="49" charset="0"/>
-              </a:rPr>
-              <a:t>xzf</a:t>
-            </a:r>
-            <a:r>
-              <a:rPr lang="en-US" dirty="0">
-                <a:latin typeface="Courier New" panose="02070309020205020404" pitchFamily="49" charset="0"/>
-                <a:cs typeface="Courier New" panose="02070309020205020404" pitchFamily="49" charset="0"/>
-              </a:rPr>
-              <a:t>” </a:t>
-            </a:r>
-            <a:r>
-              <a:rPr lang="en-US" dirty="0"/>
-              <a:t>for a general </a:t>
-            </a:r>
-            <a:r>
-              <a:rPr lang="en-US" dirty="0">
-                <a:latin typeface="Courier New" panose="02070309020205020404" pitchFamily="49" charset="0"/>
-                <a:cs typeface="Courier New" panose="02070309020205020404" pitchFamily="49" charset="0"/>
-              </a:rPr>
-              <a:t>tar</a:t>
-            </a:r>
-            <a:r>
-              <a:rPr lang="en-US" dirty="0"/>
-              <a:t> extractor without having to remember which options you need</a:t>
-            </a:r>
-          </a:p>
-          <a:p>
-            <a:endParaRPr lang="en-US" dirty="0"/>
-          </a:p>
-          <a:p>
-            <a:endParaRPr lang="en-US" dirty="0"/>
+              <a:t>fg</a:t>
+            </a:r>
+            <a:endParaRPr lang="en-US" sz="2400" dirty="0">
+              <a:latin typeface="Courier New" panose="02070309020205020404" pitchFamily="49" charset="0"/>
+              <a:cs typeface="Courier New" panose="02070309020205020404" pitchFamily="49" charset="0"/>
+            </a:endParaRPr>
+          </a:p>
+          <a:p>
+            <a:r>
+              <a:rPr lang="en-US" dirty="0"/>
+              <a:t>Great for long running processes – I use this with visual text editors all the time!</a:t>
+            </a:r>
           </a:p>
         </p:txBody>
       </p:sp>
@@ -14579,7 +14706,7 @@
           <a:p>
             <a:fld id="{8AAE40A0-A7D8-4DC3-BC9E-BADA32DA2004}" type="datetime4">
               <a:rPr lang="en-US" smtClean="0"/>
-              <a:t>August 16, 2019</a:t>
+              <a:t>August 19, 2019</a:t>
             </a:fld>
             <a:endParaRPr lang="en-US" dirty="0"/>
           </a:p>
@@ -14674,7 +14801,7 @@
     </p:spTree>
     <p:extLst>
       <p:ext uri="{BB962C8B-B14F-4D97-AF65-F5344CB8AC3E}">
-        <p14:creationId xmlns:p14="http://schemas.microsoft.com/office/powerpoint/2010/main" val="3102884327"/>
+        <p14:creationId xmlns:p14="http://schemas.microsoft.com/office/powerpoint/2010/main" val="4077320852"/>
       </p:ext>
     </p:extLst>
   </p:cSld>
@@ -14706,7 +14833,7 @@
           <p:cNvPr id="2" name="Title 1">
             <a:extLst>
               <a:ext uri="{FF2B5EF4-FFF2-40B4-BE49-F238E27FC236}">
-                <a16:creationId xmlns:a16="http://schemas.microsoft.com/office/drawing/2014/main" id="{98EB4F1B-51B3-4B64-8210-21AE8BE64582}"/>
+                <a16:creationId xmlns:a16="http://schemas.microsoft.com/office/drawing/2014/main" id="{763619FC-2C00-4A86-9CDA-1BF3459DAC50}"/>
               </a:ext>
             </a:extLst>
           </p:cNvPr>
@@ -14724,17 +14851,17 @@
           <a:p>
             <a:r>
               <a:rPr lang="en-US" dirty="0"/>
-              <a:t>BASH FUNCTIONS</a:t>
-            </a:r>
-          </a:p>
-        </p:txBody>
-      </p:sp>
-      <p:sp>
-        <p:nvSpPr>
-          <p:cNvPr id="3" name="Content Placeholder 2">
-            <a:extLst>
-              <a:ext uri="{FF2B5EF4-FFF2-40B4-BE49-F238E27FC236}">
-                <a16:creationId xmlns:a16="http://schemas.microsoft.com/office/drawing/2014/main" id="{593AD591-5DD9-410C-B27F-EACDDF765FF4}"/>
+              <a:t>ALIASES</a:t>
+            </a:r>
+          </a:p>
+        </p:txBody>
+      </p:sp>
+      <p:sp>
+        <p:nvSpPr>
+          <p:cNvPr id="3" name="Text Placeholder 2">
+            <a:extLst>
+              <a:ext uri="{FF2B5EF4-FFF2-40B4-BE49-F238E27FC236}">
+                <a16:creationId xmlns:a16="http://schemas.microsoft.com/office/drawing/2014/main" id="{14188AF0-954F-45E0-97B5-73D18A416CC7}"/>
               </a:ext>
             </a:extLst>
           </p:cNvPr>
@@ -14752,118 +14879,77 @@
           <a:p>
             <a:r>
               <a:rPr lang="en-US" dirty="0"/>
-              <a:t>Great for writing quick, reusable programs that don’t quite fit into </a:t>
+              <a:t>Handy shortcuts for long commands with lots of arguments</a:t>
+            </a:r>
+          </a:p>
+          <a:p>
+            <a:r>
+              <a:rPr lang="en-US" dirty="0"/>
+              <a:t>Don’t want to have to remember which options you need? Just make an alias!</a:t>
+            </a:r>
+          </a:p>
+          <a:p>
+            <a:pPr lvl="1"/>
+            <a:r>
+              <a:rPr lang="en-US" dirty="0"/>
+              <a:t>Example: </a:t>
             </a:r>
             <a:r>
               <a:rPr lang="en-US" dirty="0">
                 <a:latin typeface="Courier New" panose="02070309020205020404" pitchFamily="49" charset="0"/>
                 <a:cs typeface="Courier New" panose="02070309020205020404" pitchFamily="49" charset="0"/>
               </a:rPr>
-              <a:t>alias</a:t>
-            </a:r>
-            <a:r>
-              <a:rPr lang="en-US" dirty="0"/>
-              <a:t> form</a:t>
-            </a:r>
-          </a:p>
-          <a:p>
-            <a:r>
-              <a:rPr lang="en-US" dirty="0"/>
-              <a:t>Get arguments with </a:t>
+              <a:t>alias </a:t>
+            </a:r>
+            <a:r>
+              <a:rPr lang="en-US" dirty="0" err="1">
+                <a:latin typeface="Courier New" panose="02070309020205020404" pitchFamily="49" charset="0"/>
+                <a:cs typeface="Courier New" panose="02070309020205020404" pitchFamily="49" charset="0"/>
+              </a:rPr>
+              <a:t>tarx</a:t>
             </a:r>
             <a:r>
               <a:rPr lang="en-US" dirty="0">
                 <a:latin typeface="Courier New" panose="02070309020205020404" pitchFamily="49" charset="0"/>
                 <a:cs typeface="Courier New" panose="02070309020205020404" pitchFamily="49" charset="0"/>
               </a:rPr>
-              <a:t>$1</a:t>
-            </a:r>
-            <a:r>
-              <a:rPr lang="en-US" dirty="0">
+              <a:t>=“tar -</a:t>
+            </a:r>
+            <a:r>
+              <a:rPr lang="en-US" dirty="0" err="1">
+                <a:latin typeface="Courier New" panose="02070309020205020404" pitchFamily="49" charset="0"/>
                 <a:cs typeface="Courier New" panose="02070309020205020404" pitchFamily="49" charset="0"/>
               </a:rPr>
-              <a:t>, </a:t>
+              <a:t>xzf</a:t>
             </a:r>
             <a:r>
               <a:rPr lang="en-US" dirty="0">
                 <a:latin typeface="Courier New" panose="02070309020205020404" pitchFamily="49" charset="0"/>
                 <a:cs typeface="Courier New" panose="02070309020205020404" pitchFamily="49" charset="0"/>
               </a:rPr>
-              <a:t>$2</a:t>
-            </a:r>
-            <a:r>
-              <a:rPr lang="en-US" dirty="0">
-                <a:cs typeface="Courier New" panose="02070309020205020404" pitchFamily="49" charset="0"/>
-              </a:rPr>
-              <a:t>, </a:t>
-            </a:r>
-            <a:r>
-              <a:rPr lang="en-US" dirty="0" err="1">
-                <a:cs typeface="Courier New" panose="02070309020205020404" pitchFamily="49" charset="0"/>
-              </a:rPr>
-              <a:t>etc</a:t>
-            </a:r>
-            <a:endParaRPr lang="en-US" dirty="0">
-              <a:cs typeface="Courier New" panose="02070309020205020404" pitchFamily="49" charset="0"/>
-            </a:endParaRPr>
-          </a:p>
-          <a:p>
-            <a:r>
-              <a:rPr lang="en-US" dirty="0">
-                <a:cs typeface="Courier New" panose="02070309020205020404" pitchFamily="49" charset="0"/>
-              </a:rPr>
-              <a:t>Combine </a:t>
+              <a:t>” </a:t>
+            </a:r>
+            <a:r>
+              <a:rPr lang="en-US" dirty="0"/>
+              <a:t>for a general </a:t>
             </a:r>
             <a:r>
               <a:rPr lang="en-US" dirty="0">
                 <a:latin typeface="Courier New" panose="02070309020205020404" pitchFamily="49" charset="0"/>
                 <a:cs typeface="Courier New" panose="02070309020205020404" pitchFamily="49" charset="0"/>
               </a:rPr>
-              <a:t>cd</a:t>
-            </a:r>
-            <a:r>
-              <a:rPr lang="en-US" dirty="0">
-                <a:cs typeface="Courier New" panose="02070309020205020404" pitchFamily="49" charset="0"/>
-              </a:rPr>
-              <a:t> and </a:t>
-            </a:r>
-            <a:r>
-              <a:rPr lang="en-US" dirty="0">
-                <a:latin typeface="Courier New" panose="02070309020205020404" pitchFamily="49" charset="0"/>
-                <a:cs typeface="Courier New" panose="02070309020205020404" pitchFamily="49" charset="0"/>
-              </a:rPr>
-              <a:t>ls</a:t>
-            </a:r>
-          </a:p>
-          <a:p>
-            <a:pPr lvl="1"/>
-            <a:r>
-              <a:rPr lang="en-US" dirty="0">
-                <a:cs typeface="Courier New" panose="02070309020205020404" pitchFamily="49" charset="0"/>
-              </a:rPr>
-              <a:t>can’t quite do this with an alias, since you need to pass an argument and not just do a simple replacement</a:t>
-            </a:r>
-          </a:p>
-          <a:p>
-            <a:pPr lvl="1"/>
-            <a:r>
-              <a:rPr lang="en-US" dirty="0">
-                <a:latin typeface="Courier New" panose="02070309020205020404" pitchFamily="49" charset="0"/>
-                <a:cs typeface="Courier New" panose="02070309020205020404" pitchFamily="49" charset="0"/>
-              </a:rPr>
-              <a:t>cs() { cd $1; ls}</a:t>
-            </a:r>
-          </a:p>
-          <a:p>
-            <a:pPr lvl="1"/>
-            <a:endParaRPr lang="en-US" dirty="0">
-              <a:cs typeface="Courier New" panose="02070309020205020404" pitchFamily="49" charset="0"/>
-            </a:endParaRPr>
-          </a:p>
-          <a:p>
-            <a:endParaRPr lang="en-US" dirty="0">
-              <a:cs typeface="Courier New" panose="02070309020205020404" pitchFamily="49" charset="0"/>
-            </a:endParaRPr>
+              <a:t>tar</a:t>
+            </a:r>
+            <a:r>
+              <a:rPr lang="en-US" dirty="0"/>
+              <a:t> extractor without having to remember which options you need</a:t>
+            </a:r>
+          </a:p>
+          <a:p>
+            <a:endParaRPr lang="en-US" dirty="0"/>
+          </a:p>
+          <a:p>
+            <a:endParaRPr lang="en-US" dirty="0"/>
           </a:p>
         </p:txBody>
       </p:sp>
@@ -14872,7 +14958,7 @@
           <p:cNvPr id="4" name="Date Placeholder 3">
             <a:extLst>
               <a:ext uri="{FF2B5EF4-FFF2-40B4-BE49-F238E27FC236}">
-                <a16:creationId xmlns:a16="http://schemas.microsoft.com/office/drawing/2014/main" id="{17E05AC0-8A63-4FDD-A727-54A8C6040A83}"/>
+                <a16:creationId xmlns:a16="http://schemas.microsoft.com/office/drawing/2014/main" id="{6D5133BD-4847-4D49-B5BF-4CC178F8FDB8}"/>
               </a:ext>
             </a:extLst>
           </p:cNvPr>
@@ -14890,7 +14976,7 @@
           <a:p>
             <a:fld id="{8AAE40A0-A7D8-4DC3-BC9E-BADA32DA2004}" type="datetime4">
               <a:rPr lang="en-US" smtClean="0"/>
-              <a:t>August 16, 2019</a:t>
+              <a:t>August 19, 2019</a:t>
             </a:fld>
             <a:endParaRPr lang="en-US" dirty="0"/>
           </a:p>
@@ -14901,7 +14987,7 @@
           <p:cNvPr id="5" name="Footer Placeholder 4">
             <a:extLst>
               <a:ext uri="{FF2B5EF4-FFF2-40B4-BE49-F238E27FC236}">
-                <a16:creationId xmlns:a16="http://schemas.microsoft.com/office/drawing/2014/main" id="{9C0CA735-E60F-4094-86F7-D33BB272FA25}"/>
+                <a16:creationId xmlns:a16="http://schemas.microsoft.com/office/drawing/2014/main" id="{5963B75A-EC19-4470-9F8C-1E2C1FB85999}"/>
               </a:ext>
             </a:extLst>
           </p:cNvPr>
@@ -14958,7 +15044,7 @@
           <p:cNvPr id="6" name="Slide Number Placeholder 5">
             <a:extLst>
               <a:ext uri="{FF2B5EF4-FFF2-40B4-BE49-F238E27FC236}">
-                <a16:creationId xmlns:a16="http://schemas.microsoft.com/office/drawing/2014/main" id="{33AAFB92-45C0-421A-AC0A-7A439518D3F4}"/>
+                <a16:creationId xmlns:a16="http://schemas.microsoft.com/office/drawing/2014/main" id="{BDAB3897-F226-4B28-B7E1-52A0CDB34A2C}"/>
               </a:ext>
             </a:extLst>
           </p:cNvPr>
@@ -14985,7 +15071,7 @@
     </p:spTree>
     <p:extLst>
       <p:ext uri="{BB962C8B-B14F-4D97-AF65-F5344CB8AC3E}">
-        <p14:creationId xmlns:p14="http://schemas.microsoft.com/office/powerpoint/2010/main" val="3721287351"/>
+        <p14:creationId xmlns:p14="http://schemas.microsoft.com/office/powerpoint/2010/main" val="3102884327"/>
       </p:ext>
     </p:extLst>
   </p:cSld>
@@ -15035,7 +15121,7 @@
           <a:p>
             <a:r>
               <a:rPr lang="en-US" dirty="0"/>
-              <a:t>CONDITONALLY RUN PROGRAMS</a:t>
+              <a:t>BASH FUNCTIONS</a:t>
             </a:r>
           </a:p>
         </p:txBody>
@@ -15061,57 +15147,108 @@
           <a:bodyPr/>
           <a:lstStyle/>
           <a:p>
+            <a:r>
+              <a:rPr lang="en-US" dirty="0"/>
+              <a:t>Great for writing quick, reusable programs that don’t quite fit into </a:t>
+            </a:r>
             <a:r>
               <a:rPr lang="en-US" dirty="0">
                 <a:latin typeface="Courier New" panose="02070309020205020404" pitchFamily="49" charset="0"/>
                 <a:cs typeface="Courier New" panose="02070309020205020404" pitchFamily="49" charset="0"/>
               </a:rPr>
-              <a:t>program1 &amp;&amp; program2</a:t>
-            </a:r>
-          </a:p>
-          <a:p>
-            <a:pPr lvl="1"/>
-            <a:r>
-              <a:rPr lang="en-US" dirty="0">
-                <a:cs typeface="Courier New" panose="02070309020205020404" pitchFamily="49" charset="0"/>
-              </a:rPr>
-              <a:t>Only run program2 if program1 is successful</a:t>
-            </a:r>
-          </a:p>
-          <a:p>
-            <a:pPr lvl="1"/>
-            <a:r>
-              <a:rPr lang="en-US" dirty="0">
-                <a:cs typeface="Courier New" panose="02070309020205020404" pitchFamily="49" charset="0"/>
-              </a:rPr>
-              <a:t>Good if you have dependencies between commands</a:t>
-            </a:r>
-          </a:p>
-          <a:p>
+              <a:t>alias</a:t>
+            </a:r>
+            <a:r>
+              <a:rPr lang="en-US" dirty="0"/>
+              <a:t> form</a:t>
+            </a:r>
+          </a:p>
+          <a:p>
+            <a:r>
+              <a:rPr lang="en-US" dirty="0"/>
+              <a:t>Get arguments with </a:t>
+            </a:r>
             <a:r>
               <a:rPr lang="en-US" dirty="0">
                 <a:latin typeface="Courier New" panose="02070309020205020404" pitchFamily="49" charset="0"/>
                 <a:cs typeface="Courier New" panose="02070309020205020404" pitchFamily="49" charset="0"/>
               </a:rPr>
-              <a:t>program1 || program2</a:t>
-            </a:r>
-          </a:p>
-          <a:p>
-            <a:pPr lvl="1"/>
+              <a:t>$1</a:t>
+            </a:r>
             <a:r>
               <a:rPr lang="en-US" dirty="0">
                 <a:cs typeface="Courier New" panose="02070309020205020404" pitchFamily="49" charset="0"/>
               </a:rPr>
-              <a:t>Only run program2 if program1 fails</a:t>
-            </a:r>
-          </a:p>
-          <a:p>
-            <a:pPr lvl="1"/>
+              <a:t>, </a:t>
+            </a:r>
+            <a:r>
+              <a:rPr lang="en-US" dirty="0">
+                <a:latin typeface="Courier New" panose="02070309020205020404" pitchFamily="49" charset="0"/>
+                <a:cs typeface="Courier New" panose="02070309020205020404" pitchFamily="49" charset="0"/>
+              </a:rPr>
+              <a:t>$2</a:t>
+            </a:r>
             <a:r>
               <a:rPr lang="en-US" dirty="0">
                 <a:cs typeface="Courier New" panose="02070309020205020404" pitchFamily="49" charset="0"/>
               </a:rPr>
-              <a:t>Good if you want to try to fix it</a:t>
+              <a:t>, </a:t>
+            </a:r>
+            <a:r>
+              <a:rPr lang="en-US" dirty="0" err="1">
+                <a:cs typeface="Courier New" panose="02070309020205020404" pitchFamily="49" charset="0"/>
+              </a:rPr>
+              <a:t>etc</a:t>
+            </a:r>
+            <a:endParaRPr lang="en-US" dirty="0">
+              <a:cs typeface="Courier New" panose="02070309020205020404" pitchFamily="49" charset="0"/>
+            </a:endParaRPr>
+          </a:p>
+          <a:p>
+            <a:r>
+              <a:rPr lang="en-US" dirty="0">
+                <a:cs typeface="Courier New" panose="02070309020205020404" pitchFamily="49" charset="0"/>
+              </a:rPr>
+              <a:t>Combine </a:t>
+            </a:r>
+            <a:r>
+              <a:rPr lang="en-US" dirty="0">
+                <a:latin typeface="Courier New" panose="02070309020205020404" pitchFamily="49" charset="0"/>
+                <a:cs typeface="Courier New" panose="02070309020205020404" pitchFamily="49" charset="0"/>
+              </a:rPr>
+              <a:t>cd</a:t>
+            </a:r>
+            <a:r>
+              <a:rPr lang="en-US" dirty="0">
+                <a:cs typeface="Courier New" panose="02070309020205020404" pitchFamily="49" charset="0"/>
+              </a:rPr>
+              <a:t> and </a:t>
+            </a:r>
+            <a:r>
+              <a:rPr lang="en-US" dirty="0">
+                <a:latin typeface="Courier New" panose="02070309020205020404" pitchFamily="49" charset="0"/>
+                <a:cs typeface="Courier New" panose="02070309020205020404" pitchFamily="49" charset="0"/>
+              </a:rPr>
+              <a:t>ls</a:t>
+            </a:r>
+          </a:p>
+          <a:p>
+            <a:pPr lvl="1"/>
+            <a:r>
+              <a:rPr lang="en-US" dirty="0">
+                <a:cs typeface="Courier New" panose="02070309020205020404" pitchFamily="49" charset="0"/>
+              </a:rPr>
+              <a:t>can’t quite do this with an alias, since you need to pass an argument and not just do a simple replacement</a:t>
+            </a:r>
+          </a:p>
+          <a:p>
+            <a:pPr lvl="1"/>
+            <a:r>
+              <a:rPr lang="en-US" dirty="0">
+                <a:latin typeface="Courier New" panose="02070309020205020404" pitchFamily="49" charset="0"/>
+                <a:cs typeface="Courier New" panose="02070309020205020404" pitchFamily="49" charset="0"/>
+              </a:rPr>
+              <a:t>cs() { cd $1; ls}</a:t>
             </a:r>
           </a:p>
           <a:p>
@@ -15150,7 +15287,7 @@
           <a:p>
             <a:fld id="{8AAE40A0-A7D8-4DC3-BC9E-BADA32DA2004}" type="datetime4">
               <a:rPr lang="en-US" smtClean="0"/>
-              <a:t>August 16, 2019</a:t>
+              <a:t>August 19, 2019</a:t>
             </a:fld>
             <a:endParaRPr lang="en-US" dirty="0"/>
           </a:p>
@@ -15245,7 +15382,7 @@
     </p:spTree>
     <p:extLst>
       <p:ext uri="{BB962C8B-B14F-4D97-AF65-F5344CB8AC3E}">
-        <p14:creationId xmlns:p14="http://schemas.microsoft.com/office/powerpoint/2010/main" val="604735545"/>
+        <p14:creationId xmlns:p14="http://schemas.microsoft.com/office/powerpoint/2010/main" val="3721287351"/>
       </p:ext>
     </p:extLst>
   </p:cSld>
@@ -15277,7 +15414,7 @@
           <p:cNvPr id="2" name="Title 1">
             <a:extLst>
               <a:ext uri="{FF2B5EF4-FFF2-40B4-BE49-F238E27FC236}">
-                <a16:creationId xmlns:a16="http://schemas.microsoft.com/office/drawing/2014/main" id="{763619FC-2C00-4A86-9CDA-1BF3459DAC50}"/>
+                <a16:creationId xmlns:a16="http://schemas.microsoft.com/office/drawing/2014/main" id="{98EB4F1B-51B3-4B64-8210-21AE8BE64582}"/>
               </a:ext>
             </a:extLst>
           </p:cNvPr>
@@ -15295,17 +15432,17 @@
           <a:p>
             <a:r>
               <a:rPr lang="en-US" dirty="0"/>
-              <a:t>INTERACTIVE INPUT</a:t>
-            </a:r>
-          </a:p>
-        </p:txBody>
-      </p:sp>
-      <p:sp>
-        <p:nvSpPr>
-          <p:cNvPr id="3" name="Text Placeholder 2">
-            <a:extLst>
-              <a:ext uri="{FF2B5EF4-FFF2-40B4-BE49-F238E27FC236}">
-                <a16:creationId xmlns:a16="http://schemas.microsoft.com/office/drawing/2014/main" id="{14188AF0-954F-45E0-97B5-73D18A416CC7}"/>
+              <a:t>CONDITONALLY RUN PROGRAMS</a:t>
+            </a:r>
+          </a:p>
+        </p:txBody>
+      </p:sp>
+      <p:sp>
+        <p:nvSpPr>
+          <p:cNvPr id="3" name="Content Placeholder 2">
+            <a:extLst>
+              <a:ext uri="{FF2B5EF4-FFF2-40B4-BE49-F238E27FC236}">
+                <a16:creationId xmlns:a16="http://schemas.microsoft.com/office/drawing/2014/main" id="{593AD591-5DD9-410C-B27F-EACDDF765FF4}"/>
               </a:ext>
             </a:extLst>
           </p:cNvPr>
@@ -15322,12 +15459,68 @@
           <a:lstStyle/>
           <a:p>
             <a:r>
-              <a:rPr lang="en-US" dirty="0"/>
-              <a:t>Makes things harder to combine, but certainly still has its uses!</a:t>
-            </a:r>
-          </a:p>
-          <a:p>
-            <a:endParaRPr lang="en-US" dirty="0"/>
+              <a:rPr lang="en-US" dirty="0">
+                <a:latin typeface="Courier New" panose="02070309020205020404" pitchFamily="49" charset="0"/>
+                <a:cs typeface="Courier New" panose="02070309020205020404" pitchFamily="49" charset="0"/>
+              </a:rPr>
+              <a:t>program1 &amp;&amp; program2</a:t>
+            </a:r>
+          </a:p>
+          <a:p>
+            <a:pPr lvl="1"/>
+            <a:r>
+              <a:rPr lang="en-US" dirty="0">
+                <a:cs typeface="Courier New" panose="02070309020205020404" pitchFamily="49" charset="0"/>
+              </a:rPr>
+              <a:t>Only run program2 if program1 is successful</a:t>
+            </a:r>
+          </a:p>
+          <a:p>
+            <a:pPr lvl="1"/>
+            <a:r>
+              <a:rPr lang="en-US" dirty="0">
+                <a:cs typeface="Courier New" panose="02070309020205020404" pitchFamily="49" charset="0"/>
+              </a:rPr>
+              <a:t>Good if you have dependencies between commands</a:t>
+            </a:r>
+          </a:p>
+          <a:p>
+            <a:r>
+              <a:rPr lang="en-US" dirty="0">
+                <a:latin typeface="Courier New" panose="02070309020205020404" pitchFamily="49" charset="0"/>
+                <a:cs typeface="Courier New" panose="02070309020205020404" pitchFamily="49" charset="0"/>
+              </a:rPr>
+              <a:t>program1 || program2</a:t>
+            </a:r>
+          </a:p>
+          <a:p>
+            <a:pPr lvl="1"/>
+            <a:r>
+              <a:rPr lang="en-US" dirty="0">
+                <a:cs typeface="Courier New" panose="02070309020205020404" pitchFamily="49" charset="0"/>
+              </a:rPr>
+              <a:t>Only run program2 if program1 fails</a:t>
+            </a:r>
+          </a:p>
+          <a:p>
+            <a:pPr lvl="1"/>
+            <a:r>
+              <a:rPr lang="en-US" dirty="0">
+                <a:cs typeface="Courier New" panose="02070309020205020404" pitchFamily="49" charset="0"/>
+              </a:rPr>
+              <a:t>Good if you want to try to fix it</a:t>
+            </a:r>
+          </a:p>
+          <a:p>
+            <a:pPr lvl="1"/>
+            <a:endParaRPr lang="en-US" dirty="0">
+              <a:cs typeface="Courier New" panose="02070309020205020404" pitchFamily="49" charset="0"/>
+            </a:endParaRPr>
+          </a:p>
+          <a:p>
+            <a:endParaRPr lang="en-US" dirty="0">
+              <a:cs typeface="Courier New" panose="02070309020205020404" pitchFamily="49" charset="0"/>
+            </a:endParaRPr>
           </a:p>
         </p:txBody>
       </p:sp>
@@ -15336,7 +15529,7 @@
           <p:cNvPr id="4" name="Date Placeholder 3">
             <a:extLst>
               <a:ext uri="{FF2B5EF4-FFF2-40B4-BE49-F238E27FC236}">
-                <a16:creationId xmlns:a16="http://schemas.microsoft.com/office/drawing/2014/main" id="{6D5133BD-4847-4D49-B5BF-4CC178F8FDB8}"/>
+                <a16:creationId xmlns:a16="http://schemas.microsoft.com/office/drawing/2014/main" id="{17E05AC0-8A63-4FDD-A727-54A8C6040A83}"/>
               </a:ext>
             </a:extLst>
           </p:cNvPr>
@@ -15354,7 +15547,7 @@
           <a:p>
             <a:fld id="{8AAE40A0-A7D8-4DC3-BC9E-BADA32DA2004}" type="datetime4">
               <a:rPr lang="en-US" smtClean="0"/>
-              <a:t>August 16, 2019</a:t>
+              <a:t>August 19, 2019</a:t>
             </a:fld>
             <a:endParaRPr lang="en-US" dirty="0"/>
           </a:p>
@@ -15365,7 +15558,7 @@
           <p:cNvPr id="5" name="Footer Placeholder 4">
             <a:extLst>
               <a:ext uri="{FF2B5EF4-FFF2-40B4-BE49-F238E27FC236}">
-                <a16:creationId xmlns:a16="http://schemas.microsoft.com/office/drawing/2014/main" id="{5963B75A-EC19-4470-9F8C-1E2C1FB85999}"/>
+                <a16:creationId xmlns:a16="http://schemas.microsoft.com/office/drawing/2014/main" id="{9C0CA735-E60F-4094-86F7-D33BB272FA25}"/>
               </a:ext>
             </a:extLst>
           </p:cNvPr>
@@ -15422,7 +15615,7 @@
           <p:cNvPr id="6" name="Slide Number Placeholder 5">
             <a:extLst>
               <a:ext uri="{FF2B5EF4-FFF2-40B4-BE49-F238E27FC236}">
-                <a16:creationId xmlns:a16="http://schemas.microsoft.com/office/drawing/2014/main" id="{BDAB3897-F226-4B28-B7E1-52A0CDB34A2C}"/>
+                <a16:creationId xmlns:a16="http://schemas.microsoft.com/office/drawing/2014/main" id="{33AAFB92-45C0-421A-AC0A-7A439518D3F4}"/>
               </a:ext>
             </a:extLst>
           </p:cNvPr>
@@ -15449,7 +15642,7 @@
     </p:spTree>
     <p:extLst>
       <p:ext uri="{BB962C8B-B14F-4D97-AF65-F5344CB8AC3E}">
-        <p14:creationId xmlns:p14="http://schemas.microsoft.com/office/powerpoint/2010/main" val="4212509257"/>
+        <p14:creationId xmlns:p14="http://schemas.microsoft.com/office/powerpoint/2010/main" val="604735545"/>
       </p:ext>
     </p:extLst>
   </p:cSld>
@@ -15478,10 +15671,10 @@
       </p:grpSpPr>
       <p:sp>
         <p:nvSpPr>
-          <p:cNvPr id="7" name="Title 6">
-            <a:extLst>
-              <a:ext uri="{FF2B5EF4-FFF2-40B4-BE49-F238E27FC236}">
-                <a16:creationId xmlns:a16="http://schemas.microsoft.com/office/drawing/2014/main" id="{495B4BC0-844B-4414-A623-BEF78AAC1BA1}"/>
+          <p:cNvPr id="2" name="Title 1">
+            <a:extLst>
+              <a:ext uri="{FF2B5EF4-FFF2-40B4-BE49-F238E27FC236}">
+                <a16:creationId xmlns:a16="http://schemas.microsoft.com/office/drawing/2014/main" id="{763619FC-2C00-4A86-9CDA-1BF3459DAC50}"/>
               </a:ext>
             </a:extLst>
           </p:cNvPr>
@@ -15499,17 +15692,17 @@
           <a:p>
             <a:r>
               <a:rPr lang="en-US" dirty="0"/>
-              <a:t>ACKNOWLEDGMENTS</a:t>
-            </a:r>
-          </a:p>
-        </p:txBody>
-      </p:sp>
-      <p:sp>
-        <p:nvSpPr>
-          <p:cNvPr id="8" name="Content Placeholder 7">
-            <a:extLst>
-              <a:ext uri="{FF2B5EF4-FFF2-40B4-BE49-F238E27FC236}">
-                <a16:creationId xmlns:a16="http://schemas.microsoft.com/office/drawing/2014/main" id="{2BED3EB3-7E98-4A82-8335-7321D9E37B16}"/>
+              <a:t>INTERACTIVE INPUT</a:t>
+            </a:r>
+          </a:p>
+        </p:txBody>
+      </p:sp>
+      <p:sp>
+        <p:nvSpPr>
+          <p:cNvPr id="3" name="Text Placeholder 2">
+            <a:extLst>
+              <a:ext uri="{FF2B5EF4-FFF2-40B4-BE49-F238E27FC236}">
+                <a16:creationId xmlns:a16="http://schemas.microsoft.com/office/drawing/2014/main" id="{14188AF0-954F-45E0-97B5-73D18A416CC7}"/>
               </a:ext>
             </a:extLst>
           </p:cNvPr>
@@ -15527,40 +15720,10 @@
           <a:p>
             <a:r>
               <a:rPr lang="en-US" dirty="0"/>
-              <a:t>The Bash Logo is licensed for free use under the Copyleft license.</a:t>
-            </a:r>
-          </a:p>
-          <a:p>
-            <a:r>
-              <a:rPr lang="en-US" dirty="0"/>
-              <a:t>The bash screenshot on Slide 2 is R and Bash running under a </a:t>
-            </a:r>
-            <a:r>
-              <a:rPr lang="en-US" dirty="0" err="1"/>
-              <a:t>Remmina</a:t>
-            </a:r>
-            <a:r>
-              <a:rPr lang="en-US" dirty="0"/>
-              <a:t> connection.</a:t>
-            </a:r>
-          </a:p>
-          <a:p>
-            <a:r>
-              <a:rPr lang="en-US" dirty="0"/>
-              <a:t>The picture on Slide 6 is licensed under Creative Commons Attribution-</a:t>
-            </a:r>
-            <a:r>
-              <a:rPr lang="en-US" dirty="0" err="1"/>
-              <a:t>ShareAlike</a:t>
-            </a:r>
-            <a:r>
-              <a:rPr lang="en-US" dirty="0"/>
-              <a:t> 4.0 International, created by </a:t>
-            </a:r>
-            <a:r>
-              <a:rPr lang="en-US" dirty="0" err="1"/>
-              <a:t>Gorthmog</a:t>
-            </a:r>
+              <a:t>Makes things harder to combine, but certainly still has its uses!</a:t>
+            </a:r>
+          </a:p>
+          <a:p>
             <a:endParaRPr lang="en-US" dirty="0"/>
           </a:p>
         </p:txBody>
@@ -15570,7 +15733,7 @@
           <p:cNvPr id="4" name="Date Placeholder 3">
             <a:extLst>
               <a:ext uri="{FF2B5EF4-FFF2-40B4-BE49-F238E27FC236}">
-                <a16:creationId xmlns:a16="http://schemas.microsoft.com/office/drawing/2014/main" id="{540F37F1-4F33-429F-A568-1A3ADC499E54}"/>
+                <a16:creationId xmlns:a16="http://schemas.microsoft.com/office/drawing/2014/main" id="{6D5133BD-4847-4D49-B5BF-4CC178F8FDB8}"/>
               </a:ext>
             </a:extLst>
           </p:cNvPr>
@@ -15586,9 +15749,9 @@
           <a:bodyPr/>
           <a:lstStyle/>
           <a:p>
-            <a:fld id="{B08FEED8-D7D4-44E9-BFBC-ED06B5996D94}" type="datetime4">
+            <a:fld id="{8AAE40A0-A7D8-4DC3-BC9E-BADA32DA2004}" type="datetime4">
               <a:rPr lang="en-US" smtClean="0"/>
-              <a:t>August 16, 2019</a:t>
+              <a:t>August 19, 2019</a:t>
             </a:fld>
             <a:endParaRPr lang="en-US" dirty="0"/>
           </a:p>
@@ -15599,7 +15762,7 @@
           <p:cNvPr id="5" name="Footer Placeholder 4">
             <a:extLst>
               <a:ext uri="{FF2B5EF4-FFF2-40B4-BE49-F238E27FC236}">
-                <a16:creationId xmlns:a16="http://schemas.microsoft.com/office/drawing/2014/main" id="{673FFA57-C126-4795-A5F6-DD33AAC5ACBD}"/>
+                <a16:creationId xmlns:a16="http://schemas.microsoft.com/office/drawing/2014/main" id="{5963B75A-EC19-4470-9F8C-1E2C1FB85999}"/>
               </a:ext>
             </a:extLst>
           </p:cNvPr>
@@ -15656,7 +15819,7 @@
           <p:cNvPr id="6" name="Slide Number Placeholder 5">
             <a:extLst>
               <a:ext uri="{FF2B5EF4-FFF2-40B4-BE49-F238E27FC236}">
-                <a16:creationId xmlns:a16="http://schemas.microsoft.com/office/drawing/2014/main" id="{2FA49567-BB70-4798-8746-D0B522CCEE20}"/>
+                <a16:creationId xmlns:a16="http://schemas.microsoft.com/office/drawing/2014/main" id="{BDAB3897-F226-4B28-B7E1-52A0CDB34A2C}"/>
               </a:ext>
             </a:extLst>
           </p:cNvPr>
@@ -15675,6 +15838,240 @@
             <a:fld id="{D57F1E4F-1CFF-5643-939E-02111984F565}" type="slidenum">
               <a:rPr lang="en-US" smtClean="0"/>
               <a:t>47</a:t>
+            </a:fld>
+            <a:endParaRPr lang="en-US" dirty="0"/>
+          </a:p>
+        </p:txBody>
+      </p:sp>
+    </p:spTree>
+    <p:extLst>
+      <p:ext uri="{BB962C8B-B14F-4D97-AF65-F5344CB8AC3E}">
+        <p14:creationId xmlns:p14="http://schemas.microsoft.com/office/powerpoint/2010/main" val="4212509257"/>
+      </p:ext>
+    </p:extLst>
+  </p:cSld>
+  <p:clrMapOvr>
+    <a:masterClrMapping/>
+  </p:clrMapOvr>
+</p:sld>
+</file>
+
+<file path=ppt/slides/slide48.xml><?xml version="1.0" encoding="utf-8"?>
+<p:sld xmlns:a="http://schemas.openxmlformats.org/drawingml/2006/main" xmlns:r="http://schemas.openxmlformats.org/officeDocument/2006/relationships" xmlns:p="http://schemas.openxmlformats.org/presentationml/2006/main">
+  <p:cSld>
+    <p:spTree>
+      <p:nvGrpSpPr>
+        <p:cNvPr id="1" name=""/>
+        <p:cNvGrpSpPr/>
+        <p:nvPr/>
+      </p:nvGrpSpPr>
+      <p:grpSpPr>
+        <a:xfrm>
+          <a:off x="0" y="0"/>
+          <a:ext cx="0" cy="0"/>
+          <a:chOff x="0" y="0"/>
+          <a:chExt cx="0" cy="0"/>
+        </a:xfrm>
+      </p:grpSpPr>
+      <p:sp>
+        <p:nvSpPr>
+          <p:cNvPr id="7" name="Title 6">
+            <a:extLst>
+              <a:ext uri="{FF2B5EF4-FFF2-40B4-BE49-F238E27FC236}">
+                <a16:creationId xmlns:a16="http://schemas.microsoft.com/office/drawing/2014/main" id="{495B4BC0-844B-4414-A623-BEF78AAC1BA1}"/>
+              </a:ext>
+            </a:extLst>
+          </p:cNvPr>
+          <p:cNvSpPr>
+            <a:spLocks noGrp="1"/>
+          </p:cNvSpPr>
+          <p:nvPr>
+            <p:ph type="title"/>
+          </p:nvPr>
+        </p:nvSpPr>
+        <p:spPr/>
+        <p:txBody>
+          <a:bodyPr/>
+          <a:lstStyle/>
+          <a:p>
+            <a:r>
+              <a:rPr lang="en-US" dirty="0"/>
+              <a:t>ACKNOWLEDGMENTS</a:t>
+            </a:r>
+          </a:p>
+        </p:txBody>
+      </p:sp>
+      <p:sp>
+        <p:nvSpPr>
+          <p:cNvPr id="8" name="Content Placeholder 7">
+            <a:extLst>
+              <a:ext uri="{FF2B5EF4-FFF2-40B4-BE49-F238E27FC236}">
+                <a16:creationId xmlns:a16="http://schemas.microsoft.com/office/drawing/2014/main" id="{2BED3EB3-7E98-4A82-8335-7321D9E37B16}"/>
+              </a:ext>
+            </a:extLst>
+          </p:cNvPr>
+          <p:cNvSpPr>
+            <a:spLocks noGrp="1"/>
+          </p:cNvSpPr>
+          <p:nvPr>
+            <p:ph idx="1"/>
+          </p:nvPr>
+        </p:nvSpPr>
+        <p:spPr/>
+        <p:txBody>
+          <a:bodyPr/>
+          <a:lstStyle/>
+          <a:p>
+            <a:r>
+              <a:rPr lang="en-US" dirty="0"/>
+              <a:t>The Bash Logo is licensed for free use under the Copyleft license.</a:t>
+            </a:r>
+          </a:p>
+          <a:p>
+            <a:r>
+              <a:rPr lang="en-US" dirty="0"/>
+              <a:t>The bash screenshot on Slide 2 is R and Bash running under a </a:t>
+            </a:r>
+            <a:r>
+              <a:rPr lang="en-US" dirty="0" err="1"/>
+              <a:t>Remmina</a:t>
+            </a:r>
+            <a:r>
+              <a:rPr lang="en-US" dirty="0"/>
+              <a:t> connection.</a:t>
+            </a:r>
+          </a:p>
+          <a:p>
+            <a:r>
+              <a:rPr lang="en-US" dirty="0"/>
+              <a:t>The picture on Slide 6 is licensed under Creative Commons Attribution-</a:t>
+            </a:r>
+            <a:r>
+              <a:rPr lang="en-US" dirty="0" err="1"/>
+              <a:t>ShareAlike</a:t>
+            </a:r>
+            <a:r>
+              <a:rPr lang="en-US" dirty="0"/>
+              <a:t> 4.0 International, created by </a:t>
+            </a:r>
+            <a:r>
+              <a:rPr lang="en-US" dirty="0" err="1"/>
+              <a:t>Gorthmog</a:t>
+            </a:r>
+            <a:endParaRPr lang="en-US" dirty="0"/>
+          </a:p>
+        </p:txBody>
+      </p:sp>
+      <p:sp>
+        <p:nvSpPr>
+          <p:cNvPr id="4" name="Date Placeholder 3">
+            <a:extLst>
+              <a:ext uri="{FF2B5EF4-FFF2-40B4-BE49-F238E27FC236}">
+                <a16:creationId xmlns:a16="http://schemas.microsoft.com/office/drawing/2014/main" id="{540F37F1-4F33-429F-A568-1A3ADC499E54}"/>
+              </a:ext>
+            </a:extLst>
+          </p:cNvPr>
+          <p:cNvSpPr>
+            <a:spLocks noGrp="1"/>
+          </p:cNvSpPr>
+          <p:nvPr>
+            <p:ph type="dt" sz="half" idx="10"/>
+          </p:nvPr>
+        </p:nvSpPr>
+        <p:spPr/>
+        <p:txBody>
+          <a:bodyPr/>
+          <a:lstStyle/>
+          <a:p>
+            <a:fld id="{B08FEED8-D7D4-44E9-BFBC-ED06B5996D94}" type="datetime4">
+              <a:rPr lang="en-US" smtClean="0"/>
+              <a:t>August 19, 2019</a:t>
+            </a:fld>
+            <a:endParaRPr lang="en-US" dirty="0"/>
+          </a:p>
+        </p:txBody>
+      </p:sp>
+      <p:sp>
+        <p:nvSpPr>
+          <p:cNvPr id="5" name="Footer Placeholder 4">
+            <a:extLst>
+              <a:ext uri="{FF2B5EF4-FFF2-40B4-BE49-F238E27FC236}">
+                <a16:creationId xmlns:a16="http://schemas.microsoft.com/office/drawing/2014/main" id="{673FFA57-C126-4795-A5F6-DD33AAC5ACBD}"/>
+              </a:ext>
+            </a:extLst>
+          </p:cNvPr>
+          <p:cNvSpPr>
+            <a:spLocks noGrp="1"/>
+          </p:cNvSpPr>
+          <p:nvPr>
+            <p:ph type="ftr" sz="quarter" idx="11"/>
+          </p:nvPr>
+        </p:nvSpPr>
+        <p:spPr/>
+        <p:txBody>
+          <a:bodyPr/>
+          <a:lstStyle/>
+          <a:p>
+            <a:r>
+              <a:rPr lang="en-US"/>
+              <a:t>Digital Scholarship Services </a:t>
+            </a:r>
+            <a:r>
+              <a:rPr lang="en-US">
+                <a:solidFill>
+                  <a:schemeClr val="accent1">
+                    <a:lumMod val="50000"/>
+                  </a:schemeClr>
+                </a:solidFill>
+              </a:rPr>
+              <a:t>| Email</a:t>
+            </a:r>
+            <a:r>
+              <a:rPr lang="en-US"/>
+              <a:t> cf24@rice.edu </a:t>
+            </a:r>
+            <a:r>
+              <a:rPr lang="en-US">
+                <a:solidFill>
+                  <a:schemeClr val="accent1">
+                    <a:lumMod val="50000"/>
+                  </a:schemeClr>
+                </a:solidFill>
+              </a:rPr>
+              <a:t>|</a:t>
+            </a:r>
+            <a:r>
+              <a:rPr lang="en-US"/>
+              <a:t> library.rice.edu/dss</a:t>
+            </a:r>
+            <a:endParaRPr lang="en-US" dirty="0"/>
+          </a:p>
+        </p:txBody>
+      </p:sp>
+      <p:sp>
+        <p:nvSpPr>
+          <p:cNvPr id="6" name="Slide Number Placeholder 5">
+            <a:extLst>
+              <a:ext uri="{FF2B5EF4-FFF2-40B4-BE49-F238E27FC236}">
+                <a16:creationId xmlns:a16="http://schemas.microsoft.com/office/drawing/2014/main" id="{2FA49567-BB70-4798-8746-D0B522CCEE20}"/>
+              </a:ext>
+            </a:extLst>
+          </p:cNvPr>
+          <p:cNvSpPr>
+            <a:spLocks noGrp="1"/>
+          </p:cNvSpPr>
+          <p:nvPr>
+            <p:ph type="sldNum" sz="quarter" idx="12"/>
+          </p:nvPr>
+        </p:nvSpPr>
+        <p:spPr/>
+        <p:txBody>
+          <a:bodyPr/>
+          <a:lstStyle/>
+          <a:p>
+            <a:fld id="{D57F1E4F-1CFF-5643-939E-02111984F565}" type="slidenum">
+              <a:rPr lang="en-US" smtClean="0"/>
+              <a:t>48</a:t>
             </a:fld>
             <a:endParaRPr lang="en-US" dirty="0"/>
           </a:p>
@@ -15782,7 +16179,7 @@
             <a:pPr lvl="2"/>
             <a:r>
               <a:rPr lang="en-US" dirty="0"/>
-              <a:t>Say you have your Microsoft Office installed to an external hard drive, and not the customary C:/ location. You can’t</a:t>
+              <a:t>Say you have your Microsoft Office installed to an external hard drive, and not the customary C:/ location. You can’t expect everyone on other computers to do this as well!</a:t>
             </a:r>
           </a:p>
           <a:p>
@@ -15824,7 +16221,7 @@
           <a:p>
             <a:fld id="{8AAE40A0-A7D8-4DC3-BC9E-BADA32DA2004}" type="datetime4">
               <a:rPr lang="en-US" smtClean="0"/>
-              <a:t>August 16, 2019</a:t>
+              <a:t>August 19, 2019</a:t>
             </a:fld>
             <a:endParaRPr lang="en-US" dirty="0"/>
           </a:p>
@@ -16075,7 +16472,7 @@
           <a:p>
             <a:fld id="{8AAE40A0-A7D8-4DC3-BC9E-BADA32DA2004}" type="datetime4">
               <a:rPr lang="en-US" smtClean="0"/>
-              <a:t>August 16, 2019</a:t>
+              <a:t>August 19, 2019</a:t>
             </a:fld>
             <a:endParaRPr lang="en-US" dirty="0"/>
           </a:p>
@@ -16277,7 +16674,7 @@
           <a:p>
             <a:fld id="{8AAE40A0-A7D8-4DC3-BC9E-BADA32DA2004}" type="datetime4">
               <a:rPr lang="en-US" smtClean="0"/>
-              <a:t>August 16, 2019</a:t>
+              <a:t>August 19, 2019</a:t>
             </a:fld>
             <a:endParaRPr lang="en-US" dirty="0"/>
           </a:p>
@@ -16715,7 +17112,7 @@
           <a:p>
             <a:fld id="{8AAE40A0-A7D8-4DC3-BC9E-BADA32DA2004}" type="datetime4">
               <a:rPr lang="en-US" smtClean="0"/>
-              <a:t>August 16, 2019</a:t>
+              <a:t>August 19, 2019</a:t>
             </a:fld>
             <a:endParaRPr lang="en-US" dirty="0"/>
           </a:p>
@@ -16916,7 +17313,7 @@
           <a:p>
             <a:fld id="{8AAE40A0-A7D8-4DC3-BC9E-BADA32DA2004}" type="datetime4">
               <a:rPr lang="en-US" smtClean="0"/>
-              <a:t>August 16, 2019</a:t>
+              <a:t>August 19, 2019</a:t>
             </a:fld>
             <a:endParaRPr lang="en-US" dirty="0"/>
           </a:p>

</xml_diff>

<commit_message>
more on pipes and pattern matching
</commit_message>
<xml_diff>
--- a/bash/Introduction to Bash.pptx
+++ b/bash/Introduction to Bash.pptx
@@ -245,7 +245,7 @@
           <a:p>
             <a:fld id="{D46E3B93-8523-4DBC-8FC5-65A9B9CDE5EE}" type="datetimeFigureOut">
               <a:rPr lang="en-US" smtClean="0"/>
-              <a:t>8/20/2019</a:t>
+              <a:t>8/22/2019</a:t>
             </a:fld>
             <a:endParaRPr lang="en-US"/>
           </a:p>
@@ -641,7 +641,7 @@
           <a:p>
             <a:fld id="{CE8F6EB4-B6EF-44F6-BBD1-CD5E279CFAE2}" type="datetime4">
               <a:rPr lang="en-US" smtClean="0"/>
-              <a:t>August 20, 2019</a:t>
+              <a:t>August 22, 2019</a:t>
             </a:fld>
             <a:endParaRPr lang="en-US" dirty="0"/>
           </a:p>
@@ -813,7 +813,7 @@
           <a:p>
             <a:fld id="{8A405AA7-4C18-4A99-8AAA-8677C1976FC9}" type="datetime4">
               <a:rPr lang="en-US" smtClean="0"/>
-              <a:t>August 20, 2019</a:t>
+              <a:t>August 22, 2019</a:t>
             </a:fld>
             <a:endParaRPr lang="en-US" dirty="0"/>
           </a:p>
@@ -995,7 +995,7 @@
           <a:p>
             <a:fld id="{4EA0D668-33DD-41B9-B668-7E7FF430C345}" type="datetime4">
               <a:rPr lang="en-US" smtClean="0"/>
-              <a:t>August 20, 2019</a:t>
+              <a:t>August 22, 2019</a:t>
             </a:fld>
             <a:endParaRPr lang="en-US" dirty="0"/>
           </a:p>
@@ -1178,7 +1178,7 @@
           <a:p>
             <a:fld id="{8AAE40A0-A7D8-4DC3-BC9E-BADA32DA2004}" type="datetime4">
               <a:rPr lang="en-US" smtClean="0"/>
-              <a:t>August 20, 2019</a:t>
+              <a:t>August 22, 2019</a:t>
             </a:fld>
             <a:endParaRPr lang="en-US" dirty="0"/>
           </a:p>
@@ -1505,7 +1505,7 @@
           <a:p>
             <a:fld id="{B08FEED8-D7D4-44E9-BFBC-ED06B5996D94}" type="datetime4">
               <a:rPr lang="en-US" smtClean="0"/>
-              <a:t>August 20, 2019</a:t>
+              <a:t>August 22, 2019</a:t>
             </a:fld>
             <a:endParaRPr lang="en-US" dirty="0"/>
           </a:p>
@@ -1815,7 +1815,7 @@
           <a:p>
             <a:fld id="{A143C325-9442-4629-8CC6-5CAC69736C93}" type="datetime4">
               <a:rPr lang="en-US" smtClean="0"/>
-              <a:t>August 20, 2019</a:t>
+              <a:t>August 22, 2019</a:t>
             </a:fld>
             <a:endParaRPr lang="en-US" dirty="0"/>
           </a:p>
@@ -2183,7 +2183,7 @@
           <a:p>
             <a:fld id="{EEDAFACB-3FED-4607-9FDD-34A82581A119}" type="datetime4">
               <a:rPr lang="en-US" smtClean="0"/>
-              <a:t>August 20, 2019</a:t>
+              <a:t>August 22, 2019</a:t>
             </a:fld>
             <a:endParaRPr lang="en-US" dirty="0"/>
           </a:p>
@@ -2304,7 +2304,7 @@
           <a:p>
             <a:fld id="{EC2805D6-2E3E-42F7-ABBA-DCD51C704328}" type="datetime4">
               <a:rPr lang="en-US" smtClean="0"/>
-              <a:t>August 20, 2019</a:t>
+              <a:t>August 22, 2019</a:t>
             </a:fld>
             <a:endParaRPr lang="en-US" dirty="0"/>
           </a:p>
@@ -2403,7 +2403,7 @@
           <a:p>
             <a:fld id="{7A745AAB-8888-45FB-8C4E-B86AF9A05200}" type="datetime4">
               <a:rPr lang="en-US" smtClean="0"/>
-              <a:t>August 20, 2019</a:t>
+              <a:t>August 22, 2019</a:t>
             </a:fld>
             <a:endParaRPr lang="en-US" dirty="0"/>
           </a:p>
@@ -2682,7 +2682,7 @@
           <a:p>
             <a:fld id="{9F896CED-8AFA-412F-B61A-472E6093CDBA}" type="datetime4">
               <a:rPr lang="en-US" smtClean="0"/>
-              <a:t>August 20, 2019</a:t>
+              <a:t>August 22, 2019</a:t>
             </a:fld>
             <a:endParaRPr lang="en-US" dirty="0"/>
           </a:p>
@@ -2941,7 +2941,7 @@
           <a:p>
             <a:fld id="{61078AB2-2970-444D-B1FF-A9F37FC020F5}" type="datetime4">
               <a:rPr lang="en-US" smtClean="0"/>
-              <a:t>August 20, 2019</a:t>
+              <a:t>August 22, 2019</a:t>
             </a:fld>
             <a:endParaRPr lang="en-US" dirty="0"/>
           </a:p>
@@ -3159,7 +3159,7 @@
           <a:p>
             <a:fld id="{1148AE1E-D441-45CD-8192-49B13802301D}" type="datetime4">
               <a:rPr lang="en-US" smtClean="0"/>
-              <a:t>August 20, 2019</a:t>
+              <a:t>August 22, 2019</a:t>
             </a:fld>
             <a:endParaRPr lang="en-US" dirty="0"/>
           </a:p>
@@ -3956,7 +3956,7 @@
           <a:p>
             <a:fld id="{B08FEED8-D7D4-44E9-BFBC-ED06B5996D94}" type="datetime4">
               <a:rPr lang="en-US" smtClean="0"/>
-              <a:t>August 20, 2019</a:t>
+              <a:t>August 22, 2019</a:t>
             </a:fld>
             <a:endParaRPr lang="en-US" dirty="0"/>
           </a:p>
@@ -4399,7 +4399,7 @@
           <a:p>
             <a:fld id="{B08FEED8-D7D4-44E9-BFBC-ED06B5996D94}" type="datetime4">
               <a:rPr lang="en-US" smtClean="0"/>
-              <a:t>August 20, 2019</a:t>
+              <a:t>August 22, 2019</a:t>
             </a:fld>
             <a:endParaRPr lang="en-US" dirty="0"/>
           </a:p>
@@ -4901,7 +4901,7 @@
           <a:p>
             <a:fld id="{B08FEED8-D7D4-44E9-BFBC-ED06B5996D94}" type="datetime4">
               <a:rPr lang="en-US" smtClean="0"/>
-              <a:t>August 20, 2019</a:t>
+              <a:t>August 22, 2019</a:t>
             </a:fld>
             <a:endParaRPr lang="en-US" dirty="0"/>
           </a:p>
@@ -5369,7 +5369,7 @@
           <a:p>
             <a:fld id="{B08FEED8-D7D4-44E9-BFBC-ED06B5996D94}" type="datetime4">
               <a:rPr lang="en-US" smtClean="0"/>
-              <a:t>August 20, 2019</a:t>
+              <a:t>August 22, 2019</a:t>
             </a:fld>
             <a:endParaRPr lang="en-US" dirty="0"/>
           </a:p>
@@ -5841,7 +5841,7 @@
           <a:p>
             <a:fld id="{B08FEED8-D7D4-44E9-BFBC-ED06B5996D94}" type="datetime4">
               <a:rPr lang="en-US" smtClean="0"/>
-              <a:t>August 20, 2019</a:t>
+              <a:t>August 22, 2019</a:t>
             </a:fld>
             <a:endParaRPr lang="en-US" dirty="0"/>
           </a:p>
@@ -6263,7 +6263,7 @@
           <a:p>
             <a:fld id="{8AAE40A0-A7D8-4DC3-BC9E-BADA32DA2004}" type="datetime4">
               <a:rPr lang="en-US" smtClean="0"/>
-              <a:t>August 20, 2019</a:t>
+              <a:t>August 22, 2019</a:t>
             </a:fld>
             <a:endParaRPr lang="en-US" dirty="0"/>
           </a:p>
@@ -6533,7 +6533,7 @@
           <a:p>
             <a:fld id="{8AAE40A0-A7D8-4DC3-BC9E-BADA32DA2004}" type="datetime4">
               <a:rPr lang="en-US" smtClean="0"/>
-              <a:t>August 20, 2019</a:t>
+              <a:t>August 22, 2019</a:t>
             </a:fld>
             <a:endParaRPr lang="en-US" dirty="0"/>
           </a:p>
@@ -6774,7 +6774,7 @@
           <a:p>
             <a:fld id="{8AAE40A0-A7D8-4DC3-BC9E-BADA32DA2004}" type="datetime4">
               <a:rPr lang="en-US" smtClean="0"/>
-              <a:t>August 20, 2019</a:t>
+              <a:t>August 22, 2019</a:t>
             </a:fld>
             <a:endParaRPr lang="en-US" dirty="0"/>
           </a:p>
@@ -7033,7 +7033,7 @@
           <a:p>
             <a:fld id="{8AAE40A0-A7D8-4DC3-BC9E-BADA32DA2004}" type="datetime4">
               <a:rPr lang="en-US" smtClean="0"/>
-              <a:t>August 20, 2019</a:t>
+              <a:t>August 22, 2019</a:t>
             </a:fld>
             <a:endParaRPr lang="en-US" dirty="0"/>
           </a:p>
@@ -7236,7 +7236,7 @@
           <a:p>
             <a:fld id="{8AAE40A0-A7D8-4DC3-BC9E-BADA32DA2004}" type="datetime4">
               <a:rPr lang="en-US" smtClean="0"/>
-              <a:t>August 20, 2019</a:t>
+              <a:t>August 22, 2019</a:t>
             </a:fld>
             <a:endParaRPr lang="en-US" dirty="0"/>
           </a:p>
@@ -7439,7 +7439,7 @@
             <a:fld id="{8AAE40A0-A7D8-4DC3-BC9E-BADA32DA2004}" type="datetime4">
               <a:rPr lang="en-US" smtClean="0"/>
               <a:pPr/>
-              <a:t>August 20, 2019</a:t>
+              <a:t>August 22, 2019</a:t>
             </a:fld>
             <a:endParaRPr lang="en-US" dirty="0"/>
           </a:p>
@@ -7779,8 +7779,8 @@
           </a:p>
         </p:txBody>
       </p:sp>
-      <mc:AlternateContent xmlns:mc="http://schemas.openxmlformats.org/markup-compatibility/2006">
-        <mc:Choice xmlns:a14="http://schemas.microsoft.com/office/drawing/2010/main" Requires="a14">
+      <mc:AlternateContent xmlns:mc="http://schemas.openxmlformats.org/markup-compatibility/2006" xmlns:a14="http://schemas.microsoft.com/office/drawing/2010/main">
+        <mc:Choice Requires="a14">
           <p:sp>
             <p:nvSpPr>
               <p:cNvPr id="3" name="Content Placeholder 2">
@@ -8367,7 +8367,7 @@
             </p:txBody>
           </p:sp>
         </mc:Choice>
-        <mc:Fallback>
+        <mc:Fallback xmlns="">
           <p:sp>
             <p:nvSpPr>
               <p:cNvPr id="3" name="Content Placeholder 2">
@@ -8430,7 +8430,7 @@
           <a:p>
             <a:fld id="{8AAE40A0-A7D8-4DC3-BC9E-BADA32DA2004}" type="datetime4">
               <a:rPr lang="en-US" smtClean="0"/>
-              <a:t>August 20, 2019</a:t>
+              <a:t>August 22, 2019</a:t>
             </a:fld>
             <a:endParaRPr lang="en-US" dirty="0"/>
           </a:p>
@@ -8580,8 +8580,8 @@
           </a:p>
         </p:txBody>
       </p:sp>
-      <mc:AlternateContent xmlns:mc="http://schemas.openxmlformats.org/markup-compatibility/2006">
-        <mc:Choice xmlns:a14="http://schemas.microsoft.com/office/drawing/2010/main" Requires="a14">
+      <mc:AlternateContent xmlns:mc="http://schemas.openxmlformats.org/markup-compatibility/2006" xmlns:a14="http://schemas.microsoft.com/office/drawing/2010/main">
+        <mc:Choice Requires="a14">
           <p:sp>
             <p:nvSpPr>
               <p:cNvPr id="3" name="Content Placeholder 2">
@@ -8970,7 +8970,7 @@
             </p:txBody>
           </p:sp>
         </mc:Choice>
-        <mc:Fallback>
+        <mc:Fallback xmlns="">
           <p:sp>
             <p:nvSpPr>
               <p:cNvPr id="3" name="Content Placeholder 2">
@@ -9033,7 +9033,7 @@
           <a:p>
             <a:fld id="{8AAE40A0-A7D8-4DC3-BC9E-BADA32DA2004}" type="datetime4">
               <a:rPr lang="en-US" smtClean="0"/>
-              <a:t>August 20, 2019</a:t>
+              <a:t>August 22, 2019</a:t>
             </a:fld>
             <a:endParaRPr lang="en-US" dirty="0"/>
           </a:p>
@@ -9266,7 +9266,7 @@
           <a:p>
             <a:fld id="{8AAE40A0-A7D8-4DC3-BC9E-BADA32DA2004}" type="datetime4">
               <a:rPr lang="en-US" smtClean="0"/>
-              <a:t>August 20, 2019</a:t>
+              <a:t>August 22, 2019</a:t>
             </a:fld>
             <a:endParaRPr lang="en-US" dirty="0"/>
           </a:p>
@@ -9506,7 +9506,7 @@
           <a:p>
             <a:fld id="{8AAE40A0-A7D8-4DC3-BC9E-BADA32DA2004}" type="datetime4">
               <a:rPr lang="en-US" smtClean="0"/>
-              <a:t>August 20, 2019</a:t>
+              <a:t>August 22, 2019</a:t>
             </a:fld>
             <a:endParaRPr lang="en-US" dirty="0"/>
           </a:p>
@@ -9866,7 +9866,7 @@
           <a:p>
             <a:fld id="{8AAE40A0-A7D8-4DC3-BC9E-BADA32DA2004}" type="datetime4">
               <a:rPr lang="en-US" smtClean="0"/>
-              <a:t>August 20, 2019</a:t>
+              <a:t>August 22, 2019</a:t>
             </a:fld>
             <a:endParaRPr lang="en-US" dirty="0"/>
           </a:p>
@@ -10170,7 +10170,7 @@
           <a:p>
             <a:fld id="{8AAE40A0-A7D8-4DC3-BC9E-BADA32DA2004}" type="datetime4">
               <a:rPr lang="en-US" smtClean="0"/>
-              <a:t>August 20, 2019</a:t>
+              <a:t>August 22, 2019</a:t>
             </a:fld>
             <a:endParaRPr lang="en-US" dirty="0"/>
           </a:p>
@@ -10343,7 +10343,47 @@
           <a:p>
             <a:r>
               <a:rPr lang="en-US" dirty="0"/>
-              <a:t>The most direct shell regex program</a:t>
+              <a:t>Search for strings in files or in program output</a:t>
+            </a:r>
+          </a:p>
+          <a:p>
+            <a:r>
+              <a:rPr lang="en-US" dirty="0"/>
+              <a:t>I always recommend quoting your regular expressions!</a:t>
+            </a:r>
+          </a:p>
+          <a:p>
+            <a:r>
+              <a:rPr lang="en-US" dirty="0">
+                <a:latin typeface="Courier New" panose="02070309020205020404" pitchFamily="49" charset="0"/>
+                <a:cs typeface="Courier New" panose="02070309020205020404" pitchFamily="49" charset="0"/>
+              </a:rPr>
+              <a:t>grep “\</a:t>
+            </a:r>
+            <a:r>
+              <a:rPr lang="en-US" dirty="0" err="1">
+                <a:latin typeface="Courier New" panose="02070309020205020404" pitchFamily="49" charset="0"/>
+                <a:cs typeface="Courier New" panose="02070309020205020404" pitchFamily="49" charset="0"/>
+              </a:rPr>
+              <a:t>bF</a:t>
+            </a:r>
+            <a:r>
+              <a:rPr lang="en-US" dirty="0">
+                <a:latin typeface="Courier New" panose="02070309020205020404" pitchFamily="49" charset="0"/>
+                <a:cs typeface="Courier New" panose="02070309020205020404" pitchFamily="49" charset="0"/>
+              </a:rPr>
+              <a:t>” countries.txt </a:t>
+            </a:r>
+            <a:r>
+              <a:rPr lang="en-US" dirty="0"/>
+              <a:t>would find all countries starting with the letter F</a:t>
+            </a:r>
+          </a:p>
+          <a:p>
+            <a:pPr lvl="1"/>
+            <a:r>
+              <a:rPr lang="en-US" dirty="0"/>
+              <a:t>\b means word boundary</a:t>
             </a:r>
           </a:p>
         </p:txBody>
@@ -10371,7 +10411,7 @@
           <a:p>
             <a:fld id="{8AAE40A0-A7D8-4DC3-BC9E-BADA32DA2004}" type="datetime4">
               <a:rPr lang="en-US" smtClean="0"/>
-              <a:t>August 20, 2019</a:t>
+              <a:t>August 22, 2019</a:t>
             </a:fld>
             <a:endParaRPr lang="en-US" dirty="0"/>
           </a:p>
@@ -10542,7 +10582,140 @@
           <a:bodyPr/>
           <a:lstStyle/>
           <a:p>
-            <a:endParaRPr lang="en-US" dirty="0"/>
+            <a:r>
+              <a:rPr lang="en-US" dirty="0"/>
+              <a:t>Replacing strings within files</a:t>
+            </a:r>
+          </a:p>
+          <a:p>
+            <a:r>
+              <a:rPr lang="en-US" dirty="0"/>
+              <a:t>Options I like:</a:t>
+            </a:r>
+          </a:p>
+          <a:p>
+            <a:pPr lvl="1"/>
+            <a:r>
+              <a:rPr lang="en-US" dirty="0">
+                <a:latin typeface="Courier New" panose="02070309020205020404" pitchFamily="49" charset="0"/>
+                <a:cs typeface="Courier New" panose="02070309020205020404" pitchFamily="49" charset="0"/>
+              </a:rPr>
+              <a:t>-</a:t>
+            </a:r>
+            <a:r>
+              <a:rPr lang="en-US" dirty="0" err="1">
+                <a:latin typeface="Courier New" panose="02070309020205020404" pitchFamily="49" charset="0"/>
+                <a:cs typeface="Courier New" panose="02070309020205020404" pitchFamily="49" charset="0"/>
+              </a:rPr>
+              <a:t>i</a:t>
+            </a:r>
+            <a:r>
+              <a:rPr lang="en-US" dirty="0">
+                <a:latin typeface="Courier New" panose="02070309020205020404" pitchFamily="49" charset="0"/>
+                <a:cs typeface="Courier New" panose="02070309020205020404" pitchFamily="49" charset="0"/>
+              </a:rPr>
+              <a:t> </a:t>
+            </a:r>
+            <a:r>
+              <a:rPr lang="en-US" dirty="0"/>
+              <a:t>means modify the file in-place instead of making a new one.</a:t>
+            </a:r>
+          </a:p>
+          <a:p>
+            <a:pPr lvl="1"/>
+            <a:r>
+              <a:rPr lang="en-US" dirty="0">
+                <a:latin typeface="Courier New" panose="02070309020205020404" pitchFamily="49" charset="0"/>
+                <a:cs typeface="Courier New" panose="02070309020205020404" pitchFamily="49" charset="0"/>
+              </a:rPr>
+              <a:t>-r</a:t>
+            </a:r>
+            <a:r>
+              <a:rPr lang="en-US" dirty="0"/>
+              <a:t> means use regex. If you don’t use this, the replacement will be literal.</a:t>
+            </a:r>
+          </a:p>
+          <a:p>
+            <a:r>
+              <a:rPr lang="en-US" dirty="0"/>
+              <a:t>replace syntax examples:</a:t>
+            </a:r>
+          </a:p>
+          <a:p>
+            <a:pPr lvl="1"/>
+            <a:r>
+              <a:rPr lang="en-US" dirty="0">
+                <a:latin typeface="Courier New" panose="02070309020205020404" pitchFamily="49" charset="0"/>
+                <a:cs typeface="Courier New" panose="02070309020205020404" pitchFamily="49" charset="0"/>
+              </a:rPr>
+              <a:t>sed -</a:t>
+            </a:r>
+            <a:r>
+              <a:rPr lang="en-US" dirty="0" err="1">
+                <a:latin typeface="Courier New" panose="02070309020205020404" pitchFamily="49" charset="0"/>
+                <a:cs typeface="Courier New" panose="02070309020205020404" pitchFamily="49" charset="0"/>
+              </a:rPr>
+              <a:t>i</a:t>
+            </a:r>
+            <a:r>
+              <a:rPr lang="en-US" dirty="0">
+                <a:latin typeface="Courier New" panose="02070309020205020404" pitchFamily="49" charset="0"/>
+                <a:cs typeface="Courier New" panose="02070309020205020404" pitchFamily="49" charset="0"/>
+              </a:rPr>
+              <a:t> “s/</a:t>
+            </a:r>
+            <a:r>
+              <a:rPr lang="en-US" dirty="0" err="1">
+                <a:latin typeface="Courier New" panose="02070309020205020404" pitchFamily="49" charset="0"/>
+                <a:cs typeface="Courier New" panose="02070309020205020404" pitchFamily="49" charset="0"/>
+              </a:rPr>
+              <a:t>doller</a:t>
+            </a:r>
+            <a:r>
+              <a:rPr lang="en-US" dirty="0">
+                <a:latin typeface="Courier New" panose="02070309020205020404" pitchFamily="49" charset="0"/>
+                <a:cs typeface="Courier New" panose="02070309020205020404" pitchFamily="49" charset="0"/>
+              </a:rPr>
+              <a:t>/dollar/g” file.txt</a:t>
+            </a:r>
+          </a:p>
+          <a:p>
+            <a:pPr lvl="2"/>
+            <a:r>
+              <a:rPr lang="en-US" dirty="0"/>
+              <a:t>s for search, g for globally replace</a:t>
+            </a:r>
+          </a:p>
+          <a:p>
+            <a:pPr lvl="1"/>
+            <a:r>
+              <a:rPr lang="en-US" dirty="0">
+                <a:latin typeface="Courier New" panose="02070309020205020404" pitchFamily="49" charset="0"/>
+                <a:cs typeface="Courier New" panose="02070309020205020404" pitchFamily="49" charset="0"/>
+              </a:rPr>
+              <a:t>sed –</a:t>
+            </a:r>
+            <a:r>
+              <a:rPr lang="en-US" dirty="0" err="1">
+                <a:latin typeface="Courier New" panose="02070309020205020404" pitchFamily="49" charset="0"/>
+                <a:cs typeface="Courier New" panose="02070309020205020404" pitchFamily="49" charset="0"/>
+              </a:rPr>
+              <a:t>ir</a:t>
+            </a:r>
+            <a:r>
+              <a:rPr lang="en-US" dirty="0">
+                <a:latin typeface="Courier New" panose="02070309020205020404" pitchFamily="49" charset="0"/>
+                <a:cs typeface="Courier New" panose="02070309020205020404" pitchFamily="49" charset="0"/>
+              </a:rPr>
+              <a:t> “s/Season([0-9]+) Episode ([0-9]+)/S\1E\2/g” seasons.txt</a:t>
+            </a:r>
+          </a:p>
+          <a:p>
+            <a:pPr lvl="2"/>
+            <a:r>
+              <a:rPr lang="en-US" dirty="0"/>
+              <a:t>If you want to replace with strings depending on what you match, use \1, \2, etc. Make sure you enclose the important parts of the pattern with parentheses!</a:t>
+            </a:r>
           </a:p>
         </p:txBody>
       </p:sp>
@@ -10569,7 +10742,7 @@
           <a:p>
             <a:fld id="{8AAE40A0-A7D8-4DC3-BC9E-BADA32DA2004}" type="datetime4">
               <a:rPr lang="en-US" smtClean="0"/>
-              <a:t>August 20, 2019</a:t>
+              <a:t>August 22, 2019</a:t>
             </a:fld>
             <a:endParaRPr lang="en-US" dirty="0"/>
           </a:p>
@@ -10898,7 +11071,7 @@
           <a:p>
             <a:fld id="{8AAE40A0-A7D8-4DC3-BC9E-BADA32DA2004}" type="datetime4">
               <a:rPr lang="en-US" smtClean="0"/>
-              <a:t>August 20, 2019</a:t>
+              <a:t>August 22, 2019</a:t>
             </a:fld>
             <a:endParaRPr lang="en-US" dirty="0"/>
           </a:p>
@@ -11251,7 +11424,7 @@
           <a:p>
             <a:fld id="{8AAE40A0-A7D8-4DC3-BC9E-BADA32DA2004}" type="datetime4">
               <a:rPr lang="en-US" smtClean="0"/>
-              <a:t>August 20, 2019</a:t>
+              <a:t>August 22, 2019</a:t>
             </a:fld>
             <a:endParaRPr lang="en-US" dirty="0"/>
           </a:p>
@@ -11494,7 +11667,7 @@
           <a:p>
             <a:fld id="{8AAE40A0-A7D8-4DC3-BC9E-BADA32DA2004}" type="datetime4">
               <a:rPr lang="en-US" smtClean="0"/>
-              <a:t>August 20, 2019</a:t>
+              <a:t>August 22, 2019</a:t>
             </a:fld>
             <a:endParaRPr lang="en-US" dirty="0"/>
           </a:p>
@@ -11666,45 +11839,95 @@
           <a:lstStyle/>
           <a:p>
             <a:r>
-              <a:rPr lang="en-US" dirty="0"/>
-              <a:t>Sending output to a different program</a:t>
-            </a:r>
-          </a:p>
-          <a:p>
-            <a:r>
-              <a:rPr lang="en-US" dirty="0"/>
-              <a:t>Use |</a:t>
-            </a:r>
-          </a:p>
-          <a:p>
-            <a:r>
-              <a:rPr lang="en-US" dirty="0"/>
-              <a:t>echo “echo” | </a:t>
-            </a:r>
-          </a:p>
-          <a:p>
-            <a:r>
-              <a:rPr lang="en-US" dirty="0"/>
-              <a:t>By default, only </a:t>
-            </a:r>
-            <a:r>
-              <a:rPr lang="en-US" dirty="0" err="1"/>
-              <a:t>stdout</a:t>
-            </a:r>
-            <a:endParaRPr lang="en-US" dirty="0"/>
-          </a:p>
-          <a:p>
-            <a:pPr lvl="1"/>
-            <a:r>
-              <a:rPr lang="en-US" dirty="0"/>
-              <a:t>Can pipe stderr with </a:t>
-            </a:r>
-            <a:r>
               <a:rPr lang="en-US" dirty="0">
                 <a:latin typeface="Courier New" panose="02070309020205020404" pitchFamily="49" charset="0"/>
                 <a:cs typeface="Courier New" panose="02070309020205020404" pitchFamily="49" charset="0"/>
               </a:rPr>
+              <a:t>|</a:t>
+            </a:r>
+            <a:r>
+              <a:rPr lang="en-US" dirty="0"/>
+              <a:t> character</a:t>
+            </a:r>
+          </a:p>
+          <a:p>
+            <a:r>
+              <a:rPr lang="en-US" dirty="0"/>
+              <a:t>Sends forms of output to a different program</a:t>
+            </a:r>
+          </a:p>
+          <a:p>
+            <a:r>
+              <a:rPr lang="en-US" dirty="0"/>
+              <a:t>By default, only </a:t>
+            </a:r>
+            <a:r>
+              <a:rPr lang="en-US" dirty="0" err="1"/>
+              <a:t>stdout</a:t>
+            </a:r>
+            <a:endParaRPr lang="en-US" dirty="0"/>
+          </a:p>
+          <a:p>
+            <a:pPr lvl="1"/>
+            <a:r>
+              <a:rPr lang="en-US" dirty="0"/>
+              <a:t>Can pipe stderr with </a:t>
+            </a:r>
+            <a:r>
+              <a:rPr lang="en-US" dirty="0">
+                <a:latin typeface="Courier New" panose="02070309020205020404" pitchFamily="49" charset="0"/>
+                <a:cs typeface="Courier New" panose="02070309020205020404" pitchFamily="49" charset="0"/>
+              </a:rPr>
               <a:t>|&amp;</a:t>
+            </a:r>
+          </a:p>
+          <a:p>
+            <a:r>
+              <a:rPr lang="en-US" dirty="0">
+                <a:latin typeface="Calibri" panose="020F0502020204030204" pitchFamily="34" charset="0"/>
+                <a:cs typeface="Calibri" panose="020F0502020204030204" pitchFamily="34" charset="0"/>
+              </a:rPr>
+              <a:t>Useful to avoid intermediate storing of data in temporary files</a:t>
+            </a:r>
+          </a:p>
+          <a:p>
+            <a:r>
+              <a:rPr lang="en-US" dirty="0">
+                <a:latin typeface="Calibri" panose="020F0502020204030204" pitchFamily="34" charset="0"/>
+                <a:cs typeface="Calibri" panose="020F0502020204030204" pitchFamily="34" charset="0"/>
+              </a:rPr>
+              <a:t>To sequentially pattern replace:</a:t>
+            </a:r>
+          </a:p>
+          <a:p>
+            <a:pPr lvl="1"/>
+            <a:r>
+              <a:rPr lang="en-US" dirty="0">
+                <a:latin typeface="Calibri" panose="020F0502020204030204" pitchFamily="34" charset="0"/>
+                <a:cs typeface="Calibri" panose="020F0502020204030204" pitchFamily="34" charset="0"/>
+              </a:rPr>
+              <a:t>Say we have a bunch of items in a list, but we don’t want to manually number them because we think they may change, so we just use # as </a:t>
+            </a:r>
+            <a:r>
+              <a:rPr lang="en-US">
+                <a:latin typeface="Calibri" panose="020F0502020204030204" pitchFamily="34" charset="0"/>
+                <a:cs typeface="Calibri" panose="020F0502020204030204" pitchFamily="34" charset="0"/>
+              </a:rPr>
+              <a:t>a placeholder</a:t>
+            </a:r>
+            <a:endParaRPr lang="en-US" dirty="0">
+              <a:latin typeface="Calibri" panose="020F0502020204030204" pitchFamily="34" charset="0"/>
+              <a:cs typeface="Calibri" panose="020F0502020204030204" pitchFamily="34" charset="0"/>
+            </a:endParaRPr>
+          </a:p>
+          <a:p>
+            <a:pPr lvl="1"/>
+            <a:r>
+              <a:rPr lang="en-US" dirty="0">
+                <a:latin typeface="Calibri" panose="020F0502020204030204" pitchFamily="34" charset="0"/>
+                <a:cs typeface="Calibri" panose="020F0502020204030204" pitchFamily="34" charset="0"/>
+              </a:rPr>
+              <a:t>sed “s/\b#\b/1st/” &lt;file.txt | sed “s/\b#\b/2nd/” | …</a:t>
             </a:r>
           </a:p>
         </p:txBody>
@@ -11732,7 +11955,7 @@
           <a:p>
             <a:fld id="{8AAE40A0-A7D8-4DC3-BC9E-BADA32DA2004}" type="datetime4">
               <a:rPr lang="en-US" smtClean="0"/>
-              <a:t>August 20, 2019</a:t>
+              <a:t>August 22, 2019</a:t>
             </a:fld>
             <a:endParaRPr lang="en-US" dirty="0"/>
           </a:p>
@@ -11930,7 +12153,7 @@
           <a:p>
             <a:fld id="{8AAE40A0-A7D8-4DC3-BC9E-BADA32DA2004}" type="datetime4">
               <a:rPr lang="en-US" smtClean="0"/>
-              <a:t>August 20, 2019</a:t>
+              <a:t>August 22, 2019</a:t>
             </a:fld>
             <a:endParaRPr lang="en-US" dirty="0"/>
           </a:p>
@@ -12174,7 +12397,7 @@
           <a:p>
             <a:fld id="{8AAE40A0-A7D8-4DC3-BC9E-BADA32DA2004}" type="datetime4">
               <a:rPr lang="en-US" smtClean="0"/>
-              <a:t>August 20, 2019</a:t>
+              <a:t>August 22, 2019</a:t>
             </a:fld>
             <a:endParaRPr lang="en-US" dirty="0"/>
           </a:p>
@@ -12547,7 +12770,7 @@
           <a:p>
             <a:fld id="{8AAE40A0-A7D8-4DC3-BC9E-BADA32DA2004}" type="datetime4">
               <a:rPr lang="en-US" smtClean="0"/>
-              <a:t>August 20, 2019</a:t>
+              <a:t>August 22, 2019</a:t>
             </a:fld>
             <a:endParaRPr lang="en-US" dirty="0"/>
           </a:p>
@@ -12745,7 +12968,7 @@
           <a:p>
             <a:fld id="{8AAE40A0-A7D8-4DC3-BC9E-BADA32DA2004}" type="datetime4">
               <a:rPr lang="en-US" smtClean="0"/>
-              <a:t>August 20, 2019</a:t>
+              <a:t>August 22, 2019</a:t>
             </a:fld>
             <a:endParaRPr lang="en-US" dirty="0"/>
           </a:p>
@@ -12943,7 +13166,7 @@
           <a:p>
             <a:fld id="{8AAE40A0-A7D8-4DC3-BC9E-BADA32DA2004}" type="datetime4">
               <a:rPr lang="en-US" smtClean="0"/>
-              <a:t>August 20, 2019</a:t>
+              <a:t>August 22, 2019</a:t>
             </a:fld>
             <a:endParaRPr lang="en-US" dirty="0"/>
           </a:p>
@@ -13198,7 +13421,7 @@
           <a:p>
             <a:fld id="{8AAE40A0-A7D8-4DC3-BC9E-BADA32DA2004}" type="datetime4">
               <a:rPr lang="en-US" smtClean="0"/>
-              <a:t>August 20, 2019</a:t>
+              <a:t>August 22, 2019</a:t>
             </a:fld>
             <a:endParaRPr lang="en-US" dirty="0"/>
           </a:p>
@@ -13399,7 +13622,7 @@
           <a:p>
             <a:fld id="{8AAE40A0-A7D8-4DC3-BC9E-BADA32DA2004}" type="datetime4">
               <a:rPr lang="en-US" smtClean="0"/>
-              <a:t>August 20, 2019</a:t>
+              <a:t>August 22, 2019</a:t>
             </a:fld>
             <a:endParaRPr lang="en-US" dirty="0"/>
           </a:p>
@@ -13663,7 +13886,7 @@
           <a:p>
             <a:fld id="{8AAE40A0-A7D8-4DC3-BC9E-BADA32DA2004}" type="datetime4">
               <a:rPr lang="en-US" smtClean="0"/>
-              <a:t>August 20, 2019</a:t>
+              <a:t>August 22, 2019</a:t>
             </a:fld>
             <a:endParaRPr lang="en-US" dirty="0"/>
           </a:p>
@@ -13913,7 +14136,7 @@
           <a:p>
             <a:fld id="{8AAE40A0-A7D8-4DC3-BC9E-BADA32DA2004}" type="datetime4">
               <a:rPr lang="en-US" smtClean="0"/>
-              <a:t>August 20, 2019</a:t>
+              <a:t>August 22, 2019</a:t>
             </a:fld>
             <a:endParaRPr lang="en-US" dirty="0"/>
           </a:p>
@@ -14181,7 +14404,7 @@
           <a:p>
             <a:fld id="{8AAE40A0-A7D8-4DC3-BC9E-BADA32DA2004}" type="datetime4">
               <a:rPr lang="en-US" smtClean="0"/>
-              <a:t>August 20, 2019</a:t>
+              <a:t>August 22, 2019</a:t>
             </a:fld>
             <a:endParaRPr lang="en-US" dirty="0"/>
           </a:p>
@@ -14379,7 +14602,7 @@
           <a:p>
             <a:fld id="{8AAE40A0-A7D8-4DC3-BC9E-BADA32DA2004}" type="datetime4">
               <a:rPr lang="en-US" smtClean="0"/>
-              <a:t>August 20, 2019</a:t>
+              <a:t>August 22, 2019</a:t>
             </a:fld>
             <a:endParaRPr lang="en-US" dirty="0"/>
           </a:p>
@@ -14583,7 +14806,7 @@
           <a:p>
             <a:fld id="{8AAE40A0-A7D8-4DC3-BC9E-BADA32DA2004}" type="datetime4">
               <a:rPr lang="en-US" smtClean="0"/>
-              <a:t>August 20, 2019</a:t>
+              <a:t>August 22, 2019</a:t>
             </a:fld>
             <a:endParaRPr lang="en-US" dirty="0"/>
           </a:p>
@@ -14793,7 +15016,7 @@
           <a:p>
             <a:fld id="{8AAE40A0-A7D8-4DC3-BC9E-BADA32DA2004}" type="datetime4">
               <a:rPr lang="en-US" smtClean="0"/>
-              <a:t>August 20, 2019</a:t>
+              <a:t>August 22, 2019</a:t>
             </a:fld>
             <a:endParaRPr lang="en-US" dirty="0"/>
           </a:p>
@@ -14997,7 +15220,7 @@
           <a:p>
             <a:fld id="{8AAE40A0-A7D8-4DC3-BC9E-BADA32DA2004}" type="datetime4">
               <a:rPr lang="en-US" smtClean="0"/>
-              <a:t>August 20, 2019</a:t>
+              <a:t>August 22, 2019</a:t>
             </a:fld>
             <a:endParaRPr lang="en-US" dirty="0"/>
           </a:p>
@@ -15234,7 +15457,7 @@
           <a:p>
             <a:fld id="{8AAE40A0-A7D8-4DC3-BC9E-BADA32DA2004}" type="datetime4">
               <a:rPr lang="en-US" smtClean="0"/>
-              <a:t>August 20, 2019</a:t>
+              <a:t>August 22, 2019</a:t>
             </a:fld>
             <a:endParaRPr lang="en-US" dirty="0"/>
           </a:p>
@@ -15504,7 +15727,7 @@
           <a:p>
             <a:fld id="{8AAE40A0-A7D8-4DC3-BC9E-BADA32DA2004}" type="datetime4">
               <a:rPr lang="en-US" smtClean="0"/>
-              <a:t>August 20, 2019</a:t>
+              <a:t>August 22, 2019</a:t>
             </a:fld>
             <a:endParaRPr lang="en-US" dirty="0"/>
           </a:p>
@@ -15815,7 +16038,7 @@
           <a:p>
             <a:fld id="{8AAE40A0-A7D8-4DC3-BC9E-BADA32DA2004}" type="datetime4">
               <a:rPr lang="en-US" smtClean="0"/>
-              <a:t>August 20, 2019</a:t>
+              <a:t>August 22, 2019</a:t>
             </a:fld>
             <a:endParaRPr lang="en-US" dirty="0"/>
           </a:p>
@@ -16075,7 +16298,7 @@
           <a:p>
             <a:fld id="{8AAE40A0-A7D8-4DC3-BC9E-BADA32DA2004}" type="datetime4">
               <a:rPr lang="en-US" smtClean="0"/>
-              <a:t>August 20, 2019</a:t>
+              <a:t>August 22, 2019</a:t>
             </a:fld>
             <a:endParaRPr lang="en-US" dirty="0"/>
           </a:p>
@@ -16279,7 +16502,7 @@
           <a:p>
             <a:fld id="{8AAE40A0-A7D8-4DC3-BC9E-BADA32DA2004}" type="datetime4">
               <a:rPr lang="en-US" smtClean="0"/>
-              <a:t>August 20, 2019</a:t>
+              <a:t>August 22, 2019</a:t>
             </a:fld>
             <a:endParaRPr lang="en-US" dirty="0"/>
           </a:p>
@@ -16513,7 +16736,7 @@
           <a:p>
             <a:fld id="{B08FEED8-D7D4-44E9-BFBC-ED06B5996D94}" type="datetime4">
               <a:rPr lang="en-US" smtClean="0"/>
-              <a:t>August 20, 2019</a:t>
+              <a:t>August 22, 2019</a:t>
             </a:fld>
             <a:endParaRPr lang="en-US" dirty="0"/>
           </a:p>
@@ -16749,7 +16972,7 @@
           <a:p>
             <a:fld id="{8AAE40A0-A7D8-4DC3-BC9E-BADA32DA2004}" type="datetime4">
               <a:rPr lang="en-US" smtClean="0"/>
-              <a:t>August 20, 2019</a:t>
+              <a:t>August 22, 2019</a:t>
             </a:fld>
             <a:endParaRPr lang="en-US" dirty="0"/>
           </a:p>
@@ -17000,7 +17223,7 @@
           <a:p>
             <a:fld id="{8AAE40A0-A7D8-4DC3-BC9E-BADA32DA2004}" type="datetime4">
               <a:rPr lang="en-US" smtClean="0"/>
-              <a:t>August 20, 2019</a:t>
+              <a:t>August 22, 2019</a:t>
             </a:fld>
             <a:endParaRPr lang="en-US" dirty="0"/>
           </a:p>
@@ -17202,7 +17425,7 @@
           <a:p>
             <a:fld id="{8AAE40A0-A7D8-4DC3-BC9E-BADA32DA2004}" type="datetime4">
               <a:rPr lang="en-US" smtClean="0"/>
-              <a:t>August 20, 2019</a:t>
+              <a:t>August 22, 2019</a:t>
             </a:fld>
             <a:endParaRPr lang="en-US" dirty="0"/>
           </a:p>
@@ -17640,7 +17863,7 @@
           <a:p>
             <a:fld id="{8AAE40A0-A7D8-4DC3-BC9E-BADA32DA2004}" type="datetime4">
               <a:rPr lang="en-US" smtClean="0"/>
-              <a:t>August 20, 2019</a:t>
+              <a:t>August 22, 2019</a:t>
             </a:fld>
             <a:endParaRPr lang="en-US" dirty="0"/>
           </a:p>
@@ -17841,7 +18064,7 @@
           <a:p>
             <a:fld id="{8AAE40A0-A7D8-4DC3-BC9E-BADA32DA2004}" type="datetime4">
               <a:rPr lang="en-US" smtClean="0"/>
-              <a:t>August 20, 2019</a:t>
+              <a:t>August 22, 2019</a:t>
             </a:fld>
             <a:endParaRPr lang="en-US" dirty="0"/>
           </a:p>

</xml_diff>